<commit_message>
added made slides for testing added pretty things to ci. Also excersizes
</commit_message>
<xml_diff>
--- a/continuous_integration.pptx
+++ b/continuous_integration.pptx
@@ -5,25 +5,26 @@
     <p:sldMasterId id="2147483660" r:id="rId1"/>
   </p:sldMasterIdLst>
   <p:notesMasterIdLst>
-    <p:notesMasterId r:id="rId15"/>
+    <p:notesMasterId r:id="rId16"/>
   </p:notesMasterIdLst>
   <p:handoutMasterIdLst>
-    <p:handoutMasterId r:id="rId16"/>
+    <p:handoutMasterId r:id="rId17"/>
   </p:handoutMasterIdLst>
   <p:sldIdLst>
     <p:sldId id="273" r:id="rId2"/>
-    <p:sldId id="302" r:id="rId3"/>
-    <p:sldId id="300" r:id="rId4"/>
-    <p:sldId id="301" r:id="rId5"/>
-    <p:sldId id="304" r:id="rId6"/>
-    <p:sldId id="305" r:id="rId7"/>
-    <p:sldId id="306" r:id="rId8"/>
-    <p:sldId id="308" r:id="rId9"/>
+    <p:sldId id="300" r:id="rId3"/>
+    <p:sldId id="301" r:id="rId4"/>
+    <p:sldId id="311" r:id="rId5"/>
+    <p:sldId id="305" r:id="rId6"/>
+    <p:sldId id="306" r:id="rId7"/>
+    <p:sldId id="308" r:id="rId8"/>
+    <p:sldId id="312" r:id="rId9"/>
     <p:sldId id="309" r:id="rId10"/>
-    <p:sldId id="299" r:id="rId11"/>
-    <p:sldId id="307" r:id="rId12"/>
-    <p:sldId id="288" r:id="rId13"/>
-    <p:sldId id="298" r:id="rId14"/>
+    <p:sldId id="313" r:id="rId11"/>
+    <p:sldId id="299" r:id="rId12"/>
+    <p:sldId id="307" r:id="rId13"/>
+    <p:sldId id="288" r:id="rId14"/>
+    <p:sldId id="298" r:id="rId15"/>
   </p:sldIdLst>
   <p:sldSz cx="9144000" cy="6858000" type="screen4x3"/>
   <p:notesSz cx="6858000" cy="9144000"/>
@@ -158,14 +159,15 @@
         <p14:section name="Untitled Section" id="{BAA15BF6-FE96-3445-86D7-BE737DCC358B}">
           <p14:sldIdLst>
             <p14:sldId id="273"/>
-            <p14:sldId id="302"/>
             <p14:sldId id="300"/>
             <p14:sldId id="301"/>
-            <p14:sldId id="304"/>
+            <p14:sldId id="311"/>
             <p14:sldId id="305"/>
             <p14:sldId id="306"/>
             <p14:sldId id="308"/>
+            <p14:sldId id="312"/>
             <p14:sldId id="309"/>
+            <p14:sldId id="313"/>
             <p14:sldId id="299"/>
             <p14:sldId id="307"/>
             <p14:sldId id="288"/>
@@ -275,7 +277,7 @@
             <a:fld id="{80AC11AF-147E-0A48-A5B0-8DA858D84551}" type="datetimeFigureOut">
               <a:rPr lang="en-US" smtClean="0"/>
               <a:pPr/>
-              <a:t>7/26/21</a:t>
+              <a:t>8/4/21</a:t>
             </a:fld>
             <a:endParaRPr lang="en-US"/>
           </a:p>
@@ -4704,7 +4706,7 @@
           <p:cNvPr id="2" name="Title 1">
             <a:extLst>
               <a:ext uri="{FF2B5EF4-FFF2-40B4-BE49-F238E27FC236}">
-                <a16:creationId xmlns:a16="http://schemas.microsoft.com/office/drawing/2014/main" id="{B7017452-BCB9-F741-8FCF-3C44B11F783B}"/>
+                <a16:creationId xmlns:a16="http://schemas.microsoft.com/office/drawing/2014/main" id="{33165359-9CD5-EF41-9C08-A5F425B6C08E}"/>
               </a:ext>
             </a:extLst>
           </p:cNvPr>
@@ -4717,18 +4719,12 @@
         </p:nvSpPr>
         <p:spPr/>
         <p:txBody>
-          <a:bodyPr>
-            <a:normAutofit fontScale="90000"/>
-          </a:bodyPr>
-          <a:lstStyle/>
-          <a:p>
-            <a:r>
-              <a:rPr lang="en-CH" dirty="0"/>
-              <a:t>Notes on how to use </a:t>
-            </a:r>
-            <a:r>
-              <a:rPr lang="en-CH"/>
-              <a:t>github actions (is this best practice?)</a:t>
+          <a:bodyPr/>
+          <a:lstStyle/>
+          <a:p>
+            <a:r>
+              <a:rPr lang="de-DE" dirty="0"/>
+              <a:t>Hands On!</a:t>
             </a:r>
             <a:endParaRPr lang="en-CH" dirty="0"/>
           </a:p>
@@ -4739,7 +4735,7 @@
           <p:cNvPr id="3" name="Content Placeholder 2">
             <a:extLst>
               <a:ext uri="{FF2B5EF4-FFF2-40B4-BE49-F238E27FC236}">
-                <a16:creationId xmlns:a16="http://schemas.microsoft.com/office/drawing/2014/main" id="{4C8340C5-F3D8-9449-92D1-7DDEB02F0756}"/>
+                <a16:creationId xmlns:a16="http://schemas.microsoft.com/office/drawing/2014/main" id="{1C9C9C51-D00C-9945-9623-98BDACA07638}"/>
               </a:ext>
             </a:extLst>
           </p:cNvPr>
@@ -4756,33 +4752,67 @@
           <a:lstStyle/>
           <a:p>
             <a:r>
-              <a:rPr lang="en-CH" dirty="0"/>
-              <a:t>set trigger to “push, pull_request” without branches so at every push you can see what is going on</a:t>
-            </a:r>
-          </a:p>
-          <a:p>
-            <a:r>
-              <a:rPr lang="en-CH" dirty="0"/>
-              <a:t>debug by looking at ”Actions/workflows” tabs</a:t>
-            </a:r>
-          </a:p>
-          <a:p>
-            <a:r>
-              <a:rPr lang="en-CH" dirty="0"/>
-              <a:t>once it works, add branches (typically master) if it makes more sense for you</a:t>
-            </a:r>
-          </a:p>
-          <a:p>
-            <a:r>
-              <a:rPr lang="en-CH" dirty="0"/>
-              <a:t>PR -&gt; Actions run</a:t>
-            </a:r>
-          </a:p>
-          <a:p>
-            <a:r>
-              <a:rPr lang="en-CH" dirty="0"/>
-              <a:t>Executed: 1) when pushed to branch, on branch current state 2) when PR is made, on PR branch final state 3) when merged to master (push), on the master+PR final status</a:t>
-            </a:r>
+              <a:rPr lang="de-DE" dirty="0"/>
+              <a:t>Add a CI </a:t>
+            </a:r>
+            <a:r>
+              <a:rPr lang="de-DE" dirty="0" err="1"/>
+              <a:t>pipeline</a:t>
+            </a:r>
+            <a:r>
+              <a:rPr lang="de-DE" dirty="0"/>
+              <a:t> </a:t>
+            </a:r>
+            <a:r>
+              <a:rPr lang="de-DE" dirty="0" err="1"/>
+              <a:t>to</a:t>
+            </a:r>
+            <a:r>
+              <a:rPr lang="de-DE" dirty="0"/>
+              <a:t> </a:t>
+            </a:r>
+            <a:r>
+              <a:rPr lang="de-DE" dirty="0" err="1"/>
+              <a:t>your</a:t>
+            </a:r>
+            <a:r>
+              <a:rPr lang="de-DE" dirty="0"/>
+              <a:t> </a:t>
+            </a:r>
+            <a:r>
+              <a:rPr lang="de-DE" dirty="0" err="1"/>
+              <a:t>logistic</a:t>
+            </a:r>
+            <a:r>
+              <a:rPr lang="de-DE" dirty="0"/>
+              <a:t> </a:t>
+            </a:r>
+            <a:r>
+              <a:rPr lang="de-DE" dirty="0" err="1"/>
+              <a:t>function</a:t>
+            </a:r>
+            <a:r>
+              <a:rPr lang="de-DE" dirty="0"/>
+              <a:t> </a:t>
+            </a:r>
+            <a:r>
+              <a:rPr lang="de-DE" dirty="0" err="1"/>
+              <a:t>project</a:t>
+            </a:r>
+            <a:r>
+              <a:rPr lang="de-DE" dirty="0"/>
+              <a:t>!</a:t>
+            </a:r>
+            <a:endParaRPr lang="en-CH" dirty="0"/>
+          </a:p>
+          <a:p>
+            <a:pPr marL="0" indent="0">
+              <a:buNone/>
+            </a:pPr>
+            <a:endParaRPr lang="en-CH" dirty="0"/>
+          </a:p>
+          <a:p>
+            <a:endParaRPr lang="en-CH" dirty="0"/>
           </a:p>
         </p:txBody>
       </p:sp>
@@ -4791,7 +4821,7 @@
           <p:cNvPr id="4" name="Date Placeholder 3">
             <a:extLst>
               <a:ext uri="{FF2B5EF4-FFF2-40B4-BE49-F238E27FC236}">
-                <a16:creationId xmlns:a16="http://schemas.microsoft.com/office/drawing/2014/main" id="{7394CC83-6E3D-F742-8F53-7736E40C9AA4}"/>
+                <a16:creationId xmlns:a16="http://schemas.microsoft.com/office/drawing/2014/main" id="{06E829B2-1694-924F-8E80-036B417E1533}"/>
               </a:ext>
             </a:extLst>
           </p:cNvPr>
@@ -4820,7 +4850,7 @@
           <p:cNvPr id="5" name="Footer Placeholder 4">
             <a:extLst>
               <a:ext uri="{FF2B5EF4-FFF2-40B4-BE49-F238E27FC236}">
-                <a16:creationId xmlns:a16="http://schemas.microsoft.com/office/drawing/2014/main" id="{D160849F-FCBE-794E-BA2F-348B46DAC22D}"/>
+                <a16:creationId xmlns:a16="http://schemas.microsoft.com/office/drawing/2014/main" id="{AFBE3539-299D-3540-AAA7-1CDBAAD0E777}"/>
               </a:ext>
             </a:extLst>
           </p:cNvPr>
@@ -4847,7 +4877,7 @@
     </p:spTree>
     <p:extLst>
       <p:ext uri="{BB962C8B-B14F-4D97-AF65-F5344CB8AC3E}">
-        <p14:creationId xmlns:p14="http://schemas.microsoft.com/office/powerpoint/2010/main" val="3061818551"/>
+        <p14:creationId xmlns:p14="http://schemas.microsoft.com/office/powerpoint/2010/main" val="492757597"/>
       </p:ext>
     </p:extLst>
   </p:cSld>
@@ -4879,7 +4909,7 @@
           <p:cNvPr id="2" name="Title 1">
             <a:extLst>
               <a:ext uri="{FF2B5EF4-FFF2-40B4-BE49-F238E27FC236}">
-                <a16:creationId xmlns:a16="http://schemas.microsoft.com/office/drawing/2014/main" id="{061016C8-512C-EB4B-9D32-9CF4CB9D4F11}"/>
+                <a16:creationId xmlns:a16="http://schemas.microsoft.com/office/drawing/2014/main" id="{B7017452-BCB9-F741-8FCF-3C44B11F783B}"/>
               </a:ext>
             </a:extLst>
           </p:cNvPr>
@@ -4892,13 +4922,20 @@
         </p:nvSpPr>
         <p:spPr/>
         <p:txBody>
-          <a:bodyPr/>
+          <a:bodyPr>
+            <a:normAutofit fontScale="90000"/>
+          </a:bodyPr>
           <a:lstStyle/>
           <a:p>
             <a:r>
               <a:rPr lang="en-CH" dirty="0"/>
-              <a:t>More advanced topics?</a:t>
-            </a:r>
+              <a:t>Notes on how to use </a:t>
+            </a:r>
+            <a:r>
+              <a:rPr lang="en-CH"/>
+              <a:t>github actions (is this best practice?)</a:t>
+            </a:r>
+            <a:endParaRPr lang="en-CH" dirty="0"/>
           </a:p>
         </p:txBody>
       </p:sp>
@@ -4907,7 +4944,7 @@
           <p:cNvPr id="3" name="Content Placeholder 2">
             <a:extLst>
               <a:ext uri="{FF2B5EF4-FFF2-40B4-BE49-F238E27FC236}">
-                <a16:creationId xmlns:a16="http://schemas.microsoft.com/office/drawing/2014/main" id="{463079FE-7331-C647-815D-07795DC7ED3D}"/>
+                <a16:creationId xmlns:a16="http://schemas.microsoft.com/office/drawing/2014/main" id="{4C8340C5-F3D8-9449-92D1-7DDEB02F0756}"/>
               </a:ext>
             </a:extLst>
           </p:cNvPr>
@@ -4925,7 +4962,95 @@
           <a:p>
             <a:r>
               <a:rPr lang="en-CH" dirty="0"/>
-              <a:t>Security: be careful with passwords and other sensitive information (“secrets”) even on private repositories (needed e.g. to push a package to PyPi). Each CI system has a way to do it safely. In the repository you store a token that is linked to a GitHub account and the actual secret is store encrypted by GitHub. The secret is then decrypted at the moment of running the job and added as environment variable (double-check)</a:t>
+              <a:t>set trigger to “push, pull_request” without branches so at every push you can see what is going on</a:t>
+            </a:r>
+          </a:p>
+          <a:p>
+            <a:r>
+              <a:rPr lang="en-CH" dirty="0"/>
+              <a:t>debug by looking at ”Actions/workflows” tabs</a:t>
+            </a:r>
+          </a:p>
+          <a:p>
+            <a:r>
+              <a:rPr lang="en-CH" dirty="0"/>
+              <a:t>once it works, add branches (</a:t>
+            </a:r>
+            <a:r>
+              <a:rPr lang="en-CH"/>
+              <a:t>typically </a:t>
+            </a:r>
+            <a:r>
+              <a:rPr lang="de-DE" dirty="0" err="1"/>
+              <a:t>main</a:t>
+            </a:r>
+            <a:r>
+              <a:rPr lang="en-CH"/>
+              <a:t>) </a:t>
+            </a:r>
+            <a:r>
+              <a:rPr lang="en-CH" dirty="0"/>
+              <a:t>if it makes more sense for you</a:t>
+            </a:r>
+          </a:p>
+          <a:p>
+            <a:r>
+              <a:rPr lang="en-CH" dirty="0"/>
+              <a:t>PR -&gt; Actions run</a:t>
+            </a:r>
+          </a:p>
+          <a:p>
+            <a:r>
+              <a:rPr lang="en-CH" dirty="0"/>
+              <a:t>Executed</a:t>
+            </a:r>
+            <a:r>
+              <a:rPr lang="en-CH"/>
+              <a:t>: </a:t>
+            </a:r>
+            <a:endParaRPr lang="de-DE" dirty="0"/>
+          </a:p>
+          <a:p>
+            <a:pPr lvl="1"/>
+            <a:r>
+              <a:rPr lang="en-CH"/>
+              <a:t>1</a:t>
+            </a:r>
+            <a:r>
+              <a:rPr lang="en-CH" dirty="0"/>
+              <a:t>) when pushed to branch, on branch current </a:t>
+            </a:r>
+            <a:r>
+              <a:rPr lang="en-CH"/>
+              <a:t>state </a:t>
+            </a:r>
+            <a:endParaRPr lang="de-DE" dirty="0"/>
+          </a:p>
+          <a:p>
+            <a:pPr lvl="1"/>
+            <a:r>
+              <a:rPr lang="en-CH"/>
+              <a:t>2</a:t>
+            </a:r>
+            <a:r>
+              <a:rPr lang="en-CH" dirty="0"/>
+              <a:t>) when PR is made, on PR branch final </a:t>
+            </a:r>
+            <a:r>
+              <a:rPr lang="en-CH"/>
+              <a:t>state </a:t>
+            </a:r>
+            <a:endParaRPr lang="de-DE" dirty="0"/>
+          </a:p>
+          <a:p>
+            <a:pPr lvl="1"/>
+            <a:r>
+              <a:rPr lang="en-CH"/>
+              <a:t>3</a:t>
+            </a:r>
+            <a:r>
+              <a:rPr lang="en-CH" dirty="0"/>
+              <a:t>) when merged to master (push), on the master+PR final status</a:t>
             </a:r>
           </a:p>
         </p:txBody>
@@ -4935,7 +5060,7 @@
           <p:cNvPr id="4" name="Date Placeholder 3">
             <a:extLst>
               <a:ext uri="{FF2B5EF4-FFF2-40B4-BE49-F238E27FC236}">
-                <a16:creationId xmlns:a16="http://schemas.microsoft.com/office/drawing/2014/main" id="{9EE323CB-7E09-7C4F-B160-F4B2E2E319F3}"/>
+                <a16:creationId xmlns:a16="http://schemas.microsoft.com/office/drawing/2014/main" id="{7394CC83-6E3D-F742-8F53-7736E40C9AA4}"/>
               </a:ext>
             </a:extLst>
           </p:cNvPr>
@@ -4964,7 +5089,7 @@
           <p:cNvPr id="5" name="Footer Placeholder 4">
             <a:extLst>
               <a:ext uri="{FF2B5EF4-FFF2-40B4-BE49-F238E27FC236}">
-                <a16:creationId xmlns:a16="http://schemas.microsoft.com/office/drawing/2014/main" id="{3453E2C3-64E5-E44E-8FAB-45D4F29AD119}"/>
+                <a16:creationId xmlns:a16="http://schemas.microsoft.com/office/drawing/2014/main" id="{D160849F-FCBE-794E-BA2F-348B46DAC22D}"/>
               </a:ext>
             </a:extLst>
           </p:cNvPr>
@@ -4991,7 +5116,7 @@
     </p:spTree>
     <p:extLst>
       <p:ext uri="{BB962C8B-B14F-4D97-AF65-F5344CB8AC3E}">
-        <p14:creationId xmlns:p14="http://schemas.microsoft.com/office/powerpoint/2010/main" val="2375245855"/>
+        <p14:creationId xmlns:p14="http://schemas.microsoft.com/office/powerpoint/2010/main" val="3061818551"/>
       </p:ext>
     </p:extLst>
   </p:cSld>
@@ -5020,6 +5145,150 @@
       </p:grpSpPr>
       <p:sp>
         <p:nvSpPr>
+          <p:cNvPr id="2" name="Title 1">
+            <a:extLst>
+              <a:ext uri="{FF2B5EF4-FFF2-40B4-BE49-F238E27FC236}">
+                <a16:creationId xmlns:a16="http://schemas.microsoft.com/office/drawing/2014/main" id="{061016C8-512C-EB4B-9D32-9CF4CB9D4F11}"/>
+              </a:ext>
+            </a:extLst>
+          </p:cNvPr>
+          <p:cNvSpPr>
+            <a:spLocks noGrp="1"/>
+          </p:cNvSpPr>
+          <p:nvPr>
+            <p:ph type="title"/>
+          </p:nvPr>
+        </p:nvSpPr>
+        <p:spPr/>
+        <p:txBody>
+          <a:bodyPr/>
+          <a:lstStyle/>
+          <a:p>
+            <a:r>
+              <a:rPr lang="en-CH" dirty="0"/>
+              <a:t>More advanced topics?</a:t>
+            </a:r>
+          </a:p>
+        </p:txBody>
+      </p:sp>
+      <p:sp>
+        <p:nvSpPr>
+          <p:cNvPr id="3" name="Content Placeholder 2">
+            <a:extLst>
+              <a:ext uri="{FF2B5EF4-FFF2-40B4-BE49-F238E27FC236}">
+                <a16:creationId xmlns:a16="http://schemas.microsoft.com/office/drawing/2014/main" id="{463079FE-7331-C647-815D-07795DC7ED3D}"/>
+              </a:ext>
+            </a:extLst>
+          </p:cNvPr>
+          <p:cNvSpPr>
+            <a:spLocks noGrp="1"/>
+          </p:cNvSpPr>
+          <p:nvPr>
+            <p:ph sz="quarter" idx="1"/>
+          </p:nvPr>
+        </p:nvSpPr>
+        <p:spPr/>
+        <p:txBody>
+          <a:bodyPr/>
+          <a:lstStyle/>
+          <a:p>
+            <a:r>
+              <a:rPr lang="en-CH" dirty="0"/>
+              <a:t>Security: be careful with passwords and other sensitive information (“secrets”) even on private repositories (needed e.g. to push a package to PyPi). Each CI system has a way to do it safely. In the repository you store a token that is linked to a GitHub account and the actual secret is store encrypted by GitHub. The secret is then decrypted at the moment of running the job and added as environment variable (double-check)</a:t>
+            </a:r>
+          </a:p>
+        </p:txBody>
+      </p:sp>
+      <p:sp>
+        <p:nvSpPr>
+          <p:cNvPr id="4" name="Date Placeholder 3">
+            <a:extLst>
+              <a:ext uri="{FF2B5EF4-FFF2-40B4-BE49-F238E27FC236}">
+                <a16:creationId xmlns:a16="http://schemas.microsoft.com/office/drawing/2014/main" id="{9EE323CB-7E09-7C4F-B160-F4B2E2E319F3}"/>
+              </a:ext>
+            </a:extLst>
+          </p:cNvPr>
+          <p:cNvSpPr>
+            <a:spLocks noGrp="1"/>
+          </p:cNvSpPr>
+          <p:nvPr>
+            <p:ph type="dt" sz="half" idx="10"/>
+          </p:nvPr>
+        </p:nvSpPr>
+        <p:spPr/>
+        <p:txBody>
+          <a:bodyPr/>
+          <a:lstStyle/>
+          <a:p>
+            <a:r>
+              <a:rPr lang="en-US" sz="1000"/>
+              <a:t>August 2019, CC BY-SA 4.0</a:t>
+            </a:r>
+            <a:endParaRPr lang="en-US" sz="1000" dirty="0"/>
+          </a:p>
+        </p:txBody>
+      </p:sp>
+      <p:sp>
+        <p:nvSpPr>
+          <p:cNvPr id="5" name="Footer Placeholder 4">
+            <a:extLst>
+              <a:ext uri="{FF2B5EF4-FFF2-40B4-BE49-F238E27FC236}">
+                <a16:creationId xmlns:a16="http://schemas.microsoft.com/office/drawing/2014/main" id="{3453E2C3-64E5-E44E-8FAB-45D4F29AD119}"/>
+              </a:ext>
+            </a:extLst>
+          </p:cNvPr>
+          <p:cNvSpPr>
+            <a:spLocks noGrp="1"/>
+          </p:cNvSpPr>
+          <p:nvPr>
+            <p:ph type="ftr" sz="quarter" idx="11"/>
+          </p:nvPr>
+        </p:nvSpPr>
+        <p:spPr/>
+        <p:txBody>
+          <a:bodyPr/>
+          <a:lstStyle/>
+          <a:p>
+            <a:r>
+              <a:rPr lang="en-US"/>
+              <a:t>Testing scientific code, v12.0</a:t>
+            </a:r>
+            <a:endParaRPr lang="en-US" dirty="0"/>
+          </a:p>
+        </p:txBody>
+      </p:sp>
+    </p:spTree>
+    <p:extLst>
+      <p:ext uri="{BB962C8B-B14F-4D97-AF65-F5344CB8AC3E}">
+        <p14:creationId xmlns:p14="http://schemas.microsoft.com/office/powerpoint/2010/main" val="2375245855"/>
+      </p:ext>
+    </p:extLst>
+  </p:cSld>
+  <p:clrMapOvr>
+    <a:masterClrMapping/>
+  </p:clrMapOvr>
+</p:sld>
+</file>
+
+<file path=ppt/slides/slide13.xml><?xml version="1.0" encoding="utf-8"?>
+<p:sld xmlns:a="http://schemas.openxmlformats.org/drawingml/2006/main" xmlns:r="http://schemas.openxmlformats.org/officeDocument/2006/relationships" xmlns:p="http://schemas.openxmlformats.org/presentationml/2006/main">
+  <p:cSld>
+    <p:spTree>
+      <p:nvGrpSpPr>
+        <p:cNvPr id="1" name=""/>
+        <p:cNvGrpSpPr/>
+        <p:nvPr/>
+      </p:nvGrpSpPr>
+      <p:grpSpPr>
+        <a:xfrm>
+          <a:off x="0" y="0"/>
+          <a:ext cx="0" cy="0"/>
+          <a:chOff x="0" y="0"/>
+          <a:chExt cx="0" cy="0"/>
+        </a:xfrm>
+      </p:grpSpPr>
+      <p:sp>
+        <p:nvSpPr>
           <p:cNvPr id="3" name="Date Placeholder 2"/>
           <p:cNvSpPr>
             <a:spLocks noGrp="1"/>
@@ -5100,7 +5369,7 @@
 </p:sld>
 </file>
 
-<file path=ppt/slides/slide13.xml><?xml version="1.0" encoding="utf-8"?>
+<file path=ppt/slides/slide14.xml><?xml version="1.0" encoding="utf-8"?>
 <p:sld xmlns:a="http://schemas.openxmlformats.org/drawingml/2006/main" xmlns:r="http://schemas.openxmlformats.org/officeDocument/2006/relationships" xmlns:p="http://schemas.openxmlformats.org/presentationml/2006/main">
   <p:cSld>
     <p:spTree>
@@ -5191,7 +5460,7 @@
           <p:cNvPr id="2" name="Title 1">
             <a:extLst>
               <a:ext uri="{FF2B5EF4-FFF2-40B4-BE49-F238E27FC236}">
-                <a16:creationId xmlns:a16="http://schemas.microsoft.com/office/drawing/2014/main" id="{849C4DE7-FDDA-9943-BF91-88CD85DFA84A}"/>
+                <a16:creationId xmlns:a16="http://schemas.microsoft.com/office/drawing/2014/main" id="{74FAFB2A-D26F-3648-9ACC-0C945867D509}"/>
               </a:ext>
             </a:extLst>
           </p:cNvPr>
@@ -5207,7 +5476,10 @@
           <a:bodyPr/>
           <a:lstStyle/>
           <a:p>
-            <a:endParaRPr lang="en-CH"/>
+            <a:r>
+              <a:rPr lang="en-CH" dirty="0"/>
+              <a:t>Topics</a:t>
+            </a:r>
           </a:p>
         </p:txBody>
       </p:sp>
@@ -5216,7 +5488,7 @@
           <p:cNvPr id="3" name="Content Placeholder 2">
             <a:extLst>
               <a:ext uri="{FF2B5EF4-FFF2-40B4-BE49-F238E27FC236}">
-                <a16:creationId xmlns:a16="http://schemas.microsoft.com/office/drawing/2014/main" id="{681FE9DF-4488-DF45-937D-CBAFBDB114B8}"/>
+                <a16:creationId xmlns:a16="http://schemas.microsoft.com/office/drawing/2014/main" id="{D1748B23-D002-AC42-BEAB-62C2B74F2CC0}"/>
               </a:ext>
             </a:extLst>
           </p:cNvPr>
@@ -5229,13 +5501,90 @@
         </p:nvSpPr>
         <p:spPr/>
         <p:txBody>
-          <a:bodyPr/>
+          <a:bodyPr>
+            <a:normAutofit fontScale="92500" lnSpcReduction="10000"/>
+          </a:bodyPr>
           <a:lstStyle/>
           <a:p>
             <a:r>
               <a:rPr lang="en-CH" dirty="0"/>
-              <a:t>I just made a mind dump so far</a:t>
-            </a:r>
+              <a:t>What is it, why</a:t>
+            </a:r>
+          </a:p>
+          <a:p>
+            <a:pPr lvl="1"/>
+            <a:r>
+              <a:rPr lang="en-CH" dirty="0"/>
+              <a:t>automatize non-coding-related tasks</a:t>
+            </a:r>
+          </a:p>
+          <a:p>
+            <a:pPr lvl="1"/>
+            <a:r>
+              <a:rPr lang="en-CH" dirty="0"/>
+              <a:t>“it worked on my machine”</a:t>
+            </a:r>
+          </a:p>
+          <a:p>
+            <a:r>
+              <a:rPr lang="en-CH" dirty="0"/>
+              <a:t>Concepts: events, CI server, virtual machine, jobs</a:t>
+            </a:r>
+          </a:p>
+          <a:p>
+            <a:r>
+              <a:rPr lang="en-CH" dirty="0"/>
+              <a:t>Examples of most typical jobs</a:t>
+            </a:r>
+          </a:p>
+          <a:p>
+            <a:r>
+              <a:rPr lang="en-CH" dirty="0"/>
+              <a:t>Options: Travis CI, Circle CI, Github Actions</a:t>
+            </a:r>
+          </a:p>
+          <a:p>
+            <a:r>
+              <a:rPr lang="en-CH" dirty="0"/>
+              <a:t>Github Actions</a:t>
+            </a:r>
+          </a:p>
+          <a:p>
+            <a:pPr lvl="1"/>
+            <a:r>
+              <a:rPr lang="en-CH" dirty="0"/>
+              <a:t>architecture</a:t>
+            </a:r>
+          </a:p>
+          <a:p>
+            <a:pPr lvl="1"/>
+            <a:r>
+              <a:rPr lang="en-CH" dirty="0"/>
+              <a:t>demonstration and how to debug</a:t>
+            </a:r>
+          </a:p>
+          <a:p>
+            <a:pPr lvl="1"/>
+            <a:r>
+              <a:rPr lang="en-CH" dirty="0"/>
+              <a:t>exercise</a:t>
+            </a:r>
+          </a:p>
+          <a:p>
+            <a:pPr lvl="1"/>
+            <a:r>
+              <a:rPr lang="en-CH" dirty="0"/>
+              <a:t>security: workflow is not executed on first-time commits from branches</a:t>
+            </a:r>
+          </a:p>
+          <a:p>
+            <a:r>
+              <a:rPr lang="en-CH" dirty="0"/>
+              <a:t>Security topics: secrets (just mention)</a:t>
+            </a:r>
+          </a:p>
+          <a:p>
+            <a:endParaRPr lang="en-CH" dirty="0"/>
           </a:p>
         </p:txBody>
       </p:sp>
@@ -5244,7 +5593,7 @@
           <p:cNvPr id="4" name="Date Placeholder 3">
             <a:extLst>
               <a:ext uri="{FF2B5EF4-FFF2-40B4-BE49-F238E27FC236}">
-                <a16:creationId xmlns:a16="http://schemas.microsoft.com/office/drawing/2014/main" id="{05C48504-7183-A64D-82EE-3521E6B67BB3}"/>
+                <a16:creationId xmlns:a16="http://schemas.microsoft.com/office/drawing/2014/main" id="{E74925CE-05A2-3549-9CB0-B7F21222958D}"/>
               </a:ext>
             </a:extLst>
           </p:cNvPr>
@@ -5273,7 +5622,7 @@
           <p:cNvPr id="5" name="Footer Placeholder 4">
             <a:extLst>
               <a:ext uri="{FF2B5EF4-FFF2-40B4-BE49-F238E27FC236}">
-                <a16:creationId xmlns:a16="http://schemas.microsoft.com/office/drawing/2014/main" id="{F2B58AB4-DE38-A942-9C0D-DE54006E8C9E}"/>
+                <a16:creationId xmlns:a16="http://schemas.microsoft.com/office/drawing/2014/main" id="{3C08F752-A120-1F40-8C6F-85F7D166FCC6}"/>
               </a:ext>
             </a:extLst>
           </p:cNvPr>
@@ -5300,7 +5649,7 @@
     </p:spTree>
     <p:extLst>
       <p:ext uri="{BB962C8B-B14F-4D97-AF65-F5344CB8AC3E}">
-        <p14:creationId xmlns:p14="http://schemas.microsoft.com/office/powerpoint/2010/main" val="2445880835"/>
+        <p14:creationId xmlns:p14="http://schemas.microsoft.com/office/powerpoint/2010/main" val="4210066346"/>
       </p:ext>
     </p:extLst>
   </p:cSld>
@@ -5332,7 +5681,7 @@
           <p:cNvPr id="2" name="Title 1">
             <a:extLst>
               <a:ext uri="{FF2B5EF4-FFF2-40B4-BE49-F238E27FC236}">
-                <a16:creationId xmlns:a16="http://schemas.microsoft.com/office/drawing/2014/main" id="{74FAFB2A-D26F-3648-9ACC-0C945867D509}"/>
+                <a16:creationId xmlns:a16="http://schemas.microsoft.com/office/drawing/2014/main" id="{4993AE45-A766-0F4D-9D65-D692ECB4ED00}"/>
               </a:ext>
             </a:extLst>
           </p:cNvPr>
@@ -5350,7 +5699,7 @@
           <a:p>
             <a:r>
               <a:rPr lang="en-CH" dirty="0"/>
-              <a:t>Topics</a:t>
+              <a:t>Continuous Integration</a:t>
             </a:r>
           </a:p>
         </p:txBody>
@@ -5360,7 +5709,7 @@
           <p:cNvPr id="3" name="Content Placeholder 2">
             <a:extLst>
               <a:ext uri="{FF2B5EF4-FFF2-40B4-BE49-F238E27FC236}">
-                <a16:creationId xmlns:a16="http://schemas.microsoft.com/office/drawing/2014/main" id="{D1748B23-D002-AC42-BEAB-62C2B74F2CC0}"/>
+                <a16:creationId xmlns:a16="http://schemas.microsoft.com/office/drawing/2014/main" id="{993A7968-BAB0-2A48-B1DC-9A91DE873775}"/>
               </a:ext>
             </a:extLst>
           </p:cNvPr>
@@ -5373,90 +5722,97 @@
         </p:nvSpPr>
         <p:spPr/>
         <p:txBody>
-          <a:bodyPr>
-            <a:normAutofit fontScale="92500" lnSpcReduction="10000"/>
-          </a:bodyPr>
+          <a:bodyPr/>
           <a:lstStyle/>
           <a:p>
             <a:r>
               <a:rPr lang="en-CH" dirty="0"/>
-              <a:t>What is it, why</a:t>
+              <a:t>Merging the code of multiple contributor often, multiple times a day (originally this was a challenge, there was a person who was in charge of merging things on the main branch). Now merging is peanuts</a:t>
+            </a:r>
+          </a:p>
+          <a:p>
+            <a:r>
+              <a:rPr lang="en-CH" dirty="0"/>
+              <a:t>Today it’s a set of tools and practices to make sure that a project with many contributors (&gt;= 1) runs smoothly</a:t>
             </a:r>
           </a:p>
           <a:p>
             <a:pPr lvl="1"/>
             <a:r>
               <a:rPr lang="en-CH" dirty="0"/>
-              <a:t>automatize non-coding-related tasks</a:t>
+              <a:t>Automatize the non-coding tasks</a:t>
+            </a:r>
+            <a:r>
+              <a:rPr lang="en-CH"/>
+              <a:t>: </a:t>
+            </a:r>
+            <a:endParaRPr lang="de-DE" dirty="0"/>
+          </a:p>
+          <a:p>
+            <a:pPr lvl="2"/>
+            <a:r>
+              <a:rPr lang="en-CH"/>
+              <a:t>making </a:t>
+            </a:r>
+            <a:r>
+              <a:rPr lang="en-CH" dirty="0"/>
+              <a:t>sure that the tests </a:t>
+            </a:r>
+            <a:r>
+              <a:rPr lang="en-CH"/>
+              <a:t>always pass</a:t>
+            </a:r>
+            <a:endParaRPr lang="de-DE" dirty="0"/>
+          </a:p>
+          <a:p>
+            <a:pPr lvl="2"/>
+            <a:r>
+              <a:rPr lang="en-CH"/>
+              <a:t>check </a:t>
+            </a:r>
+            <a:r>
+              <a:rPr lang="en-CH" dirty="0"/>
+              <a:t>for </a:t>
+            </a:r>
+            <a:r>
+              <a:rPr lang="en-CH"/>
+              <a:t>style consistency</a:t>
+            </a:r>
+            <a:endParaRPr lang="de-DE" dirty="0"/>
+          </a:p>
+          <a:p>
+            <a:pPr lvl="2"/>
+            <a:r>
+              <a:rPr lang="en-CH"/>
+              <a:t>build </a:t>
+            </a:r>
+            <a:r>
+              <a:rPr lang="en-CH" dirty="0"/>
+              <a:t>packages for distribution on </a:t>
+            </a:r>
+            <a:r>
+              <a:rPr lang="en-CH"/>
+              <a:t>multiple architectures</a:t>
+            </a:r>
+            <a:endParaRPr lang="de-DE" dirty="0"/>
+          </a:p>
+          <a:p>
+            <a:pPr lvl="2"/>
+            <a:r>
+              <a:rPr lang="en-CH"/>
+              <a:t>build </a:t>
+            </a:r>
+            <a:r>
+              <a:rPr lang="en-CH" dirty="0"/>
+              <a:t>documentation</a:t>
             </a:r>
           </a:p>
           <a:p>
             <a:pPr lvl="1"/>
             <a:r>
               <a:rPr lang="en-CH" dirty="0"/>
-              <a:t>“it worked on my machine”</a:t>
-            </a:r>
-          </a:p>
-          <a:p>
-            <a:r>
-              <a:rPr lang="en-CH" dirty="0"/>
-              <a:t>Concepts: events, CI server, virtual machine, jobs</a:t>
-            </a:r>
-          </a:p>
-          <a:p>
-            <a:r>
-              <a:rPr lang="en-CH" dirty="0"/>
-              <a:t>Examples of most typical jobs</a:t>
-            </a:r>
-          </a:p>
-          <a:p>
-            <a:r>
-              <a:rPr lang="en-CH" dirty="0"/>
-              <a:t>Options: Travis CI, Circle CI, Github Actions</a:t>
-            </a:r>
-          </a:p>
-          <a:p>
-            <a:r>
-              <a:rPr lang="en-CH" dirty="0"/>
-              <a:t>Github Actions</a:t>
-            </a:r>
-          </a:p>
-          <a:p>
-            <a:pPr lvl="1"/>
-            <a:r>
-              <a:rPr lang="en-CH" dirty="0"/>
-              <a:t>architecture</a:t>
-            </a:r>
-          </a:p>
-          <a:p>
-            <a:pPr lvl="1"/>
-            <a:r>
-              <a:rPr lang="en-CH" dirty="0"/>
-              <a:t>demonstration and how to debug</a:t>
-            </a:r>
-          </a:p>
-          <a:p>
-            <a:pPr lvl="1"/>
-            <a:r>
-              <a:rPr lang="en-CH" dirty="0"/>
-              <a:t>exercise</a:t>
-            </a:r>
-          </a:p>
-          <a:p>
-            <a:pPr lvl="1"/>
-            <a:r>
-              <a:rPr lang="en-CH" dirty="0"/>
-              <a:t>security: workflow is not executed on first-time commits from branches</a:t>
-            </a:r>
-          </a:p>
-          <a:p>
-            <a:r>
-              <a:rPr lang="en-CH" dirty="0"/>
-              <a:t>Security topics: secrets (just mention)</a:t>
-            </a:r>
-          </a:p>
-          <a:p>
-            <a:endParaRPr lang="en-CH" dirty="0"/>
+              <a:t>Solves the “it works on my machine” problem</a:t>
+            </a:r>
           </a:p>
         </p:txBody>
       </p:sp>
@@ -5465,7 +5821,7 @@
           <p:cNvPr id="4" name="Date Placeholder 3">
             <a:extLst>
               <a:ext uri="{FF2B5EF4-FFF2-40B4-BE49-F238E27FC236}">
-                <a16:creationId xmlns:a16="http://schemas.microsoft.com/office/drawing/2014/main" id="{E74925CE-05A2-3549-9CB0-B7F21222958D}"/>
+                <a16:creationId xmlns:a16="http://schemas.microsoft.com/office/drawing/2014/main" id="{BB7DFD63-E8DE-9344-BDD0-A143F8BD67AC}"/>
               </a:ext>
             </a:extLst>
           </p:cNvPr>
@@ -5494,7 +5850,7 @@
           <p:cNvPr id="5" name="Footer Placeholder 4">
             <a:extLst>
               <a:ext uri="{FF2B5EF4-FFF2-40B4-BE49-F238E27FC236}">
-                <a16:creationId xmlns:a16="http://schemas.microsoft.com/office/drawing/2014/main" id="{3C08F752-A120-1F40-8C6F-85F7D166FCC6}"/>
+                <a16:creationId xmlns:a16="http://schemas.microsoft.com/office/drawing/2014/main" id="{5138C878-C3D9-AC4C-BDD7-9EFA39DFB1A1}"/>
               </a:ext>
             </a:extLst>
           </p:cNvPr>
@@ -5521,7 +5877,7 @@
     </p:spTree>
     <p:extLst>
       <p:ext uri="{BB962C8B-B14F-4D97-AF65-F5344CB8AC3E}">
-        <p14:creationId xmlns:p14="http://schemas.microsoft.com/office/powerpoint/2010/main" val="4210066346"/>
+        <p14:creationId xmlns:p14="http://schemas.microsoft.com/office/powerpoint/2010/main" val="1572891354"/>
       </p:ext>
     </p:extLst>
   </p:cSld>
@@ -5570,57 +5926,10 @@
           <a:lstStyle/>
           <a:p>
             <a:r>
-              <a:rPr lang="en-CH" dirty="0"/>
-              <a:t>Continuous Integration</a:t>
-            </a:r>
-          </a:p>
-        </p:txBody>
-      </p:sp>
-      <p:sp>
-        <p:nvSpPr>
-          <p:cNvPr id="3" name="Content Placeholder 2">
-            <a:extLst>
-              <a:ext uri="{FF2B5EF4-FFF2-40B4-BE49-F238E27FC236}">
-                <a16:creationId xmlns:a16="http://schemas.microsoft.com/office/drawing/2014/main" id="{993A7968-BAB0-2A48-B1DC-9A91DE873775}"/>
-              </a:ext>
-            </a:extLst>
-          </p:cNvPr>
-          <p:cNvSpPr>
-            <a:spLocks noGrp="1"/>
-          </p:cNvSpPr>
-          <p:nvPr>
-            <p:ph sz="quarter" idx="1"/>
-          </p:nvPr>
-        </p:nvSpPr>
-        <p:spPr/>
-        <p:txBody>
-          <a:bodyPr/>
-          <a:lstStyle/>
-          <a:p>
-            <a:r>
-              <a:rPr lang="en-CH" dirty="0"/>
-              <a:t>Merging the code of multiple contributor often, multiple times a day (originally this was a challenge, there was a person who was in charge of merging things on the main branch). Now merging is peanuts</a:t>
-            </a:r>
-          </a:p>
-          <a:p>
-            <a:r>
-              <a:rPr lang="en-CH" dirty="0"/>
-              <a:t>Today it’s a set of tools and practices to make sure that a project with many contributors (&gt;= 1) runs smoothly</a:t>
-            </a:r>
-          </a:p>
-          <a:p>
-            <a:pPr lvl="1"/>
-            <a:r>
-              <a:rPr lang="en-CH" dirty="0"/>
-              <a:t>Automatize the non-coding tasks: making sure that the tests always pass, check for style consistency, build packages for distribution on multiple architectures, build documentation</a:t>
-            </a:r>
-          </a:p>
-          <a:p>
-            <a:pPr lvl="1"/>
-            <a:r>
-              <a:rPr lang="en-CH" dirty="0"/>
-              <a:t>Solves the “it works on my machine” problem</a:t>
-            </a:r>
+              <a:rPr lang="de-DE" dirty="0" err="1"/>
+              <a:t>Concepts</a:t>
+            </a:r>
+            <a:endParaRPr lang="en-CH" dirty="0"/>
           </a:p>
         </p:txBody>
       </p:sp>
@@ -5682,10 +5991,46 @@
           </a:p>
         </p:txBody>
       </p:sp>
+      <p:pic>
+        <p:nvPicPr>
+          <p:cNvPr id="12" name="Picture 11" descr="Diagram&#10;&#10;Description automatically generated">
+            <a:extLst>
+              <a:ext uri="{FF2B5EF4-FFF2-40B4-BE49-F238E27FC236}">
+                <a16:creationId xmlns:a16="http://schemas.microsoft.com/office/drawing/2014/main" id="{B9839AC5-96DD-7443-A9BF-6572C7FD7E9A}"/>
+              </a:ext>
+            </a:extLst>
+          </p:cNvPr>
+          <p:cNvPicPr>
+            <a:picLocks noChangeAspect="1"/>
+          </p:cNvPicPr>
+          <p:nvPr/>
+        </p:nvPicPr>
+        <p:blipFill>
+          <a:blip r:embed="rId2">
+            <a:extLst>
+              <a:ext uri="{28A0092B-C50C-407E-A947-70E740481C1C}">
+                <a14:useLocalDpi xmlns:a14="http://schemas.microsoft.com/office/drawing/2010/main" val="0"/>
+              </a:ext>
+            </a:extLst>
+          </a:blip>
+          <a:stretch>
+            <a:fillRect/>
+          </a:stretch>
+        </p:blipFill>
+        <p:spPr>
+          <a:xfrm>
+            <a:off x="1403648" y="1020262"/>
+            <a:ext cx="7452320" cy="5468742"/>
+          </a:xfrm>
+          <a:prstGeom prst="rect">
+            <a:avLst/>
+          </a:prstGeom>
+        </p:spPr>
+      </p:pic>
     </p:spTree>
     <p:extLst>
       <p:ext uri="{BB962C8B-B14F-4D97-AF65-F5344CB8AC3E}">
-        <p14:creationId xmlns:p14="http://schemas.microsoft.com/office/powerpoint/2010/main" val="1572891354"/>
+        <p14:creationId xmlns:p14="http://schemas.microsoft.com/office/powerpoint/2010/main" val="3314637399"/>
       </p:ext>
     </p:extLst>
   </p:cSld>
@@ -5714,10 +6059,10 @@
       </p:grpSpPr>
       <p:sp>
         <p:nvSpPr>
-          <p:cNvPr id="4" name="Date Placeholder 3">
+          <p:cNvPr id="4" name="Title 3">
             <a:extLst>
               <a:ext uri="{FF2B5EF4-FFF2-40B4-BE49-F238E27FC236}">
-                <a16:creationId xmlns:a16="http://schemas.microsoft.com/office/drawing/2014/main" id="{762BB4C5-BE42-A94F-AD1F-06AEC4D47395}"/>
+                <a16:creationId xmlns:a16="http://schemas.microsoft.com/office/drawing/2014/main" id="{592155F5-347D-644E-89FD-C442F979301F}"/>
               </a:ext>
             </a:extLst>
           </p:cNvPr>
@@ -5725,28 +6070,27 @@
             <a:spLocks noGrp="1"/>
           </p:cNvSpPr>
           <p:nvPr>
-            <p:ph type="dt" sz="half" idx="10"/>
-          </p:nvPr>
-        </p:nvSpPr>
-        <p:spPr/>
-        <p:txBody>
-          <a:bodyPr/>
-          <a:lstStyle/>
-          <a:p>
-            <a:r>
-              <a:rPr lang="en-US" sz="1000"/>
-              <a:t>August 2019, CC BY-SA 4.0</a:t>
-            </a:r>
-            <a:endParaRPr lang="en-US" sz="1000" dirty="0"/>
-          </a:p>
-        </p:txBody>
-      </p:sp>
-      <p:sp>
-        <p:nvSpPr>
-          <p:cNvPr id="5" name="Footer Placeholder 4">
+            <p:ph type="title"/>
+          </p:nvPr>
+        </p:nvSpPr>
+        <p:spPr/>
+        <p:txBody>
+          <a:bodyPr/>
+          <a:lstStyle/>
+          <a:p>
+            <a:r>
+              <a:rPr lang="en-CH" dirty="0"/>
+              <a:t>The examples that you’ll find 95% of the time</a:t>
+            </a:r>
+          </a:p>
+        </p:txBody>
+      </p:sp>
+      <p:sp>
+        <p:nvSpPr>
+          <p:cNvPr id="5" name="Content Placeholder 4">
             <a:extLst>
               <a:ext uri="{FF2B5EF4-FFF2-40B4-BE49-F238E27FC236}">
-                <a16:creationId xmlns:a16="http://schemas.microsoft.com/office/drawing/2014/main" id="{5E600F7B-FDF6-2648-B3D5-595FFCA9A99E}"/>
+                <a16:creationId xmlns:a16="http://schemas.microsoft.com/office/drawing/2014/main" id="{1C2B1E13-5423-2E41-AA60-63C74E3BAE73}"/>
               </a:ext>
             </a:extLst>
           </p:cNvPr>
@@ -5754,28 +6098,78 @@
             <a:spLocks noGrp="1"/>
           </p:cNvSpPr>
           <p:nvPr>
-            <p:ph type="ftr" sz="quarter" idx="11"/>
-          </p:nvPr>
-        </p:nvSpPr>
-        <p:spPr/>
-        <p:txBody>
-          <a:bodyPr/>
-          <a:lstStyle/>
-          <a:p>
-            <a:r>
-              <a:rPr lang="en-US"/>
-              <a:t>Testing scientific code, v12.0</a:t>
-            </a:r>
-            <a:endParaRPr lang="en-US" dirty="0"/>
-          </a:p>
-        </p:txBody>
-      </p:sp>
-      <p:sp>
-        <p:nvSpPr>
-          <p:cNvPr id="2" name="Title 1">
+            <p:ph sz="quarter" idx="1"/>
+          </p:nvPr>
+        </p:nvSpPr>
+        <p:spPr/>
+        <p:txBody>
+          <a:bodyPr/>
+          <a:lstStyle/>
+          <a:p>
+            <a:r>
+              <a:rPr lang="en-CH" dirty="0"/>
+              <a:t>Event: PR is created or a commit is pushed to master</a:t>
+            </a:r>
+            <a:br>
+              <a:rPr lang="en-CH" dirty="0"/>
+            </a:br>
+            <a:r>
+              <a:rPr lang="en-CH" dirty="0"/>
+              <a:t>Tasks:</a:t>
+            </a:r>
+          </a:p>
+          <a:p>
+            <a:pPr lvl="1"/>
+            <a:r>
+              <a:rPr lang="en-CH" dirty="0"/>
+              <a:t>Run all tests</a:t>
+            </a:r>
+          </a:p>
+          <a:p>
+            <a:pPr lvl="1"/>
+            <a:r>
+              <a:rPr lang="en-CH" dirty="0"/>
+              <a:t>(Verify code coverage)</a:t>
+            </a:r>
+          </a:p>
+          <a:p>
+            <a:pPr lvl="1"/>
+            <a:r>
+              <a:rPr lang="en-CH" dirty="0"/>
+              <a:t>(Check code style)</a:t>
+            </a:r>
+          </a:p>
+          <a:p>
+            <a:r>
+              <a:rPr lang="en-CH" dirty="0"/>
+              <a:t>Event: Repostory is tagged in a certain way</a:t>
+            </a:r>
+          </a:p>
+          <a:p>
+            <a:pPr lvl="1"/>
+            <a:r>
+              <a:rPr lang="en-CH" dirty="0"/>
+              <a:t>Create binary packages for Linux, Mac, Windows and upload them to a package repository</a:t>
+            </a:r>
+          </a:p>
+          <a:p>
+            <a:pPr lvl="1"/>
+            <a:r>
+              <a:rPr lang="en-CH" dirty="0"/>
+              <a:t>Build the documentaion</a:t>
+            </a:r>
+          </a:p>
+          <a:p>
+            <a:endParaRPr lang="en-CH" dirty="0"/>
+          </a:p>
+        </p:txBody>
+      </p:sp>
+      <p:sp>
+        <p:nvSpPr>
+          <p:cNvPr id="2" name="Date Placeholder 1">
             <a:extLst>
               <a:ext uri="{FF2B5EF4-FFF2-40B4-BE49-F238E27FC236}">
-                <a16:creationId xmlns:a16="http://schemas.microsoft.com/office/drawing/2014/main" id="{0932E7A4-429B-F246-AD4A-BD3595AA5D88}"/>
+                <a16:creationId xmlns:a16="http://schemas.microsoft.com/office/drawing/2014/main" id="{6A4B685F-95E0-7E43-B6D9-301502E8D040}"/>
               </a:ext>
             </a:extLst>
           </p:cNvPr>
@@ -5783,392 +6177,45 @@
             <a:spLocks noGrp="1"/>
           </p:cNvSpPr>
           <p:nvPr>
-            <p:ph type="title" idx="4294967295"/>
-          </p:nvPr>
-        </p:nvSpPr>
-        <p:spPr>
-          <a:xfrm>
-            <a:off x="0" y="152400"/>
-            <a:ext cx="8229600" cy="990600"/>
-          </a:xfrm>
-        </p:spPr>
-        <p:txBody>
-          <a:bodyPr/>
-          <a:lstStyle/>
-          <a:p>
-            <a:r>
-              <a:rPr lang="en-CH" dirty="0"/>
-              <a:t>Concepts</a:t>
-            </a:r>
-          </a:p>
-        </p:txBody>
-      </p:sp>
-      <p:grpSp>
-        <p:nvGrpSpPr>
-          <p:cNvPr id="10" name="Group 9">
+            <p:ph type="dt" sz="half" idx="10"/>
+          </p:nvPr>
+        </p:nvSpPr>
+        <p:spPr/>
+        <p:txBody>
+          <a:bodyPr/>
+          <a:lstStyle/>
+          <a:p>
+            <a:r>
+              <a:rPr lang="en-US"/>
+              <a:t>August 2019, CC BY-SA 4.0</a:t>
+            </a:r>
+          </a:p>
+        </p:txBody>
+      </p:sp>
+      <p:sp>
+        <p:nvSpPr>
+          <p:cNvPr id="3" name="Footer Placeholder 2">
             <a:extLst>
               <a:ext uri="{FF2B5EF4-FFF2-40B4-BE49-F238E27FC236}">
-                <a16:creationId xmlns:a16="http://schemas.microsoft.com/office/drawing/2014/main" id="{11522B59-99EF-F446-BF21-117411574FED}"/>
+                <a16:creationId xmlns:a16="http://schemas.microsoft.com/office/drawing/2014/main" id="{9A09B552-3415-3C4E-86C4-1D04C278AD4E}"/>
               </a:ext>
             </a:extLst>
           </p:cNvPr>
-          <p:cNvGrpSpPr/>
-          <p:nvPr/>
-        </p:nvGrpSpPr>
-        <p:grpSpPr>
-          <a:xfrm>
-            <a:off x="827584" y="1700808"/>
-            <a:ext cx="1224136" cy="1080120"/>
-            <a:chOff x="827584" y="1700808"/>
-            <a:chExt cx="1224136" cy="1080120"/>
-          </a:xfrm>
-        </p:grpSpPr>
-        <p:sp>
-          <p:nvSpPr>
-            <p:cNvPr id="7" name="Rectangle 6">
-              <a:extLst>
-                <a:ext uri="{FF2B5EF4-FFF2-40B4-BE49-F238E27FC236}">
-                  <a16:creationId xmlns:a16="http://schemas.microsoft.com/office/drawing/2014/main" id="{78FD121C-74C1-704B-96AC-823D2AECBE59}"/>
-                </a:ext>
-              </a:extLst>
-            </p:cNvPr>
-            <p:cNvSpPr/>
-            <p:nvPr/>
-          </p:nvSpPr>
-          <p:spPr>
-            <a:xfrm>
-              <a:off x="827584" y="1700808"/>
-              <a:ext cx="1224136" cy="1080120"/>
-            </a:xfrm>
-            <a:prstGeom prst="rect">
-              <a:avLst/>
-            </a:prstGeom>
-          </p:spPr>
-          <p:style>
-            <a:lnRef idx="2">
-              <a:schemeClr val="accent1">
-                <a:shade val="50000"/>
-              </a:schemeClr>
-            </a:lnRef>
-            <a:fillRef idx="1">
-              <a:schemeClr val="accent1"/>
-            </a:fillRef>
-            <a:effectRef idx="0">
-              <a:schemeClr val="accent1"/>
-            </a:effectRef>
-            <a:fontRef idx="minor">
-              <a:schemeClr val="lt1"/>
-            </a:fontRef>
-          </p:style>
-          <p:txBody>
-            <a:bodyPr rtlCol="0" anchor="t"/>
-            <a:lstStyle/>
-            <a:p>
-              <a:r>
-                <a:rPr lang="en-CH" dirty="0"/>
-                <a:t>Project</a:t>
-              </a:r>
-            </a:p>
-          </p:txBody>
-        </p:sp>
-        <p:sp>
-          <p:nvSpPr>
-            <p:cNvPr id="8" name="TextBox 7">
-              <a:extLst>
-                <a:ext uri="{FF2B5EF4-FFF2-40B4-BE49-F238E27FC236}">
-                  <a16:creationId xmlns:a16="http://schemas.microsoft.com/office/drawing/2014/main" id="{60ABB111-D4D3-804A-8676-83F1AD8D3001}"/>
-                </a:ext>
-              </a:extLst>
-            </p:cNvPr>
-            <p:cNvSpPr txBox="1"/>
-            <p:nvPr/>
-          </p:nvSpPr>
-          <p:spPr>
-            <a:xfrm>
-              <a:off x="1043608" y="2204864"/>
-              <a:ext cx="936104" cy="523220"/>
-            </a:xfrm>
-            <a:prstGeom prst="rect">
-              <a:avLst/>
-            </a:prstGeom>
-            <a:solidFill>
-              <a:schemeClr val="bg2">
-                <a:lumMod val="75000"/>
-              </a:schemeClr>
-            </a:solidFill>
-          </p:spPr>
-          <p:txBody>
-            <a:bodyPr wrap="square" rtlCol="0">
-              <a:spAutoFit/>
-            </a:bodyPr>
-            <a:lstStyle/>
-            <a:p>
-              <a:r>
-                <a:rPr lang="en-CH" sz="1400" dirty="0"/>
-                <a:t>CI config file</a:t>
-              </a:r>
-            </a:p>
-          </p:txBody>
-        </p:sp>
-      </p:grpSp>
-      <p:sp>
-        <p:nvSpPr>
-          <p:cNvPr id="11" name="Right Arrow 10">
-            <a:extLst>
-              <a:ext uri="{FF2B5EF4-FFF2-40B4-BE49-F238E27FC236}">
-                <a16:creationId xmlns:a16="http://schemas.microsoft.com/office/drawing/2014/main" id="{7A0AE462-7EEA-5F48-AE99-16D88151F0FB}"/>
-              </a:ext>
-            </a:extLst>
-          </p:cNvPr>
-          <p:cNvSpPr/>
-          <p:nvPr/>
-        </p:nvSpPr>
-        <p:spPr>
-          <a:xfrm>
-            <a:off x="2483768" y="2060848"/>
-            <a:ext cx="936104" cy="360040"/>
-          </a:xfrm>
-          <a:prstGeom prst="rightArrow">
-            <a:avLst/>
-          </a:prstGeom>
-        </p:spPr>
-        <p:style>
-          <a:lnRef idx="2">
-            <a:schemeClr val="accent1">
-              <a:shade val="50000"/>
-            </a:schemeClr>
-          </a:lnRef>
-          <a:fillRef idx="1">
-            <a:schemeClr val="accent1"/>
-          </a:fillRef>
-          <a:effectRef idx="0">
-            <a:schemeClr val="accent1"/>
-          </a:effectRef>
-          <a:fontRef idx="minor">
-            <a:schemeClr val="lt1"/>
-          </a:fontRef>
-        </p:style>
-        <p:txBody>
-          <a:bodyPr rtlCol="0" anchor="ctr"/>
-          <a:lstStyle/>
-          <a:p>
-            <a:pPr algn="ctr"/>
-            <a:endParaRPr lang="en-CH"/>
-          </a:p>
-        </p:txBody>
-      </p:sp>
-      <p:sp>
-        <p:nvSpPr>
-          <p:cNvPr id="12" name="TextBox 11">
-            <a:extLst>
-              <a:ext uri="{FF2B5EF4-FFF2-40B4-BE49-F238E27FC236}">
-                <a16:creationId xmlns:a16="http://schemas.microsoft.com/office/drawing/2014/main" id="{579BB1BD-42D5-694C-B142-15D96C4E1D66}"/>
-              </a:ext>
-            </a:extLst>
-          </p:cNvPr>
-          <p:cNvSpPr txBox="1"/>
-          <p:nvPr/>
-        </p:nvSpPr>
-        <p:spPr>
-          <a:xfrm>
-            <a:off x="2483768" y="1556792"/>
-            <a:ext cx="864096" cy="369332"/>
-          </a:xfrm>
-          <a:prstGeom prst="rect">
-            <a:avLst/>
-          </a:prstGeom>
-          <a:noFill/>
-        </p:spPr>
-        <p:txBody>
-          <a:bodyPr wrap="square" rtlCol="0">
-            <a:spAutoFit/>
-          </a:bodyPr>
-          <a:lstStyle/>
-          <a:p>
-            <a:r>
-              <a:rPr lang="en-CH" sz="1800" dirty="0"/>
-              <a:t>events</a:t>
-            </a:r>
-          </a:p>
-        </p:txBody>
-      </p:sp>
-      <p:grpSp>
-        <p:nvGrpSpPr>
-          <p:cNvPr id="13" name="Group 12">
-            <a:extLst>
-              <a:ext uri="{FF2B5EF4-FFF2-40B4-BE49-F238E27FC236}">
-                <a16:creationId xmlns:a16="http://schemas.microsoft.com/office/drawing/2014/main" id="{CF5A89CA-25FF-224F-8E38-2446E5D1027E}"/>
-              </a:ext>
-            </a:extLst>
-          </p:cNvPr>
-          <p:cNvGrpSpPr/>
-          <p:nvPr/>
-        </p:nvGrpSpPr>
-        <p:grpSpPr>
-          <a:xfrm>
-            <a:off x="4283968" y="1700808"/>
-            <a:ext cx="2736304" cy="3168352"/>
-            <a:chOff x="827584" y="1700808"/>
-            <a:chExt cx="1224136" cy="1080120"/>
-          </a:xfrm>
-        </p:grpSpPr>
-        <p:sp>
-          <p:nvSpPr>
-            <p:cNvPr id="14" name="Rectangle 13">
-              <a:extLst>
-                <a:ext uri="{FF2B5EF4-FFF2-40B4-BE49-F238E27FC236}">
-                  <a16:creationId xmlns:a16="http://schemas.microsoft.com/office/drawing/2014/main" id="{29527712-E2AB-554F-97BD-0A96B38E2B6C}"/>
-                </a:ext>
-              </a:extLst>
-            </p:cNvPr>
-            <p:cNvSpPr/>
-            <p:nvPr/>
-          </p:nvSpPr>
-          <p:spPr>
-            <a:xfrm>
-              <a:off x="827584" y="1700808"/>
-              <a:ext cx="1224136" cy="1080120"/>
-            </a:xfrm>
-            <a:prstGeom prst="rect">
-              <a:avLst/>
-            </a:prstGeom>
-          </p:spPr>
-          <p:style>
-            <a:lnRef idx="2">
-              <a:schemeClr val="accent1">
-                <a:shade val="50000"/>
-              </a:schemeClr>
-            </a:lnRef>
-            <a:fillRef idx="1">
-              <a:schemeClr val="accent1"/>
-            </a:fillRef>
-            <a:effectRef idx="0">
-              <a:schemeClr val="accent1"/>
-            </a:effectRef>
-            <a:fontRef idx="minor">
-              <a:schemeClr val="lt1"/>
-            </a:fontRef>
-          </p:style>
-          <p:txBody>
-            <a:bodyPr rtlCol="0" anchor="t"/>
-            <a:lstStyle/>
-            <a:p>
-              <a:r>
-                <a:rPr lang="en-CH" dirty="0"/>
-                <a:t>CI server</a:t>
-              </a:r>
-            </a:p>
-          </p:txBody>
-        </p:sp>
-        <p:sp>
-          <p:nvSpPr>
-            <p:cNvPr id="15" name="TextBox 14">
-              <a:extLst>
-                <a:ext uri="{FF2B5EF4-FFF2-40B4-BE49-F238E27FC236}">
-                  <a16:creationId xmlns:a16="http://schemas.microsoft.com/office/drawing/2014/main" id="{465C3FDF-1B01-3C4B-BF60-1CE1AA55F20B}"/>
-                </a:ext>
-              </a:extLst>
-            </p:cNvPr>
-            <p:cNvSpPr txBox="1"/>
-            <p:nvPr/>
-          </p:nvSpPr>
-          <p:spPr>
-            <a:xfrm>
-              <a:off x="915022" y="1954213"/>
-              <a:ext cx="1092979" cy="765944"/>
-            </a:xfrm>
-            <a:prstGeom prst="rect">
-              <a:avLst/>
-            </a:prstGeom>
-            <a:solidFill>
-              <a:schemeClr val="bg2">
-                <a:lumMod val="75000"/>
-              </a:schemeClr>
-            </a:solidFill>
-          </p:spPr>
-          <p:txBody>
-            <a:bodyPr wrap="square" rtlCol="0">
-              <a:spAutoFit/>
-            </a:bodyPr>
-            <a:lstStyle/>
-            <a:p>
-              <a:r>
-                <a:rPr lang="en-CH" sz="1400" dirty="0"/>
-                <a:t>virtual machine</a:t>
-              </a:r>
-            </a:p>
-            <a:p>
-              <a:r>
-                <a:rPr lang="en-CH" sz="1400" dirty="0"/>
-                <a:t>OS</a:t>
-              </a:r>
-            </a:p>
-            <a:p>
-              <a:r>
-                <a:rPr lang="en-CH" sz="1400" dirty="0"/>
-                <a:t>Python version</a:t>
-              </a:r>
-            </a:p>
-            <a:p>
-              <a:r>
-                <a:rPr lang="en-CH" sz="1400" dirty="0"/>
-                <a:t>packages</a:t>
-              </a:r>
-            </a:p>
-            <a:p>
-              <a:endParaRPr lang="en-CH" sz="1400" dirty="0"/>
-            </a:p>
-            <a:p>
-              <a:endParaRPr lang="en-CH" sz="1400" dirty="0"/>
-            </a:p>
-            <a:p>
-              <a:endParaRPr lang="en-CH" sz="1400" dirty="0"/>
-            </a:p>
-            <a:p>
-              <a:endParaRPr lang="en-CH" sz="1400" dirty="0"/>
-            </a:p>
-            <a:p>
-              <a:endParaRPr lang="en-CH" sz="1400" dirty="0"/>
-            </a:p>
-            <a:p>
-              <a:endParaRPr lang="en-CH" sz="1400" dirty="0"/>
-            </a:p>
-          </p:txBody>
-        </p:sp>
-      </p:grpSp>
-      <p:sp>
-        <p:nvSpPr>
-          <p:cNvPr id="16" name="TextBox 15">
-            <a:extLst>
-              <a:ext uri="{FF2B5EF4-FFF2-40B4-BE49-F238E27FC236}">
-                <a16:creationId xmlns:a16="http://schemas.microsoft.com/office/drawing/2014/main" id="{328B28F2-9366-9B4C-A90A-364B8D624F49}"/>
-              </a:ext>
-            </a:extLst>
-          </p:cNvPr>
-          <p:cNvSpPr txBox="1"/>
-          <p:nvPr/>
-        </p:nvSpPr>
-        <p:spPr>
-          <a:xfrm>
-            <a:off x="4716016" y="3789040"/>
-            <a:ext cx="1872208" cy="338554"/>
-          </a:xfrm>
-          <a:prstGeom prst="rect">
-            <a:avLst/>
-          </a:prstGeom>
-          <a:solidFill>
-            <a:schemeClr val="bg2"/>
-          </a:solidFill>
-        </p:spPr>
-        <p:txBody>
-          <a:bodyPr wrap="square" rtlCol="0">
-            <a:spAutoFit/>
-          </a:bodyPr>
-          <a:lstStyle/>
-          <a:p>
-            <a:r>
-              <a:rPr lang="en-CH" sz="1600" dirty="0"/>
-              <a:t>Run a set of tasks</a:t>
+          <p:cNvSpPr>
+            <a:spLocks noGrp="1"/>
+          </p:cNvSpPr>
+          <p:nvPr>
+            <p:ph type="ftr" sz="quarter" idx="11"/>
+          </p:nvPr>
+        </p:nvSpPr>
+        <p:spPr/>
+        <p:txBody>
+          <a:bodyPr/>
+          <a:lstStyle/>
+          <a:p>
+            <a:r>
+              <a:rPr lang="en-US"/>
+              <a:t>Testing scientific code, v12.0</a:t>
             </a:r>
           </a:p>
         </p:txBody>
@@ -6176,7 +6223,7 @@
     </p:spTree>
     <p:extLst>
       <p:ext uri="{BB962C8B-B14F-4D97-AF65-F5344CB8AC3E}">
-        <p14:creationId xmlns:p14="http://schemas.microsoft.com/office/powerpoint/2010/main" val="1006687292"/>
+        <p14:creationId xmlns:p14="http://schemas.microsoft.com/office/powerpoint/2010/main" val="1370039741"/>
       </p:ext>
     </p:extLst>
   </p:cSld>
@@ -6205,10 +6252,10 @@
       </p:grpSpPr>
       <p:sp>
         <p:nvSpPr>
-          <p:cNvPr id="4" name="Title 3">
+          <p:cNvPr id="2" name="Title 1">
             <a:extLst>
               <a:ext uri="{FF2B5EF4-FFF2-40B4-BE49-F238E27FC236}">
-                <a16:creationId xmlns:a16="http://schemas.microsoft.com/office/drawing/2014/main" id="{592155F5-347D-644E-89FD-C442F979301F}"/>
+                <a16:creationId xmlns:a16="http://schemas.microsoft.com/office/drawing/2014/main" id="{61A0A082-4C3F-FB4A-89CB-D4F309011CE6}"/>
               </a:ext>
             </a:extLst>
           </p:cNvPr>
@@ -6226,17 +6273,17 @@
           <a:p>
             <a:r>
               <a:rPr lang="en-CH" dirty="0"/>
-              <a:t>The examples that you’ll find 95% of the time</a:t>
-            </a:r>
-          </a:p>
-        </p:txBody>
-      </p:sp>
-      <p:sp>
-        <p:nvSpPr>
-          <p:cNvPr id="5" name="Content Placeholder 4">
+              <a:t>CI options</a:t>
+            </a:r>
+          </a:p>
+        </p:txBody>
+      </p:sp>
+      <p:sp>
+        <p:nvSpPr>
+          <p:cNvPr id="3" name="Content Placeholder 2">
             <a:extLst>
               <a:ext uri="{FF2B5EF4-FFF2-40B4-BE49-F238E27FC236}">
-                <a16:creationId xmlns:a16="http://schemas.microsoft.com/office/drawing/2014/main" id="{1C2B1E13-5423-2E41-AA60-63C74E3BAE73}"/>
+                <a16:creationId xmlns:a16="http://schemas.microsoft.com/office/drawing/2014/main" id="{D5A7549D-6C69-FC4D-94A9-2F481DCF80E4}"/>
               </a:ext>
             </a:extLst>
           </p:cNvPr>
@@ -6254,68 +6301,29 @@
           <a:p>
             <a:r>
               <a:rPr lang="en-CH" dirty="0"/>
-              <a:t>Event: PR is created or a commit is pushed to master</a:t>
-            </a:r>
-            <a:br>
+              <a:t>TravisCI</a:t>
+            </a:r>
+          </a:p>
+          <a:p>
+            <a:r>
               <a:rPr lang="en-CH" dirty="0"/>
-            </a:br>
+              <a:t>CircleCI</a:t>
+            </a:r>
+          </a:p>
+          <a:p>
             <a:r>
               <a:rPr lang="en-CH" dirty="0"/>
-              <a:t>Tasks:</a:t>
-            </a:r>
-          </a:p>
-          <a:p>
-            <a:pPr lvl="1"/>
-            <a:r>
-              <a:rPr lang="en-CH" dirty="0"/>
-              <a:t>Run all tests</a:t>
-            </a:r>
-          </a:p>
-          <a:p>
-            <a:pPr lvl="1"/>
-            <a:r>
-              <a:rPr lang="en-CH" dirty="0"/>
-              <a:t>(Verify code coverage)</a:t>
-            </a:r>
-          </a:p>
-          <a:p>
-            <a:pPr lvl="1"/>
-            <a:r>
-              <a:rPr lang="en-CH" dirty="0"/>
-              <a:t>(Check code style)</a:t>
-            </a:r>
-          </a:p>
-          <a:p>
-            <a:r>
-              <a:rPr lang="en-CH" dirty="0"/>
-              <a:t>Event: Repostory is tagged in a certain way</a:t>
-            </a:r>
-          </a:p>
-          <a:p>
-            <a:pPr lvl="1"/>
-            <a:r>
-              <a:rPr lang="en-CH" dirty="0"/>
-              <a:t>Create binary packages for Linux, Mac, Windows and upload them to a package repository</a:t>
-            </a:r>
-          </a:p>
-          <a:p>
-            <a:pPr lvl="1"/>
-            <a:r>
-              <a:rPr lang="en-CH" dirty="0"/>
-              <a:t>Build the documentaion</a:t>
-            </a:r>
-          </a:p>
-          <a:p>
-            <a:endParaRPr lang="en-CH" dirty="0"/>
-          </a:p>
-        </p:txBody>
-      </p:sp>
-      <p:sp>
-        <p:nvSpPr>
-          <p:cNvPr id="2" name="Date Placeholder 1">
+              <a:t>GitHub actions</a:t>
+            </a:r>
+          </a:p>
+        </p:txBody>
+      </p:sp>
+      <p:sp>
+        <p:nvSpPr>
+          <p:cNvPr id="4" name="Date Placeholder 3">
             <a:extLst>
               <a:ext uri="{FF2B5EF4-FFF2-40B4-BE49-F238E27FC236}">
-                <a16:creationId xmlns:a16="http://schemas.microsoft.com/office/drawing/2014/main" id="{6A4B685F-95E0-7E43-B6D9-301502E8D040}"/>
+                <a16:creationId xmlns:a16="http://schemas.microsoft.com/office/drawing/2014/main" id="{164E4951-B129-814A-9CEF-5E059F59DA99}"/>
               </a:ext>
             </a:extLst>
           </p:cNvPr>
@@ -6332,18 +6340,19 @@
           <a:lstStyle/>
           <a:p>
             <a:r>
-              <a:rPr lang="en-US"/>
+              <a:rPr lang="en-US" sz="1000"/>
               <a:t>August 2019, CC BY-SA 4.0</a:t>
             </a:r>
-          </a:p>
-        </p:txBody>
-      </p:sp>
-      <p:sp>
-        <p:nvSpPr>
-          <p:cNvPr id="3" name="Footer Placeholder 2">
+            <a:endParaRPr lang="en-US" sz="1000" dirty="0"/>
+          </a:p>
+        </p:txBody>
+      </p:sp>
+      <p:sp>
+        <p:nvSpPr>
+          <p:cNvPr id="5" name="Footer Placeholder 4">
             <a:extLst>
               <a:ext uri="{FF2B5EF4-FFF2-40B4-BE49-F238E27FC236}">
-                <a16:creationId xmlns:a16="http://schemas.microsoft.com/office/drawing/2014/main" id="{9A09B552-3415-3C4E-86C4-1D04C278AD4E}"/>
+                <a16:creationId xmlns:a16="http://schemas.microsoft.com/office/drawing/2014/main" id="{92A06B6D-EFF0-6C49-AC59-B54B8947E86B}"/>
               </a:ext>
             </a:extLst>
           </p:cNvPr>
@@ -6363,13 +6372,157 @@
               <a:rPr lang="en-US"/>
               <a:t>Testing scientific code, v12.0</a:t>
             </a:r>
-          </a:p>
-        </p:txBody>
-      </p:sp>
+            <a:endParaRPr lang="en-US" dirty="0"/>
+          </a:p>
+        </p:txBody>
+      </p:sp>
+      <p:pic>
+        <p:nvPicPr>
+          <p:cNvPr id="1025" name="Picture 1">
+            <a:extLst>
+              <a:ext uri="{FF2B5EF4-FFF2-40B4-BE49-F238E27FC236}">
+                <a16:creationId xmlns:a16="http://schemas.microsoft.com/office/drawing/2014/main" id="{2D57F371-F9CA-1748-9D55-3E3714299E39}"/>
+              </a:ext>
+            </a:extLst>
+          </p:cNvPr>
+          <p:cNvPicPr>
+            <a:picLocks noChangeAspect="1" noChangeArrowheads="1"/>
+          </p:cNvPicPr>
+          <p:nvPr/>
+        </p:nvPicPr>
+        <p:blipFill>
+          <a:blip r:embed="rId2">
+            <a:extLst>
+              <a:ext uri="{28A0092B-C50C-407E-A947-70E740481C1C}">
+                <a14:useLocalDpi xmlns:a14="http://schemas.microsoft.com/office/drawing/2010/main" val="0"/>
+              </a:ext>
+            </a:extLst>
+          </a:blip>
+          <a:srcRect/>
+          <a:stretch>
+            <a:fillRect/>
+          </a:stretch>
+        </p:blipFill>
+        <p:spPr bwMode="auto">
+          <a:xfrm>
+            <a:off x="5004048" y="1219200"/>
+            <a:ext cx="3024336" cy="933734"/>
+          </a:xfrm>
+          <a:prstGeom prst="rect">
+            <a:avLst/>
+          </a:prstGeom>
+          <a:noFill/>
+          <a:extLst>
+            <a:ext uri="{909E8E84-426E-40DD-AFC4-6F175D3DCCD1}">
+              <a14:hiddenFill xmlns:a14="http://schemas.microsoft.com/office/drawing/2010/main">
+                <a:solidFill>
+                  <a:srgbClr val="FFFFFF"/>
+                </a:solidFill>
+              </a14:hiddenFill>
+            </a:ext>
+          </a:extLst>
+        </p:spPr>
+      </p:pic>
+      <p:pic>
+        <p:nvPicPr>
+          <p:cNvPr id="1027" name="Picture 3">
+            <a:hlinkClick r:id="rId3"/>
+            <a:extLst>
+              <a:ext uri="{FF2B5EF4-FFF2-40B4-BE49-F238E27FC236}">
+                <a16:creationId xmlns:a16="http://schemas.microsoft.com/office/drawing/2014/main" id="{E1038F5B-C610-084E-8920-39B86C78F229}"/>
+              </a:ext>
+            </a:extLst>
+          </p:cNvPr>
+          <p:cNvPicPr>
+            <a:picLocks noChangeAspect="1" noChangeArrowheads="1"/>
+          </p:cNvPicPr>
+          <p:nvPr/>
+        </p:nvPicPr>
+        <p:blipFill>
+          <a:blip r:embed="rId4">
+            <a:extLst>
+              <a:ext uri="{28A0092B-C50C-407E-A947-70E740481C1C}">
+                <a14:useLocalDpi xmlns:a14="http://schemas.microsoft.com/office/drawing/2010/main" val="0"/>
+              </a:ext>
+            </a:extLst>
+          </a:blip>
+          <a:srcRect/>
+          <a:stretch>
+            <a:fillRect/>
+          </a:stretch>
+        </p:blipFill>
+        <p:spPr bwMode="auto">
+          <a:xfrm>
+            <a:off x="5940152" y="2352324"/>
+            <a:ext cx="1749720" cy="1749720"/>
+          </a:xfrm>
+          <a:prstGeom prst="rect">
+            <a:avLst/>
+          </a:prstGeom>
+          <a:noFill/>
+          <a:extLst>
+            <a:ext uri="{909E8E84-426E-40DD-AFC4-6F175D3DCCD1}">
+              <a14:hiddenFill xmlns:a14="http://schemas.microsoft.com/office/drawing/2010/main">
+                <a:solidFill>
+                  <a:srgbClr val="FFFFFF"/>
+                </a:solidFill>
+              </a14:hiddenFill>
+            </a:ext>
+          </a:extLst>
+        </p:spPr>
+      </p:pic>
+      <p:pic>
+        <p:nvPicPr>
+          <p:cNvPr id="1030" name="Picture 6">
+            <a:hlinkClick r:id="rId5"/>
+            <a:extLst>
+              <a:ext uri="{FF2B5EF4-FFF2-40B4-BE49-F238E27FC236}">
+                <a16:creationId xmlns:a16="http://schemas.microsoft.com/office/drawing/2014/main" id="{03029DC7-78CB-DF46-ABFC-183F86763DA9}"/>
+              </a:ext>
+            </a:extLst>
+          </p:cNvPr>
+          <p:cNvPicPr>
+            <a:picLocks noChangeAspect="1" noChangeArrowheads="1"/>
+          </p:cNvPicPr>
+          <p:nvPr/>
+        </p:nvPicPr>
+        <p:blipFill>
+          <a:blip r:embed="rId6">
+            <a:extLst>
+              <a:ext uri="{28A0092B-C50C-407E-A947-70E740481C1C}">
+                <a14:useLocalDpi xmlns:a14="http://schemas.microsoft.com/office/drawing/2010/main" val="0"/>
+              </a:ext>
+            </a:extLst>
+          </a:blip>
+          <a:srcRect/>
+          <a:stretch>
+            <a:fillRect/>
+          </a:stretch>
+        </p:blipFill>
+        <p:spPr bwMode="auto">
+          <a:xfrm>
+            <a:off x="5593796" y="4317356"/>
+            <a:ext cx="2442432" cy="1231522"/>
+          </a:xfrm>
+          <a:prstGeom prst="rect">
+            <a:avLst/>
+          </a:prstGeom>
+          <a:noFill/>
+          <a:extLst>
+            <a:ext uri="{909E8E84-426E-40DD-AFC4-6F175D3DCCD1}">
+              <a14:hiddenFill xmlns:a14="http://schemas.microsoft.com/office/drawing/2010/main">
+                <a:solidFill>
+                  <a:srgbClr val="FFFFFF"/>
+                </a:solidFill>
+              </a14:hiddenFill>
+            </a:ext>
+          </a:extLst>
+        </p:spPr>
+      </p:pic>
     </p:spTree>
     <p:extLst>
       <p:ext uri="{BB962C8B-B14F-4D97-AF65-F5344CB8AC3E}">
-        <p14:creationId xmlns:p14="http://schemas.microsoft.com/office/powerpoint/2010/main" val="1370039741"/>
+        <p14:creationId xmlns:p14="http://schemas.microsoft.com/office/powerpoint/2010/main" val="1680327364"/>
       </p:ext>
     </p:extLst>
   </p:cSld>
@@ -6401,7 +6554,7 @@
           <p:cNvPr id="2" name="Title 1">
             <a:extLst>
               <a:ext uri="{FF2B5EF4-FFF2-40B4-BE49-F238E27FC236}">
-                <a16:creationId xmlns:a16="http://schemas.microsoft.com/office/drawing/2014/main" id="{61A0A082-4C3F-FB4A-89CB-D4F309011CE6}"/>
+                <a16:creationId xmlns:a16="http://schemas.microsoft.com/office/drawing/2014/main" id="{BD476358-0FD2-764F-AEC5-3A574E8F39D1}"/>
               </a:ext>
             </a:extLst>
           </p:cNvPr>
@@ -6419,7 +6572,7 @@
           <a:p>
             <a:r>
               <a:rPr lang="en-CH" dirty="0"/>
-              <a:t>CI options</a:t>
+              <a:t>GitHub Actions basic ideas</a:t>
             </a:r>
           </a:p>
         </p:txBody>
@@ -6429,7 +6582,7 @@
           <p:cNvPr id="3" name="Content Placeholder 2">
             <a:extLst>
               <a:ext uri="{FF2B5EF4-FFF2-40B4-BE49-F238E27FC236}">
-                <a16:creationId xmlns:a16="http://schemas.microsoft.com/office/drawing/2014/main" id="{D5A7549D-6C69-FC4D-94A9-2F481DCF80E4}"/>
+                <a16:creationId xmlns:a16="http://schemas.microsoft.com/office/drawing/2014/main" id="{6D76AC3E-727D-9345-BF91-E141F622FCB8}"/>
               </a:ext>
             </a:extLst>
           </p:cNvPr>
@@ -6447,20 +6600,25 @@
           <a:p>
             <a:r>
               <a:rPr lang="en-CH" dirty="0"/>
-              <a:t>TravisCI</a:t>
+              <a:t>An event occurs, it has an associated commit SHA</a:t>
             </a:r>
           </a:p>
           <a:p>
             <a:r>
               <a:rPr lang="en-CH" dirty="0"/>
-              <a:t>CircleCI</a:t>
+              <a:t>GitHub searches for config files in .github/workflows at that SHA, and looks if there is a trigger that matches the event (the “on:” part of the config file</a:t>
             </a:r>
           </a:p>
           <a:p>
             <a:r>
               <a:rPr lang="en-CH" dirty="0"/>
-              <a:t>GitHub actions</a:t>
-            </a:r>
+              <a:t>It then creates a virtual machine as specified in the config file and runs the commands </a:t>
+            </a:r>
+            <a:r>
+              <a:rPr lang="en-CH"/>
+              <a:t>listed there</a:t>
+            </a:r>
+            <a:endParaRPr lang="en-CH" dirty="0"/>
           </a:p>
         </p:txBody>
       </p:sp>
@@ -6469,7 +6627,7 @@
           <p:cNvPr id="4" name="Date Placeholder 3">
             <a:extLst>
               <a:ext uri="{FF2B5EF4-FFF2-40B4-BE49-F238E27FC236}">
-                <a16:creationId xmlns:a16="http://schemas.microsoft.com/office/drawing/2014/main" id="{164E4951-B129-814A-9CEF-5E059F59DA99}"/>
+                <a16:creationId xmlns:a16="http://schemas.microsoft.com/office/drawing/2014/main" id="{01B74FBB-6928-0E40-87F8-3689137B6A44}"/>
               </a:ext>
             </a:extLst>
           </p:cNvPr>
@@ -6498,7 +6656,7 @@
           <p:cNvPr id="5" name="Footer Placeholder 4">
             <a:extLst>
               <a:ext uri="{FF2B5EF4-FFF2-40B4-BE49-F238E27FC236}">
-                <a16:creationId xmlns:a16="http://schemas.microsoft.com/office/drawing/2014/main" id="{92A06B6D-EFF0-6C49-AC59-B54B8947E86B}"/>
+                <a16:creationId xmlns:a16="http://schemas.microsoft.com/office/drawing/2014/main" id="{4FB5E559-28D2-B742-A608-B353E85B9786}"/>
               </a:ext>
             </a:extLst>
           </p:cNvPr>
@@ -6525,7 +6683,7 @@
     </p:spTree>
     <p:extLst>
       <p:ext uri="{BB962C8B-B14F-4D97-AF65-F5344CB8AC3E}">
-        <p14:creationId xmlns:p14="http://schemas.microsoft.com/office/powerpoint/2010/main" val="1680327364"/>
+        <p14:creationId xmlns:p14="http://schemas.microsoft.com/office/powerpoint/2010/main" val="3315879559"/>
       </p:ext>
     </p:extLst>
   </p:cSld>
@@ -6602,26 +6760,12 @@
           <a:lstStyle/>
           <a:p>
             <a:r>
+              <a:rPr lang="en-CH"/>
+              <a:t>The </a:t>
+            </a:r>
+            <a:r>
               <a:rPr lang="en-CH" dirty="0"/>
-              <a:t>An event occurs, it has an associated commit SHA</a:t>
-            </a:r>
-          </a:p>
-          <a:p>
-            <a:r>
-              <a:rPr lang="en-CH" dirty="0"/>
-              <a:t>GitHub searches for config files in .github/workflows at that SHA, and looks if there is a trigger that matches the event (the “on:” part of the config file</a:t>
-            </a:r>
-          </a:p>
-          <a:p>
-            <a:r>
-              <a:rPr lang="en-CH" dirty="0"/>
-              <a:t>It then creates a virtual machine as specified in the config file and runs the commands listed there</a:t>
-            </a:r>
-          </a:p>
-          <a:p>
-            <a:r>
-              <a:rPr lang="en-CH" dirty="0"/>
-              <a:t>The outcome is logged and if the job exits cleanly it is marked as ”passed” otherwise “failed”</a:t>
+              <a:t>outcome is logged and if the job exits cleanly it is marked as ”passed” otherwise “failed”</a:t>
             </a:r>
           </a:p>
           <a:p>
@@ -6687,10 +6831,82 @@
           </a:p>
         </p:txBody>
       </p:sp>
+      <p:pic>
+        <p:nvPicPr>
+          <p:cNvPr id="8" name="Picture 7" descr="A screenshot of a computer&#10;&#10;Description automatically generated with medium confidence">
+            <a:extLst>
+              <a:ext uri="{FF2B5EF4-FFF2-40B4-BE49-F238E27FC236}">
+                <a16:creationId xmlns:a16="http://schemas.microsoft.com/office/drawing/2014/main" id="{2161033D-8E2B-394A-B1ED-5F835F679C2E}"/>
+              </a:ext>
+            </a:extLst>
+          </p:cNvPr>
+          <p:cNvPicPr>
+            <a:picLocks noChangeAspect="1"/>
+          </p:cNvPicPr>
+          <p:nvPr/>
+        </p:nvPicPr>
+        <p:blipFill>
+          <a:blip r:embed="rId2">
+            <a:extLst>
+              <a:ext uri="{28A0092B-C50C-407E-A947-70E740481C1C}">
+                <a14:useLocalDpi xmlns:a14="http://schemas.microsoft.com/office/drawing/2010/main" val="0"/>
+              </a:ext>
+            </a:extLst>
+          </a:blip>
+          <a:stretch>
+            <a:fillRect/>
+          </a:stretch>
+        </p:blipFill>
+        <p:spPr>
+          <a:xfrm>
+            <a:off x="457200" y="2270610"/>
+            <a:ext cx="5328592" cy="2316779"/>
+          </a:xfrm>
+          <a:prstGeom prst="rect">
+            <a:avLst/>
+          </a:prstGeom>
+        </p:spPr>
+      </p:pic>
+      <p:pic>
+        <p:nvPicPr>
+          <p:cNvPr id="9" name="Picture 8" descr="Graphical user interface, text, application&#10;&#10;Description automatically generated">
+            <a:extLst>
+              <a:ext uri="{FF2B5EF4-FFF2-40B4-BE49-F238E27FC236}">
+                <a16:creationId xmlns:a16="http://schemas.microsoft.com/office/drawing/2014/main" id="{EC30FD2E-55B1-4D4E-8DCD-80DC18F36C5A}"/>
+              </a:ext>
+            </a:extLst>
+          </p:cNvPr>
+          <p:cNvPicPr>
+            <a:picLocks noChangeAspect="1"/>
+          </p:cNvPicPr>
+          <p:nvPr/>
+        </p:nvPicPr>
+        <p:blipFill>
+          <a:blip r:embed="rId3">
+            <a:extLst>
+              <a:ext uri="{28A0092B-C50C-407E-A947-70E740481C1C}">
+                <a14:useLocalDpi xmlns:a14="http://schemas.microsoft.com/office/drawing/2010/main" val="0"/>
+              </a:ext>
+            </a:extLst>
+          </a:blip>
+          <a:stretch>
+            <a:fillRect/>
+          </a:stretch>
+        </p:blipFill>
+        <p:spPr>
+          <a:xfrm>
+            <a:off x="3243876" y="3628398"/>
+            <a:ext cx="5442924" cy="2316762"/>
+          </a:xfrm>
+          <a:prstGeom prst="rect">
+            <a:avLst/>
+          </a:prstGeom>
+        </p:spPr>
+      </p:pic>
     </p:spTree>
     <p:extLst>
       <p:ext uri="{BB962C8B-B14F-4D97-AF65-F5344CB8AC3E}">
-        <p14:creationId xmlns:p14="http://schemas.microsoft.com/office/powerpoint/2010/main" val="3315879559"/>
+        <p14:creationId xmlns:p14="http://schemas.microsoft.com/office/powerpoint/2010/main" val="4034475540"/>
       </p:ext>
     </p:extLst>
   </p:cSld>
@@ -6740,8 +6956,13 @@
           <a:p>
             <a:r>
               <a:rPr lang="en-CH" dirty="0"/>
-              <a:t>GitHub config file, </a:t>
-            </a:r>
+              <a:t>GitHub </a:t>
+            </a:r>
+            <a:r>
+              <a:rPr lang="en-CH"/>
+              <a:t>config file </a:t>
+            </a:r>
+            <a:endParaRPr lang="en-CH" dirty="0"/>
           </a:p>
         </p:txBody>
       </p:sp>
@@ -6767,21 +6988,99 @@
           <a:lstStyle/>
           <a:p>
             <a:r>
-              <a:rPr lang="en-CH" dirty="0"/>
-              <a:t>what is looks like</a:t>
-            </a:r>
-          </a:p>
-          <a:p>
-            <a:r>
-              <a:rPr lang="en-CH" dirty="0"/>
-              <a:t>demo</a:t>
-            </a:r>
-          </a:p>
-          <a:p>
-            <a:r>
-              <a:rPr lang="en-CH" dirty="0"/>
-              <a:t>exercise</a:t>
-            </a:r>
+              <a:rPr lang="en-CH"/>
+              <a:t>what i</a:t>
+            </a:r>
+            <a:r>
+              <a:rPr lang="de-DE" dirty="0"/>
+              <a:t>t</a:t>
+            </a:r>
+            <a:r>
+              <a:rPr lang="en-CH"/>
+              <a:t> looks like</a:t>
+            </a:r>
+            <a:r>
+              <a:rPr lang="de-DE" dirty="0"/>
+              <a:t> (</a:t>
+            </a:r>
+            <a:r>
+              <a:rPr lang="de-DE" dirty="0" err="1"/>
+              <a:t>show</a:t>
+            </a:r>
+            <a:r>
+              <a:rPr lang="de-DE" dirty="0"/>
+              <a:t> </a:t>
+            </a:r>
+            <a:r>
+              <a:rPr lang="de-DE" dirty="0" err="1"/>
+              <a:t>example</a:t>
+            </a:r>
+            <a:r>
+              <a:rPr lang="de-DE" dirty="0"/>
+              <a:t> </a:t>
+            </a:r>
+            <a:r>
+              <a:rPr lang="de-DE" dirty="0" err="1"/>
+              <a:t>with</a:t>
+            </a:r>
+            <a:r>
+              <a:rPr lang="de-DE" dirty="0"/>
+              <a:t> all </a:t>
+            </a:r>
+            <a:r>
+              <a:rPr lang="de-DE" dirty="0" err="1"/>
+              <a:t>the</a:t>
+            </a:r>
+            <a:r>
+              <a:rPr lang="de-DE" dirty="0"/>
+              <a:t> </a:t>
+            </a:r>
+            <a:r>
+              <a:rPr lang="de-DE" dirty="0" err="1"/>
+              <a:t>options</a:t>
+            </a:r>
+            <a:r>
+              <a:rPr lang="de-DE" dirty="0"/>
+              <a:t> </a:t>
+            </a:r>
+            <a:r>
+              <a:rPr lang="de-DE" dirty="0" err="1"/>
+              <a:t>enabled</a:t>
+            </a:r>
+            <a:r>
+              <a:rPr lang="de-DE" dirty="0"/>
+              <a:t> like in </a:t>
+            </a:r>
+            <a:r>
+              <a:rPr lang="de-DE" dirty="0" err="1"/>
+              <a:t>pelita</a:t>
+            </a:r>
+            <a:r>
+              <a:rPr lang="de-DE" dirty="0"/>
+              <a:t>?)</a:t>
+            </a:r>
+            <a:endParaRPr lang="en-CH" dirty="0"/>
+          </a:p>
+          <a:p>
+            <a:r>
+              <a:rPr lang="en-GB" dirty="0"/>
+              <a:t>D</a:t>
+            </a:r>
+            <a:r>
+              <a:rPr lang="en-CH"/>
+              <a:t>emo</a:t>
+            </a:r>
+            <a:r>
+              <a:rPr lang="de-DE" dirty="0"/>
+              <a:t> (?)</a:t>
+            </a:r>
+            <a:endParaRPr lang="en-CH" dirty="0"/>
+          </a:p>
+          <a:p>
+            <a:pPr marL="0" indent="0">
+              <a:buNone/>
+            </a:pPr>
+            <a:endParaRPr lang="en-CH" dirty="0"/>
           </a:p>
           <a:p>
             <a:endParaRPr lang="en-CH" dirty="0"/>

</xml_diff>

<commit_message>
Use RandomState for the fuzzing
</commit_message>
<xml_diff>
--- a/continuous_integration.pptx
+++ b/continuous_integration.pptx
@@ -297,7 +297,7 @@
             <a:fld id="{80AC11AF-147E-0A48-A5B0-8DA858D84551}" type="datetimeFigureOut">
               <a:rPr lang="en-US" smtClean="0"/>
               <a:pPr/>
-              <a:t>8/22/21</a:t>
+              <a:t>8/23/21</a:t>
             </a:fld>
             <a:endParaRPr lang="en-US"/>
           </a:p>
@@ -6325,8 +6325,18 @@
               <a:t> </a:t>
             </a:r>
             <a:r>
+              <a:rPr lang="de-DE" dirty="0" err="1">
+                <a:cs typeface="Courier New" panose="02070309020205020404" pitchFamily="49" charset="0"/>
+              </a:rPr>
+              <a:t>r</a:t>
+            </a:r>
+            <a:r>
+              <a:rPr lang="de-DE" dirty="0" err="1"/>
+              <a:t>un</a:t>
+            </a:r>
+            <a:r>
               <a:rPr lang="de-DE" dirty="0"/>
-              <a:t>Run </a:t>
+              <a:t> </a:t>
             </a:r>
             <a:r>
               <a:rPr lang="de-DE" dirty="0" err="1"/>
@@ -9612,7 +9622,7 @@
               <a:rPr lang="en-CH" sz="2000" dirty="0">
                 <a:latin typeface="+mn-lt"/>
               </a:rPr>
-              <a:t>The tests might pass on one machine and/or the other, but not in a third-party environment (versions, OS, computer ghosts)</a:t>
+              <a:t>The tests might pass on one machine and/or the other, but not in a third-party environment (versions, OS, etc.)</a:t>
             </a:r>
           </a:p>
           <a:p>
@@ -11655,22 +11665,21 @@
             <p:ph type="title"/>
           </p:nvPr>
         </p:nvSpPr>
-        <p:spPr/>
-        <p:txBody>
-          <a:bodyPr/>
+        <p:spPr>
+          <a:xfrm>
+            <a:off x="457200" y="228600"/>
+            <a:ext cx="8527976" cy="914400"/>
+          </a:xfrm>
+        </p:spPr>
+        <p:txBody>
+          <a:bodyPr>
+            <a:normAutofit/>
+          </a:bodyPr>
           <a:lstStyle/>
           <a:p>
             <a:r>
               <a:rPr lang="de-DE" dirty="0"/>
-              <a:t>Collaborative </a:t>
-            </a:r>
-            <a:r>
-              <a:rPr lang="de-DE" dirty="0" err="1"/>
-              <a:t>development</a:t>
-            </a:r>
-            <a:r>
-              <a:rPr lang="de-DE" dirty="0"/>
-              <a:t> </a:t>
+              <a:t>Collaborative Development </a:t>
             </a:r>
             <a:r>
               <a:rPr lang="de-DE" dirty="0" err="1"/>
@@ -11926,12 +11935,8 @@
               <a:buNone/>
             </a:pPr>
             <a:r>
-              <a:rPr lang="en-CH"/>
-              <a:t>GitHub </a:t>
-            </a:r>
-            <a:r>
               <a:rPr lang="en-CH" dirty="0"/>
-              <a:t>searches for config files in </a:t>
+              <a:t>GitHub searches for config files in </a:t>
             </a:r>
             <a:r>
               <a:rPr lang="en-CH" sz="2000" dirty="0">
@@ -11942,37 +11947,26 @@
             </a:r>
             <a:r>
               <a:rPr lang="en-CH" dirty="0"/>
-              <a:t>at that SHA, and looks if there is a trigger that matches the event (the “</a:t>
-            </a:r>
-            <a:r>
-              <a:rPr lang="en-CH" dirty="0">
-                <a:latin typeface="Courier New" panose="02070309020205020404" pitchFamily="49" charset="0"/>
-                <a:cs typeface="Courier New" panose="02070309020205020404" pitchFamily="49" charset="0"/>
-              </a:rPr>
-              <a:t>on:</a:t>
-            </a:r>
-            <a:r>
+              <a:t>at that SHA, and looks if there is a trigger that matches the event</a:t>
+            </a:r>
+            <a:br>
               <a:rPr lang="en-CH" dirty="0"/>
-              <a:t>” part of the config file)</a:t>
-            </a:r>
+            </a:br>
+            <a:br>
+              <a:rPr lang="en-CH" dirty="0"/>
+            </a:br>
+            <a:br>
+              <a:rPr lang="en-CH" dirty="0"/>
+            </a:br>
+            <a:endParaRPr lang="de-DE" dirty="0"/>
           </a:p>
           <a:p>
             <a:pPr marL="0" indent="0">
               <a:buNone/>
             </a:pPr>
-            <a:endParaRPr lang="de-DE" dirty="0"/>
-          </a:p>
-          <a:p>
-            <a:pPr marL="0" indent="0">
-              <a:buNone/>
-            </a:pPr>
-            <a:r>
-              <a:rPr lang="en-CH"/>
-              <a:t>It </a:t>
-            </a:r>
             <a:r>
               <a:rPr lang="en-CH" dirty="0"/>
-              <a:t>then creates a virtual machine as specified in the config file and runs the commands listed there</a:t>
+              <a:t>It then creates a virtual machine as specified in the config file and runs the commands listed there</a:t>
             </a:r>
           </a:p>
         </p:txBody>

</xml_diff>

<commit_message>
minor changes to slides
</commit_message>
<xml_diff>
--- a/continuous_integration.pptx
+++ b/continuous_integration.pptx
@@ -29,11 +29,11 @@
     <p:sldId id="326" r:id="rId17"/>
     <p:sldId id="327" r:id="rId18"/>
     <p:sldId id="320" r:id="rId19"/>
-    <p:sldId id="328" r:id="rId20"/>
-    <p:sldId id="307" r:id="rId21"/>
-    <p:sldId id="321" r:id="rId22"/>
-    <p:sldId id="322" r:id="rId23"/>
-    <p:sldId id="288" r:id="rId24"/>
+    <p:sldId id="322" r:id="rId20"/>
+    <p:sldId id="288" r:id="rId21"/>
+    <p:sldId id="328" r:id="rId22"/>
+    <p:sldId id="307" r:id="rId23"/>
+    <p:sldId id="321" r:id="rId24"/>
     <p:sldId id="298" r:id="rId25"/>
   </p:sldIdLst>
   <p:sldSz cx="9144000" cy="6858000" type="screen4x3"/>
@@ -186,11 +186,11 @@
             <p14:sldId id="326"/>
             <p14:sldId id="327"/>
             <p14:sldId id="320"/>
+            <p14:sldId id="322"/>
+            <p14:sldId id="288"/>
             <p14:sldId id="328"/>
             <p14:sldId id="307"/>
             <p14:sldId id="321"/>
-            <p14:sldId id="322"/>
-            <p14:sldId id="288"/>
             <p14:sldId id="298"/>
           </p14:sldIdLst>
         </p14:section>
@@ -297,7 +297,7 @@
             <a:fld id="{80AC11AF-147E-0A48-A5B0-8DA858D84551}" type="datetimeFigureOut">
               <a:rPr lang="en-US" smtClean="0"/>
               <a:pPr/>
-              <a:t>8/23/21</a:t>
+              <a:t>8/24/22</a:t>
             </a:fld>
             <a:endParaRPr lang="en-US"/>
           </a:p>
@@ -8965,6 +8965,524 @@
           <p:cNvPr id="2" name="Title 1">
             <a:extLst>
               <a:ext uri="{FF2B5EF4-FFF2-40B4-BE49-F238E27FC236}">
+                <a16:creationId xmlns:a16="http://schemas.microsoft.com/office/drawing/2014/main" id="{0209F7B9-B500-6A48-B3AA-7D5C6DC44CB2}"/>
+              </a:ext>
+            </a:extLst>
+          </p:cNvPr>
+          <p:cNvSpPr>
+            <a:spLocks noGrp="1"/>
+          </p:cNvSpPr>
+          <p:nvPr>
+            <p:ph type="title"/>
+          </p:nvPr>
+        </p:nvSpPr>
+        <p:spPr/>
+        <p:txBody>
+          <a:bodyPr/>
+          <a:lstStyle/>
+          <a:p>
+            <a:r>
+              <a:rPr lang="en-CH" dirty="0"/>
+              <a:t>Conclusions</a:t>
+            </a:r>
+          </a:p>
+        </p:txBody>
+      </p:sp>
+      <p:sp>
+        <p:nvSpPr>
+          <p:cNvPr id="3" name="Content Placeholder 2">
+            <a:extLst>
+              <a:ext uri="{FF2B5EF4-FFF2-40B4-BE49-F238E27FC236}">
+                <a16:creationId xmlns:a16="http://schemas.microsoft.com/office/drawing/2014/main" id="{B483744F-BEF5-0B46-9B81-355BEB76BA2A}"/>
+              </a:ext>
+            </a:extLst>
+          </p:cNvPr>
+          <p:cNvSpPr>
+            <a:spLocks noGrp="1"/>
+          </p:cNvSpPr>
+          <p:nvPr>
+            <p:ph sz="quarter" idx="1"/>
+          </p:nvPr>
+        </p:nvSpPr>
+        <p:spPr/>
+        <p:txBody>
+          <a:bodyPr/>
+          <a:lstStyle/>
+          <a:p>
+            <a:r>
+              <a:rPr lang="en-CH" dirty="0"/>
+              <a:t>It takes a bit of time to set up and debug a Continuous Integration workflow, but it’s a good investment that can save you a lot </a:t>
+            </a:r>
+            <a:r>
+              <a:rPr lang="en-CH"/>
+              <a:t>of time later on!</a:t>
+            </a:r>
+            <a:endParaRPr lang="en-CH" dirty="0"/>
+          </a:p>
+        </p:txBody>
+      </p:sp>
+      <p:sp>
+        <p:nvSpPr>
+          <p:cNvPr id="4" name="Date Placeholder 3">
+            <a:extLst>
+              <a:ext uri="{FF2B5EF4-FFF2-40B4-BE49-F238E27FC236}">
+                <a16:creationId xmlns:a16="http://schemas.microsoft.com/office/drawing/2014/main" id="{C03D37C7-B59B-1048-A802-78F6FA69F6C7}"/>
+              </a:ext>
+            </a:extLst>
+          </p:cNvPr>
+          <p:cNvSpPr>
+            <a:spLocks noGrp="1"/>
+          </p:cNvSpPr>
+          <p:nvPr>
+            <p:ph type="dt" sz="half" idx="10"/>
+          </p:nvPr>
+        </p:nvSpPr>
+        <p:spPr/>
+        <p:txBody>
+          <a:bodyPr/>
+          <a:lstStyle/>
+          <a:p>
+            <a:r>
+              <a:rPr lang="de-CH" sz="1000"/>
+              <a:t>August 2021, CC BY-SA 4.0</a:t>
+            </a:r>
+            <a:endParaRPr lang="en-US" sz="1000" dirty="0"/>
+          </a:p>
+        </p:txBody>
+      </p:sp>
+      <p:sp>
+        <p:nvSpPr>
+          <p:cNvPr id="5" name="Footer Placeholder 4">
+            <a:extLst>
+              <a:ext uri="{FF2B5EF4-FFF2-40B4-BE49-F238E27FC236}">
+                <a16:creationId xmlns:a16="http://schemas.microsoft.com/office/drawing/2014/main" id="{DB93DB5F-4A03-CA44-A54B-D5F34E39E00B}"/>
+              </a:ext>
+            </a:extLst>
+          </p:cNvPr>
+          <p:cNvSpPr>
+            <a:spLocks noGrp="1"/>
+          </p:cNvSpPr>
+          <p:nvPr>
+            <p:ph type="ftr" sz="quarter" idx="11"/>
+          </p:nvPr>
+        </p:nvSpPr>
+        <p:spPr/>
+        <p:txBody>
+          <a:bodyPr/>
+          <a:lstStyle/>
+          <a:p>
+            <a:r>
+              <a:rPr lang="en-US"/>
+              <a:t>Continuous integration, v1.0</a:t>
+            </a:r>
+            <a:endParaRPr lang="en-US" dirty="0"/>
+          </a:p>
+        </p:txBody>
+      </p:sp>
+      <p:pic>
+        <p:nvPicPr>
+          <p:cNvPr id="7" name="Picture 6" descr="A picture containing metalware, gear, white&#10;&#10;Description automatically generated">
+            <a:extLst>
+              <a:ext uri="{FF2B5EF4-FFF2-40B4-BE49-F238E27FC236}">
+                <a16:creationId xmlns:a16="http://schemas.microsoft.com/office/drawing/2014/main" id="{1C8CF780-D6FA-BB4C-A576-417D77749A00}"/>
+              </a:ext>
+            </a:extLst>
+          </p:cNvPr>
+          <p:cNvPicPr>
+            <a:picLocks noChangeAspect="1"/>
+          </p:cNvPicPr>
+          <p:nvPr/>
+        </p:nvPicPr>
+        <p:blipFill>
+          <a:blip r:embed="rId2">
+            <a:extLst>
+              <a:ext uri="{28A0092B-C50C-407E-A947-70E740481C1C}">
+                <a14:useLocalDpi xmlns:a14="http://schemas.microsoft.com/office/drawing/2010/main" val="0"/>
+              </a:ext>
+            </a:extLst>
+          </a:blip>
+          <a:stretch>
+            <a:fillRect/>
+          </a:stretch>
+        </p:blipFill>
+        <p:spPr>
+          <a:xfrm rot="16200000">
+            <a:off x="5957585" y="3157241"/>
+            <a:ext cx="3830908" cy="2567310"/>
+          </a:xfrm>
+          <a:prstGeom prst="rect">
+            <a:avLst/>
+          </a:prstGeom>
+        </p:spPr>
+      </p:pic>
+    </p:spTree>
+    <p:extLst>
+      <p:ext uri="{BB962C8B-B14F-4D97-AF65-F5344CB8AC3E}">
+        <p14:creationId xmlns:p14="http://schemas.microsoft.com/office/powerpoint/2010/main" val="202595180"/>
+      </p:ext>
+    </p:extLst>
+  </p:cSld>
+  <p:clrMapOvr>
+    <a:masterClrMapping/>
+  </p:clrMapOvr>
+</p:sld>
+</file>
+
+<file path=ppt/slides/slide2.xml><?xml version="1.0" encoding="utf-8"?>
+<p:sld xmlns:a="http://schemas.openxmlformats.org/drawingml/2006/main" xmlns:r="http://schemas.openxmlformats.org/officeDocument/2006/relationships" xmlns:p="http://schemas.openxmlformats.org/presentationml/2006/main">
+  <p:cSld>
+    <p:spTree>
+      <p:nvGrpSpPr>
+        <p:cNvPr id="1" name=""/>
+        <p:cNvGrpSpPr/>
+        <p:nvPr/>
+      </p:nvGrpSpPr>
+      <p:grpSpPr>
+        <a:xfrm>
+          <a:off x="0" y="0"/>
+          <a:ext cx="0" cy="0"/>
+          <a:chOff x="0" y="0"/>
+          <a:chExt cx="0" cy="0"/>
+        </a:xfrm>
+      </p:grpSpPr>
+      <p:sp>
+        <p:nvSpPr>
+          <p:cNvPr id="2" name="Title 1">
+            <a:extLst>
+              <a:ext uri="{FF2B5EF4-FFF2-40B4-BE49-F238E27FC236}">
+                <a16:creationId xmlns:a16="http://schemas.microsoft.com/office/drawing/2014/main" id="{4993AE45-A766-0F4D-9D65-D692ECB4ED00}"/>
+              </a:ext>
+            </a:extLst>
+          </p:cNvPr>
+          <p:cNvSpPr>
+            <a:spLocks noGrp="1"/>
+          </p:cNvSpPr>
+          <p:nvPr>
+            <p:ph type="title"/>
+          </p:nvPr>
+        </p:nvSpPr>
+        <p:spPr/>
+        <p:txBody>
+          <a:bodyPr/>
+          <a:lstStyle/>
+          <a:p>
+            <a:r>
+              <a:rPr lang="de-DE" dirty="0"/>
+              <a:t>Collaborative Development </a:t>
+            </a:r>
+            <a:r>
+              <a:rPr lang="de-DE" dirty="0" err="1"/>
+              <a:t>without</a:t>
+            </a:r>
+            <a:r>
+              <a:rPr lang="de-DE" dirty="0"/>
+              <a:t> CI</a:t>
+            </a:r>
+            <a:endParaRPr lang="en-CH" dirty="0"/>
+          </a:p>
+        </p:txBody>
+      </p:sp>
+      <p:sp>
+        <p:nvSpPr>
+          <p:cNvPr id="4" name="Date Placeholder 3">
+            <a:extLst>
+              <a:ext uri="{FF2B5EF4-FFF2-40B4-BE49-F238E27FC236}">
+                <a16:creationId xmlns:a16="http://schemas.microsoft.com/office/drawing/2014/main" id="{BB7DFD63-E8DE-9344-BDD0-A143F8BD67AC}"/>
+              </a:ext>
+            </a:extLst>
+          </p:cNvPr>
+          <p:cNvSpPr>
+            <a:spLocks noGrp="1"/>
+          </p:cNvSpPr>
+          <p:nvPr>
+            <p:ph type="dt" sz="half" idx="10"/>
+          </p:nvPr>
+        </p:nvSpPr>
+        <p:spPr/>
+        <p:txBody>
+          <a:bodyPr/>
+          <a:lstStyle/>
+          <a:p>
+            <a:r>
+              <a:rPr lang="de-CH" sz="1000"/>
+              <a:t>August 2021, CC BY-SA 4.0</a:t>
+            </a:r>
+            <a:endParaRPr lang="en-US" sz="1000" dirty="0"/>
+          </a:p>
+        </p:txBody>
+      </p:sp>
+      <p:sp>
+        <p:nvSpPr>
+          <p:cNvPr id="5" name="Footer Placeholder 4">
+            <a:extLst>
+              <a:ext uri="{FF2B5EF4-FFF2-40B4-BE49-F238E27FC236}">
+                <a16:creationId xmlns:a16="http://schemas.microsoft.com/office/drawing/2014/main" id="{5138C878-C3D9-AC4C-BDD7-9EFA39DFB1A1}"/>
+              </a:ext>
+            </a:extLst>
+          </p:cNvPr>
+          <p:cNvSpPr>
+            <a:spLocks noGrp="1"/>
+          </p:cNvSpPr>
+          <p:nvPr>
+            <p:ph type="ftr" sz="quarter" idx="11"/>
+          </p:nvPr>
+        </p:nvSpPr>
+        <p:spPr/>
+        <p:txBody>
+          <a:bodyPr/>
+          <a:lstStyle/>
+          <a:p>
+            <a:r>
+              <a:rPr lang="en-US"/>
+              <a:t>Continuous integration, v1.0</a:t>
+            </a:r>
+            <a:endParaRPr lang="en-US" dirty="0"/>
+          </a:p>
+        </p:txBody>
+      </p:sp>
+      <p:sp>
+        <p:nvSpPr>
+          <p:cNvPr id="15" name="Rectangle 14">
+            <a:extLst>
+              <a:ext uri="{FF2B5EF4-FFF2-40B4-BE49-F238E27FC236}">
+                <a16:creationId xmlns:a16="http://schemas.microsoft.com/office/drawing/2014/main" id="{A6D19DE0-5F67-1746-9159-5DDB1C4C03CA}"/>
+              </a:ext>
+            </a:extLst>
+          </p:cNvPr>
+          <p:cNvSpPr/>
+          <p:nvPr/>
+        </p:nvSpPr>
+        <p:spPr>
+          <a:xfrm>
+            <a:off x="354569" y="4145012"/>
+            <a:ext cx="8537911" cy="2308324"/>
+          </a:xfrm>
+          <a:prstGeom prst="rect">
+            <a:avLst/>
+          </a:prstGeom>
+        </p:spPr>
+        <p:txBody>
+          <a:bodyPr wrap="square">
+            <a:spAutoFit/>
+          </a:bodyPr>
+          <a:lstStyle/>
+          <a:p>
+            <a:r>
+              <a:rPr lang="en-CH" dirty="0">
+                <a:latin typeface="+mn-lt"/>
+              </a:rPr>
+              <a:t>Potential issues</a:t>
+            </a:r>
+          </a:p>
+          <a:p>
+            <a:pPr marL="342900" indent="-342900">
+              <a:buFontTx/>
+              <a:buChar char="-"/>
+            </a:pPr>
+            <a:r>
+              <a:rPr lang="en-CH" sz="2000" dirty="0">
+                <a:latin typeface="+mn-lt"/>
+              </a:rPr>
+              <a:t>The tests might pass on one machine and/or the other, but not in a third-party environment (versions, OS, etc.)</a:t>
+            </a:r>
+          </a:p>
+          <a:p>
+            <a:pPr marL="342900" indent="-342900">
+              <a:buFontTx/>
+              <a:buChar char="-"/>
+            </a:pPr>
+            <a:r>
+              <a:rPr lang="en-CH" sz="2000" dirty="0">
+                <a:latin typeface="+mn-lt"/>
+              </a:rPr>
+              <a:t>A maintainer needs to ensure that the software works on all the supported combinations of versions / OSs</a:t>
+            </a:r>
+          </a:p>
+          <a:p>
+            <a:pPr marL="342900" indent="-342900">
+              <a:buFontTx/>
+              <a:buChar char="-"/>
+            </a:pPr>
+            <a:r>
+              <a:rPr lang="en-CH" sz="2000" dirty="0">
+                <a:latin typeface="+mn-lt"/>
+              </a:rPr>
+              <a:t>A maintainer needs to create and upload artifacts like binary packages, documentation, etc </a:t>
+            </a:r>
+          </a:p>
+        </p:txBody>
+      </p:sp>
+      <p:pic>
+        <p:nvPicPr>
+          <p:cNvPr id="7" name="Picture 6" descr="Graphical user interface, diagram&#10;&#10;Description automatically generated">
+            <a:extLst>
+              <a:ext uri="{FF2B5EF4-FFF2-40B4-BE49-F238E27FC236}">
+                <a16:creationId xmlns:a16="http://schemas.microsoft.com/office/drawing/2014/main" id="{D7FC7664-635F-E842-8D8C-22F2EAE1C75C}"/>
+              </a:ext>
+            </a:extLst>
+          </p:cNvPr>
+          <p:cNvPicPr>
+            <a:picLocks noChangeAspect="1"/>
+          </p:cNvPicPr>
+          <p:nvPr/>
+        </p:nvPicPr>
+        <p:blipFill>
+          <a:blip r:embed="rId2">
+            <a:extLst>
+              <a:ext uri="{28A0092B-C50C-407E-A947-70E740481C1C}">
+                <a14:useLocalDpi xmlns:a14="http://schemas.microsoft.com/office/drawing/2010/main" val="0"/>
+              </a:ext>
+            </a:extLst>
+          </a:blip>
+          <a:stretch>
+            <a:fillRect/>
+          </a:stretch>
+        </p:blipFill>
+        <p:spPr>
+          <a:xfrm>
+            <a:off x="1050848" y="1053132"/>
+            <a:ext cx="7200800" cy="3181749"/>
+          </a:xfrm>
+          <a:prstGeom prst="rect">
+            <a:avLst/>
+          </a:prstGeom>
+        </p:spPr>
+      </p:pic>
+    </p:spTree>
+    <p:extLst>
+      <p:ext uri="{BB962C8B-B14F-4D97-AF65-F5344CB8AC3E}">
+        <p14:creationId xmlns:p14="http://schemas.microsoft.com/office/powerpoint/2010/main" val="578119186"/>
+      </p:ext>
+    </p:extLst>
+  </p:cSld>
+  <p:clrMapOvr>
+    <a:masterClrMapping/>
+  </p:clrMapOvr>
+</p:sld>
+</file>
+
+<file path=ppt/slides/slide20.xml><?xml version="1.0" encoding="utf-8"?>
+<p:sld xmlns:a="http://schemas.openxmlformats.org/drawingml/2006/main" xmlns:r="http://schemas.openxmlformats.org/officeDocument/2006/relationships" xmlns:p="http://schemas.openxmlformats.org/presentationml/2006/main">
+  <p:cSld>
+    <p:spTree>
+      <p:nvGrpSpPr>
+        <p:cNvPr id="1" name=""/>
+        <p:cNvGrpSpPr/>
+        <p:nvPr/>
+      </p:nvGrpSpPr>
+      <p:grpSpPr>
+        <a:xfrm>
+          <a:off x="0" y="0"/>
+          <a:ext cx="0" cy="0"/>
+          <a:chOff x="0" y="0"/>
+          <a:chExt cx="0" cy="0"/>
+        </a:xfrm>
+      </p:grpSpPr>
+      <p:sp>
+        <p:nvSpPr>
+          <p:cNvPr id="3" name="Date Placeholder 2"/>
+          <p:cNvSpPr>
+            <a:spLocks noGrp="1"/>
+          </p:cNvSpPr>
+          <p:nvPr>
+            <p:ph type="dt" sz="half" idx="10"/>
+          </p:nvPr>
+        </p:nvSpPr>
+        <p:spPr/>
+        <p:txBody>
+          <a:bodyPr/>
+          <a:lstStyle/>
+          <a:p>
+            <a:r>
+              <a:rPr lang="de-CH"/>
+              <a:t>August 2021, CC BY-SA 4.0</a:t>
+            </a:r>
+            <a:endParaRPr lang="en-US"/>
+          </a:p>
+        </p:txBody>
+      </p:sp>
+      <p:sp>
+        <p:nvSpPr>
+          <p:cNvPr id="4" name="Footer Placeholder 3"/>
+          <p:cNvSpPr>
+            <a:spLocks noGrp="1"/>
+          </p:cNvSpPr>
+          <p:nvPr>
+            <p:ph type="ftr" sz="quarter" idx="11"/>
+          </p:nvPr>
+        </p:nvSpPr>
+        <p:spPr/>
+        <p:txBody>
+          <a:bodyPr/>
+          <a:lstStyle/>
+          <a:p>
+            <a:r>
+              <a:rPr lang="en-US"/>
+              <a:t>Continuous integration, v1.0</a:t>
+            </a:r>
+          </a:p>
+        </p:txBody>
+      </p:sp>
+      <p:sp>
+        <p:nvSpPr>
+          <p:cNvPr id="2" name="Title 1"/>
+          <p:cNvSpPr>
+            <a:spLocks noGrp="1"/>
+          </p:cNvSpPr>
+          <p:nvPr>
+            <p:ph type="title" idx="4294967295"/>
+          </p:nvPr>
+        </p:nvSpPr>
+        <p:spPr>
+          <a:xfrm>
+            <a:off x="460248" y="2705375"/>
+            <a:ext cx="8229600" cy="990600"/>
+          </a:xfrm>
+        </p:spPr>
+        <p:txBody>
+          <a:bodyPr anchor="ctr">
+            <a:normAutofit/>
+          </a:bodyPr>
+          <a:lstStyle/>
+          <a:p>
+            <a:pPr algn="ctr"/>
+            <a:r>
+              <a:rPr lang="en-GB" sz="5400" dirty="0"/>
+              <a:t>Thank you!</a:t>
+            </a:r>
+          </a:p>
+        </p:txBody>
+      </p:sp>
+    </p:spTree>
+  </p:cSld>
+  <p:clrMapOvr>
+    <a:masterClrMapping/>
+  </p:clrMapOvr>
+</p:sld>
+</file>
+
+<file path=ppt/slides/slide21.xml><?xml version="1.0" encoding="utf-8"?>
+<p:sld xmlns:a="http://schemas.openxmlformats.org/drawingml/2006/main" xmlns:r="http://schemas.openxmlformats.org/officeDocument/2006/relationships" xmlns:p="http://schemas.openxmlformats.org/presentationml/2006/main">
+  <p:cSld>
+    <p:spTree>
+      <p:nvGrpSpPr>
+        <p:cNvPr id="1" name=""/>
+        <p:cNvGrpSpPr/>
+        <p:nvPr/>
+      </p:nvGrpSpPr>
+      <p:grpSpPr>
+        <a:xfrm>
+          <a:off x="0" y="0"/>
+          <a:ext cx="0" cy="0"/>
+          <a:chOff x="0" y="0"/>
+          <a:chExt cx="0" cy="0"/>
+        </a:xfrm>
+      </p:grpSpPr>
+      <p:sp>
+        <p:nvSpPr>
+          <p:cNvPr id="2" name="Title 1">
+            <a:extLst>
+              <a:ext uri="{FF2B5EF4-FFF2-40B4-BE49-F238E27FC236}">
                 <a16:creationId xmlns:a16="http://schemas.microsoft.com/office/drawing/2014/main" id="{061016C8-512C-EB4B-9D32-9CF4CB9D4F11}"/>
               </a:ext>
             </a:extLst>
@@ -8982,9 +9500,14 @@
           <a:lstStyle/>
           <a:p>
             <a:r>
-              <a:rPr lang="en-CH" dirty="0"/>
+              <a:rPr lang="de-DE" dirty="0"/>
+              <a:t>Bonus: </a:t>
+            </a:r>
+            <a:r>
+              <a:rPr lang="en-CH"/>
               <a:t>Security</a:t>
             </a:r>
+            <a:endParaRPr lang="en-CH" dirty="0"/>
           </a:p>
         </p:txBody>
       </p:sp>
@@ -9467,7 +9990,7 @@
 </p:sld>
 </file>
 
-<file path=ppt/slides/slide2.xml><?xml version="1.0" encoding="utf-8"?>
+<file path=ppt/slides/slide22.xml><?xml version="1.0" encoding="utf-8"?>
 <p:sld xmlns:a="http://schemas.openxmlformats.org/drawingml/2006/main" xmlns:r="http://schemas.openxmlformats.org/officeDocument/2006/relationships" xmlns:p="http://schemas.openxmlformats.org/presentationml/2006/main">
   <p:cSld>
     <p:spTree>
@@ -9489,239 +10012,6 @@
           <p:cNvPr id="2" name="Title 1">
             <a:extLst>
               <a:ext uri="{FF2B5EF4-FFF2-40B4-BE49-F238E27FC236}">
-                <a16:creationId xmlns:a16="http://schemas.microsoft.com/office/drawing/2014/main" id="{4993AE45-A766-0F4D-9D65-D692ECB4ED00}"/>
-              </a:ext>
-            </a:extLst>
-          </p:cNvPr>
-          <p:cNvSpPr>
-            <a:spLocks noGrp="1"/>
-          </p:cNvSpPr>
-          <p:nvPr>
-            <p:ph type="title"/>
-          </p:nvPr>
-        </p:nvSpPr>
-        <p:spPr/>
-        <p:txBody>
-          <a:bodyPr/>
-          <a:lstStyle/>
-          <a:p>
-            <a:r>
-              <a:rPr lang="de-DE" dirty="0"/>
-              <a:t>Collaborative Development </a:t>
-            </a:r>
-            <a:r>
-              <a:rPr lang="de-DE" dirty="0" err="1"/>
-              <a:t>without</a:t>
-            </a:r>
-            <a:r>
-              <a:rPr lang="de-DE" dirty="0"/>
-              <a:t> CI</a:t>
-            </a:r>
-            <a:endParaRPr lang="en-CH" dirty="0"/>
-          </a:p>
-        </p:txBody>
-      </p:sp>
-      <p:sp>
-        <p:nvSpPr>
-          <p:cNvPr id="4" name="Date Placeholder 3">
-            <a:extLst>
-              <a:ext uri="{FF2B5EF4-FFF2-40B4-BE49-F238E27FC236}">
-                <a16:creationId xmlns:a16="http://schemas.microsoft.com/office/drawing/2014/main" id="{BB7DFD63-E8DE-9344-BDD0-A143F8BD67AC}"/>
-              </a:ext>
-            </a:extLst>
-          </p:cNvPr>
-          <p:cNvSpPr>
-            <a:spLocks noGrp="1"/>
-          </p:cNvSpPr>
-          <p:nvPr>
-            <p:ph type="dt" sz="half" idx="10"/>
-          </p:nvPr>
-        </p:nvSpPr>
-        <p:spPr/>
-        <p:txBody>
-          <a:bodyPr/>
-          <a:lstStyle/>
-          <a:p>
-            <a:r>
-              <a:rPr lang="de-CH" sz="1000"/>
-              <a:t>August 2021, CC BY-SA 4.0</a:t>
-            </a:r>
-            <a:endParaRPr lang="en-US" sz="1000" dirty="0"/>
-          </a:p>
-        </p:txBody>
-      </p:sp>
-      <p:sp>
-        <p:nvSpPr>
-          <p:cNvPr id="5" name="Footer Placeholder 4">
-            <a:extLst>
-              <a:ext uri="{FF2B5EF4-FFF2-40B4-BE49-F238E27FC236}">
-                <a16:creationId xmlns:a16="http://schemas.microsoft.com/office/drawing/2014/main" id="{5138C878-C3D9-AC4C-BDD7-9EFA39DFB1A1}"/>
-              </a:ext>
-            </a:extLst>
-          </p:cNvPr>
-          <p:cNvSpPr>
-            <a:spLocks noGrp="1"/>
-          </p:cNvSpPr>
-          <p:nvPr>
-            <p:ph type="ftr" sz="quarter" idx="11"/>
-          </p:nvPr>
-        </p:nvSpPr>
-        <p:spPr/>
-        <p:txBody>
-          <a:bodyPr/>
-          <a:lstStyle/>
-          <a:p>
-            <a:r>
-              <a:rPr lang="en-US"/>
-              <a:t>Continuous integration, v1.0</a:t>
-            </a:r>
-            <a:endParaRPr lang="en-US" dirty="0"/>
-          </a:p>
-        </p:txBody>
-      </p:sp>
-      <p:sp>
-        <p:nvSpPr>
-          <p:cNvPr id="15" name="Rectangle 14">
-            <a:extLst>
-              <a:ext uri="{FF2B5EF4-FFF2-40B4-BE49-F238E27FC236}">
-                <a16:creationId xmlns:a16="http://schemas.microsoft.com/office/drawing/2014/main" id="{A6D19DE0-5F67-1746-9159-5DDB1C4C03CA}"/>
-              </a:ext>
-            </a:extLst>
-          </p:cNvPr>
-          <p:cNvSpPr/>
-          <p:nvPr/>
-        </p:nvSpPr>
-        <p:spPr>
-          <a:xfrm>
-            <a:off x="354569" y="4145012"/>
-            <a:ext cx="8537911" cy="2308324"/>
-          </a:xfrm>
-          <a:prstGeom prst="rect">
-            <a:avLst/>
-          </a:prstGeom>
-        </p:spPr>
-        <p:txBody>
-          <a:bodyPr wrap="square">
-            <a:spAutoFit/>
-          </a:bodyPr>
-          <a:lstStyle/>
-          <a:p>
-            <a:r>
-              <a:rPr lang="en-CH" dirty="0">
-                <a:latin typeface="+mn-lt"/>
-              </a:rPr>
-              <a:t>Potential issues</a:t>
-            </a:r>
-          </a:p>
-          <a:p>
-            <a:pPr marL="342900" indent="-342900">
-              <a:buFontTx/>
-              <a:buChar char="-"/>
-            </a:pPr>
-            <a:r>
-              <a:rPr lang="en-CH" sz="2000" dirty="0">
-                <a:latin typeface="+mn-lt"/>
-              </a:rPr>
-              <a:t>The tests might pass on one machine and/or the other, but not in a third-party environment (versions, OS, etc.)</a:t>
-            </a:r>
-          </a:p>
-          <a:p>
-            <a:pPr marL="342900" indent="-342900">
-              <a:buFontTx/>
-              <a:buChar char="-"/>
-            </a:pPr>
-            <a:r>
-              <a:rPr lang="en-CH" sz="2000" dirty="0">
-                <a:latin typeface="+mn-lt"/>
-              </a:rPr>
-              <a:t>A maintainer needs to ensure that the software works on all the supported combinations of versions / OSs</a:t>
-            </a:r>
-          </a:p>
-          <a:p>
-            <a:pPr marL="342900" indent="-342900">
-              <a:buFontTx/>
-              <a:buChar char="-"/>
-            </a:pPr>
-            <a:r>
-              <a:rPr lang="en-CH" sz="2000" dirty="0">
-                <a:latin typeface="+mn-lt"/>
-              </a:rPr>
-              <a:t>A maintainer needs to create and upload artifacts like binary packages, documentation, etc </a:t>
-            </a:r>
-          </a:p>
-        </p:txBody>
-      </p:sp>
-      <p:pic>
-        <p:nvPicPr>
-          <p:cNvPr id="7" name="Picture 6" descr="Graphical user interface, diagram&#10;&#10;Description automatically generated">
-            <a:extLst>
-              <a:ext uri="{FF2B5EF4-FFF2-40B4-BE49-F238E27FC236}">
-                <a16:creationId xmlns:a16="http://schemas.microsoft.com/office/drawing/2014/main" id="{D7FC7664-635F-E842-8D8C-22F2EAE1C75C}"/>
-              </a:ext>
-            </a:extLst>
-          </p:cNvPr>
-          <p:cNvPicPr>
-            <a:picLocks noChangeAspect="1"/>
-          </p:cNvPicPr>
-          <p:nvPr/>
-        </p:nvPicPr>
-        <p:blipFill>
-          <a:blip r:embed="rId2">
-            <a:extLst>
-              <a:ext uri="{28A0092B-C50C-407E-A947-70E740481C1C}">
-                <a14:useLocalDpi xmlns:a14="http://schemas.microsoft.com/office/drawing/2010/main" val="0"/>
-              </a:ext>
-            </a:extLst>
-          </a:blip>
-          <a:stretch>
-            <a:fillRect/>
-          </a:stretch>
-        </p:blipFill>
-        <p:spPr>
-          <a:xfrm>
-            <a:off x="1050848" y="1053132"/>
-            <a:ext cx="7200800" cy="3181749"/>
-          </a:xfrm>
-          <a:prstGeom prst="rect">
-            <a:avLst/>
-          </a:prstGeom>
-        </p:spPr>
-      </p:pic>
-    </p:spTree>
-    <p:extLst>
-      <p:ext uri="{BB962C8B-B14F-4D97-AF65-F5344CB8AC3E}">
-        <p14:creationId xmlns:p14="http://schemas.microsoft.com/office/powerpoint/2010/main" val="578119186"/>
-      </p:ext>
-    </p:extLst>
-  </p:cSld>
-  <p:clrMapOvr>
-    <a:masterClrMapping/>
-  </p:clrMapOvr>
-</p:sld>
-</file>
-
-<file path=ppt/slides/slide20.xml><?xml version="1.0" encoding="utf-8"?>
-<p:sld xmlns:a="http://schemas.openxmlformats.org/drawingml/2006/main" xmlns:r="http://schemas.openxmlformats.org/officeDocument/2006/relationships" xmlns:p="http://schemas.openxmlformats.org/presentationml/2006/main">
-  <p:cSld>
-    <p:spTree>
-      <p:nvGrpSpPr>
-        <p:cNvPr id="1" name=""/>
-        <p:cNvGrpSpPr/>
-        <p:nvPr/>
-      </p:nvGrpSpPr>
-      <p:grpSpPr>
-        <a:xfrm>
-          <a:off x="0" y="0"/>
-          <a:ext cx="0" cy="0"/>
-          <a:chOff x="0" y="0"/>
-          <a:chExt cx="0" cy="0"/>
-        </a:xfrm>
-      </p:grpSpPr>
-      <p:sp>
-        <p:nvSpPr>
-          <p:cNvPr id="2" name="Title 1">
-            <a:extLst>
-              <a:ext uri="{FF2B5EF4-FFF2-40B4-BE49-F238E27FC236}">
                 <a16:creationId xmlns:a16="http://schemas.microsoft.com/office/drawing/2014/main" id="{061016C8-512C-EB4B-9D32-9CF4CB9D4F11}"/>
               </a:ext>
             </a:extLst>
@@ -9739,9 +10029,14 @@
           <a:lstStyle/>
           <a:p>
             <a:r>
-              <a:rPr lang="en-CH" dirty="0"/>
+              <a:rPr lang="de-DE" dirty="0"/>
+              <a:t>Bonus: </a:t>
+            </a:r>
+            <a:r>
+              <a:rPr lang="en-CH"/>
               <a:t>Security</a:t>
             </a:r>
+            <a:endParaRPr lang="en-CH" dirty="0"/>
           </a:p>
         </p:txBody>
       </p:sp>
@@ -9934,585 +10229,6 @@
 </p:sld>
 </file>
 
-<file path=ppt/slides/slide21.xml><?xml version="1.0" encoding="utf-8"?>
-<p:sld xmlns:a="http://schemas.openxmlformats.org/drawingml/2006/main" xmlns:r="http://schemas.openxmlformats.org/officeDocument/2006/relationships" xmlns:p="http://schemas.openxmlformats.org/presentationml/2006/main">
-  <p:cSld>
-    <p:spTree>
-      <p:nvGrpSpPr>
-        <p:cNvPr id="1" name=""/>
-        <p:cNvGrpSpPr/>
-        <p:nvPr/>
-      </p:nvGrpSpPr>
-      <p:grpSpPr>
-        <a:xfrm>
-          <a:off x="0" y="0"/>
-          <a:ext cx="0" cy="0"/>
-          <a:chOff x="0" y="0"/>
-          <a:chExt cx="0" cy="0"/>
-        </a:xfrm>
-      </p:grpSpPr>
-      <p:sp>
-        <p:nvSpPr>
-          <p:cNvPr id="2" name="Title 1">
-            <a:extLst>
-              <a:ext uri="{FF2B5EF4-FFF2-40B4-BE49-F238E27FC236}">
-                <a16:creationId xmlns:a16="http://schemas.microsoft.com/office/drawing/2014/main" id="{D85EDF41-0FBB-5548-8206-29D15F1E1334}"/>
-              </a:ext>
-            </a:extLst>
-          </p:cNvPr>
-          <p:cNvSpPr>
-            <a:spLocks noGrp="1"/>
-          </p:cNvSpPr>
-          <p:nvPr>
-            <p:ph type="title"/>
-          </p:nvPr>
-        </p:nvSpPr>
-        <p:spPr/>
-        <p:txBody>
-          <a:bodyPr/>
-          <a:lstStyle/>
-          <a:p>
-            <a:r>
-              <a:rPr lang="en-CH" dirty="0"/>
-              <a:t>Examples of handling secrets</a:t>
-            </a:r>
-          </a:p>
-        </p:txBody>
-      </p:sp>
-      <p:sp>
-        <p:nvSpPr>
-          <p:cNvPr id="3" name="Content Placeholder 2">
-            <a:extLst>
-              <a:ext uri="{FF2B5EF4-FFF2-40B4-BE49-F238E27FC236}">
-                <a16:creationId xmlns:a16="http://schemas.microsoft.com/office/drawing/2014/main" id="{BB2C67C3-32BF-C441-8A6B-23796F786C85}"/>
-              </a:ext>
-            </a:extLst>
-          </p:cNvPr>
-          <p:cNvSpPr>
-            <a:spLocks noGrp="1"/>
-          </p:cNvSpPr>
-          <p:nvPr>
-            <p:ph sz="quarter" idx="1"/>
-          </p:nvPr>
-        </p:nvSpPr>
-        <p:spPr>
-          <a:xfrm>
-            <a:off x="457200" y="5318720"/>
-            <a:ext cx="8229600" cy="990600"/>
-          </a:xfrm>
-        </p:spPr>
-        <p:txBody>
-          <a:bodyPr>
-            <a:normAutofit lnSpcReduction="10000"/>
-          </a:bodyPr>
-          <a:lstStyle/>
-          <a:p>
-            <a:pPr marL="0" indent="0">
-              <a:buNone/>
-            </a:pPr>
-            <a:r>
-              <a:rPr lang="en-CH" dirty="0"/>
-              <a:t>Details available at</a:t>
-            </a:r>
-            <a:br>
-              <a:rPr lang="en-CH" dirty="0"/>
-            </a:br>
-            <a:r>
-              <a:rPr lang="en-US" sz="1800" dirty="0">
-                <a:latin typeface="Courier New" panose="02070309020205020404" pitchFamily="49" charset="0"/>
-                <a:cs typeface="Courier New" panose="02070309020205020404" pitchFamily="49" charset="0"/>
-                <a:hlinkClick r:id="rId2"/>
-              </a:rPr>
-              <a:t>https://docs.github.com/en/actions/reference/encrypted-secrets</a:t>
-            </a:r>
-            <a:endParaRPr lang="en-US" sz="1800" dirty="0">
-              <a:latin typeface="Courier New" panose="02070309020205020404" pitchFamily="49" charset="0"/>
-              <a:cs typeface="Courier New" panose="02070309020205020404" pitchFamily="49" charset="0"/>
-            </a:endParaRPr>
-          </a:p>
-          <a:p>
-            <a:pPr marL="0" indent="0">
-              <a:buNone/>
-            </a:pPr>
-            <a:endParaRPr lang="en-CH" dirty="0">
-              <a:latin typeface="Courier New" panose="02070309020205020404" pitchFamily="49" charset="0"/>
-              <a:cs typeface="Courier New" panose="02070309020205020404" pitchFamily="49" charset="0"/>
-            </a:endParaRPr>
-          </a:p>
-        </p:txBody>
-      </p:sp>
-      <p:sp>
-        <p:nvSpPr>
-          <p:cNvPr id="4" name="Date Placeholder 3">
-            <a:extLst>
-              <a:ext uri="{FF2B5EF4-FFF2-40B4-BE49-F238E27FC236}">
-                <a16:creationId xmlns:a16="http://schemas.microsoft.com/office/drawing/2014/main" id="{EFDE6383-63B8-0F40-A2F9-3C9190716F80}"/>
-              </a:ext>
-            </a:extLst>
-          </p:cNvPr>
-          <p:cNvSpPr>
-            <a:spLocks noGrp="1"/>
-          </p:cNvSpPr>
-          <p:nvPr>
-            <p:ph type="dt" sz="half" idx="10"/>
-          </p:nvPr>
-        </p:nvSpPr>
-        <p:spPr/>
-        <p:txBody>
-          <a:bodyPr/>
-          <a:lstStyle/>
-          <a:p>
-            <a:r>
-              <a:rPr lang="de-CH" sz="1000"/>
-              <a:t>August 2021, CC BY-SA 4.0</a:t>
-            </a:r>
-            <a:endParaRPr lang="en-US" sz="1000" dirty="0"/>
-          </a:p>
-        </p:txBody>
-      </p:sp>
-      <p:sp>
-        <p:nvSpPr>
-          <p:cNvPr id="5" name="Footer Placeholder 4">
-            <a:extLst>
-              <a:ext uri="{FF2B5EF4-FFF2-40B4-BE49-F238E27FC236}">
-                <a16:creationId xmlns:a16="http://schemas.microsoft.com/office/drawing/2014/main" id="{33A31BB0-4A2A-6C47-9EAA-F64406BF1A82}"/>
-              </a:ext>
-            </a:extLst>
-          </p:cNvPr>
-          <p:cNvSpPr>
-            <a:spLocks noGrp="1"/>
-          </p:cNvSpPr>
-          <p:nvPr>
-            <p:ph type="ftr" sz="quarter" idx="11"/>
-          </p:nvPr>
-        </p:nvSpPr>
-        <p:spPr/>
-        <p:txBody>
-          <a:bodyPr/>
-          <a:lstStyle/>
-          <a:p>
-            <a:r>
-              <a:rPr lang="en-US"/>
-              <a:t>Continuous integration, v1.0</a:t>
-            </a:r>
-            <a:endParaRPr lang="en-US" dirty="0"/>
-          </a:p>
-        </p:txBody>
-      </p:sp>
-      <p:sp>
-        <p:nvSpPr>
-          <p:cNvPr id="7" name="TextBox 6">
-            <a:extLst>
-              <a:ext uri="{FF2B5EF4-FFF2-40B4-BE49-F238E27FC236}">
-                <a16:creationId xmlns:a16="http://schemas.microsoft.com/office/drawing/2014/main" id="{039746D5-6BF5-384F-93EB-C12A9E07EB20}"/>
-              </a:ext>
-            </a:extLst>
-          </p:cNvPr>
-          <p:cNvSpPr txBox="1"/>
-          <p:nvPr/>
-        </p:nvSpPr>
-        <p:spPr>
-          <a:xfrm>
-            <a:off x="457200" y="1268760"/>
-            <a:ext cx="6563072" cy="3970318"/>
-          </a:xfrm>
-          <a:prstGeom prst="rect">
-            <a:avLst/>
-          </a:prstGeom>
-          <a:solidFill>
-            <a:schemeClr val="bg1"/>
-          </a:solidFill>
-        </p:spPr>
-        <p:txBody>
-          <a:bodyPr wrap="square" rtlCol="0">
-            <a:spAutoFit/>
-          </a:bodyPr>
-          <a:lstStyle/>
-          <a:p>
-            <a:r>
-              <a:rPr lang="en-US" sz="1200" dirty="0">
-                <a:latin typeface="Courier New" panose="02070309020205020404" pitchFamily="49" charset="0"/>
-                <a:cs typeface="Courier New" panose="02070309020205020404" pitchFamily="49" charset="0"/>
-              </a:rPr>
-              <a:t>name: Reveal a secret when the repository is tagged as something starting by secret</a:t>
-            </a:r>
-          </a:p>
-          <a:p>
-            <a:endParaRPr lang="en-US" sz="1200" dirty="0">
-              <a:latin typeface="Courier New" panose="02070309020205020404" pitchFamily="49" charset="0"/>
-              <a:cs typeface="Courier New" panose="02070309020205020404" pitchFamily="49" charset="0"/>
-            </a:endParaRPr>
-          </a:p>
-          <a:p>
-            <a:r>
-              <a:rPr lang="en-US" sz="1200" dirty="0">
-                <a:latin typeface="Courier New" panose="02070309020205020404" pitchFamily="49" charset="0"/>
-                <a:cs typeface="Courier New" panose="02070309020205020404" pitchFamily="49" charset="0"/>
-              </a:rPr>
-              <a:t>on:</a:t>
-            </a:r>
-          </a:p>
-          <a:p>
-            <a:r>
-              <a:rPr lang="en-US" sz="1200" dirty="0">
-                <a:latin typeface="Courier New" panose="02070309020205020404" pitchFamily="49" charset="0"/>
-                <a:cs typeface="Courier New" panose="02070309020205020404" pitchFamily="49" charset="0"/>
-              </a:rPr>
-              <a:t>  push:</a:t>
-            </a:r>
-          </a:p>
-          <a:p>
-            <a:r>
-              <a:rPr lang="en-US" sz="1200" dirty="0">
-                <a:latin typeface="Courier New" panose="02070309020205020404" pitchFamily="49" charset="0"/>
-                <a:cs typeface="Courier New" panose="02070309020205020404" pitchFamily="49" charset="0"/>
-              </a:rPr>
-              <a:t>    tags:</a:t>
-            </a:r>
-          </a:p>
-          <a:p>
-            <a:r>
-              <a:rPr lang="en-US" sz="1200" dirty="0">
-                <a:latin typeface="Courier New" panose="02070309020205020404" pitchFamily="49" charset="0"/>
-                <a:cs typeface="Courier New" panose="02070309020205020404" pitchFamily="49" charset="0"/>
-              </a:rPr>
-              <a:t>      - 'secret*'</a:t>
-            </a:r>
-          </a:p>
-          <a:p>
-            <a:endParaRPr lang="en-US" sz="1200" dirty="0">
-              <a:latin typeface="Courier New" panose="02070309020205020404" pitchFamily="49" charset="0"/>
-              <a:cs typeface="Courier New" panose="02070309020205020404" pitchFamily="49" charset="0"/>
-            </a:endParaRPr>
-          </a:p>
-          <a:p>
-            <a:r>
-              <a:rPr lang="en-US" sz="1200" dirty="0">
-                <a:latin typeface="Courier New" panose="02070309020205020404" pitchFamily="49" charset="0"/>
-                <a:cs typeface="Courier New" panose="02070309020205020404" pitchFamily="49" charset="0"/>
-              </a:rPr>
-              <a:t>jobs:</a:t>
-            </a:r>
-          </a:p>
-          <a:p>
-            <a:r>
-              <a:rPr lang="en-US" sz="1200" dirty="0">
-                <a:latin typeface="Courier New" panose="02070309020205020404" pitchFamily="49" charset="0"/>
-                <a:cs typeface="Courier New" panose="02070309020205020404" pitchFamily="49" charset="0"/>
-              </a:rPr>
-              <a:t>  reveal-secret:</a:t>
-            </a:r>
-          </a:p>
-          <a:p>
-            <a:r>
-              <a:rPr lang="en-US" sz="1200" dirty="0">
-                <a:latin typeface="Courier New" panose="02070309020205020404" pitchFamily="49" charset="0"/>
-                <a:cs typeface="Courier New" panose="02070309020205020404" pitchFamily="49" charset="0"/>
-              </a:rPr>
-              <a:t>    runs-on: ubuntu-latest</a:t>
-            </a:r>
-          </a:p>
-          <a:p>
-            <a:endParaRPr lang="en-US" sz="1200" dirty="0">
-              <a:latin typeface="Courier New" panose="02070309020205020404" pitchFamily="49" charset="0"/>
-              <a:cs typeface="Courier New" panose="02070309020205020404" pitchFamily="49" charset="0"/>
-            </a:endParaRPr>
-          </a:p>
-          <a:p>
-            <a:r>
-              <a:rPr lang="en-US" sz="1200" dirty="0">
-                <a:latin typeface="Courier New" panose="02070309020205020404" pitchFamily="49" charset="0"/>
-                <a:cs typeface="Courier New" panose="02070309020205020404" pitchFamily="49" charset="0"/>
-              </a:rPr>
-              <a:t>    steps:</a:t>
-            </a:r>
-          </a:p>
-          <a:p>
-            <a:r>
-              <a:rPr lang="en-US" sz="1200" dirty="0">
-                <a:latin typeface="Courier New" panose="02070309020205020404" pitchFamily="49" charset="0"/>
-                <a:cs typeface="Courier New" panose="02070309020205020404" pitchFamily="49" charset="0"/>
-              </a:rPr>
-              <a:t>    - shell: bash</a:t>
-            </a:r>
-          </a:p>
-          <a:p>
-            <a:r>
-              <a:rPr lang="en-US" sz="1200" dirty="0">
-                <a:latin typeface="Courier New" panose="02070309020205020404" pitchFamily="49" charset="0"/>
-                <a:cs typeface="Courier New" panose="02070309020205020404" pitchFamily="49" charset="0"/>
-              </a:rPr>
-              <a:t>      env:</a:t>
-            </a:r>
-          </a:p>
-          <a:p>
-            <a:r>
-              <a:rPr lang="en-US" sz="1200" dirty="0">
-                <a:latin typeface="Courier New" panose="02070309020205020404" pitchFamily="49" charset="0"/>
-                <a:cs typeface="Courier New" panose="02070309020205020404" pitchFamily="49" charset="0"/>
-              </a:rPr>
-              <a:t>        SECRET_MSG: ${{ </a:t>
-            </a:r>
-            <a:r>
-              <a:rPr lang="en-US" sz="1200" dirty="0" err="1">
-                <a:latin typeface="Courier New" panose="02070309020205020404" pitchFamily="49" charset="0"/>
-                <a:cs typeface="Courier New" panose="02070309020205020404" pitchFamily="49" charset="0"/>
-              </a:rPr>
-              <a:t>secrets.TOP_SECRET</a:t>
-            </a:r>
-            <a:r>
-              <a:rPr lang="en-US" sz="1200" dirty="0">
-                <a:latin typeface="Courier New" panose="02070309020205020404" pitchFamily="49" charset="0"/>
-                <a:cs typeface="Courier New" panose="02070309020205020404" pitchFamily="49" charset="0"/>
-              </a:rPr>
-              <a:t> }}</a:t>
-            </a:r>
-          </a:p>
-          <a:p>
-            <a:r>
-              <a:rPr lang="en-US" sz="1200" dirty="0">
-                <a:latin typeface="Courier New" panose="02070309020205020404" pitchFamily="49" charset="0"/>
-                <a:cs typeface="Courier New" panose="02070309020205020404" pitchFamily="49" charset="0"/>
-              </a:rPr>
-              <a:t>      run: |</a:t>
-            </a:r>
-          </a:p>
-          <a:p>
-            <a:r>
-              <a:rPr lang="en-US" sz="1200" dirty="0">
-                <a:latin typeface="Courier New" panose="02070309020205020404" pitchFamily="49" charset="0"/>
-                <a:cs typeface="Courier New" panose="02070309020205020404" pitchFamily="49" charset="0"/>
-              </a:rPr>
-              <a:t>        echo The secret is "$SECRET_MSG"</a:t>
-            </a:r>
-          </a:p>
-          <a:p>
-            <a:r>
-              <a:rPr lang="en-US" sz="1200" dirty="0">
-                <a:latin typeface="Courier New" panose="02070309020205020404" pitchFamily="49" charset="0"/>
-                <a:cs typeface="Courier New" panose="02070309020205020404" pitchFamily="49" charset="0"/>
-              </a:rPr>
-              <a:t>        if [ "$SECRET_MSG" = 'do not tell anyone' ]; then</a:t>
-            </a:r>
-          </a:p>
-          <a:p>
-            <a:r>
-              <a:rPr lang="en-US" sz="1200" dirty="0">
-                <a:latin typeface="Courier New" panose="02070309020205020404" pitchFamily="49" charset="0"/>
-                <a:cs typeface="Courier New" panose="02070309020205020404" pitchFamily="49" charset="0"/>
-              </a:rPr>
-              <a:t>          echo matches</a:t>
-            </a:r>
-          </a:p>
-          <a:p>
-            <a:r>
-              <a:rPr lang="en-US" sz="1200" dirty="0">
-                <a:latin typeface="Courier New" panose="02070309020205020404" pitchFamily="49" charset="0"/>
-                <a:cs typeface="Courier New" panose="02070309020205020404" pitchFamily="49" charset="0"/>
-              </a:rPr>
-              <a:t>        fi</a:t>
-            </a:r>
-          </a:p>
-        </p:txBody>
-      </p:sp>
-    </p:spTree>
-    <p:extLst>
-      <p:ext uri="{BB962C8B-B14F-4D97-AF65-F5344CB8AC3E}">
-        <p14:creationId xmlns:p14="http://schemas.microsoft.com/office/powerpoint/2010/main" val="2944273705"/>
-      </p:ext>
-    </p:extLst>
-  </p:cSld>
-  <p:clrMapOvr>
-    <a:masterClrMapping/>
-  </p:clrMapOvr>
-</p:sld>
-</file>
-
-<file path=ppt/slides/slide22.xml><?xml version="1.0" encoding="utf-8"?>
-<p:sld xmlns:a="http://schemas.openxmlformats.org/drawingml/2006/main" xmlns:r="http://schemas.openxmlformats.org/officeDocument/2006/relationships" xmlns:p="http://schemas.openxmlformats.org/presentationml/2006/main">
-  <p:cSld>
-    <p:spTree>
-      <p:nvGrpSpPr>
-        <p:cNvPr id="1" name=""/>
-        <p:cNvGrpSpPr/>
-        <p:nvPr/>
-      </p:nvGrpSpPr>
-      <p:grpSpPr>
-        <a:xfrm>
-          <a:off x="0" y="0"/>
-          <a:ext cx="0" cy="0"/>
-          <a:chOff x="0" y="0"/>
-          <a:chExt cx="0" cy="0"/>
-        </a:xfrm>
-      </p:grpSpPr>
-      <p:sp>
-        <p:nvSpPr>
-          <p:cNvPr id="2" name="Title 1">
-            <a:extLst>
-              <a:ext uri="{FF2B5EF4-FFF2-40B4-BE49-F238E27FC236}">
-                <a16:creationId xmlns:a16="http://schemas.microsoft.com/office/drawing/2014/main" id="{0209F7B9-B500-6A48-B3AA-7D5C6DC44CB2}"/>
-              </a:ext>
-            </a:extLst>
-          </p:cNvPr>
-          <p:cNvSpPr>
-            <a:spLocks noGrp="1"/>
-          </p:cNvSpPr>
-          <p:nvPr>
-            <p:ph type="title"/>
-          </p:nvPr>
-        </p:nvSpPr>
-        <p:spPr/>
-        <p:txBody>
-          <a:bodyPr/>
-          <a:lstStyle/>
-          <a:p>
-            <a:r>
-              <a:rPr lang="en-CH" dirty="0"/>
-              <a:t>Conclusions</a:t>
-            </a:r>
-          </a:p>
-        </p:txBody>
-      </p:sp>
-      <p:sp>
-        <p:nvSpPr>
-          <p:cNvPr id="3" name="Content Placeholder 2">
-            <a:extLst>
-              <a:ext uri="{FF2B5EF4-FFF2-40B4-BE49-F238E27FC236}">
-                <a16:creationId xmlns:a16="http://schemas.microsoft.com/office/drawing/2014/main" id="{B483744F-BEF5-0B46-9B81-355BEB76BA2A}"/>
-              </a:ext>
-            </a:extLst>
-          </p:cNvPr>
-          <p:cNvSpPr>
-            <a:spLocks noGrp="1"/>
-          </p:cNvSpPr>
-          <p:nvPr>
-            <p:ph sz="quarter" idx="1"/>
-          </p:nvPr>
-        </p:nvSpPr>
-        <p:spPr/>
-        <p:txBody>
-          <a:bodyPr/>
-          <a:lstStyle/>
-          <a:p>
-            <a:r>
-              <a:rPr lang="en-CH" dirty="0"/>
-              <a:t>It takes a bit of time to set up and debug a Continuous Integration workflow, but it’s a good investment that can save you a lot </a:t>
-            </a:r>
-            <a:r>
-              <a:rPr lang="en-CH"/>
-              <a:t>of time later on!</a:t>
-            </a:r>
-            <a:endParaRPr lang="en-CH" dirty="0"/>
-          </a:p>
-        </p:txBody>
-      </p:sp>
-      <p:sp>
-        <p:nvSpPr>
-          <p:cNvPr id="4" name="Date Placeholder 3">
-            <a:extLst>
-              <a:ext uri="{FF2B5EF4-FFF2-40B4-BE49-F238E27FC236}">
-                <a16:creationId xmlns:a16="http://schemas.microsoft.com/office/drawing/2014/main" id="{C03D37C7-B59B-1048-A802-78F6FA69F6C7}"/>
-              </a:ext>
-            </a:extLst>
-          </p:cNvPr>
-          <p:cNvSpPr>
-            <a:spLocks noGrp="1"/>
-          </p:cNvSpPr>
-          <p:nvPr>
-            <p:ph type="dt" sz="half" idx="10"/>
-          </p:nvPr>
-        </p:nvSpPr>
-        <p:spPr/>
-        <p:txBody>
-          <a:bodyPr/>
-          <a:lstStyle/>
-          <a:p>
-            <a:r>
-              <a:rPr lang="de-CH" sz="1000"/>
-              <a:t>August 2021, CC BY-SA 4.0</a:t>
-            </a:r>
-            <a:endParaRPr lang="en-US" sz="1000" dirty="0"/>
-          </a:p>
-        </p:txBody>
-      </p:sp>
-      <p:sp>
-        <p:nvSpPr>
-          <p:cNvPr id="5" name="Footer Placeholder 4">
-            <a:extLst>
-              <a:ext uri="{FF2B5EF4-FFF2-40B4-BE49-F238E27FC236}">
-                <a16:creationId xmlns:a16="http://schemas.microsoft.com/office/drawing/2014/main" id="{DB93DB5F-4A03-CA44-A54B-D5F34E39E00B}"/>
-              </a:ext>
-            </a:extLst>
-          </p:cNvPr>
-          <p:cNvSpPr>
-            <a:spLocks noGrp="1"/>
-          </p:cNvSpPr>
-          <p:nvPr>
-            <p:ph type="ftr" sz="quarter" idx="11"/>
-          </p:nvPr>
-        </p:nvSpPr>
-        <p:spPr/>
-        <p:txBody>
-          <a:bodyPr/>
-          <a:lstStyle/>
-          <a:p>
-            <a:r>
-              <a:rPr lang="en-US"/>
-              <a:t>Continuous integration, v1.0</a:t>
-            </a:r>
-            <a:endParaRPr lang="en-US" dirty="0"/>
-          </a:p>
-        </p:txBody>
-      </p:sp>
-      <p:pic>
-        <p:nvPicPr>
-          <p:cNvPr id="7" name="Picture 6" descr="A picture containing metalware, gear, white&#10;&#10;Description automatically generated">
-            <a:extLst>
-              <a:ext uri="{FF2B5EF4-FFF2-40B4-BE49-F238E27FC236}">
-                <a16:creationId xmlns:a16="http://schemas.microsoft.com/office/drawing/2014/main" id="{1C8CF780-D6FA-BB4C-A576-417D77749A00}"/>
-              </a:ext>
-            </a:extLst>
-          </p:cNvPr>
-          <p:cNvPicPr>
-            <a:picLocks noChangeAspect="1"/>
-          </p:cNvPicPr>
-          <p:nvPr/>
-        </p:nvPicPr>
-        <p:blipFill>
-          <a:blip r:embed="rId2">
-            <a:extLst>
-              <a:ext uri="{28A0092B-C50C-407E-A947-70E740481C1C}">
-                <a14:useLocalDpi xmlns:a14="http://schemas.microsoft.com/office/drawing/2010/main" val="0"/>
-              </a:ext>
-            </a:extLst>
-          </a:blip>
-          <a:stretch>
-            <a:fillRect/>
-          </a:stretch>
-        </p:blipFill>
-        <p:spPr>
-          <a:xfrm rot="16200000">
-            <a:off x="5957585" y="3157241"/>
-            <a:ext cx="3830908" cy="2567310"/>
-          </a:xfrm>
-          <a:prstGeom prst="rect">
-            <a:avLst/>
-          </a:prstGeom>
-        </p:spPr>
-      </p:pic>
-    </p:spTree>
-    <p:extLst>
-      <p:ext uri="{BB962C8B-B14F-4D97-AF65-F5344CB8AC3E}">
-        <p14:creationId xmlns:p14="http://schemas.microsoft.com/office/powerpoint/2010/main" val="202595180"/>
-      </p:ext>
-    </p:extLst>
-  </p:cSld>
-  <p:clrMapOvr>
-    <a:masterClrMapping/>
-  </p:clrMapOvr>
-</p:sld>
-</file>
-
 <file path=ppt/slides/slide23.xml><?xml version="1.0" encoding="utf-8"?>
 <p:sld xmlns:a="http://schemas.openxmlformats.org/drawingml/2006/main" xmlns:r="http://schemas.openxmlformats.org/officeDocument/2006/relationships" xmlns:p="http://schemas.openxmlformats.org/presentationml/2006/main">
   <p:cSld>
@@ -10532,12 +10248,18 @@
       </p:grpSpPr>
       <p:sp>
         <p:nvSpPr>
-          <p:cNvPr id="3" name="Date Placeholder 2"/>
-          <p:cNvSpPr>
-            <a:spLocks noGrp="1"/>
-          </p:cNvSpPr>
-          <p:nvPr>
-            <p:ph type="dt" sz="half" idx="10"/>
+          <p:cNvPr id="2" name="Title 1">
+            <a:extLst>
+              <a:ext uri="{FF2B5EF4-FFF2-40B4-BE49-F238E27FC236}">
+                <a16:creationId xmlns:a16="http://schemas.microsoft.com/office/drawing/2014/main" id="{D85EDF41-0FBB-5548-8206-29D15F1E1334}"/>
+              </a:ext>
+            </a:extLst>
+          </p:cNvPr>
+          <p:cNvSpPr>
+            <a:spLocks noGrp="1"/>
+          </p:cNvSpPr>
+          <p:nvPr>
+            <p:ph type="title"/>
           </p:nvPr>
         </p:nvSpPr>
         <p:spPr/>
@@ -10546,66 +10268,362 @@
           <a:lstStyle/>
           <a:p>
             <a:r>
-              <a:rPr lang="de-CH"/>
-              <a:t>August 2021, CC BY-SA 4.0</a:t>
-            </a:r>
-            <a:endParaRPr lang="en-US"/>
-          </a:p>
-        </p:txBody>
-      </p:sp>
-      <p:sp>
-        <p:nvSpPr>
-          <p:cNvPr id="4" name="Footer Placeholder 3"/>
-          <p:cNvSpPr>
-            <a:spLocks noGrp="1"/>
-          </p:cNvSpPr>
-          <p:nvPr>
-            <p:ph type="ftr" sz="quarter" idx="11"/>
-          </p:nvPr>
-        </p:nvSpPr>
-        <p:spPr/>
-        <p:txBody>
-          <a:bodyPr/>
-          <a:lstStyle/>
-          <a:p>
-            <a:r>
-              <a:rPr lang="en-US"/>
-              <a:t>Continuous integration, v1.0</a:t>
-            </a:r>
-          </a:p>
-        </p:txBody>
-      </p:sp>
-      <p:sp>
-        <p:nvSpPr>
-          <p:cNvPr id="2" name="Title 1"/>
-          <p:cNvSpPr>
-            <a:spLocks noGrp="1"/>
-          </p:cNvSpPr>
-          <p:nvPr>
-            <p:ph type="title" idx="4294967295"/>
+              <a:rPr lang="de-DE" dirty="0"/>
+              <a:t>Bonus: </a:t>
+            </a:r>
+            <a:r>
+              <a:rPr lang="en-CH"/>
+              <a:t>Examples </a:t>
+            </a:r>
+            <a:r>
+              <a:rPr lang="en-CH" dirty="0"/>
+              <a:t>of handling secrets</a:t>
+            </a:r>
+          </a:p>
+        </p:txBody>
+      </p:sp>
+      <p:sp>
+        <p:nvSpPr>
+          <p:cNvPr id="3" name="Content Placeholder 2">
+            <a:extLst>
+              <a:ext uri="{FF2B5EF4-FFF2-40B4-BE49-F238E27FC236}">
+                <a16:creationId xmlns:a16="http://schemas.microsoft.com/office/drawing/2014/main" id="{BB2C67C3-32BF-C441-8A6B-23796F786C85}"/>
+              </a:ext>
+            </a:extLst>
+          </p:cNvPr>
+          <p:cNvSpPr>
+            <a:spLocks noGrp="1"/>
+          </p:cNvSpPr>
+          <p:nvPr>
+            <p:ph sz="quarter" idx="1"/>
           </p:nvPr>
         </p:nvSpPr>
         <p:spPr>
           <a:xfrm>
-            <a:off x="460248" y="2705375"/>
+            <a:off x="457200" y="5318720"/>
             <a:ext cx="8229600" cy="990600"/>
           </a:xfrm>
         </p:spPr>
         <p:txBody>
-          <a:bodyPr anchor="ctr">
-            <a:normAutofit/>
+          <a:bodyPr>
+            <a:normAutofit lnSpcReduction="10000"/>
           </a:bodyPr>
           <a:lstStyle/>
           <a:p>
-            <a:pPr algn="ctr"/>
-            <a:r>
-              <a:rPr lang="en-GB" sz="5400" dirty="0"/>
-              <a:t>Thank you!</a:t>
+            <a:pPr marL="0" indent="0">
+              <a:buNone/>
+            </a:pPr>
+            <a:r>
+              <a:rPr lang="en-CH" dirty="0"/>
+              <a:t>Details available at</a:t>
+            </a:r>
+            <a:br>
+              <a:rPr lang="en-CH" dirty="0"/>
+            </a:br>
+            <a:r>
+              <a:rPr lang="en-US" sz="1800" dirty="0">
+                <a:latin typeface="Courier New" panose="02070309020205020404" pitchFamily="49" charset="0"/>
+                <a:cs typeface="Courier New" panose="02070309020205020404" pitchFamily="49" charset="0"/>
+                <a:hlinkClick r:id="rId2"/>
+              </a:rPr>
+              <a:t>https://docs.github.com/en/actions/reference/encrypted-secrets</a:t>
+            </a:r>
+            <a:endParaRPr lang="en-US" sz="1800" dirty="0">
+              <a:latin typeface="Courier New" panose="02070309020205020404" pitchFamily="49" charset="0"/>
+              <a:cs typeface="Courier New" panose="02070309020205020404" pitchFamily="49" charset="0"/>
+            </a:endParaRPr>
+          </a:p>
+          <a:p>
+            <a:pPr marL="0" indent="0">
+              <a:buNone/>
+            </a:pPr>
+            <a:endParaRPr lang="en-CH" dirty="0">
+              <a:latin typeface="Courier New" panose="02070309020205020404" pitchFamily="49" charset="0"/>
+              <a:cs typeface="Courier New" panose="02070309020205020404" pitchFamily="49" charset="0"/>
+            </a:endParaRPr>
+          </a:p>
+        </p:txBody>
+      </p:sp>
+      <p:sp>
+        <p:nvSpPr>
+          <p:cNvPr id="4" name="Date Placeholder 3">
+            <a:extLst>
+              <a:ext uri="{FF2B5EF4-FFF2-40B4-BE49-F238E27FC236}">
+                <a16:creationId xmlns:a16="http://schemas.microsoft.com/office/drawing/2014/main" id="{EFDE6383-63B8-0F40-A2F9-3C9190716F80}"/>
+              </a:ext>
+            </a:extLst>
+          </p:cNvPr>
+          <p:cNvSpPr>
+            <a:spLocks noGrp="1"/>
+          </p:cNvSpPr>
+          <p:nvPr>
+            <p:ph type="dt" sz="half" idx="10"/>
+          </p:nvPr>
+        </p:nvSpPr>
+        <p:spPr/>
+        <p:txBody>
+          <a:bodyPr/>
+          <a:lstStyle/>
+          <a:p>
+            <a:r>
+              <a:rPr lang="de-CH" sz="1000"/>
+              <a:t>August 2021, CC BY-SA 4.0</a:t>
+            </a:r>
+            <a:endParaRPr lang="en-US" sz="1000" dirty="0"/>
+          </a:p>
+        </p:txBody>
+      </p:sp>
+      <p:sp>
+        <p:nvSpPr>
+          <p:cNvPr id="5" name="Footer Placeholder 4">
+            <a:extLst>
+              <a:ext uri="{FF2B5EF4-FFF2-40B4-BE49-F238E27FC236}">
+                <a16:creationId xmlns:a16="http://schemas.microsoft.com/office/drawing/2014/main" id="{33A31BB0-4A2A-6C47-9EAA-F64406BF1A82}"/>
+              </a:ext>
+            </a:extLst>
+          </p:cNvPr>
+          <p:cNvSpPr>
+            <a:spLocks noGrp="1"/>
+          </p:cNvSpPr>
+          <p:nvPr>
+            <p:ph type="ftr" sz="quarter" idx="11"/>
+          </p:nvPr>
+        </p:nvSpPr>
+        <p:spPr/>
+        <p:txBody>
+          <a:bodyPr/>
+          <a:lstStyle/>
+          <a:p>
+            <a:r>
+              <a:rPr lang="en-US"/>
+              <a:t>Continuous integration, v1.0</a:t>
+            </a:r>
+            <a:endParaRPr lang="en-US" dirty="0"/>
+          </a:p>
+        </p:txBody>
+      </p:sp>
+      <p:sp>
+        <p:nvSpPr>
+          <p:cNvPr id="7" name="TextBox 6">
+            <a:extLst>
+              <a:ext uri="{FF2B5EF4-FFF2-40B4-BE49-F238E27FC236}">
+                <a16:creationId xmlns:a16="http://schemas.microsoft.com/office/drawing/2014/main" id="{039746D5-6BF5-384F-93EB-C12A9E07EB20}"/>
+              </a:ext>
+            </a:extLst>
+          </p:cNvPr>
+          <p:cNvSpPr txBox="1"/>
+          <p:nvPr/>
+        </p:nvSpPr>
+        <p:spPr>
+          <a:xfrm>
+            <a:off x="457200" y="1268760"/>
+            <a:ext cx="6563072" cy="3970318"/>
+          </a:xfrm>
+          <a:prstGeom prst="rect">
+            <a:avLst/>
+          </a:prstGeom>
+          <a:solidFill>
+            <a:schemeClr val="bg1"/>
+          </a:solidFill>
+        </p:spPr>
+        <p:txBody>
+          <a:bodyPr wrap="square" rtlCol="0">
+            <a:spAutoFit/>
+          </a:bodyPr>
+          <a:lstStyle/>
+          <a:p>
+            <a:r>
+              <a:rPr lang="en-US" sz="1200" dirty="0">
+                <a:latin typeface="Courier New" panose="02070309020205020404" pitchFamily="49" charset="0"/>
+                <a:cs typeface="Courier New" panose="02070309020205020404" pitchFamily="49" charset="0"/>
+              </a:rPr>
+              <a:t>name: Reveal a secret when the repository is tagged as something starting by secret</a:t>
+            </a:r>
+          </a:p>
+          <a:p>
+            <a:endParaRPr lang="en-US" sz="1200" dirty="0">
+              <a:latin typeface="Courier New" panose="02070309020205020404" pitchFamily="49" charset="0"/>
+              <a:cs typeface="Courier New" panose="02070309020205020404" pitchFamily="49" charset="0"/>
+            </a:endParaRPr>
+          </a:p>
+          <a:p>
+            <a:r>
+              <a:rPr lang="en-US" sz="1200" dirty="0">
+                <a:latin typeface="Courier New" panose="02070309020205020404" pitchFamily="49" charset="0"/>
+                <a:cs typeface="Courier New" panose="02070309020205020404" pitchFamily="49" charset="0"/>
+              </a:rPr>
+              <a:t>on:</a:t>
+            </a:r>
+          </a:p>
+          <a:p>
+            <a:r>
+              <a:rPr lang="en-US" sz="1200" dirty="0">
+                <a:latin typeface="Courier New" panose="02070309020205020404" pitchFamily="49" charset="0"/>
+                <a:cs typeface="Courier New" panose="02070309020205020404" pitchFamily="49" charset="0"/>
+              </a:rPr>
+              <a:t>  push:</a:t>
+            </a:r>
+          </a:p>
+          <a:p>
+            <a:r>
+              <a:rPr lang="en-US" sz="1200" dirty="0">
+                <a:latin typeface="Courier New" panose="02070309020205020404" pitchFamily="49" charset="0"/>
+                <a:cs typeface="Courier New" panose="02070309020205020404" pitchFamily="49" charset="0"/>
+              </a:rPr>
+              <a:t>    tags:</a:t>
+            </a:r>
+          </a:p>
+          <a:p>
+            <a:r>
+              <a:rPr lang="en-US" sz="1200" dirty="0">
+                <a:latin typeface="Courier New" panose="02070309020205020404" pitchFamily="49" charset="0"/>
+                <a:cs typeface="Courier New" panose="02070309020205020404" pitchFamily="49" charset="0"/>
+              </a:rPr>
+              <a:t>      - 'secret*'</a:t>
+            </a:r>
+          </a:p>
+          <a:p>
+            <a:endParaRPr lang="en-US" sz="1200" dirty="0">
+              <a:latin typeface="Courier New" panose="02070309020205020404" pitchFamily="49" charset="0"/>
+              <a:cs typeface="Courier New" panose="02070309020205020404" pitchFamily="49" charset="0"/>
+            </a:endParaRPr>
+          </a:p>
+          <a:p>
+            <a:r>
+              <a:rPr lang="en-US" sz="1200" dirty="0">
+                <a:latin typeface="Courier New" panose="02070309020205020404" pitchFamily="49" charset="0"/>
+                <a:cs typeface="Courier New" panose="02070309020205020404" pitchFamily="49" charset="0"/>
+              </a:rPr>
+              <a:t>jobs:</a:t>
+            </a:r>
+          </a:p>
+          <a:p>
+            <a:r>
+              <a:rPr lang="en-US" sz="1200" dirty="0">
+                <a:latin typeface="Courier New" panose="02070309020205020404" pitchFamily="49" charset="0"/>
+                <a:cs typeface="Courier New" panose="02070309020205020404" pitchFamily="49" charset="0"/>
+              </a:rPr>
+              <a:t>  reveal-secret:</a:t>
+            </a:r>
+          </a:p>
+          <a:p>
+            <a:r>
+              <a:rPr lang="en-US" sz="1200" dirty="0">
+                <a:latin typeface="Courier New" panose="02070309020205020404" pitchFamily="49" charset="0"/>
+                <a:cs typeface="Courier New" panose="02070309020205020404" pitchFamily="49" charset="0"/>
+              </a:rPr>
+              <a:t>    runs-on: ubuntu-latest</a:t>
+            </a:r>
+          </a:p>
+          <a:p>
+            <a:endParaRPr lang="en-US" sz="1200" dirty="0">
+              <a:latin typeface="Courier New" panose="02070309020205020404" pitchFamily="49" charset="0"/>
+              <a:cs typeface="Courier New" panose="02070309020205020404" pitchFamily="49" charset="0"/>
+            </a:endParaRPr>
+          </a:p>
+          <a:p>
+            <a:r>
+              <a:rPr lang="en-US" sz="1200" dirty="0">
+                <a:latin typeface="Courier New" panose="02070309020205020404" pitchFamily="49" charset="0"/>
+                <a:cs typeface="Courier New" panose="02070309020205020404" pitchFamily="49" charset="0"/>
+              </a:rPr>
+              <a:t>    steps:</a:t>
+            </a:r>
+          </a:p>
+          <a:p>
+            <a:r>
+              <a:rPr lang="en-US" sz="1200" dirty="0">
+                <a:latin typeface="Courier New" panose="02070309020205020404" pitchFamily="49" charset="0"/>
+                <a:cs typeface="Courier New" panose="02070309020205020404" pitchFamily="49" charset="0"/>
+              </a:rPr>
+              <a:t>    - shell: bash</a:t>
+            </a:r>
+          </a:p>
+          <a:p>
+            <a:r>
+              <a:rPr lang="en-US" sz="1200" dirty="0">
+                <a:latin typeface="Courier New" panose="02070309020205020404" pitchFamily="49" charset="0"/>
+                <a:cs typeface="Courier New" panose="02070309020205020404" pitchFamily="49" charset="0"/>
+              </a:rPr>
+              <a:t>      env:</a:t>
+            </a:r>
+          </a:p>
+          <a:p>
+            <a:r>
+              <a:rPr lang="en-US" sz="1200" dirty="0">
+                <a:latin typeface="Courier New" panose="02070309020205020404" pitchFamily="49" charset="0"/>
+                <a:cs typeface="Courier New" panose="02070309020205020404" pitchFamily="49" charset="0"/>
+              </a:rPr>
+              <a:t>        SECRET_MSG: ${{ </a:t>
+            </a:r>
+            <a:r>
+              <a:rPr lang="en-US" sz="1200" dirty="0" err="1">
+                <a:latin typeface="Courier New" panose="02070309020205020404" pitchFamily="49" charset="0"/>
+                <a:cs typeface="Courier New" panose="02070309020205020404" pitchFamily="49" charset="0"/>
+              </a:rPr>
+              <a:t>secrets.TOP_SECRET</a:t>
+            </a:r>
+            <a:r>
+              <a:rPr lang="en-US" sz="1200" dirty="0">
+                <a:latin typeface="Courier New" panose="02070309020205020404" pitchFamily="49" charset="0"/>
+                <a:cs typeface="Courier New" panose="02070309020205020404" pitchFamily="49" charset="0"/>
+              </a:rPr>
+              <a:t> }}</a:t>
+            </a:r>
+          </a:p>
+          <a:p>
+            <a:r>
+              <a:rPr lang="en-US" sz="1200" dirty="0">
+                <a:latin typeface="Courier New" panose="02070309020205020404" pitchFamily="49" charset="0"/>
+                <a:cs typeface="Courier New" panose="02070309020205020404" pitchFamily="49" charset="0"/>
+              </a:rPr>
+              <a:t>      run: |</a:t>
+            </a:r>
+          </a:p>
+          <a:p>
+            <a:r>
+              <a:rPr lang="en-US" sz="1200" dirty="0">
+                <a:latin typeface="Courier New" panose="02070309020205020404" pitchFamily="49" charset="0"/>
+                <a:cs typeface="Courier New" panose="02070309020205020404" pitchFamily="49" charset="0"/>
+              </a:rPr>
+              <a:t>        echo The secret is "$SECRET_MSG"</a:t>
+            </a:r>
+          </a:p>
+          <a:p>
+            <a:r>
+              <a:rPr lang="en-US" sz="1200" dirty="0">
+                <a:latin typeface="Courier New" panose="02070309020205020404" pitchFamily="49" charset="0"/>
+                <a:cs typeface="Courier New" panose="02070309020205020404" pitchFamily="49" charset="0"/>
+              </a:rPr>
+              <a:t>        if [ "$SECRET_MSG" = 'do not tell anyone' ]; then</a:t>
+            </a:r>
+          </a:p>
+          <a:p>
+            <a:r>
+              <a:rPr lang="en-US" sz="1200" dirty="0">
+                <a:latin typeface="Courier New" panose="02070309020205020404" pitchFamily="49" charset="0"/>
+                <a:cs typeface="Courier New" panose="02070309020205020404" pitchFamily="49" charset="0"/>
+              </a:rPr>
+              <a:t>          echo matches</a:t>
+            </a:r>
+          </a:p>
+          <a:p>
+            <a:r>
+              <a:rPr lang="en-US" sz="1200" dirty="0">
+                <a:latin typeface="Courier New" panose="02070309020205020404" pitchFamily="49" charset="0"/>
+                <a:cs typeface="Courier New" panose="02070309020205020404" pitchFamily="49" charset="0"/>
+              </a:rPr>
+              <a:t>        fi</a:t>
             </a:r>
           </a:p>
         </p:txBody>
       </p:sp>
     </p:spTree>
+    <p:extLst>
+      <p:ext uri="{BB962C8B-B14F-4D97-AF65-F5344CB8AC3E}">
+        <p14:creationId xmlns:p14="http://schemas.microsoft.com/office/powerpoint/2010/main" val="2944273705"/>
+      </p:ext>
+    </p:extLst>
   </p:cSld>
   <p:clrMapOvr>
     <a:masterClrMapping/>

</xml_diff>

<commit_message>
Change footer of continuous integration slides
</commit_message>
<xml_diff>
--- a/continuous_integration.pptx
+++ b/continuous_integration.pptx
@@ -1305,7 +1305,7 @@
           <a:p>
             <a:r>
               <a:rPr lang="de-CH"/>
-              <a:t>Sept 2022, CC BY-SA 4.0</a:t>
+              <a:t>June 2023, CC BY-SA 4.0</a:t>
             </a:r>
             <a:endParaRPr lang="en-US"/>
           </a:p>
@@ -1328,7 +1328,7 @@
           <a:p>
             <a:r>
               <a:rPr lang="en-US"/>
-              <a:t>Continuous integration, v2.0</a:t>
+              <a:t>Continuous integration, v3.0</a:t>
             </a:r>
           </a:p>
         </p:txBody>
@@ -1473,7 +1473,7 @@
           <a:p>
             <a:r>
               <a:rPr lang="de-CH"/>
-              <a:t>Sept 2022, CC BY-SA 4.0</a:t>
+              <a:t>June 2023, CC BY-SA 4.0</a:t>
             </a:r>
             <a:endParaRPr lang="en-US"/>
           </a:p>
@@ -1496,7 +1496,7 @@
           <a:p>
             <a:r>
               <a:rPr lang="en-US"/>
-              <a:t>Continuous integration, v2.0</a:t>
+              <a:t>Continuous integration, v3.0</a:t>
             </a:r>
           </a:p>
         </p:txBody>
@@ -1773,7 +1773,7 @@
           <a:p>
             <a:r>
               <a:rPr lang="de-CH"/>
-              <a:t>Sept 2022, CC BY-SA 4.0</a:t>
+              <a:t>June 2023, CC BY-SA 4.0</a:t>
             </a:r>
             <a:endParaRPr lang="en-US"/>
           </a:p>
@@ -1796,7 +1796,7 @@
           <a:p>
             <a:r>
               <a:rPr lang="en-US"/>
-              <a:t>Continuous integration, v2.0</a:t>
+              <a:t>Continuous integration, v3.0</a:t>
             </a:r>
           </a:p>
         </p:txBody>
@@ -1963,7 +1963,7 @@
           <a:p>
             <a:r>
               <a:rPr lang="de-CH" sz="1000"/>
-              <a:t>Sept 2022, CC BY-SA 4.0</a:t>
+              <a:t>June 2023, CC BY-SA 4.0</a:t>
             </a:r>
             <a:endParaRPr lang="en-US" sz="1000" dirty="0"/>
           </a:p>
@@ -1990,7 +1990,7 @@
           <a:p>
             <a:r>
               <a:rPr lang="en-US"/>
-              <a:t>Continuous integration, v2.0</a:t>
+              <a:t>Continuous integration, v3.0</a:t>
             </a:r>
             <a:endParaRPr lang="en-US" dirty="0"/>
           </a:p>
@@ -2270,7 +2270,7 @@
           <a:p>
             <a:r>
               <a:rPr lang="de-CH"/>
-              <a:t>Sept 2022, CC BY-SA 4.0</a:t>
+              <a:t>June 2023, CC BY-SA 4.0</a:t>
             </a:r>
             <a:endParaRPr lang="en-US"/>
           </a:p>
@@ -2293,7 +2293,7 @@
           <a:p>
             <a:r>
               <a:rPr lang="en-US"/>
-              <a:t>Continuous integration, v2.0</a:t>
+              <a:t>Continuous integration, v3.0</a:t>
             </a:r>
           </a:p>
         </p:txBody>
@@ -2505,7 +2505,7 @@
           <a:p>
             <a:r>
               <a:rPr lang="de-CH"/>
-              <a:t>Sept 2022, CC BY-SA 4.0</a:t>
+              <a:t>June 2023, CC BY-SA 4.0</a:t>
             </a:r>
             <a:endParaRPr lang="en-US"/>
           </a:p>
@@ -2528,7 +2528,7 @@
           <a:p>
             <a:r>
               <a:rPr lang="en-US"/>
-              <a:t>Continuous integration, v2.0</a:t>
+              <a:t>Continuous integration, v3.0</a:t>
             </a:r>
           </a:p>
         </p:txBody>
@@ -2860,7 +2860,7 @@
           <a:p>
             <a:r>
               <a:rPr lang="de-CH"/>
-              <a:t>Sept 2022, CC BY-SA 4.0</a:t>
+              <a:t>June 2023, CC BY-SA 4.0</a:t>
             </a:r>
             <a:endParaRPr lang="en-US"/>
           </a:p>
@@ -2883,7 +2883,7 @@
           <a:p>
             <a:r>
               <a:rPr lang="en-US"/>
-              <a:t>Continuous integration, v2.0</a:t>
+              <a:t>Continuous integration, v3.0</a:t>
             </a:r>
           </a:p>
         </p:txBody>
@@ -3031,7 +3031,7 @@
           <a:p>
             <a:r>
               <a:rPr lang="de-CH"/>
-              <a:t>Sept 2022, CC BY-SA 4.0</a:t>
+              <a:t>June 2023, CC BY-SA 4.0</a:t>
             </a:r>
             <a:endParaRPr lang="en-US"/>
           </a:p>
@@ -3054,7 +3054,7 @@
           <a:p>
             <a:r>
               <a:rPr lang="en-US"/>
-              <a:t>Continuous integration, v2.0</a:t>
+              <a:t>Continuous integration, v3.0</a:t>
             </a:r>
           </a:p>
         </p:txBody>
@@ -3211,7 +3211,7 @@
           <a:p>
             <a:r>
               <a:rPr lang="de-CH"/>
-              <a:t>Sept 2022, CC BY-SA 4.0</a:t>
+              <a:t>June 2023, CC BY-SA 4.0</a:t>
             </a:r>
             <a:endParaRPr lang="en-US"/>
           </a:p>
@@ -3234,7 +3234,7 @@
           <a:p>
             <a:r>
               <a:rPr lang="en-US"/>
-              <a:t>Continuous integration, v2.0</a:t>
+              <a:t>Continuous integration, v3.0</a:t>
             </a:r>
           </a:p>
         </p:txBody>
@@ -3584,7 +3584,7 @@
           <a:p>
             <a:r>
               <a:rPr lang="de-CH"/>
-              <a:t>Sept 2022, CC BY-SA 4.0</a:t>
+              <a:t>June 2023, CC BY-SA 4.0</a:t>
             </a:r>
             <a:endParaRPr lang="en-US"/>
           </a:p>
@@ -3607,7 +3607,7 @@
           <a:p>
             <a:r>
               <a:rPr lang="en-US"/>
-              <a:t>Continuous integration, v2.0</a:t>
+              <a:t>Continuous integration, v3.0</a:t>
             </a:r>
           </a:p>
         </p:txBody>
@@ -3815,7 +3815,7 @@
           <a:p>
             <a:r>
               <a:rPr lang="de-CH"/>
-              <a:t>Sept 2022, CC BY-SA 4.0</a:t>
+              <a:t>June 2023, CC BY-SA 4.0</a:t>
             </a:r>
             <a:endParaRPr lang="en-US"/>
           </a:p>
@@ -3838,7 +3838,7 @@
           <a:p>
             <a:r>
               <a:rPr lang="en-US"/>
-              <a:t>Continuous integration, v2.0</a:t>
+              <a:t>Continuous integration, v3.0</a:t>
             </a:r>
           </a:p>
         </p:txBody>
@@ -4155,7 +4155,7 @@
           <a:p>
             <a:r>
               <a:rPr lang="de-CH"/>
-              <a:t>Sept 2022, CC BY-SA 4.0</a:t>
+              <a:t>June 2023, CC BY-SA 4.0</a:t>
             </a:r>
             <a:endParaRPr lang="en-US" dirty="0"/>
           </a:p>
@@ -4194,7 +4194,7 @@
           <a:p>
             <a:r>
               <a:rPr lang="en-US"/>
-              <a:t>Continuous integration, v2.0</a:t>
+              <a:t>Continuous integration, v3.0</a:t>
             </a:r>
             <a:endParaRPr lang="en-US" dirty="0"/>
           </a:p>
@@ -4889,7 +4889,7 @@
           <a:p>
             <a:r>
               <a:rPr lang="de-CH" sz="1000"/>
-              <a:t>Sept 2022, CC BY-SA 4.0</a:t>
+              <a:t>June 2023, CC BY-SA 4.0</a:t>
             </a:r>
             <a:endParaRPr lang="en-US" sz="1000" dirty="0"/>
           </a:p>
@@ -4918,7 +4918,7 @@
           <a:p>
             <a:r>
               <a:rPr lang="en-US"/>
-              <a:t>Continuous integration, v2.0</a:t>
+              <a:t>Continuous integration, v3.0</a:t>
             </a:r>
             <a:endParaRPr lang="en-US" dirty="0"/>
           </a:p>
@@ -5007,7 +5007,7 @@
           <a:p>
             <a:r>
               <a:rPr lang="de-CH" sz="1000"/>
-              <a:t>Sept 2022, CC BY-SA 4.0</a:t>
+              <a:t>June 2023, CC BY-SA 4.0</a:t>
             </a:r>
             <a:endParaRPr lang="en-US" sz="1000" dirty="0"/>
           </a:p>
@@ -5036,7 +5036,7 @@
           <a:p>
             <a:r>
               <a:rPr lang="en-US"/>
-              <a:t>Continuous integration, v2.0</a:t>
+              <a:t>Continuous integration, v3.0</a:t>
             </a:r>
             <a:endParaRPr lang="en-US" dirty="0"/>
           </a:p>
@@ -5946,7 +5946,7 @@
           <a:p>
             <a:r>
               <a:rPr lang="de-CH" sz="1000"/>
-              <a:t>Sept 2022, CC BY-SA 4.0</a:t>
+              <a:t>June 2023, CC BY-SA 4.0</a:t>
             </a:r>
             <a:endParaRPr lang="en-US" sz="1000" dirty="0"/>
           </a:p>
@@ -5975,7 +5975,7 @@
           <a:p>
             <a:r>
               <a:rPr lang="en-US"/>
-              <a:t>Continuous integration, v2.0</a:t>
+              <a:t>Continuous integration, v3.0</a:t>
             </a:r>
             <a:endParaRPr lang="en-US" dirty="0"/>
           </a:p>
@@ -6802,7 +6802,7 @@
           <a:p>
             <a:r>
               <a:rPr lang="de-CH" sz="1000"/>
-              <a:t>Sept 2022, CC BY-SA 4.0</a:t>
+              <a:t>June 2023, CC BY-SA 4.0</a:t>
             </a:r>
             <a:endParaRPr lang="en-US" sz="1000" dirty="0"/>
           </a:p>
@@ -6831,7 +6831,7 @@
           <a:p>
             <a:r>
               <a:rPr lang="en-US"/>
-              <a:t>Continuous integration, v2.0</a:t>
+              <a:t>Continuous integration, v3.0</a:t>
             </a:r>
             <a:endParaRPr lang="en-US" dirty="0"/>
           </a:p>
@@ -6999,7 +6999,7 @@
           <a:p>
             <a:r>
               <a:rPr lang="de-CH" sz="1000"/>
-              <a:t>Sept 2022, CC BY-SA 4.0</a:t>
+              <a:t>June 2023, CC BY-SA 4.0</a:t>
             </a:r>
             <a:endParaRPr lang="en-US" sz="1000" dirty="0"/>
           </a:p>
@@ -7028,7 +7028,7 @@
           <a:p>
             <a:r>
               <a:rPr lang="en-US"/>
-              <a:t>Continuous integration, v2.0</a:t>
+              <a:t>Continuous integration, v3.0</a:t>
             </a:r>
             <a:endParaRPr lang="en-US" dirty="0"/>
           </a:p>
@@ -7147,7 +7147,7 @@
           <a:p>
             <a:r>
               <a:rPr lang="de-CH" sz="1000"/>
-              <a:t>Sept 2022, CC BY-SA 4.0</a:t>
+              <a:t>June 2023, CC BY-SA 4.0</a:t>
             </a:r>
             <a:endParaRPr lang="en-US" sz="1000" dirty="0"/>
           </a:p>
@@ -7176,7 +7176,7 @@
           <a:p>
             <a:r>
               <a:rPr lang="en-US"/>
-              <a:t>Continuous integration, v2.0</a:t>
+              <a:t>Continuous integration, v3.0</a:t>
             </a:r>
             <a:endParaRPr lang="en-US" dirty="0"/>
           </a:p>
@@ -7785,7 +7785,7 @@
           <a:p>
             <a:r>
               <a:rPr lang="de-CH" sz="1000"/>
-              <a:t>Sept 2022, CC BY-SA 4.0</a:t>
+              <a:t>June 2023, CC BY-SA 4.0</a:t>
             </a:r>
             <a:endParaRPr lang="en-US" sz="1000" dirty="0"/>
           </a:p>
@@ -7814,7 +7814,7 @@
           <a:p>
             <a:r>
               <a:rPr lang="en-US"/>
-              <a:t>Continuous integration, v2.0</a:t>
+              <a:t>Continuous integration, v3.0</a:t>
             </a:r>
             <a:endParaRPr lang="en-US" dirty="0"/>
           </a:p>
@@ -8683,7 +8683,7 @@
           <a:p>
             <a:r>
               <a:rPr lang="de-CH" sz="1000"/>
-              <a:t>Sept 2022, CC BY-SA 4.0</a:t>
+              <a:t>June 2023, CC BY-SA 4.0</a:t>
             </a:r>
             <a:endParaRPr lang="en-US" sz="1000" dirty="0"/>
           </a:p>
@@ -8712,7 +8712,7 @@
           <a:p>
             <a:r>
               <a:rPr lang="en-US"/>
-              <a:t>Continuous integration, v2.0</a:t>
+              <a:t>Continuous integration, v3.0</a:t>
             </a:r>
             <a:endParaRPr lang="en-US" dirty="0"/>
           </a:p>
@@ -8844,7 +8844,7 @@
           <a:p>
             <a:r>
               <a:rPr lang="de-CH" sz="1000"/>
-              <a:t>Sept 2022, CC BY-SA 4.0</a:t>
+              <a:t>June 2023, CC BY-SA 4.0</a:t>
             </a:r>
             <a:endParaRPr lang="en-US" sz="1000" dirty="0"/>
           </a:p>
@@ -8873,7 +8873,7 @@
           <a:p>
             <a:r>
               <a:rPr lang="en-US"/>
-              <a:t>Continuous integration, v2.0</a:t>
+              <a:t>Continuous integration, v3.0</a:t>
             </a:r>
             <a:endParaRPr lang="en-US" dirty="0"/>
           </a:p>
@@ -9046,7 +9046,7 @@
           <a:p>
             <a:r>
               <a:rPr lang="de-CH" sz="1000"/>
-              <a:t>Sept 2022, CC BY-SA 4.0</a:t>
+              <a:t>June 2023, CC BY-SA 4.0</a:t>
             </a:r>
             <a:endParaRPr lang="en-US" sz="1000" dirty="0"/>
           </a:p>
@@ -9075,7 +9075,7 @@
           <a:p>
             <a:r>
               <a:rPr lang="en-US"/>
-              <a:t>Continuous integration, v2.0</a:t>
+              <a:t>Continuous integration, v3.0</a:t>
             </a:r>
             <a:endParaRPr lang="en-US" dirty="0"/>
           </a:p>
@@ -9207,7 +9207,7 @@
           <a:p>
             <a:r>
               <a:rPr lang="de-CH" sz="1000"/>
-              <a:t>Sept 2022, CC BY-SA 4.0</a:t>
+              <a:t>June 2023, CC BY-SA 4.0</a:t>
             </a:r>
             <a:endParaRPr lang="en-US" sz="1000" dirty="0"/>
           </a:p>
@@ -9236,7 +9236,7 @@
           <a:p>
             <a:r>
               <a:rPr lang="en-US"/>
-              <a:t>Continuous integration, v2.0</a:t>
+              <a:t>Continuous integration, v3.0</a:t>
             </a:r>
             <a:endParaRPr lang="en-US" dirty="0"/>
           </a:p>
@@ -9516,7 +9516,7 @@
           <a:p>
             <a:r>
               <a:rPr lang="en-US"/>
-              <a:t>Testing scientific code, v15.0</a:t>
+              <a:t>Continuous integration, v3.0</a:t>
             </a:r>
           </a:p>
         </p:txBody>
@@ -9568,7 +9568,7 @@
           <a:p>
             <a:r>
               <a:rPr lang="de-CH"/>
-              <a:t>Sept 2022, CC BY-SA 4.0</a:t>
+              <a:t>June 2023, CC BY-SA 4.0</a:t>
             </a:r>
             <a:endParaRPr lang="en-US"/>
           </a:p>
@@ -9591,7 +9591,7 @@
           <a:p>
             <a:r>
               <a:rPr lang="en-US"/>
-              <a:t>Continuous integration, v2.0</a:t>
+              <a:t>Continuous integration, v3.0</a:t>
             </a:r>
           </a:p>
         </p:txBody>
@@ -9790,7 +9790,7 @@
           <a:p>
             <a:r>
               <a:rPr lang="de-CH" sz="1000"/>
-              <a:t>Sept 2022, CC BY-SA 4.0</a:t>
+              <a:t>June 2023, CC BY-SA 4.0</a:t>
             </a:r>
             <a:endParaRPr lang="en-US" sz="1000" dirty="0"/>
           </a:p>
@@ -9819,7 +9819,7 @@
           <a:p>
             <a:r>
               <a:rPr lang="en-US"/>
-              <a:t>Continuous integration, v2.0</a:t>
+              <a:t>Continuous integration, v3.0</a:t>
             </a:r>
             <a:endParaRPr lang="en-US" dirty="0"/>
           </a:p>
@@ -10324,7 +10324,7 @@
           <a:p>
             <a:r>
               <a:rPr lang="de-CH" sz="1000"/>
-              <a:t>Sept 2022, CC BY-SA 4.0</a:t>
+              <a:t>June 2023, CC BY-SA 4.0</a:t>
             </a:r>
             <a:endParaRPr lang="en-US" sz="1000" dirty="0"/>
           </a:p>
@@ -10353,7 +10353,7 @@
           <a:p>
             <a:r>
               <a:rPr lang="en-US"/>
-              <a:t>Continuous integration, v2.0</a:t>
+              <a:t>Continuous integration, v3.0</a:t>
             </a:r>
             <a:endParaRPr lang="en-US" dirty="0"/>
           </a:p>
@@ -10540,7 +10540,7 @@
           <a:p>
             <a:r>
               <a:rPr lang="de-CH" sz="1000"/>
-              <a:t>Sept 2022, CC BY-SA 4.0</a:t>
+              <a:t>June 2023, CC BY-SA 4.0</a:t>
             </a:r>
             <a:endParaRPr lang="en-US" sz="1000" dirty="0"/>
           </a:p>
@@ -10569,7 +10569,7 @@
           <a:p>
             <a:r>
               <a:rPr lang="en-US"/>
-              <a:t>Continuous integration, v2.0</a:t>
+              <a:t>Continuous integration, v3.0</a:t>
             </a:r>
             <a:endParaRPr lang="en-US" dirty="0"/>
           </a:p>
@@ -10838,7 +10838,7 @@
           <a:p>
             <a:r>
               <a:rPr lang="de-CH"/>
-              <a:t>Sept 2022, CC BY-SA 4.0</a:t>
+              <a:t>June 2023, CC BY-SA 4.0</a:t>
             </a:r>
             <a:endParaRPr lang="en-US"/>
           </a:p>
@@ -10861,7 +10861,7 @@
           <a:p>
             <a:r>
               <a:rPr lang="en-US"/>
-              <a:t>Continuous integration, v2.0</a:t>
+              <a:t>Continuous integration, v3.0</a:t>
             </a:r>
           </a:p>
         </p:txBody>
@@ -11066,7 +11066,7 @@
           <a:p>
             <a:r>
               <a:rPr lang="de-CH"/>
-              <a:t>Sept 2022, CC BY-SA 4.0</a:t>
+              <a:t>June 2023, CC BY-SA 4.0</a:t>
             </a:r>
             <a:endParaRPr lang="en-US"/>
           </a:p>
@@ -11095,7 +11095,7 @@
           <a:p>
             <a:r>
               <a:rPr lang="en-US"/>
-              <a:t>Continuous integration, v2.0</a:t>
+              <a:t>Continuous integration, v3.0</a:t>
             </a:r>
           </a:p>
         </p:txBody>
@@ -11190,7 +11190,7 @@
           <a:p>
             <a:r>
               <a:rPr lang="de-CH" sz="1000"/>
-              <a:t>Sept 2022, CC BY-SA 4.0</a:t>
+              <a:t>June 2023, CC BY-SA 4.0</a:t>
             </a:r>
             <a:endParaRPr lang="en-US" sz="1000" dirty="0"/>
           </a:p>
@@ -11219,7 +11219,7 @@
           <a:p>
             <a:r>
               <a:rPr lang="en-US"/>
-              <a:t>Continuous integration, v2.0</a:t>
+              <a:t>Continuous integration, v3.0</a:t>
             </a:r>
             <a:endParaRPr lang="en-US" dirty="0"/>
           </a:p>
@@ -11462,7 +11462,7 @@
           <a:p>
             <a:r>
               <a:rPr lang="de-CH"/>
-              <a:t>Sept 2022, CC BY-SA 4.0</a:t>
+              <a:t>June 2023, CC BY-SA 4.0</a:t>
             </a:r>
             <a:endParaRPr lang="en-US"/>
           </a:p>
@@ -11491,7 +11491,7 @@
           <a:p>
             <a:r>
               <a:rPr lang="en-US"/>
-              <a:t>Continuous integration, v2.0</a:t>
+              <a:t>Continuous integration, v3.0</a:t>
             </a:r>
           </a:p>
         </p:txBody>
@@ -11577,7 +11577,7 @@
           <a:p>
             <a:r>
               <a:rPr lang="de-CH" sz="1000"/>
-              <a:t>Sept 2022, CC BY-SA 4.0</a:t>
+              <a:t>June 2023, CC BY-SA 4.0</a:t>
             </a:r>
             <a:endParaRPr lang="en-US" sz="1000" dirty="0"/>
           </a:p>
@@ -11606,7 +11606,7 @@
           <a:p>
             <a:r>
               <a:rPr lang="en-US"/>
-              <a:t>Continuous integration, v2.0</a:t>
+              <a:t>Continuous integration, v3.0</a:t>
             </a:r>
             <a:endParaRPr lang="en-US" dirty="0"/>
           </a:p>
@@ -11915,7 +11915,7 @@
           <a:p>
             <a:r>
               <a:rPr lang="de-CH" sz="1000"/>
-              <a:t>Sept 2022, CC BY-SA 4.0</a:t>
+              <a:t>June 2023, CC BY-SA 4.0</a:t>
             </a:r>
             <a:endParaRPr lang="en-US" sz="1000" dirty="0"/>
           </a:p>
@@ -11944,7 +11944,7 @@
           <a:p>
             <a:r>
               <a:rPr lang="en-US"/>
-              <a:t>Continuous integration, v2.0</a:t>
+              <a:t>Continuous integration, v3.0</a:t>
             </a:r>
             <a:endParaRPr lang="en-US" dirty="0"/>
           </a:p>
@@ -12185,7 +12185,7 @@
           <a:p>
             <a:r>
               <a:rPr lang="de-CH" sz="1000"/>
-              <a:t>Sept 2022, CC BY-SA 4.0</a:t>
+              <a:t>June 2023, CC BY-SA 4.0</a:t>
             </a:r>
             <a:endParaRPr lang="en-US" sz="1000" dirty="0"/>
           </a:p>
@@ -12214,7 +12214,7 @@
           <a:p>
             <a:r>
               <a:rPr lang="en-US"/>
-              <a:t>Continuous integration, v2.0</a:t>
+              <a:t>Continuous integration, v3.0</a:t>
             </a:r>
             <a:endParaRPr lang="en-US" dirty="0"/>
           </a:p>
@@ -12430,7 +12430,7 @@
           <a:p>
             <a:r>
               <a:rPr lang="de-CH" sz="1000"/>
-              <a:t>Sept 2022, CC BY-SA 4.0</a:t>
+              <a:t>June 2023, CC BY-SA 4.0</a:t>
             </a:r>
             <a:endParaRPr lang="en-US" sz="1000" dirty="0"/>
           </a:p>
@@ -12459,7 +12459,7 @@
           <a:p>
             <a:r>
               <a:rPr lang="en-US"/>
-              <a:t>Continuous integration, v2.0</a:t>
+              <a:t>Continuous integration, v3.0</a:t>
             </a:r>
             <a:endParaRPr lang="en-US" dirty="0"/>
           </a:p>

</xml_diff>

<commit_message>
Iteration on CI slides
</commit_message>
<xml_diff>
--- a/continuous_integration.pptx
+++ b/continuous_integration.pptx
@@ -269,7 +269,7 @@
             <a:fld id="{80AC11AF-147E-0A48-A5B0-8DA858D84551}" type="datetimeFigureOut">
               <a:rPr lang="en-US" smtClean="0"/>
               <a:pPr/>
-              <a:t>8/3/23</a:t>
+              <a:t>8/19/23</a:t>
             </a:fld>
             <a:endParaRPr lang="en-US"/>
           </a:p>
@@ -4681,14 +4681,14 @@
             </a:r>
             <a:r>
               <a:rPr lang="en-CH" dirty="0">
-                <a:latin typeface="Courier New" panose="02070309020205020404" pitchFamily="49" charset="0"/>
-                <a:cs typeface="Courier New" panose="02070309020205020404" pitchFamily="49" charset="0"/>
+                <a:latin typeface="Consolas" panose="020B0609020204030204" pitchFamily="49" charset="0"/>
+                <a:cs typeface="Consolas" panose="020B0609020204030204" pitchFamily="49" charset="0"/>
               </a:rPr>
               <a:t>.github/worflows/config-name.yml</a:t>
             </a:r>
             <a:endParaRPr lang="en-CH" sz="2000" dirty="0">
-              <a:latin typeface="Courier New" panose="02070309020205020404" pitchFamily="49" charset="0"/>
-              <a:cs typeface="Courier New" panose="02070309020205020404" pitchFamily="49" charset="0"/>
+              <a:latin typeface="Consolas" panose="020B0609020204030204" pitchFamily="49" charset="0"/>
+              <a:cs typeface="Consolas" panose="020B0609020204030204" pitchFamily="49" charset="0"/>
             </a:endParaRPr>
           </a:p>
         </p:txBody>
@@ -4728,7 +4728,7 @@
           <p:spPr>
             <a:xfrm>
               <a:off x="2377857" y="1852611"/>
-              <a:ext cx="4695516" cy="4401205"/>
+              <a:ext cx="4358886" cy="4401205"/>
             </a:xfrm>
             <a:prstGeom prst="rect">
               <a:avLst/>
@@ -4744,280 +4744,177 @@
             <a:lstStyle/>
             <a:p>
               <a:r>
-                <a:rPr lang="en-US" sz="1400" dirty="0">
-                  <a:latin typeface="Courier New" panose="02070309020205020404" pitchFamily="49" charset="0"/>
-                  <a:cs typeface="Courier New" panose="02070309020205020404" pitchFamily="49" charset="0"/>
+                <a:rPr lang="en-US" sz="1400" noProof="1">
+                  <a:latin typeface="Consolas" panose="020B0609020204030204" pitchFamily="49" charset="0"/>
+                  <a:cs typeface="Consolas" panose="020B0609020204030204" pitchFamily="49" charset="0"/>
                 </a:rPr>
                 <a:t>name: Run all the tests for PRs</a:t>
               </a:r>
             </a:p>
             <a:p>
               <a:r>
-                <a:rPr lang="en-US" sz="1400" dirty="0">
-                  <a:latin typeface="Courier New" panose="02070309020205020404" pitchFamily="49" charset="0"/>
-                  <a:cs typeface="Courier New" panose="02070309020205020404" pitchFamily="49" charset="0"/>
+                <a:rPr lang="en-US" sz="1400" noProof="1">
+                  <a:latin typeface="Consolas" panose="020B0609020204030204" pitchFamily="49" charset="0"/>
+                  <a:cs typeface="Consolas" panose="020B0609020204030204" pitchFamily="49" charset="0"/>
                 </a:rPr>
                 <a:t>on:</a:t>
               </a:r>
             </a:p>
             <a:p>
               <a:r>
-                <a:rPr lang="en-US" sz="1400" dirty="0">
-                  <a:latin typeface="Courier New" panose="02070309020205020404" pitchFamily="49" charset="0"/>
-                  <a:cs typeface="Courier New" panose="02070309020205020404" pitchFamily="49" charset="0"/>
+                <a:rPr lang="en-US" sz="1400" noProof="1">
+                  <a:latin typeface="Consolas" panose="020B0609020204030204" pitchFamily="49" charset="0"/>
+                  <a:cs typeface="Consolas" panose="020B0609020204030204" pitchFamily="49" charset="0"/>
                 </a:rPr>
-                <a:t>  [push, </a:t>
-              </a:r>
-              <a:r>
-                <a:rPr lang="en-US" sz="1400" dirty="0" err="1">
-                  <a:latin typeface="Courier New" panose="02070309020205020404" pitchFamily="49" charset="0"/>
-                  <a:cs typeface="Courier New" panose="02070309020205020404" pitchFamily="49" charset="0"/>
-                </a:rPr>
-                <a:t>pull_request</a:t>
-              </a:r>
-              <a:r>
-                <a:rPr lang="en-US" sz="1400" dirty="0">
-                  <a:latin typeface="Courier New" panose="02070309020205020404" pitchFamily="49" charset="0"/>
-                  <a:cs typeface="Courier New" panose="02070309020205020404" pitchFamily="49" charset="0"/>
-                </a:rPr>
-                <a:t>]</a:t>
+                <a:t>  [push, pull_request]</a:t>
               </a:r>
             </a:p>
             <a:p>
-              <a:endParaRPr lang="en-US" sz="1400" dirty="0">
-                <a:latin typeface="Courier New" panose="02070309020205020404" pitchFamily="49" charset="0"/>
-                <a:cs typeface="Courier New" panose="02070309020205020404" pitchFamily="49" charset="0"/>
+              <a:endParaRPr lang="en-US" sz="1400" noProof="1">
+                <a:latin typeface="Consolas" panose="020B0609020204030204" pitchFamily="49" charset="0"/>
+                <a:cs typeface="Consolas" panose="020B0609020204030204" pitchFamily="49" charset="0"/>
               </a:endParaRPr>
             </a:p>
             <a:p>
               <a:r>
-                <a:rPr lang="en-US" sz="1400" dirty="0">
-                  <a:latin typeface="Courier New" panose="02070309020205020404" pitchFamily="49" charset="0"/>
-                  <a:cs typeface="Courier New" panose="02070309020205020404" pitchFamily="49" charset="0"/>
+                <a:rPr lang="en-US" sz="1400" noProof="1">
+                  <a:latin typeface="Consolas" panose="020B0609020204030204" pitchFamily="49" charset="0"/>
+                  <a:cs typeface="Consolas" panose="020B0609020204030204" pitchFamily="49" charset="0"/>
                 </a:rPr>
                 <a:t>jobs:</a:t>
               </a:r>
             </a:p>
             <a:p>
               <a:r>
-                <a:rPr lang="en-US" sz="1400" dirty="0">
-                  <a:latin typeface="Courier New" panose="02070309020205020404" pitchFamily="49" charset="0"/>
-                  <a:cs typeface="Courier New" panose="02070309020205020404" pitchFamily="49" charset="0"/>
+                <a:rPr lang="en-US" sz="1400" noProof="1">
+                  <a:latin typeface="Consolas" panose="020B0609020204030204" pitchFamily="49" charset="0"/>
+                  <a:cs typeface="Consolas" panose="020B0609020204030204" pitchFamily="49" charset="0"/>
                 </a:rPr>
                 <a:t>  run-tests:</a:t>
               </a:r>
             </a:p>
             <a:p>
               <a:r>
-                <a:rPr lang="en-US" sz="1400" dirty="0">
-                  <a:latin typeface="Courier New" panose="02070309020205020404" pitchFamily="49" charset="0"/>
-                  <a:cs typeface="Courier New" panose="02070309020205020404" pitchFamily="49" charset="0"/>
+                <a:rPr lang="en-US" sz="1400" noProof="1">
+                  <a:latin typeface="Consolas" panose="020B0609020204030204" pitchFamily="49" charset="0"/>
+                  <a:cs typeface="Consolas" panose="020B0609020204030204" pitchFamily="49" charset="0"/>
                 </a:rPr>
                 <a:t>    runs-on: ubuntu-latest</a:t>
               </a:r>
             </a:p>
             <a:p>
-              <a:endParaRPr lang="en-US" sz="1400" dirty="0">
-                <a:latin typeface="Courier New" panose="02070309020205020404" pitchFamily="49" charset="0"/>
-                <a:cs typeface="Courier New" panose="02070309020205020404" pitchFamily="49" charset="0"/>
+              <a:endParaRPr lang="en-US" sz="1400" noProof="1">
+                <a:latin typeface="Consolas" panose="020B0609020204030204" pitchFamily="49" charset="0"/>
+                <a:cs typeface="Consolas" panose="020B0609020204030204" pitchFamily="49" charset="0"/>
               </a:endParaRPr>
             </a:p>
             <a:p>
               <a:r>
-                <a:rPr lang="en-US" sz="1400" dirty="0">
-                  <a:latin typeface="Courier New" panose="02070309020205020404" pitchFamily="49" charset="0"/>
-                  <a:cs typeface="Courier New" panose="02070309020205020404" pitchFamily="49" charset="0"/>
+                <a:rPr lang="en-US" sz="1400" noProof="1">
+                  <a:latin typeface="Consolas" panose="020B0609020204030204" pitchFamily="49" charset="0"/>
+                  <a:cs typeface="Consolas" panose="020B0609020204030204" pitchFamily="49" charset="0"/>
                 </a:rPr>
                 <a:t>    steps:</a:t>
               </a:r>
             </a:p>
             <a:p>
               <a:r>
-                <a:rPr lang="en-US" sz="1400" dirty="0">
-                  <a:latin typeface="Courier New" panose="02070309020205020404" pitchFamily="49" charset="0"/>
-                  <a:cs typeface="Courier New" panose="02070309020205020404" pitchFamily="49" charset="0"/>
+                <a:rPr lang="en-US" sz="1400" noProof="1">
+                  <a:latin typeface="Consolas" panose="020B0609020204030204" pitchFamily="49" charset="0"/>
+                  <a:cs typeface="Consolas" panose="020B0609020204030204" pitchFamily="49" charset="0"/>
                 </a:rPr>
                 <a:t>    - uses: actions/checkout@v2</a:t>
               </a:r>
             </a:p>
             <a:p>
               <a:r>
-                <a:rPr lang="en-US" sz="1400" dirty="0">
-                  <a:latin typeface="Courier New" panose="02070309020205020404" pitchFamily="49" charset="0"/>
-                  <a:cs typeface="Courier New" panose="02070309020205020404" pitchFamily="49" charset="0"/>
+                <a:rPr lang="en-US" sz="1400" noProof="1">
+                  <a:latin typeface="Consolas" panose="020B0609020204030204" pitchFamily="49" charset="0"/>
+                  <a:cs typeface="Consolas" panose="020B0609020204030204" pitchFamily="49" charset="0"/>
                 </a:rPr>
                 <a:t>    - name: Set up Python</a:t>
               </a:r>
             </a:p>
             <a:p>
               <a:r>
-                <a:rPr lang="en-US" sz="1400" dirty="0">
-                  <a:latin typeface="Courier New" panose="02070309020205020404" pitchFamily="49" charset="0"/>
-                  <a:cs typeface="Courier New" panose="02070309020205020404" pitchFamily="49" charset="0"/>
+                <a:rPr lang="en-US" sz="1400" noProof="1">
+                  <a:latin typeface="Consolas" panose="020B0609020204030204" pitchFamily="49" charset="0"/>
+                  <a:cs typeface="Consolas" panose="020B0609020204030204" pitchFamily="49" charset="0"/>
                 </a:rPr>
                 <a:t>      uses: actions/setup-python@v2</a:t>
               </a:r>
             </a:p>
             <a:p>
               <a:r>
-                <a:rPr lang="en-US" sz="1400" dirty="0">
-                  <a:latin typeface="Courier New" panose="02070309020205020404" pitchFamily="49" charset="0"/>
-                  <a:cs typeface="Courier New" panose="02070309020205020404" pitchFamily="49" charset="0"/>
+                <a:rPr lang="en-US" sz="1400" noProof="1">
+                  <a:latin typeface="Consolas" panose="020B0609020204030204" pitchFamily="49" charset="0"/>
+                  <a:cs typeface="Consolas" panose="020B0609020204030204" pitchFamily="49" charset="0"/>
                 </a:rPr>
                 <a:t>      with:</a:t>
               </a:r>
             </a:p>
             <a:p>
               <a:r>
-                <a:rPr lang="en-US" sz="1400" dirty="0">
-                  <a:latin typeface="Courier New" panose="02070309020205020404" pitchFamily="49" charset="0"/>
-                  <a:cs typeface="Courier New" panose="02070309020205020404" pitchFamily="49" charset="0"/>
+                <a:rPr lang="en-US" sz="1400" noProof="1">
+                  <a:latin typeface="Consolas" panose="020B0609020204030204" pitchFamily="49" charset="0"/>
+                  <a:cs typeface="Consolas" panose="020B0609020204030204" pitchFamily="49" charset="0"/>
                 </a:rPr>
                 <a:t>        python-version: 3.9</a:t>
               </a:r>
             </a:p>
             <a:p>
               <a:r>
-                <a:rPr lang="en-US" sz="1400" dirty="0">
-                  <a:latin typeface="Courier New" panose="02070309020205020404" pitchFamily="49" charset="0"/>
-                  <a:cs typeface="Courier New" panose="02070309020205020404" pitchFamily="49" charset="0"/>
+                <a:rPr lang="en-US" sz="1400" noProof="1">
+                  <a:latin typeface="Consolas" panose="020B0609020204030204" pitchFamily="49" charset="0"/>
+                  <a:cs typeface="Consolas" panose="020B0609020204030204" pitchFamily="49" charset="0"/>
                 </a:rPr>
                 <a:t>    - name: Install dependencies</a:t>
               </a:r>
             </a:p>
             <a:p>
               <a:r>
-                <a:rPr lang="en-US" sz="1400" dirty="0">
-                  <a:latin typeface="Courier New" panose="02070309020205020404" pitchFamily="49" charset="0"/>
-                  <a:cs typeface="Courier New" panose="02070309020205020404" pitchFamily="49" charset="0"/>
+                <a:rPr lang="en-US" sz="1400" noProof="1">
+                  <a:latin typeface="Consolas" panose="020B0609020204030204" pitchFamily="49" charset="0"/>
+                  <a:cs typeface="Consolas" panose="020B0609020204030204" pitchFamily="49" charset="0"/>
                 </a:rPr>
                 <a:t>      run:</a:t>
               </a:r>
             </a:p>
             <a:p>
               <a:r>
-                <a:rPr lang="en-US" sz="1400" dirty="0">
-                  <a:latin typeface="Courier New" panose="02070309020205020404" pitchFamily="49" charset="0"/>
-                  <a:cs typeface="Courier New" panose="02070309020205020404" pitchFamily="49" charset="0"/>
+                <a:rPr lang="en-US" sz="1400" noProof="1">
+                  <a:latin typeface="Consolas" panose="020B0609020204030204" pitchFamily="49" charset="0"/>
+                  <a:cs typeface="Consolas" panose="020B0609020204030204" pitchFamily="49" charset="0"/>
                 </a:rPr>
-                <a:t>        python -m pip install </a:t>
+                <a:t>        python -m pip install pytest numpy</a:t>
               </a:r>
-              <a:r>
-                <a:rPr lang="en-US" sz="1400" dirty="0" err="1">
-                  <a:latin typeface="Courier New" panose="02070309020205020404" pitchFamily="49" charset="0"/>
-                  <a:cs typeface="Courier New" panose="02070309020205020404" pitchFamily="49" charset="0"/>
-                </a:rPr>
-                <a:t>pytest</a:t>
-              </a:r>
-              <a:r>
-                <a:rPr lang="en-US" sz="1400" dirty="0">
-                  <a:latin typeface="Courier New" panose="02070309020205020404" pitchFamily="49" charset="0"/>
-                  <a:cs typeface="Courier New" panose="02070309020205020404" pitchFamily="49" charset="0"/>
-                </a:rPr>
-                <a:t> </a:t>
-              </a:r>
-              <a:r>
-                <a:rPr lang="en-US" sz="1400" dirty="0" err="1">
-                  <a:latin typeface="Courier New" panose="02070309020205020404" pitchFamily="49" charset="0"/>
-                  <a:cs typeface="Courier New" panose="02070309020205020404" pitchFamily="49" charset="0"/>
-                </a:rPr>
-                <a:t>numpy</a:t>
-              </a:r>
-              <a:endParaRPr lang="en-US" sz="1400" dirty="0">
-                <a:latin typeface="Courier New" panose="02070309020205020404" pitchFamily="49" charset="0"/>
-                <a:cs typeface="Courier New" panose="02070309020205020404" pitchFamily="49" charset="0"/>
-              </a:endParaRPr>
             </a:p>
             <a:p>
               <a:r>
-                <a:rPr lang="en-US" sz="1400" dirty="0">
-                  <a:latin typeface="Courier New" panose="02070309020205020404" pitchFamily="49" charset="0"/>
-                  <a:cs typeface="Courier New" panose="02070309020205020404" pitchFamily="49" charset="0"/>
+                <a:rPr lang="en-US" sz="1400" noProof="1">
+                  <a:latin typeface="Consolas" panose="020B0609020204030204" pitchFamily="49" charset="0"/>
+                  <a:cs typeface="Consolas" panose="020B0609020204030204" pitchFamily="49" charset="0"/>
                 </a:rPr>
-                <a:t>    - name: Test with </a:t>
+                <a:t>    - name: Test with pytest</a:t>
               </a:r>
-              <a:r>
-                <a:rPr lang="en-US" sz="1400" dirty="0" err="1">
-                  <a:latin typeface="Courier New" panose="02070309020205020404" pitchFamily="49" charset="0"/>
-                  <a:cs typeface="Courier New" panose="02070309020205020404" pitchFamily="49" charset="0"/>
-                </a:rPr>
-                <a:t>pytest</a:t>
-              </a:r>
-              <a:endParaRPr lang="en-US" sz="1400" dirty="0">
-                <a:latin typeface="Courier New" panose="02070309020205020404" pitchFamily="49" charset="0"/>
-                <a:cs typeface="Courier New" panose="02070309020205020404" pitchFamily="49" charset="0"/>
-              </a:endParaRPr>
             </a:p>
             <a:p>
               <a:r>
-                <a:rPr lang="en-US" sz="1400" dirty="0">
-                  <a:latin typeface="Courier New" panose="02070309020205020404" pitchFamily="49" charset="0"/>
-                  <a:cs typeface="Courier New" panose="02070309020205020404" pitchFamily="49" charset="0"/>
+                <a:rPr lang="en-US" sz="1400" noProof="1">
+                  <a:latin typeface="Consolas" panose="020B0609020204030204" pitchFamily="49" charset="0"/>
+                  <a:cs typeface="Consolas" panose="020B0609020204030204" pitchFamily="49" charset="0"/>
                 </a:rPr>
                 <a:t>      run:</a:t>
               </a:r>
             </a:p>
             <a:p>
               <a:r>
-                <a:rPr lang="en-US" sz="1400" dirty="0">
-                  <a:latin typeface="Courier New" panose="02070309020205020404" pitchFamily="49" charset="0"/>
-                  <a:cs typeface="Courier New" panose="02070309020205020404" pitchFamily="49" charset="0"/>
+                <a:rPr lang="en-US" sz="1400" noProof="1">
+                  <a:latin typeface="Consolas" panose="020B0609020204030204" pitchFamily="49" charset="0"/>
+                  <a:cs typeface="Consolas" panose="020B0609020204030204" pitchFamily="49" charset="0"/>
                 </a:rPr>
-                <a:t>        </a:t>
+                <a:t>        pytest -sv hands_on/pyanno_voting</a:t>
               </a:r>
-              <a:r>
-                <a:rPr lang="en-US" sz="1400" dirty="0" err="1">
-                  <a:latin typeface="Courier New" panose="02070309020205020404" pitchFamily="49" charset="0"/>
-                  <a:cs typeface="Courier New" panose="02070309020205020404" pitchFamily="49" charset="0"/>
-                </a:rPr>
-                <a:t>pytest</a:t>
-              </a:r>
-              <a:r>
-                <a:rPr lang="en-US" sz="1400" dirty="0">
-                  <a:latin typeface="Courier New" panose="02070309020205020404" pitchFamily="49" charset="0"/>
-                  <a:cs typeface="Courier New" panose="02070309020205020404" pitchFamily="49" charset="0"/>
-                </a:rPr>
-                <a:t> -</a:t>
-              </a:r>
-              <a:r>
-                <a:rPr lang="en-US" sz="1400" dirty="0" err="1">
-                  <a:latin typeface="Courier New" panose="02070309020205020404" pitchFamily="49" charset="0"/>
-                  <a:cs typeface="Courier New" panose="02070309020205020404" pitchFamily="49" charset="0"/>
-                </a:rPr>
-                <a:t>sv</a:t>
-              </a:r>
-              <a:r>
-                <a:rPr lang="en-US" sz="1400" dirty="0">
-                  <a:latin typeface="Courier New" panose="02070309020205020404" pitchFamily="49" charset="0"/>
-                  <a:cs typeface="Courier New" panose="02070309020205020404" pitchFamily="49" charset="0"/>
-                </a:rPr>
-                <a:t> </a:t>
-              </a:r>
-              <a:r>
-                <a:rPr lang="en-US" sz="1400" dirty="0" err="1">
-                  <a:latin typeface="Courier New" panose="02070309020205020404" pitchFamily="49" charset="0"/>
-                  <a:cs typeface="Courier New" panose="02070309020205020404" pitchFamily="49" charset="0"/>
-                </a:rPr>
-                <a:t>hands_on</a:t>
-              </a:r>
-              <a:r>
-                <a:rPr lang="en-US" sz="1400" dirty="0">
-                  <a:latin typeface="Courier New" panose="02070309020205020404" pitchFamily="49" charset="0"/>
-                  <a:cs typeface="Courier New" panose="02070309020205020404" pitchFamily="49" charset="0"/>
-                </a:rPr>
-                <a:t>/</a:t>
-              </a:r>
-              <a:r>
-                <a:rPr lang="en-US" sz="1400" dirty="0" err="1">
-                  <a:latin typeface="Courier New" panose="02070309020205020404" pitchFamily="49" charset="0"/>
-                  <a:cs typeface="Courier New" panose="02070309020205020404" pitchFamily="49" charset="0"/>
-                </a:rPr>
-                <a:t>pyanno_voting</a:t>
-              </a:r>
-              <a:endParaRPr lang="en-CH" sz="1400" dirty="0">
-                <a:latin typeface="Courier New" panose="02070309020205020404" pitchFamily="49" charset="0"/>
-                <a:cs typeface="Courier New" panose="02070309020205020404" pitchFamily="49" charset="0"/>
-              </a:endParaRPr>
             </a:p>
           </p:txBody>
         </p:sp>
@@ -5750,56 +5647,8 @@
               <a:buNone/>
             </a:pPr>
             <a:r>
-              <a:rPr lang="de-DE" b="1" dirty="0"/>
-              <a:t>Add a CI </a:t>
-            </a:r>
-            <a:r>
-              <a:rPr lang="de-DE" b="1" dirty="0" err="1"/>
-              <a:t>pipeline</a:t>
-            </a:r>
-            <a:r>
-              <a:rPr lang="de-DE" b="1" dirty="0"/>
-              <a:t> </a:t>
-            </a:r>
-            <a:r>
-              <a:rPr lang="de-DE" b="1" dirty="0" err="1"/>
-              <a:t>to</a:t>
-            </a:r>
-            <a:r>
-              <a:rPr lang="de-DE" b="1" dirty="0"/>
-              <a:t> </a:t>
-            </a:r>
-            <a:r>
-              <a:rPr lang="de-DE" b="1" dirty="0" err="1"/>
-              <a:t>your</a:t>
-            </a:r>
-            <a:r>
-              <a:rPr lang="de-DE" b="1" dirty="0"/>
-              <a:t> </a:t>
-            </a:r>
-            <a:r>
-              <a:rPr lang="de-DE" b="1" dirty="0" err="1"/>
-              <a:t>logistic</a:t>
-            </a:r>
-            <a:r>
-              <a:rPr lang="de-DE" b="1" dirty="0"/>
-              <a:t> </a:t>
-            </a:r>
-            <a:r>
-              <a:rPr lang="de-DE" b="1" dirty="0" err="1"/>
-              <a:t>function</a:t>
-            </a:r>
-            <a:r>
-              <a:rPr lang="de-DE" b="1" dirty="0"/>
-              <a:t> </a:t>
-            </a:r>
-            <a:r>
-              <a:rPr lang="de-DE" b="1" dirty="0" err="1"/>
-              <a:t>project</a:t>
-            </a:r>
-            <a:r>
-              <a:rPr lang="de-DE" b="1" dirty="0"/>
-              <a:t>!</a:t>
+              <a:rPr lang="en-US" b="1" dirty="0"/>
+              <a:t>Add a CI pipeline to your logistic function project!</a:t>
             </a:r>
           </a:p>
           <a:p>
@@ -5808,105 +5657,30 @@
               <a:buAutoNum type="arabicPeriod"/>
             </a:pPr>
             <a:r>
-              <a:rPr lang="de-DE" dirty="0"/>
-              <a:t>In </a:t>
-            </a:r>
-            <a:r>
-              <a:rPr lang="de-DE" dirty="0" err="1"/>
-              <a:t>your</a:t>
-            </a:r>
-            <a:r>
-              <a:rPr lang="de-DE" dirty="0"/>
-              <a:t> </a:t>
-            </a:r>
-            <a:r>
-              <a:rPr lang="de-DE" dirty="0" err="1"/>
-              <a:t>local</a:t>
-            </a:r>
-            <a:r>
-              <a:rPr lang="de-DE" dirty="0"/>
-              <a:t> </a:t>
-            </a:r>
-            <a:r>
-              <a:rPr lang="de-DE" dirty="0" err="1"/>
-              <a:t>version</a:t>
-            </a:r>
-            <a:r>
-              <a:rPr lang="de-DE" dirty="0"/>
-              <a:t> </a:t>
-            </a:r>
-            <a:r>
-              <a:rPr lang="de-DE" dirty="0" err="1"/>
-              <a:t>of</a:t>
-            </a:r>
-            <a:r>
-              <a:rPr lang="de-DE" dirty="0"/>
-              <a:t> </a:t>
-            </a:r>
-            <a:r>
-              <a:rPr lang="de-DE" dirty="0" err="1"/>
-              <a:t>the</a:t>
-            </a:r>
-            <a:r>
-              <a:rPr lang="de-DE" dirty="0"/>
-              <a:t> </a:t>
-            </a:r>
-            <a:r>
-              <a:rPr lang="de-DE" dirty="0" err="1"/>
-              <a:t>project</a:t>
-            </a:r>
-            <a:r>
-              <a:rPr lang="de-DE" dirty="0"/>
-              <a:t> </a:t>
-            </a:r>
-            <a:r>
-              <a:rPr lang="de-DE" dirty="0" err="1"/>
-              <a:t>make</a:t>
-            </a:r>
-            <a:r>
-              <a:rPr lang="de-DE" dirty="0"/>
-              <a:t> a </a:t>
-            </a:r>
-            <a:r>
-              <a:rPr lang="de-DE" dirty="0" err="1"/>
-              <a:t>folder</a:t>
-            </a:r>
-            <a:r>
-              <a:rPr lang="de-DE" dirty="0"/>
-              <a:t> </a:t>
-            </a:r>
-            <a:r>
-              <a:rPr lang="de-DE" dirty="0">
-                <a:latin typeface="Courier New" panose="02070309020205020404" pitchFamily="49" charset="0"/>
-                <a:cs typeface="Courier New" panose="02070309020205020404" pitchFamily="49" charset="0"/>
+              <a:rPr lang="en-US" dirty="0"/>
+              <a:t>In your local version of the project make a folder </a:t>
+            </a:r>
+            <a:r>
+              <a:rPr lang="en-US" dirty="0">
+                <a:latin typeface="Consolas" panose="020B0609020204030204" pitchFamily="49" charset="0"/>
+                <a:cs typeface="Consolas" panose="020B0609020204030204" pitchFamily="49" charset="0"/>
               </a:rPr>
               <a:t>.</a:t>
             </a:r>
             <a:r>
-              <a:rPr lang="de-DE" dirty="0" err="1">
-                <a:latin typeface="Courier New" panose="02070309020205020404" pitchFamily="49" charset="0"/>
-                <a:cs typeface="Courier New" panose="02070309020205020404" pitchFamily="49" charset="0"/>
+              <a:rPr lang="en-US" dirty="0" err="1">
+                <a:latin typeface="Consolas" panose="020B0609020204030204" pitchFamily="49" charset="0"/>
+                <a:cs typeface="Consolas" panose="020B0609020204030204" pitchFamily="49" charset="0"/>
               </a:rPr>
               <a:t>github</a:t>
             </a:r>
             <a:r>
-              <a:rPr lang="de-DE" dirty="0">
-                <a:latin typeface="Courier New" panose="02070309020205020404" pitchFamily="49" charset="0"/>
-                <a:cs typeface="Courier New" panose="02070309020205020404" pitchFamily="49" charset="0"/>
+              <a:rPr lang="en-US" dirty="0">
+                <a:latin typeface="Consolas" panose="020B0609020204030204" pitchFamily="49" charset="0"/>
+                <a:cs typeface="Consolas" panose="020B0609020204030204" pitchFamily="49" charset="0"/>
               </a:rPr>
-              <a:t>/</a:t>
-            </a:r>
-            <a:r>
-              <a:rPr lang="de-DE" dirty="0" err="1">
-                <a:latin typeface="Courier New" panose="02070309020205020404" pitchFamily="49" charset="0"/>
-                <a:cs typeface="Courier New" panose="02070309020205020404" pitchFamily="49" charset="0"/>
-              </a:rPr>
-              <a:t>workflows</a:t>
-            </a:r>
-            <a:endParaRPr lang="de-DE" dirty="0">
-              <a:latin typeface="Courier New" panose="02070309020205020404" pitchFamily="49" charset="0"/>
-              <a:cs typeface="Courier New" panose="02070309020205020404" pitchFamily="49" charset="0"/>
-            </a:endParaRPr>
+              <a:t>/workflows</a:t>
+            </a:r>
           </a:p>
           <a:p>
             <a:pPr marL="731520" lvl="1" indent="-457200">
@@ -5914,35 +5688,19 @@
               <a:buAutoNum type="arabicPeriod"/>
             </a:pPr>
             <a:r>
-              <a:rPr lang="de-DE" dirty="0"/>
-              <a:t>Create a </a:t>
-            </a:r>
-            <a:r>
-              <a:rPr lang="de-DE" dirty="0" err="1"/>
-              <a:t>file</a:t>
-            </a:r>
-            <a:r>
-              <a:rPr lang="de-DE" dirty="0"/>
-              <a:t> </a:t>
-            </a:r>
-            <a:r>
-              <a:rPr lang="de-DE" dirty="0" err="1"/>
-              <a:t>called</a:t>
-            </a:r>
-            <a:r>
-              <a:rPr lang="de-DE" dirty="0"/>
-              <a:t> </a:t>
-            </a:r>
-            <a:r>
-              <a:rPr lang="de-DE" dirty="0" err="1">
-                <a:latin typeface="Courier New" panose="02070309020205020404" pitchFamily="49" charset="0"/>
-                <a:cs typeface="Courier New" panose="02070309020205020404" pitchFamily="49" charset="0"/>
+              <a:rPr lang="en-US" dirty="0"/>
+              <a:t>Create a file called </a:t>
+            </a:r>
+            <a:r>
+              <a:rPr lang="en-US" dirty="0" err="1">
+                <a:latin typeface="Consolas" panose="020B0609020204030204" pitchFamily="49" charset="0"/>
+                <a:cs typeface="Consolas" panose="020B0609020204030204" pitchFamily="49" charset="0"/>
               </a:rPr>
-              <a:t>my_configuration.yml</a:t>
-            </a:r>
-            <a:endParaRPr lang="de-DE" dirty="0">
-              <a:latin typeface="Courier New" panose="02070309020205020404" pitchFamily="49" charset="0"/>
-              <a:cs typeface="Courier New" panose="02070309020205020404" pitchFamily="49" charset="0"/>
+              <a:t>run_test_on_push.yml</a:t>
+            </a:r>
+            <a:endParaRPr lang="en-US" dirty="0">
+              <a:latin typeface="Consolas" panose="020B0609020204030204" pitchFamily="49" charset="0"/>
+              <a:cs typeface="Consolas" panose="020B0609020204030204" pitchFamily="49" charset="0"/>
             </a:endParaRPr>
           </a:p>
           <a:p>
@@ -5951,166 +5709,15 @@
               <a:buAutoNum type="arabicPeriod"/>
             </a:pPr>
             <a:r>
-              <a:rPr lang="de-DE" dirty="0">
+              <a:rPr lang="en-US" dirty="0">
                 <a:cs typeface="Courier New" panose="02070309020205020404" pitchFamily="49" charset="0"/>
               </a:rPr>
-              <a:t>Write </a:t>
-            </a:r>
-            <a:r>
-              <a:rPr lang="de-DE" dirty="0" err="1">
-                <a:cs typeface="Courier New" panose="02070309020205020404" pitchFamily="49" charset="0"/>
-              </a:rPr>
-              <a:t>your</a:t>
-            </a:r>
-            <a:r>
-              <a:rPr lang="de-DE" dirty="0">
-                <a:cs typeface="Courier New" panose="02070309020205020404" pitchFamily="49" charset="0"/>
-              </a:rPr>
-              <a:t> </a:t>
-            </a:r>
-            <a:r>
-              <a:rPr lang="de-DE" dirty="0" err="1">
-                <a:cs typeface="Courier New" panose="02070309020205020404" pitchFamily="49" charset="0"/>
-              </a:rPr>
-              <a:t>configuration</a:t>
-            </a:r>
-            <a:r>
-              <a:rPr lang="de-DE" dirty="0">
-                <a:cs typeface="Courier New" panose="02070309020205020404" pitchFamily="49" charset="0"/>
-              </a:rPr>
-              <a:t> </a:t>
-            </a:r>
-            <a:r>
-              <a:rPr lang="de-DE" dirty="0" err="1">
-                <a:cs typeface="Courier New" panose="02070309020205020404" pitchFamily="49" charset="0"/>
-              </a:rPr>
-              <a:t>file</a:t>
-            </a:r>
-            <a:r>
-              <a:rPr lang="de-DE" dirty="0">
-                <a:cs typeface="Courier New" panose="02070309020205020404" pitchFamily="49" charset="0"/>
-              </a:rPr>
-              <a:t> </a:t>
-            </a:r>
-            <a:r>
-              <a:rPr lang="de-DE" dirty="0" err="1">
-                <a:cs typeface="Courier New" panose="02070309020205020404" pitchFamily="49" charset="0"/>
-              </a:rPr>
-              <a:t>to</a:t>
-            </a:r>
-            <a:r>
-              <a:rPr lang="de-DE" dirty="0">
-                <a:cs typeface="Courier New" panose="02070309020205020404" pitchFamily="49" charset="0"/>
-              </a:rPr>
-              <a:t> </a:t>
-            </a:r>
-            <a:r>
-              <a:rPr lang="de-DE" dirty="0" err="1">
-                <a:cs typeface="Courier New" panose="02070309020205020404" pitchFamily="49" charset="0"/>
-              </a:rPr>
-              <a:t>r</a:t>
-            </a:r>
-            <a:r>
-              <a:rPr lang="de-DE" dirty="0" err="1"/>
-              <a:t>un</a:t>
-            </a:r>
-            <a:r>
-              <a:rPr lang="de-DE" dirty="0"/>
-              <a:t> </a:t>
-            </a:r>
-            <a:r>
-              <a:rPr lang="de-DE" dirty="0" err="1"/>
-              <a:t>the</a:t>
-            </a:r>
-            <a:r>
-              <a:rPr lang="de-DE" dirty="0"/>
-              <a:t> </a:t>
-            </a:r>
-            <a:r>
-              <a:rPr lang="de-DE" dirty="0" err="1"/>
-              <a:t>tests</a:t>
-            </a:r>
-            <a:r>
-              <a:rPr lang="de-DE" dirty="0"/>
-              <a:t> </a:t>
-            </a:r>
-            <a:r>
-              <a:rPr lang="de-DE" dirty="0" err="1"/>
-              <a:t>every</a:t>
-            </a:r>
-            <a:r>
-              <a:rPr lang="de-DE" dirty="0"/>
-              <a:t> time </a:t>
-            </a:r>
-            <a:r>
-              <a:rPr lang="de-DE" dirty="0" err="1"/>
-              <a:t>someone</a:t>
-            </a:r>
-            <a:r>
-              <a:rPr lang="de-DE" dirty="0"/>
-              <a:t> </a:t>
-            </a:r>
-            <a:r>
-              <a:rPr lang="de-DE" dirty="0" err="1"/>
-              <a:t>pushes</a:t>
-            </a:r>
-            <a:r>
-              <a:rPr lang="de-DE" dirty="0"/>
-              <a:t> </a:t>
-            </a:r>
-            <a:r>
-              <a:rPr lang="de-DE" dirty="0" err="1"/>
-              <a:t>some</a:t>
-            </a:r>
-            <a:r>
-              <a:rPr lang="de-DE" dirty="0"/>
-              <a:t> </a:t>
-            </a:r>
-            <a:r>
-              <a:rPr lang="de-DE" dirty="0" err="1"/>
-              <a:t>commits</a:t>
-            </a:r>
-            <a:r>
-              <a:rPr lang="de-DE" dirty="0"/>
-              <a:t> </a:t>
-            </a:r>
-            <a:r>
-              <a:rPr lang="de-DE" dirty="0" err="1"/>
-              <a:t>or</a:t>
-            </a:r>
-            <a:r>
-              <a:rPr lang="de-DE" dirty="0"/>
-              <a:t> </a:t>
-            </a:r>
-            <a:r>
-              <a:rPr lang="de-DE" dirty="0" err="1"/>
-              <a:t>every</a:t>
-            </a:r>
-            <a:r>
-              <a:rPr lang="de-DE" dirty="0"/>
-              <a:t> time </a:t>
-            </a:r>
-            <a:r>
-              <a:rPr lang="de-DE" dirty="0" err="1"/>
-              <a:t>someone</a:t>
-            </a:r>
-            <a:r>
-              <a:rPr lang="de-DE" dirty="0"/>
-              <a:t> </a:t>
-            </a:r>
-            <a:r>
-              <a:rPr lang="de-DE" dirty="0" err="1"/>
-              <a:t>creates</a:t>
-            </a:r>
-            <a:r>
-              <a:rPr lang="de-DE" dirty="0"/>
-              <a:t> a pull </a:t>
-            </a:r>
-            <a:r>
-              <a:rPr lang="de-DE" dirty="0" err="1"/>
-              <a:t>request</a:t>
-            </a:r>
-            <a:endParaRPr lang="de-DE" dirty="0"/>
+              <a:t>Write your configuration file to r</a:t>
+            </a:r>
+            <a:r>
+              <a:rPr lang="en-US" dirty="0"/>
+              <a:t>un the tests every time someone pushes some commits or every time someone creates a pull request</a:t>
+            </a:r>
           </a:p>
           <a:p>
             <a:pPr marL="731520" lvl="1" indent="-457200">
@@ -6118,46 +5725,9 @@
               <a:buAutoNum type="arabicPeriod"/>
             </a:pPr>
             <a:r>
-              <a:rPr lang="de-DE" dirty="0"/>
-              <a:t>Commit </a:t>
-            </a:r>
-            <a:r>
-              <a:rPr lang="de-DE" dirty="0" err="1"/>
-              <a:t>and</a:t>
-            </a:r>
-            <a:r>
-              <a:rPr lang="de-DE" dirty="0"/>
-              <a:t> push </a:t>
-            </a:r>
-            <a:r>
-              <a:rPr lang="de-DE" dirty="0" err="1"/>
-              <a:t>the</a:t>
-            </a:r>
-            <a:r>
-              <a:rPr lang="de-DE" dirty="0"/>
-              <a:t> </a:t>
-            </a:r>
-            <a:r>
-              <a:rPr lang="de-DE" dirty="0" err="1"/>
-              <a:t>changes</a:t>
-            </a:r>
-            <a:r>
-              <a:rPr lang="de-DE" dirty="0"/>
-              <a:t> </a:t>
-            </a:r>
-            <a:r>
-              <a:rPr lang="de-DE" dirty="0" err="1"/>
-              <a:t>to</a:t>
-            </a:r>
-            <a:r>
-              <a:rPr lang="de-DE" dirty="0"/>
-              <a:t> </a:t>
-            </a:r>
-            <a:r>
-              <a:rPr lang="de-DE" dirty="0" err="1"/>
-              <a:t>GitHub</a:t>
-            </a:r>
-            <a:endParaRPr lang="de-DE" dirty="0"/>
+              <a:rPr lang="en-US" dirty="0"/>
+              <a:t>Commit and push the changes to GitHub</a:t>
+            </a:r>
           </a:p>
           <a:p>
             <a:pPr marL="731520" lvl="1" indent="-457200">
@@ -6165,284 +5735,31 @@
               <a:buAutoNum type="arabicPeriod"/>
             </a:pPr>
             <a:r>
-              <a:rPr lang="de-DE" dirty="0"/>
-              <a:t>Check </a:t>
-            </a:r>
-            <a:r>
-              <a:rPr lang="de-DE" dirty="0" err="1"/>
-              <a:t>the</a:t>
-            </a:r>
-            <a:r>
-              <a:rPr lang="de-DE" dirty="0"/>
-              <a:t> </a:t>
-            </a:r>
-            <a:r>
-              <a:rPr lang="de-DE" dirty="0" err="1"/>
-              <a:t>actions</a:t>
-            </a:r>
-            <a:r>
-              <a:rPr lang="de-DE" dirty="0"/>
-              <a:t> </a:t>
-            </a:r>
-            <a:r>
-              <a:rPr lang="de-DE" dirty="0" err="1"/>
-              <a:t>tab</a:t>
-            </a:r>
-            <a:r>
-              <a:rPr lang="de-DE" dirty="0"/>
-              <a:t> </a:t>
-            </a:r>
-            <a:r>
-              <a:rPr lang="de-DE" dirty="0" err="1"/>
-              <a:t>of</a:t>
-            </a:r>
-            <a:r>
-              <a:rPr lang="de-DE" dirty="0"/>
-              <a:t> </a:t>
-            </a:r>
-            <a:r>
-              <a:rPr lang="de-DE" dirty="0" err="1"/>
-              <a:t>your</a:t>
-            </a:r>
-            <a:r>
-              <a:rPr lang="de-DE" dirty="0"/>
-              <a:t> </a:t>
-            </a:r>
-            <a:r>
-              <a:rPr lang="de-DE" dirty="0" err="1"/>
-              <a:t>GitHub</a:t>
-            </a:r>
-            <a:r>
-              <a:rPr lang="de-DE" dirty="0"/>
-              <a:t> </a:t>
-            </a:r>
-            <a:r>
-              <a:rPr lang="de-DE" dirty="0" err="1"/>
-              <a:t>repo</a:t>
-            </a:r>
-            <a:r>
-              <a:rPr lang="de-DE" dirty="0"/>
-              <a:t> </a:t>
-            </a:r>
-            <a:r>
-              <a:rPr lang="de-DE" dirty="0" err="1"/>
-              <a:t>to</a:t>
-            </a:r>
-            <a:r>
-              <a:rPr lang="de-DE" dirty="0"/>
-              <a:t> </a:t>
-            </a:r>
-            <a:r>
-              <a:rPr lang="de-DE" dirty="0" err="1"/>
-              <a:t>see</a:t>
-            </a:r>
-            <a:r>
-              <a:rPr lang="de-DE" dirty="0"/>
-              <a:t> </a:t>
-            </a:r>
-            <a:r>
-              <a:rPr lang="de-DE" dirty="0" err="1"/>
-              <a:t>if</a:t>
-            </a:r>
-            <a:r>
-              <a:rPr lang="de-DE" dirty="0"/>
-              <a:t> </a:t>
-            </a:r>
-            <a:r>
-              <a:rPr lang="de-DE" dirty="0" err="1"/>
-              <a:t>it</a:t>
-            </a:r>
-            <a:r>
-              <a:rPr lang="de-DE" dirty="0"/>
-              <a:t> </a:t>
-            </a:r>
-            <a:r>
-              <a:rPr lang="de-DE" dirty="0" err="1"/>
-              <a:t>worked</a:t>
-            </a:r>
-            <a:endParaRPr lang="de-DE" dirty="0"/>
+              <a:rPr lang="en-US" dirty="0"/>
+              <a:t>Check the actions tab of your GitHub repo to see if it worked</a:t>
+            </a:r>
           </a:p>
           <a:p>
             <a:pPr marL="0" indent="0">
               <a:buNone/>
             </a:pPr>
-            <a:endParaRPr lang="en-CH" dirty="0"/>
+            <a:endParaRPr lang="en-US" dirty="0"/>
           </a:p>
           <a:p>
             <a:pPr lvl="1"/>
             <a:r>
-              <a:rPr lang="de-DE" dirty="0"/>
-              <a:t>Bonus: check </a:t>
-            </a:r>
-            <a:r>
-              <a:rPr lang="de-DE" dirty="0" err="1"/>
-              <a:t>the</a:t>
-            </a:r>
-            <a:r>
-              <a:rPr lang="de-DE" dirty="0"/>
-              <a:t> </a:t>
-            </a:r>
-            <a:r>
-              <a:rPr lang="de-DE" dirty="0" err="1"/>
-              <a:t>GitHub</a:t>
-            </a:r>
-            <a:r>
-              <a:rPr lang="de-DE" dirty="0"/>
-              <a:t> </a:t>
-            </a:r>
-            <a:r>
-              <a:rPr lang="de-DE" dirty="0" err="1"/>
-              <a:t>actions</a:t>
-            </a:r>
-            <a:r>
-              <a:rPr lang="de-DE" dirty="0"/>
-              <a:t> </a:t>
-            </a:r>
-            <a:r>
-              <a:rPr lang="de-DE" dirty="0" err="1"/>
-              <a:t>documentation</a:t>
-            </a:r>
-            <a:r>
-              <a:rPr lang="de-DE" dirty="0"/>
-              <a:t> </a:t>
-            </a:r>
-            <a:r>
-              <a:rPr lang="de-DE" dirty="0" err="1"/>
-              <a:t>and</a:t>
-            </a:r>
-            <a:r>
-              <a:rPr lang="de-DE" dirty="0"/>
-              <a:t> </a:t>
-            </a:r>
-            <a:r>
-              <a:rPr lang="de-DE" dirty="0" err="1"/>
-              <a:t>modify</a:t>
-            </a:r>
-            <a:r>
-              <a:rPr lang="de-DE" dirty="0"/>
-              <a:t> </a:t>
-            </a:r>
-            <a:r>
-              <a:rPr lang="de-DE" dirty="0" err="1"/>
-              <a:t>the</a:t>
-            </a:r>
-            <a:r>
-              <a:rPr lang="de-DE" dirty="0"/>
-              <a:t> </a:t>
-            </a:r>
-            <a:r>
-              <a:rPr lang="de-DE" dirty="0" err="1"/>
-              <a:t>configuration</a:t>
-            </a:r>
-            <a:r>
-              <a:rPr lang="de-DE" dirty="0"/>
-              <a:t> </a:t>
-            </a:r>
-            <a:r>
-              <a:rPr lang="de-DE" dirty="0" err="1"/>
-              <a:t>file</a:t>
-            </a:r>
-            <a:r>
-              <a:rPr lang="de-DE" dirty="0"/>
-              <a:t> so </a:t>
-            </a:r>
-            <a:r>
-              <a:rPr lang="de-DE" dirty="0" err="1"/>
-              <a:t>that</a:t>
-            </a:r>
-            <a:r>
-              <a:rPr lang="de-DE" dirty="0"/>
-              <a:t> </a:t>
-            </a:r>
-            <a:r>
-              <a:rPr lang="de-DE" dirty="0" err="1"/>
-              <a:t>the</a:t>
-            </a:r>
-            <a:r>
-              <a:rPr lang="de-DE" dirty="0"/>
-              <a:t> </a:t>
-            </a:r>
-            <a:r>
-              <a:rPr lang="de-DE" dirty="0" err="1"/>
-              <a:t>tasks</a:t>
-            </a:r>
-            <a:r>
-              <a:rPr lang="de-DE" dirty="0"/>
-              <a:t> </a:t>
-            </a:r>
-            <a:r>
-              <a:rPr lang="de-DE" dirty="0" err="1"/>
-              <a:t>run</a:t>
-            </a:r>
-            <a:r>
-              <a:rPr lang="de-DE" dirty="0"/>
-              <a:t> </a:t>
-            </a:r>
-            <a:r>
-              <a:rPr lang="de-DE" dirty="0" err="1"/>
-              <a:t>only</a:t>
-            </a:r>
-            <a:r>
-              <a:rPr lang="de-DE" dirty="0"/>
-              <a:t> </a:t>
-            </a:r>
-            <a:r>
-              <a:rPr lang="de-DE" dirty="0" err="1"/>
-              <a:t>for</a:t>
-            </a:r>
-            <a:r>
-              <a:rPr lang="de-DE" dirty="0"/>
-              <a:t> </a:t>
-            </a:r>
-            <a:r>
-              <a:rPr lang="de-DE" dirty="0" err="1"/>
-              <a:t>pushes</a:t>
-            </a:r>
-            <a:r>
-              <a:rPr lang="de-DE" dirty="0"/>
-              <a:t> </a:t>
-            </a:r>
-            <a:r>
-              <a:rPr lang="de-DE" dirty="0" err="1"/>
-              <a:t>and</a:t>
-            </a:r>
-            <a:r>
-              <a:rPr lang="de-DE" dirty="0"/>
-              <a:t> PRs </a:t>
-            </a:r>
-            <a:r>
-              <a:rPr lang="de-DE" dirty="0" err="1"/>
-              <a:t>against</a:t>
-            </a:r>
-            <a:r>
-              <a:rPr lang="de-DE" dirty="0"/>
-              <a:t> </a:t>
-            </a:r>
-            <a:r>
-              <a:rPr lang="de-DE" dirty="0" err="1"/>
-              <a:t>the</a:t>
-            </a:r>
-            <a:r>
-              <a:rPr lang="de-DE" dirty="0"/>
-              <a:t> </a:t>
-            </a:r>
-            <a:r>
-              <a:rPr lang="de-DE" dirty="0" err="1"/>
-              <a:t>branch</a:t>
-            </a:r>
-            <a:r>
-              <a:rPr lang="de-DE" dirty="0"/>
-              <a:t> </a:t>
-            </a:r>
-            <a:r>
-              <a:rPr lang="de-DE" dirty="0" err="1">
-                <a:latin typeface="Courier New" panose="02070309020205020404" pitchFamily="49" charset="0"/>
-                <a:cs typeface="Courier New" panose="02070309020205020404" pitchFamily="49" charset="0"/>
+              <a:rPr lang="en-US" dirty="0"/>
+              <a:t>Bonus: check the GitHub actions documentation and modify the configuration file so that the tasks run only for pushes and PRs against the branch </a:t>
+            </a:r>
+            <a:r>
+              <a:rPr lang="en-US" dirty="0">
+                <a:latin typeface="Consolas" panose="020B0609020204030204" pitchFamily="49" charset="0"/>
+                <a:cs typeface="Consolas" panose="020B0609020204030204" pitchFamily="49" charset="0"/>
               </a:rPr>
               <a:t>main</a:t>
             </a:r>
             <a:r>
-              <a:rPr lang="de-DE" dirty="0"/>
+              <a:rPr lang="en-US" dirty="0"/>
               <a:t> </a:t>
             </a:r>
           </a:p>
@@ -6450,10 +5767,10 @@
             <a:pPr marL="0" indent="0">
               <a:buNone/>
             </a:pPr>
-            <a:endParaRPr lang="en-CH" dirty="0"/>
-          </a:p>
-          <a:p>
-            <a:endParaRPr lang="en-CH" dirty="0"/>
+            <a:endParaRPr lang="en-US" dirty="0"/>
+          </a:p>
+          <a:p>
+            <a:endParaRPr lang="en-US" dirty="0"/>
           </a:p>
         </p:txBody>
       </p:sp>
@@ -6935,7 +6252,7 @@
         <p:spPr>
           <a:xfrm>
             <a:off x="2351947" y="1164135"/>
-            <a:ext cx="5205271" cy="4893647"/>
+            <a:ext cx="4772460" cy="4893647"/>
           </a:xfrm>
           <a:prstGeom prst="rect">
             <a:avLst/>
@@ -6951,401 +6268,228 @@
           <a:lstStyle/>
           <a:p>
             <a:r>
-              <a:rPr lang="en-US" sz="1200" dirty="0">
-                <a:latin typeface="Courier New" panose="02070309020205020404" pitchFamily="49" charset="0"/>
-                <a:cs typeface="Courier New" panose="02070309020205020404" pitchFamily="49" charset="0"/>
+              <a:rPr lang="en-US" sz="1200" noProof="1">
+                <a:latin typeface="Consolas" panose="020B0609020204030204" pitchFamily="49" charset="0"/>
+                <a:cs typeface="Consolas" panose="020B0609020204030204" pitchFamily="49" charset="0"/>
               </a:rPr>
               <a:t>Name: Run all the tests for PRs, with OS/Python matrix</a:t>
             </a:r>
           </a:p>
           <a:p>
-            <a:endParaRPr lang="en-US" sz="1200" dirty="0">
-              <a:latin typeface="Courier New" panose="02070309020205020404" pitchFamily="49" charset="0"/>
-              <a:cs typeface="Courier New" panose="02070309020205020404" pitchFamily="49" charset="0"/>
+            <a:endParaRPr lang="en-US" sz="1200" noProof="1">
+              <a:latin typeface="Consolas" panose="020B0609020204030204" pitchFamily="49" charset="0"/>
+              <a:cs typeface="Consolas" panose="020B0609020204030204" pitchFamily="49" charset="0"/>
             </a:endParaRPr>
           </a:p>
           <a:p>
             <a:r>
-              <a:rPr lang="en-US" sz="1200" dirty="0">
-                <a:latin typeface="Courier New" panose="02070309020205020404" pitchFamily="49" charset="0"/>
-                <a:cs typeface="Courier New" panose="02070309020205020404" pitchFamily="49" charset="0"/>
+              <a:rPr lang="en-US" sz="1200" noProof="1">
+                <a:latin typeface="Consolas" panose="020B0609020204030204" pitchFamily="49" charset="0"/>
+                <a:cs typeface="Consolas" panose="020B0609020204030204" pitchFamily="49" charset="0"/>
               </a:rPr>
               <a:t>on:</a:t>
             </a:r>
           </a:p>
           <a:p>
             <a:r>
-              <a:rPr lang="en-US" sz="1200" dirty="0">
-                <a:latin typeface="Courier New" panose="02070309020205020404" pitchFamily="49" charset="0"/>
-                <a:cs typeface="Courier New" panose="02070309020205020404" pitchFamily="49" charset="0"/>
+              <a:rPr lang="en-US" sz="1200" noProof="1">
+                <a:latin typeface="Consolas" panose="020B0609020204030204" pitchFamily="49" charset="0"/>
+                <a:cs typeface="Consolas" panose="020B0609020204030204" pitchFamily="49" charset="0"/>
               </a:rPr>
-              <a:t>  [push, </a:t>
-            </a:r>
-            <a:r>
-              <a:rPr lang="en-US" sz="1200" dirty="0" err="1">
-                <a:latin typeface="Courier New" panose="02070309020205020404" pitchFamily="49" charset="0"/>
-                <a:cs typeface="Courier New" panose="02070309020205020404" pitchFamily="49" charset="0"/>
-              </a:rPr>
-              <a:t>pull_request</a:t>
-            </a:r>
-            <a:r>
-              <a:rPr lang="en-US" sz="1200" dirty="0">
-                <a:latin typeface="Courier New" panose="02070309020205020404" pitchFamily="49" charset="0"/>
-                <a:cs typeface="Courier New" panose="02070309020205020404" pitchFamily="49" charset="0"/>
-              </a:rPr>
-              <a:t>]</a:t>
-            </a:r>
-          </a:p>
-          <a:p>
-            <a:endParaRPr lang="en-US" sz="1200" dirty="0">
-              <a:latin typeface="Courier New" panose="02070309020205020404" pitchFamily="49" charset="0"/>
-              <a:cs typeface="Courier New" panose="02070309020205020404" pitchFamily="49" charset="0"/>
+              <a:t>  [push, pull_request]</a:t>
+            </a:r>
+          </a:p>
+          <a:p>
+            <a:endParaRPr lang="en-US" sz="1200" noProof="1">
+              <a:latin typeface="Consolas" panose="020B0609020204030204" pitchFamily="49" charset="0"/>
+              <a:cs typeface="Consolas" panose="020B0609020204030204" pitchFamily="49" charset="0"/>
             </a:endParaRPr>
           </a:p>
           <a:p>
             <a:r>
-              <a:rPr lang="en-US" sz="1200" dirty="0">
-                <a:latin typeface="Courier New" panose="02070309020205020404" pitchFamily="49" charset="0"/>
-                <a:cs typeface="Courier New" panose="02070309020205020404" pitchFamily="49" charset="0"/>
+              <a:rPr lang="en-US" sz="1200" noProof="1">
+                <a:latin typeface="Consolas" panose="020B0609020204030204" pitchFamily="49" charset="0"/>
+                <a:cs typeface="Consolas" panose="020B0609020204030204" pitchFamily="49" charset="0"/>
               </a:rPr>
               <a:t>jobs:</a:t>
             </a:r>
           </a:p>
           <a:p>
             <a:r>
-              <a:rPr lang="en-US" sz="1200" dirty="0">
-                <a:latin typeface="Courier New" panose="02070309020205020404" pitchFamily="49" charset="0"/>
-                <a:cs typeface="Courier New" panose="02070309020205020404" pitchFamily="49" charset="0"/>
+              <a:rPr lang="en-US" sz="1200" noProof="1">
+                <a:latin typeface="Consolas" panose="020B0609020204030204" pitchFamily="49" charset="0"/>
+                <a:cs typeface="Consolas" panose="020B0609020204030204" pitchFamily="49" charset="0"/>
               </a:rPr>
               <a:t>  run-tests:</a:t>
             </a:r>
           </a:p>
           <a:p>
             <a:r>
-              <a:rPr lang="en-US" sz="1200" dirty="0">
-                <a:latin typeface="Courier New" panose="02070309020205020404" pitchFamily="49" charset="0"/>
-                <a:cs typeface="Courier New" panose="02070309020205020404" pitchFamily="49" charset="0"/>
+              <a:rPr lang="en-US" sz="1200" noProof="1">
+                <a:latin typeface="Consolas" panose="020B0609020204030204" pitchFamily="49" charset="0"/>
+                <a:cs typeface="Consolas" panose="020B0609020204030204" pitchFamily="49" charset="0"/>
               </a:rPr>
-              <a:t>    runs-on: ${{ </a:t>
-            </a:r>
-            <a:r>
-              <a:rPr lang="en-US" sz="1200" dirty="0" err="1">
-                <a:latin typeface="Courier New" panose="02070309020205020404" pitchFamily="49" charset="0"/>
-                <a:cs typeface="Courier New" panose="02070309020205020404" pitchFamily="49" charset="0"/>
-              </a:rPr>
-              <a:t>matrix.os</a:t>
-            </a:r>
-            <a:r>
-              <a:rPr lang="en-US" sz="1200" dirty="0">
-                <a:latin typeface="Courier New" panose="02070309020205020404" pitchFamily="49" charset="0"/>
-                <a:cs typeface="Courier New" panose="02070309020205020404" pitchFamily="49" charset="0"/>
-              </a:rPr>
-              <a:t> }}</a:t>
-            </a:r>
-          </a:p>
-          <a:p>
-            <a:r>
-              <a:rPr lang="en-US" sz="1200" dirty="0">
-                <a:latin typeface="Courier New" panose="02070309020205020404" pitchFamily="49" charset="0"/>
-                <a:cs typeface="Courier New" panose="02070309020205020404" pitchFamily="49" charset="0"/>
+              <a:t>    runs-on: ${{ matrix.os }}</a:t>
+            </a:r>
+          </a:p>
+          <a:p>
+            <a:r>
+              <a:rPr lang="en-US" sz="1200" noProof="1">
+                <a:latin typeface="Consolas" panose="020B0609020204030204" pitchFamily="49" charset="0"/>
+                <a:cs typeface="Consolas" panose="020B0609020204030204" pitchFamily="49" charset="0"/>
               </a:rPr>
               <a:t>    </a:t>
             </a:r>
           </a:p>
           <a:p>
             <a:r>
-              <a:rPr lang="en-US" sz="1200" dirty="0">
-                <a:latin typeface="Courier New" panose="02070309020205020404" pitchFamily="49" charset="0"/>
-                <a:cs typeface="Courier New" panose="02070309020205020404" pitchFamily="49" charset="0"/>
+              <a:rPr lang="en-US" sz="1200" noProof="1">
+                <a:latin typeface="Consolas" panose="020B0609020204030204" pitchFamily="49" charset="0"/>
+                <a:cs typeface="Consolas" panose="020B0609020204030204" pitchFamily="49" charset="0"/>
               </a:rPr>
               <a:t>    strategy:</a:t>
             </a:r>
           </a:p>
           <a:p>
             <a:r>
-              <a:rPr lang="en-US" sz="1200" dirty="0">
-                <a:latin typeface="Courier New" panose="02070309020205020404" pitchFamily="49" charset="0"/>
-                <a:cs typeface="Courier New" panose="02070309020205020404" pitchFamily="49" charset="0"/>
+              <a:rPr lang="en-US" sz="1200" noProof="1">
+                <a:latin typeface="Consolas" panose="020B0609020204030204" pitchFamily="49" charset="0"/>
+                <a:cs typeface="Consolas" panose="020B0609020204030204" pitchFamily="49" charset="0"/>
               </a:rPr>
               <a:t>      matrix:</a:t>
             </a:r>
           </a:p>
           <a:p>
             <a:r>
-              <a:rPr lang="en-US" sz="1200" dirty="0">
-                <a:latin typeface="Courier New" panose="02070309020205020404" pitchFamily="49" charset="0"/>
-                <a:cs typeface="Courier New" panose="02070309020205020404" pitchFamily="49" charset="0"/>
+              <a:rPr lang="en-US" sz="1200" noProof="1">
+                <a:latin typeface="Consolas" panose="020B0609020204030204" pitchFamily="49" charset="0"/>
+                <a:cs typeface="Consolas" panose="020B0609020204030204" pitchFamily="49" charset="0"/>
               </a:rPr>
-              <a:t>        </a:t>
-            </a:r>
-            <a:r>
-              <a:rPr lang="en-US" sz="1200" dirty="0" err="1">
-                <a:latin typeface="Courier New" panose="02070309020205020404" pitchFamily="49" charset="0"/>
-                <a:cs typeface="Courier New" panose="02070309020205020404" pitchFamily="49" charset="0"/>
-              </a:rPr>
-              <a:t>os</a:t>
-            </a:r>
-            <a:r>
-              <a:rPr lang="en-US" sz="1200" dirty="0">
-                <a:latin typeface="Courier New" panose="02070309020205020404" pitchFamily="49" charset="0"/>
-                <a:cs typeface="Courier New" panose="02070309020205020404" pitchFamily="49" charset="0"/>
-              </a:rPr>
-              <a:t>: [ubuntu-latest, </a:t>
-            </a:r>
-            <a:r>
-              <a:rPr lang="en-US" sz="1200" dirty="0" err="1">
-                <a:latin typeface="Courier New" panose="02070309020205020404" pitchFamily="49" charset="0"/>
-                <a:cs typeface="Courier New" panose="02070309020205020404" pitchFamily="49" charset="0"/>
-              </a:rPr>
-              <a:t>macos</a:t>
-            </a:r>
-            <a:r>
-              <a:rPr lang="en-US" sz="1200" dirty="0">
-                <a:latin typeface="Courier New" panose="02070309020205020404" pitchFamily="49" charset="0"/>
-                <a:cs typeface="Courier New" panose="02070309020205020404" pitchFamily="49" charset="0"/>
-              </a:rPr>
-              <a:t>-latest]</a:t>
-            </a:r>
-          </a:p>
-          <a:p>
-            <a:r>
-              <a:rPr lang="en-US" sz="1200" dirty="0">
-                <a:latin typeface="Courier New" panose="02070309020205020404" pitchFamily="49" charset="0"/>
-                <a:cs typeface="Courier New" panose="02070309020205020404" pitchFamily="49" charset="0"/>
+              <a:t>        os: [ubuntu-latest, macos-latest]</a:t>
+            </a:r>
+          </a:p>
+          <a:p>
+            <a:r>
+              <a:rPr lang="en-US" sz="1200" noProof="1">
+                <a:latin typeface="Consolas" panose="020B0609020204030204" pitchFamily="49" charset="0"/>
+                <a:cs typeface="Consolas" panose="020B0609020204030204" pitchFamily="49" charset="0"/>
               </a:rPr>
               <a:t>        python-version: [3.8, 3.9]</a:t>
             </a:r>
           </a:p>
           <a:p>
-            <a:endParaRPr lang="en-US" sz="1200" dirty="0">
-              <a:latin typeface="Courier New" panose="02070309020205020404" pitchFamily="49" charset="0"/>
-              <a:cs typeface="Courier New" panose="02070309020205020404" pitchFamily="49" charset="0"/>
+            <a:endParaRPr lang="en-US" sz="1200" noProof="1">
+              <a:latin typeface="Consolas" panose="020B0609020204030204" pitchFamily="49" charset="0"/>
+              <a:cs typeface="Consolas" panose="020B0609020204030204" pitchFamily="49" charset="0"/>
             </a:endParaRPr>
           </a:p>
           <a:p>
             <a:r>
-              <a:rPr lang="en-US" sz="1200" dirty="0">
-                <a:latin typeface="Courier New" panose="02070309020205020404" pitchFamily="49" charset="0"/>
-                <a:cs typeface="Courier New" panose="02070309020205020404" pitchFamily="49" charset="0"/>
+              <a:rPr lang="en-US" sz="1200" noProof="1">
+                <a:latin typeface="Consolas" panose="020B0609020204030204" pitchFamily="49" charset="0"/>
+                <a:cs typeface="Consolas" panose="020B0609020204030204" pitchFamily="49" charset="0"/>
               </a:rPr>
               <a:t>    steps:</a:t>
             </a:r>
           </a:p>
           <a:p>
             <a:r>
-              <a:rPr lang="en-US" sz="1200" dirty="0">
-                <a:latin typeface="Courier New" panose="02070309020205020404" pitchFamily="49" charset="0"/>
-                <a:cs typeface="Courier New" panose="02070309020205020404" pitchFamily="49" charset="0"/>
+              <a:rPr lang="en-US" sz="1200" noProof="1">
+                <a:latin typeface="Consolas" panose="020B0609020204030204" pitchFamily="49" charset="0"/>
+                <a:cs typeface="Consolas" panose="020B0609020204030204" pitchFamily="49" charset="0"/>
               </a:rPr>
               <a:t>    - uses: actions/checkout@v2</a:t>
             </a:r>
           </a:p>
           <a:p>
             <a:r>
-              <a:rPr lang="en-US" sz="1200" dirty="0">
-                <a:latin typeface="Courier New" panose="02070309020205020404" pitchFamily="49" charset="0"/>
-                <a:cs typeface="Courier New" panose="02070309020205020404" pitchFamily="49" charset="0"/>
+              <a:rPr lang="en-US" sz="1200" noProof="1">
+                <a:latin typeface="Consolas" panose="020B0609020204030204" pitchFamily="49" charset="0"/>
+                <a:cs typeface="Consolas" panose="020B0609020204030204" pitchFamily="49" charset="0"/>
               </a:rPr>
-              <a:t>    - name: Set up Python ${{ </a:t>
-            </a:r>
-            <a:r>
-              <a:rPr lang="en-US" sz="1200" dirty="0" err="1">
-                <a:latin typeface="Courier New" panose="02070309020205020404" pitchFamily="49" charset="0"/>
-                <a:cs typeface="Courier New" panose="02070309020205020404" pitchFamily="49" charset="0"/>
-              </a:rPr>
-              <a:t>matrix.python</a:t>
-            </a:r>
-            <a:r>
-              <a:rPr lang="en-US" sz="1200" dirty="0">
-                <a:latin typeface="Courier New" panose="02070309020205020404" pitchFamily="49" charset="0"/>
-                <a:cs typeface="Courier New" panose="02070309020205020404" pitchFamily="49" charset="0"/>
-              </a:rPr>
-              <a:t>-version }}</a:t>
-            </a:r>
-          </a:p>
-          <a:p>
-            <a:r>
-              <a:rPr lang="en-US" sz="1200" dirty="0">
-                <a:latin typeface="Courier New" panose="02070309020205020404" pitchFamily="49" charset="0"/>
-                <a:cs typeface="Courier New" panose="02070309020205020404" pitchFamily="49" charset="0"/>
+              <a:t>    - name: Set up Python ${{ matrix.python-version }}</a:t>
+            </a:r>
+          </a:p>
+          <a:p>
+            <a:r>
+              <a:rPr lang="en-US" sz="1200" noProof="1">
+                <a:latin typeface="Consolas" panose="020B0609020204030204" pitchFamily="49" charset="0"/>
+                <a:cs typeface="Consolas" panose="020B0609020204030204" pitchFamily="49" charset="0"/>
               </a:rPr>
               <a:t>      uses: actions/setup-python@v2</a:t>
             </a:r>
           </a:p>
           <a:p>
             <a:r>
-              <a:rPr lang="en-US" sz="1200" dirty="0">
-                <a:latin typeface="Courier New" panose="02070309020205020404" pitchFamily="49" charset="0"/>
-                <a:cs typeface="Courier New" panose="02070309020205020404" pitchFamily="49" charset="0"/>
+              <a:rPr lang="en-US" sz="1200" noProof="1">
+                <a:latin typeface="Consolas" panose="020B0609020204030204" pitchFamily="49" charset="0"/>
+                <a:cs typeface="Consolas" panose="020B0609020204030204" pitchFamily="49" charset="0"/>
               </a:rPr>
               <a:t>      with:</a:t>
             </a:r>
           </a:p>
           <a:p>
             <a:r>
-              <a:rPr lang="en-US" sz="1200" dirty="0">
-                <a:latin typeface="Courier New" panose="02070309020205020404" pitchFamily="49" charset="0"/>
-                <a:cs typeface="Courier New" panose="02070309020205020404" pitchFamily="49" charset="0"/>
+              <a:rPr lang="en-US" sz="1200" noProof="1">
+                <a:latin typeface="Consolas" panose="020B0609020204030204" pitchFamily="49" charset="0"/>
+                <a:cs typeface="Consolas" panose="020B0609020204030204" pitchFamily="49" charset="0"/>
               </a:rPr>
-              <a:t>        python-version: ${{ </a:t>
-            </a:r>
-            <a:r>
-              <a:rPr lang="en-US" sz="1200" dirty="0" err="1">
-                <a:latin typeface="Courier New" panose="02070309020205020404" pitchFamily="49" charset="0"/>
-                <a:cs typeface="Courier New" panose="02070309020205020404" pitchFamily="49" charset="0"/>
-              </a:rPr>
-              <a:t>matrix.python</a:t>
-            </a:r>
-            <a:r>
-              <a:rPr lang="en-US" sz="1200" dirty="0">
-                <a:latin typeface="Courier New" panose="02070309020205020404" pitchFamily="49" charset="0"/>
-                <a:cs typeface="Courier New" panose="02070309020205020404" pitchFamily="49" charset="0"/>
-              </a:rPr>
-              <a:t>-version }}</a:t>
-            </a:r>
-          </a:p>
-          <a:p>
-            <a:r>
-              <a:rPr lang="en-US" sz="1200" dirty="0">
-                <a:latin typeface="Courier New" panose="02070309020205020404" pitchFamily="49" charset="0"/>
-                <a:cs typeface="Courier New" panose="02070309020205020404" pitchFamily="49" charset="0"/>
+              <a:t>        python-version: ${{ matrix.python-version }}</a:t>
+            </a:r>
+          </a:p>
+          <a:p>
+            <a:r>
+              <a:rPr lang="en-US" sz="1200" noProof="1">
+                <a:latin typeface="Consolas" panose="020B0609020204030204" pitchFamily="49" charset="0"/>
+                <a:cs typeface="Consolas" panose="020B0609020204030204" pitchFamily="49" charset="0"/>
               </a:rPr>
               <a:t>    - name: Install dependencies</a:t>
             </a:r>
           </a:p>
           <a:p>
             <a:r>
-              <a:rPr lang="en-US" sz="1200" dirty="0">
-                <a:latin typeface="Courier New" panose="02070309020205020404" pitchFamily="49" charset="0"/>
-                <a:cs typeface="Courier New" panose="02070309020205020404" pitchFamily="49" charset="0"/>
+              <a:rPr lang="en-US" sz="1200" noProof="1">
+                <a:latin typeface="Consolas" panose="020B0609020204030204" pitchFamily="49" charset="0"/>
+                <a:cs typeface="Consolas" panose="020B0609020204030204" pitchFamily="49" charset="0"/>
               </a:rPr>
               <a:t>      run:</a:t>
             </a:r>
           </a:p>
           <a:p>
             <a:r>
-              <a:rPr lang="en-US" sz="1200" dirty="0">
-                <a:latin typeface="Courier New" panose="02070309020205020404" pitchFamily="49" charset="0"/>
-                <a:cs typeface="Courier New" panose="02070309020205020404" pitchFamily="49" charset="0"/>
+              <a:rPr lang="en-US" sz="1200" noProof="1">
+                <a:latin typeface="Consolas" panose="020B0609020204030204" pitchFamily="49" charset="0"/>
+                <a:cs typeface="Consolas" panose="020B0609020204030204" pitchFamily="49" charset="0"/>
               </a:rPr>
-              <a:t>        python -m pip install </a:t>
-            </a:r>
-            <a:r>
-              <a:rPr lang="en-US" sz="1200" dirty="0" err="1">
-                <a:latin typeface="Courier New" panose="02070309020205020404" pitchFamily="49" charset="0"/>
-                <a:cs typeface="Courier New" panose="02070309020205020404" pitchFamily="49" charset="0"/>
+              <a:t>        python -m pip install pytest numpy</a:t>
+            </a:r>
+          </a:p>
+          <a:p>
+            <a:r>
+              <a:rPr lang="en-US" sz="1200" noProof="1">
+                <a:latin typeface="Consolas" panose="020B0609020204030204" pitchFamily="49" charset="0"/>
+                <a:cs typeface="Consolas" panose="020B0609020204030204" pitchFamily="49" charset="0"/>
               </a:rPr>
-              <a:t>pytest</a:t>
-            </a:r>
-            <a:r>
-              <a:rPr lang="en-US" sz="1200" dirty="0">
-                <a:latin typeface="Courier New" panose="02070309020205020404" pitchFamily="49" charset="0"/>
-                <a:cs typeface="Courier New" panose="02070309020205020404" pitchFamily="49" charset="0"/>
-              </a:rPr>
-              <a:t> </a:t>
-            </a:r>
-            <a:r>
-              <a:rPr lang="en-US" sz="1200" dirty="0" err="1">
-                <a:latin typeface="Courier New" panose="02070309020205020404" pitchFamily="49" charset="0"/>
-                <a:cs typeface="Courier New" panose="02070309020205020404" pitchFamily="49" charset="0"/>
-              </a:rPr>
-              <a:t>numpy</a:t>
-            </a:r>
-            <a:endParaRPr lang="en-US" sz="1200" dirty="0">
-              <a:latin typeface="Courier New" panose="02070309020205020404" pitchFamily="49" charset="0"/>
-              <a:cs typeface="Courier New" panose="02070309020205020404" pitchFamily="49" charset="0"/>
-            </a:endParaRPr>
-          </a:p>
-          <a:p>
-            <a:r>
-              <a:rPr lang="en-US" sz="1200" dirty="0">
-                <a:latin typeface="Courier New" panose="02070309020205020404" pitchFamily="49" charset="0"/>
-                <a:cs typeface="Courier New" panose="02070309020205020404" pitchFamily="49" charset="0"/>
-              </a:rPr>
-              <a:t>    - name: Test with </a:t>
-            </a:r>
-            <a:r>
-              <a:rPr lang="en-US" sz="1200" dirty="0" err="1">
-                <a:latin typeface="Courier New" panose="02070309020205020404" pitchFamily="49" charset="0"/>
-                <a:cs typeface="Courier New" panose="02070309020205020404" pitchFamily="49" charset="0"/>
-              </a:rPr>
-              <a:t>pytest</a:t>
-            </a:r>
-            <a:endParaRPr lang="en-US" sz="1200" dirty="0">
-              <a:latin typeface="Courier New" panose="02070309020205020404" pitchFamily="49" charset="0"/>
-              <a:cs typeface="Courier New" panose="02070309020205020404" pitchFamily="49" charset="0"/>
-            </a:endParaRPr>
-          </a:p>
-          <a:p>
-            <a:r>
-              <a:rPr lang="en-US" sz="1200" dirty="0">
-                <a:latin typeface="Courier New" panose="02070309020205020404" pitchFamily="49" charset="0"/>
-                <a:cs typeface="Courier New" panose="02070309020205020404" pitchFamily="49" charset="0"/>
+              <a:t>    - name: Test with pytest</a:t>
+            </a:r>
+          </a:p>
+          <a:p>
+            <a:r>
+              <a:rPr lang="en-US" sz="1200" noProof="1">
+                <a:latin typeface="Consolas" panose="020B0609020204030204" pitchFamily="49" charset="0"/>
+                <a:cs typeface="Consolas" panose="020B0609020204030204" pitchFamily="49" charset="0"/>
               </a:rPr>
               <a:t>      run:</a:t>
             </a:r>
           </a:p>
           <a:p>
             <a:r>
-              <a:rPr lang="en-US" sz="1200" dirty="0">
-                <a:latin typeface="Courier New" panose="02070309020205020404" pitchFamily="49" charset="0"/>
-                <a:cs typeface="Courier New" panose="02070309020205020404" pitchFamily="49" charset="0"/>
+              <a:rPr lang="en-US" sz="1200" noProof="1">
+                <a:latin typeface="Consolas" panose="020B0609020204030204" pitchFamily="49" charset="0"/>
+                <a:cs typeface="Consolas" panose="020B0609020204030204" pitchFamily="49" charset="0"/>
               </a:rPr>
-              <a:t>        </a:t>
-            </a:r>
-            <a:r>
-              <a:rPr lang="en-US" sz="1200" dirty="0" err="1">
-                <a:latin typeface="Courier New" panose="02070309020205020404" pitchFamily="49" charset="0"/>
-                <a:cs typeface="Courier New" panose="02070309020205020404" pitchFamily="49" charset="0"/>
-              </a:rPr>
-              <a:t>pytest</a:t>
-            </a:r>
-            <a:r>
-              <a:rPr lang="en-US" sz="1200" dirty="0">
-                <a:latin typeface="Courier New" panose="02070309020205020404" pitchFamily="49" charset="0"/>
-                <a:cs typeface="Courier New" panose="02070309020205020404" pitchFamily="49" charset="0"/>
-              </a:rPr>
-              <a:t> -</a:t>
-            </a:r>
-            <a:r>
-              <a:rPr lang="en-US" sz="1200" dirty="0" err="1">
-                <a:latin typeface="Courier New" panose="02070309020205020404" pitchFamily="49" charset="0"/>
-                <a:cs typeface="Courier New" panose="02070309020205020404" pitchFamily="49" charset="0"/>
-              </a:rPr>
-              <a:t>sv</a:t>
-            </a:r>
-            <a:r>
-              <a:rPr lang="en-US" sz="1200" dirty="0">
-                <a:latin typeface="Courier New" panose="02070309020205020404" pitchFamily="49" charset="0"/>
-                <a:cs typeface="Courier New" panose="02070309020205020404" pitchFamily="49" charset="0"/>
-              </a:rPr>
-              <a:t> </a:t>
-            </a:r>
-            <a:r>
-              <a:rPr lang="en-US" sz="1200" dirty="0" err="1">
-                <a:latin typeface="Courier New" panose="02070309020205020404" pitchFamily="49" charset="0"/>
-                <a:cs typeface="Courier New" panose="02070309020205020404" pitchFamily="49" charset="0"/>
-              </a:rPr>
-              <a:t>hands_on</a:t>
-            </a:r>
-            <a:r>
-              <a:rPr lang="en-US" sz="1200" dirty="0">
-                <a:latin typeface="Courier New" panose="02070309020205020404" pitchFamily="49" charset="0"/>
-                <a:cs typeface="Courier New" panose="02070309020205020404" pitchFamily="49" charset="0"/>
-              </a:rPr>
-              <a:t>/</a:t>
-            </a:r>
-            <a:r>
-              <a:rPr lang="en-US" sz="1200" dirty="0" err="1">
-                <a:latin typeface="Courier New" panose="02070309020205020404" pitchFamily="49" charset="0"/>
-                <a:cs typeface="Courier New" panose="02070309020205020404" pitchFamily="49" charset="0"/>
-              </a:rPr>
-              <a:t>pyanno_votin</a:t>
-            </a:r>
-            <a:endParaRPr lang="en-CH" sz="1200" dirty="0">
-              <a:latin typeface="Courier New" panose="02070309020205020404" pitchFamily="49" charset="0"/>
-              <a:cs typeface="Courier New" panose="02070309020205020404" pitchFamily="49" charset="0"/>
-            </a:endParaRPr>
+              <a:t>        pytest -sv hands_on/pyanno_votin</a:t>
+            </a:r>
           </a:p>
         </p:txBody>
       </p:sp>
@@ -7603,7 +6747,7 @@
         <p:spPr>
           <a:xfrm>
             <a:off x="2351947" y="1164135"/>
-            <a:ext cx="5205271" cy="4893647"/>
+            <a:ext cx="4772460" cy="4893647"/>
           </a:xfrm>
           <a:prstGeom prst="rect">
             <a:avLst/>
@@ -7619,401 +6763,228 @@
           <a:lstStyle/>
           <a:p>
             <a:r>
-              <a:rPr lang="en-US" sz="1200" dirty="0">
-                <a:latin typeface="Courier New" panose="02070309020205020404" pitchFamily="49" charset="0"/>
-                <a:cs typeface="Courier New" panose="02070309020205020404" pitchFamily="49" charset="0"/>
+              <a:rPr lang="en-US" sz="1200" noProof="1">
+                <a:latin typeface="Consolas" panose="020B0609020204030204" pitchFamily="49" charset="0"/>
+                <a:cs typeface="Consolas" panose="020B0609020204030204" pitchFamily="49" charset="0"/>
               </a:rPr>
               <a:t>Name: Run all the tests for PRs, with OS/Python matrix</a:t>
             </a:r>
           </a:p>
           <a:p>
-            <a:endParaRPr lang="en-US" sz="1200" dirty="0">
-              <a:latin typeface="Courier New" panose="02070309020205020404" pitchFamily="49" charset="0"/>
-              <a:cs typeface="Courier New" panose="02070309020205020404" pitchFamily="49" charset="0"/>
+            <a:endParaRPr lang="en-US" sz="1200" noProof="1">
+              <a:latin typeface="Consolas" panose="020B0609020204030204" pitchFamily="49" charset="0"/>
+              <a:cs typeface="Consolas" panose="020B0609020204030204" pitchFamily="49" charset="0"/>
             </a:endParaRPr>
           </a:p>
           <a:p>
             <a:r>
-              <a:rPr lang="en-US" sz="1200" dirty="0">
-                <a:latin typeface="Courier New" panose="02070309020205020404" pitchFamily="49" charset="0"/>
-                <a:cs typeface="Courier New" panose="02070309020205020404" pitchFamily="49" charset="0"/>
+              <a:rPr lang="en-US" sz="1200" noProof="1">
+                <a:latin typeface="Consolas" panose="020B0609020204030204" pitchFamily="49" charset="0"/>
+                <a:cs typeface="Consolas" panose="020B0609020204030204" pitchFamily="49" charset="0"/>
               </a:rPr>
               <a:t>on:</a:t>
             </a:r>
           </a:p>
           <a:p>
             <a:r>
-              <a:rPr lang="en-US" sz="1200" dirty="0">
-                <a:latin typeface="Courier New" panose="02070309020205020404" pitchFamily="49" charset="0"/>
-                <a:cs typeface="Courier New" panose="02070309020205020404" pitchFamily="49" charset="0"/>
+              <a:rPr lang="en-US" sz="1200" noProof="1">
+                <a:latin typeface="Consolas" panose="020B0609020204030204" pitchFamily="49" charset="0"/>
+                <a:cs typeface="Consolas" panose="020B0609020204030204" pitchFamily="49" charset="0"/>
               </a:rPr>
-              <a:t>  [push, </a:t>
-            </a:r>
-            <a:r>
-              <a:rPr lang="en-US" sz="1200" dirty="0" err="1">
-                <a:latin typeface="Courier New" panose="02070309020205020404" pitchFamily="49" charset="0"/>
-                <a:cs typeface="Courier New" panose="02070309020205020404" pitchFamily="49" charset="0"/>
-              </a:rPr>
-              <a:t>pull_request</a:t>
-            </a:r>
-            <a:r>
-              <a:rPr lang="en-US" sz="1200" dirty="0">
-                <a:latin typeface="Courier New" panose="02070309020205020404" pitchFamily="49" charset="0"/>
-                <a:cs typeface="Courier New" panose="02070309020205020404" pitchFamily="49" charset="0"/>
-              </a:rPr>
-              <a:t>]</a:t>
-            </a:r>
-          </a:p>
-          <a:p>
-            <a:endParaRPr lang="en-US" sz="1200" dirty="0">
-              <a:latin typeface="Courier New" panose="02070309020205020404" pitchFamily="49" charset="0"/>
-              <a:cs typeface="Courier New" panose="02070309020205020404" pitchFamily="49" charset="0"/>
+              <a:t>  [push, pull_request]</a:t>
+            </a:r>
+          </a:p>
+          <a:p>
+            <a:endParaRPr lang="en-US" sz="1200" noProof="1">
+              <a:latin typeface="Consolas" panose="020B0609020204030204" pitchFamily="49" charset="0"/>
+              <a:cs typeface="Consolas" panose="020B0609020204030204" pitchFamily="49" charset="0"/>
             </a:endParaRPr>
           </a:p>
           <a:p>
             <a:r>
-              <a:rPr lang="en-US" sz="1200" dirty="0">
-                <a:latin typeface="Courier New" panose="02070309020205020404" pitchFamily="49" charset="0"/>
-                <a:cs typeface="Courier New" panose="02070309020205020404" pitchFamily="49" charset="0"/>
+              <a:rPr lang="en-US" sz="1200" noProof="1">
+                <a:latin typeface="Consolas" panose="020B0609020204030204" pitchFamily="49" charset="0"/>
+                <a:cs typeface="Consolas" panose="020B0609020204030204" pitchFamily="49" charset="0"/>
               </a:rPr>
               <a:t>jobs:</a:t>
             </a:r>
           </a:p>
           <a:p>
             <a:r>
-              <a:rPr lang="en-US" sz="1200" dirty="0">
-                <a:latin typeface="Courier New" panose="02070309020205020404" pitchFamily="49" charset="0"/>
-                <a:cs typeface="Courier New" panose="02070309020205020404" pitchFamily="49" charset="0"/>
+              <a:rPr lang="en-US" sz="1200" noProof="1">
+                <a:latin typeface="Consolas" panose="020B0609020204030204" pitchFamily="49" charset="0"/>
+                <a:cs typeface="Consolas" panose="020B0609020204030204" pitchFamily="49" charset="0"/>
               </a:rPr>
               <a:t>  run-tests:</a:t>
             </a:r>
           </a:p>
           <a:p>
             <a:r>
-              <a:rPr lang="en-US" sz="1200" dirty="0">
-                <a:latin typeface="Courier New" panose="02070309020205020404" pitchFamily="49" charset="0"/>
-                <a:cs typeface="Courier New" panose="02070309020205020404" pitchFamily="49" charset="0"/>
+              <a:rPr lang="en-US" sz="1200" noProof="1">
+                <a:latin typeface="Consolas" panose="020B0609020204030204" pitchFamily="49" charset="0"/>
+                <a:cs typeface="Consolas" panose="020B0609020204030204" pitchFamily="49" charset="0"/>
               </a:rPr>
-              <a:t>    runs-on: ${{ </a:t>
-            </a:r>
-            <a:r>
-              <a:rPr lang="en-US" sz="1200" dirty="0" err="1">
-                <a:latin typeface="Courier New" panose="02070309020205020404" pitchFamily="49" charset="0"/>
-                <a:cs typeface="Courier New" panose="02070309020205020404" pitchFamily="49" charset="0"/>
-              </a:rPr>
-              <a:t>matrix.os</a:t>
-            </a:r>
-            <a:r>
-              <a:rPr lang="en-US" sz="1200" dirty="0">
-                <a:latin typeface="Courier New" panose="02070309020205020404" pitchFamily="49" charset="0"/>
-                <a:cs typeface="Courier New" panose="02070309020205020404" pitchFamily="49" charset="0"/>
-              </a:rPr>
-              <a:t> }}</a:t>
-            </a:r>
-          </a:p>
-          <a:p>
-            <a:r>
-              <a:rPr lang="en-US" sz="1200" dirty="0">
-                <a:latin typeface="Courier New" panose="02070309020205020404" pitchFamily="49" charset="0"/>
-                <a:cs typeface="Courier New" panose="02070309020205020404" pitchFamily="49" charset="0"/>
+              <a:t>    runs-on: ${{ matrix.os }}</a:t>
+            </a:r>
+          </a:p>
+          <a:p>
+            <a:r>
+              <a:rPr lang="en-US" sz="1200" noProof="1">
+                <a:latin typeface="Consolas" panose="020B0609020204030204" pitchFamily="49" charset="0"/>
+                <a:cs typeface="Consolas" panose="020B0609020204030204" pitchFamily="49" charset="0"/>
               </a:rPr>
               <a:t>    </a:t>
             </a:r>
           </a:p>
           <a:p>
             <a:r>
-              <a:rPr lang="en-US" sz="1200" dirty="0">
-                <a:latin typeface="Courier New" panose="02070309020205020404" pitchFamily="49" charset="0"/>
-                <a:cs typeface="Courier New" panose="02070309020205020404" pitchFamily="49" charset="0"/>
+              <a:rPr lang="en-US" sz="1200" noProof="1">
+                <a:latin typeface="Consolas" panose="020B0609020204030204" pitchFamily="49" charset="0"/>
+                <a:cs typeface="Consolas" panose="020B0609020204030204" pitchFamily="49" charset="0"/>
               </a:rPr>
               <a:t>    strategy:</a:t>
             </a:r>
           </a:p>
           <a:p>
             <a:r>
-              <a:rPr lang="en-US" sz="1200" dirty="0">
-                <a:latin typeface="Courier New" panose="02070309020205020404" pitchFamily="49" charset="0"/>
-                <a:cs typeface="Courier New" panose="02070309020205020404" pitchFamily="49" charset="0"/>
+              <a:rPr lang="en-US" sz="1200" noProof="1">
+                <a:latin typeface="Consolas" panose="020B0609020204030204" pitchFamily="49" charset="0"/>
+                <a:cs typeface="Consolas" panose="020B0609020204030204" pitchFamily="49" charset="0"/>
               </a:rPr>
               <a:t>      matrix:</a:t>
             </a:r>
           </a:p>
           <a:p>
             <a:r>
-              <a:rPr lang="en-US" sz="1200" dirty="0">
-                <a:latin typeface="Courier New" panose="02070309020205020404" pitchFamily="49" charset="0"/>
-                <a:cs typeface="Courier New" panose="02070309020205020404" pitchFamily="49" charset="0"/>
+              <a:rPr lang="en-US" sz="1200" noProof="1">
+                <a:latin typeface="Consolas" panose="020B0609020204030204" pitchFamily="49" charset="0"/>
+                <a:cs typeface="Consolas" panose="020B0609020204030204" pitchFamily="49" charset="0"/>
               </a:rPr>
-              <a:t>        </a:t>
-            </a:r>
-            <a:r>
-              <a:rPr lang="en-US" sz="1200" dirty="0" err="1">
-                <a:latin typeface="Courier New" panose="02070309020205020404" pitchFamily="49" charset="0"/>
-                <a:cs typeface="Courier New" panose="02070309020205020404" pitchFamily="49" charset="0"/>
-              </a:rPr>
-              <a:t>os</a:t>
-            </a:r>
-            <a:r>
-              <a:rPr lang="en-US" sz="1200" dirty="0">
-                <a:latin typeface="Courier New" panose="02070309020205020404" pitchFamily="49" charset="0"/>
-                <a:cs typeface="Courier New" panose="02070309020205020404" pitchFamily="49" charset="0"/>
-              </a:rPr>
-              <a:t>: [ubuntu-latest, </a:t>
-            </a:r>
-            <a:r>
-              <a:rPr lang="en-US" sz="1200" dirty="0" err="1">
-                <a:latin typeface="Courier New" panose="02070309020205020404" pitchFamily="49" charset="0"/>
-                <a:cs typeface="Courier New" panose="02070309020205020404" pitchFamily="49" charset="0"/>
-              </a:rPr>
-              <a:t>macos</a:t>
-            </a:r>
-            <a:r>
-              <a:rPr lang="en-US" sz="1200" dirty="0">
-                <a:latin typeface="Courier New" panose="02070309020205020404" pitchFamily="49" charset="0"/>
-                <a:cs typeface="Courier New" panose="02070309020205020404" pitchFamily="49" charset="0"/>
-              </a:rPr>
-              <a:t>-latest]</a:t>
-            </a:r>
-          </a:p>
-          <a:p>
-            <a:r>
-              <a:rPr lang="en-US" sz="1200" dirty="0">
-                <a:latin typeface="Courier New" panose="02070309020205020404" pitchFamily="49" charset="0"/>
-                <a:cs typeface="Courier New" panose="02070309020205020404" pitchFamily="49" charset="0"/>
+              <a:t>        os: [ubuntu-latest, macos-latest]</a:t>
+            </a:r>
+          </a:p>
+          <a:p>
+            <a:r>
+              <a:rPr lang="en-US" sz="1200" noProof="1">
+                <a:latin typeface="Consolas" panose="020B0609020204030204" pitchFamily="49" charset="0"/>
+                <a:cs typeface="Consolas" panose="020B0609020204030204" pitchFamily="49" charset="0"/>
               </a:rPr>
               <a:t>        python-version: [3.8, 3.9]</a:t>
             </a:r>
           </a:p>
           <a:p>
-            <a:endParaRPr lang="en-US" sz="1200" dirty="0">
-              <a:latin typeface="Courier New" panose="02070309020205020404" pitchFamily="49" charset="0"/>
-              <a:cs typeface="Courier New" panose="02070309020205020404" pitchFamily="49" charset="0"/>
+            <a:endParaRPr lang="en-US" sz="1200" noProof="1">
+              <a:latin typeface="Consolas" panose="020B0609020204030204" pitchFamily="49" charset="0"/>
+              <a:cs typeface="Consolas" panose="020B0609020204030204" pitchFamily="49" charset="0"/>
             </a:endParaRPr>
           </a:p>
           <a:p>
             <a:r>
-              <a:rPr lang="en-US" sz="1200" dirty="0">
-                <a:latin typeface="Courier New" panose="02070309020205020404" pitchFamily="49" charset="0"/>
-                <a:cs typeface="Courier New" panose="02070309020205020404" pitchFamily="49" charset="0"/>
+              <a:rPr lang="en-US" sz="1200" noProof="1">
+                <a:latin typeface="Consolas" panose="020B0609020204030204" pitchFamily="49" charset="0"/>
+                <a:cs typeface="Consolas" panose="020B0609020204030204" pitchFamily="49" charset="0"/>
               </a:rPr>
               <a:t>    steps:</a:t>
             </a:r>
           </a:p>
           <a:p>
             <a:r>
-              <a:rPr lang="en-US" sz="1200" dirty="0">
-                <a:latin typeface="Courier New" panose="02070309020205020404" pitchFamily="49" charset="0"/>
-                <a:cs typeface="Courier New" panose="02070309020205020404" pitchFamily="49" charset="0"/>
+              <a:rPr lang="en-US" sz="1200" noProof="1">
+                <a:latin typeface="Consolas" panose="020B0609020204030204" pitchFamily="49" charset="0"/>
+                <a:cs typeface="Consolas" panose="020B0609020204030204" pitchFamily="49" charset="0"/>
               </a:rPr>
               <a:t>    - uses: actions/checkout@v2</a:t>
             </a:r>
           </a:p>
           <a:p>
             <a:r>
-              <a:rPr lang="en-US" sz="1200" dirty="0">
-                <a:latin typeface="Courier New" panose="02070309020205020404" pitchFamily="49" charset="0"/>
-                <a:cs typeface="Courier New" panose="02070309020205020404" pitchFamily="49" charset="0"/>
+              <a:rPr lang="en-US" sz="1200" noProof="1">
+                <a:latin typeface="Consolas" panose="020B0609020204030204" pitchFamily="49" charset="0"/>
+                <a:cs typeface="Consolas" panose="020B0609020204030204" pitchFamily="49" charset="0"/>
               </a:rPr>
-              <a:t>    - name: Set up Python ${{ </a:t>
-            </a:r>
-            <a:r>
-              <a:rPr lang="en-US" sz="1200" dirty="0" err="1">
-                <a:latin typeface="Courier New" panose="02070309020205020404" pitchFamily="49" charset="0"/>
-                <a:cs typeface="Courier New" panose="02070309020205020404" pitchFamily="49" charset="0"/>
-              </a:rPr>
-              <a:t>matrix.python</a:t>
-            </a:r>
-            <a:r>
-              <a:rPr lang="en-US" sz="1200" dirty="0">
-                <a:latin typeface="Courier New" panose="02070309020205020404" pitchFamily="49" charset="0"/>
-                <a:cs typeface="Courier New" panose="02070309020205020404" pitchFamily="49" charset="0"/>
-              </a:rPr>
-              <a:t>-version }}</a:t>
-            </a:r>
-          </a:p>
-          <a:p>
-            <a:r>
-              <a:rPr lang="en-US" sz="1200" dirty="0">
-                <a:latin typeface="Courier New" panose="02070309020205020404" pitchFamily="49" charset="0"/>
-                <a:cs typeface="Courier New" panose="02070309020205020404" pitchFamily="49" charset="0"/>
+              <a:t>    - name: Set up Python ${{ matrix.python-version }}</a:t>
+            </a:r>
+          </a:p>
+          <a:p>
+            <a:r>
+              <a:rPr lang="en-US" sz="1200" noProof="1">
+                <a:latin typeface="Consolas" panose="020B0609020204030204" pitchFamily="49" charset="0"/>
+                <a:cs typeface="Consolas" panose="020B0609020204030204" pitchFamily="49" charset="0"/>
               </a:rPr>
               <a:t>      uses: actions/setup-python@v2</a:t>
             </a:r>
           </a:p>
           <a:p>
             <a:r>
-              <a:rPr lang="en-US" sz="1200" dirty="0">
-                <a:latin typeface="Courier New" panose="02070309020205020404" pitchFamily="49" charset="0"/>
-                <a:cs typeface="Courier New" panose="02070309020205020404" pitchFamily="49" charset="0"/>
+              <a:rPr lang="en-US" sz="1200" noProof="1">
+                <a:latin typeface="Consolas" panose="020B0609020204030204" pitchFamily="49" charset="0"/>
+                <a:cs typeface="Consolas" panose="020B0609020204030204" pitchFamily="49" charset="0"/>
               </a:rPr>
               <a:t>      with:</a:t>
             </a:r>
           </a:p>
           <a:p>
             <a:r>
-              <a:rPr lang="en-US" sz="1200" dirty="0">
-                <a:latin typeface="Courier New" panose="02070309020205020404" pitchFamily="49" charset="0"/>
-                <a:cs typeface="Courier New" panose="02070309020205020404" pitchFamily="49" charset="0"/>
+              <a:rPr lang="en-US" sz="1200" noProof="1">
+                <a:latin typeface="Consolas" panose="020B0609020204030204" pitchFamily="49" charset="0"/>
+                <a:cs typeface="Consolas" panose="020B0609020204030204" pitchFamily="49" charset="0"/>
               </a:rPr>
-              <a:t>        python-version: ${{ </a:t>
-            </a:r>
-            <a:r>
-              <a:rPr lang="en-US" sz="1200" dirty="0" err="1">
-                <a:latin typeface="Courier New" panose="02070309020205020404" pitchFamily="49" charset="0"/>
-                <a:cs typeface="Courier New" panose="02070309020205020404" pitchFamily="49" charset="0"/>
-              </a:rPr>
-              <a:t>matrix.python</a:t>
-            </a:r>
-            <a:r>
-              <a:rPr lang="en-US" sz="1200" dirty="0">
-                <a:latin typeface="Courier New" panose="02070309020205020404" pitchFamily="49" charset="0"/>
-                <a:cs typeface="Courier New" panose="02070309020205020404" pitchFamily="49" charset="0"/>
-              </a:rPr>
-              <a:t>-version }}</a:t>
-            </a:r>
-          </a:p>
-          <a:p>
-            <a:r>
-              <a:rPr lang="en-US" sz="1200" dirty="0">
-                <a:latin typeface="Courier New" panose="02070309020205020404" pitchFamily="49" charset="0"/>
-                <a:cs typeface="Courier New" panose="02070309020205020404" pitchFamily="49" charset="0"/>
+              <a:t>        python-version: ${{ matrix.python-version }}</a:t>
+            </a:r>
+          </a:p>
+          <a:p>
+            <a:r>
+              <a:rPr lang="en-US" sz="1200" noProof="1">
+                <a:latin typeface="Consolas" panose="020B0609020204030204" pitchFamily="49" charset="0"/>
+                <a:cs typeface="Consolas" panose="020B0609020204030204" pitchFamily="49" charset="0"/>
               </a:rPr>
               <a:t>    - name: Install dependencies</a:t>
             </a:r>
           </a:p>
           <a:p>
             <a:r>
-              <a:rPr lang="en-US" sz="1200" dirty="0">
-                <a:latin typeface="Courier New" panose="02070309020205020404" pitchFamily="49" charset="0"/>
-                <a:cs typeface="Courier New" panose="02070309020205020404" pitchFamily="49" charset="0"/>
+              <a:rPr lang="en-US" sz="1200" noProof="1">
+                <a:latin typeface="Consolas" panose="020B0609020204030204" pitchFamily="49" charset="0"/>
+                <a:cs typeface="Consolas" panose="020B0609020204030204" pitchFamily="49" charset="0"/>
               </a:rPr>
               <a:t>      run:</a:t>
             </a:r>
           </a:p>
           <a:p>
             <a:r>
-              <a:rPr lang="en-US" sz="1200" dirty="0">
-                <a:latin typeface="Courier New" panose="02070309020205020404" pitchFamily="49" charset="0"/>
-                <a:cs typeface="Courier New" panose="02070309020205020404" pitchFamily="49" charset="0"/>
+              <a:rPr lang="en-US" sz="1200" noProof="1">
+                <a:latin typeface="Consolas" panose="020B0609020204030204" pitchFamily="49" charset="0"/>
+                <a:cs typeface="Consolas" panose="020B0609020204030204" pitchFamily="49" charset="0"/>
               </a:rPr>
-              <a:t>        python -m pip install </a:t>
-            </a:r>
-            <a:r>
-              <a:rPr lang="en-US" sz="1200" dirty="0" err="1">
-                <a:latin typeface="Courier New" panose="02070309020205020404" pitchFamily="49" charset="0"/>
-                <a:cs typeface="Courier New" panose="02070309020205020404" pitchFamily="49" charset="0"/>
+              <a:t>        python -m pip install pytest numpy</a:t>
+            </a:r>
+          </a:p>
+          <a:p>
+            <a:r>
+              <a:rPr lang="en-US" sz="1200" noProof="1">
+                <a:latin typeface="Consolas" panose="020B0609020204030204" pitchFamily="49" charset="0"/>
+                <a:cs typeface="Consolas" panose="020B0609020204030204" pitchFamily="49" charset="0"/>
               </a:rPr>
-              <a:t>pytest</a:t>
-            </a:r>
-            <a:r>
-              <a:rPr lang="en-US" sz="1200" dirty="0">
-                <a:latin typeface="Courier New" panose="02070309020205020404" pitchFamily="49" charset="0"/>
-                <a:cs typeface="Courier New" panose="02070309020205020404" pitchFamily="49" charset="0"/>
-              </a:rPr>
-              <a:t> </a:t>
-            </a:r>
-            <a:r>
-              <a:rPr lang="en-US" sz="1200" dirty="0" err="1">
-                <a:latin typeface="Courier New" panose="02070309020205020404" pitchFamily="49" charset="0"/>
-                <a:cs typeface="Courier New" panose="02070309020205020404" pitchFamily="49" charset="0"/>
-              </a:rPr>
-              <a:t>numpy</a:t>
-            </a:r>
-            <a:endParaRPr lang="en-US" sz="1200" dirty="0">
-              <a:latin typeface="Courier New" panose="02070309020205020404" pitchFamily="49" charset="0"/>
-              <a:cs typeface="Courier New" panose="02070309020205020404" pitchFamily="49" charset="0"/>
-            </a:endParaRPr>
-          </a:p>
-          <a:p>
-            <a:r>
-              <a:rPr lang="en-US" sz="1200" dirty="0">
-                <a:latin typeface="Courier New" panose="02070309020205020404" pitchFamily="49" charset="0"/>
-                <a:cs typeface="Courier New" panose="02070309020205020404" pitchFamily="49" charset="0"/>
-              </a:rPr>
-              <a:t>    - name: Test with </a:t>
-            </a:r>
-            <a:r>
-              <a:rPr lang="en-US" sz="1200" dirty="0" err="1">
-                <a:latin typeface="Courier New" panose="02070309020205020404" pitchFamily="49" charset="0"/>
-                <a:cs typeface="Courier New" panose="02070309020205020404" pitchFamily="49" charset="0"/>
-              </a:rPr>
-              <a:t>pytest</a:t>
-            </a:r>
-            <a:endParaRPr lang="en-US" sz="1200" dirty="0">
-              <a:latin typeface="Courier New" panose="02070309020205020404" pitchFamily="49" charset="0"/>
-              <a:cs typeface="Courier New" panose="02070309020205020404" pitchFamily="49" charset="0"/>
-            </a:endParaRPr>
-          </a:p>
-          <a:p>
-            <a:r>
-              <a:rPr lang="en-US" sz="1200" dirty="0">
-                <a:latin typeface="Courier New" panose="02070309020205020404" pitchFamily="49" charset="0"/>
-                <a:cs typeface="Courier New" panose="02070309020205020404" pitchFamily="49" charset="0"/>
+              <a:t>    - name: Test with pytest</a:t>
+            </a:r>
+          </a:p>
+          <a:p>
+            <a:r>
+              <a:rPr lang="en-US" sz="1200" noProof="1">
+                <a:latin typeface="Consolas" panose="020B0609020204030204" pitchFamily="49" charset="0"/>
+                <a:cs typeface="Consolas" panose="020B0609020204030204" pitchFamily="49" charset="0"/>
               </a:rPr>
               <a:t>      run:</a:t>
             </a:r>
           </a:p>
           <a:p>
             <a:r>
-              <a:rPr lang="en-US" sz="1200" dirty="0">
-                <a:latin typeface="Courier New" panose="02070309020205020404" pitchFamily="49" charset="0"/>
-                <a:cs typeface="Courier New" panose="02070309020205020404" pitchFamily="49" charset="0"/>
+              <a:rPr lang="en-US" sz="1200" noProof="1">
+                <a:latin typeface="Consolas" panose="020B0609020204030204" pitchFamily="49" charset="0"/>
+                <a:cs typeface="Consolas" panose="020B0609020204030204" pitchFamily="49" charset="0"/>
               </a:rPr>
-              <a:t>        </a:t>
-            </a:r>
-            <a:r>
-              <a:rPr lang="en-US" sz="1200" dirty="0" err="1">
-                <a:latin typeface="Courier New" panose="02070309020205020404" pitchFamily="49" charset="0"/>
-                <a:cs typeface="Courier New" panose="02070309020205020404" pitchFamily="49" charset="0"/>
-              </a:rPr>
-              <a:t>pytest</a:t>
-            </a:r>
-            <a:r>
-              <a:rPr lang="en-US" sz="1200" dirty="0">
-                <a:latin typeface="Courier New" panose="02070309020205020404" pitchFamily="49" charset="0"/>
-                <a:cs typeface="Courier New" panose="02070309020205020404" pitchFamily="49" charset="0"/>
-              </a:rPr>
-              <a:t> -</a:t>
-            </a:r>
-            <a:r>
-              <a:rPr lang="en-US" sz="1200" dirty="0" err="1">
-                <a:latin typeface="Courier New" panose="02070309020205020404" pitchFamily="49" charset="0"/>
-                <a:cs typeface="Courier New" panose="02070309020205020404" pitchFamily="49" charset="0"/>
-              </a:rPr>
-              <a:t>sv</a:t>
-            </a:r>
-            <a:r>
-              <a:rPr lang="en-US" sz="1200" dirty="0">
-                <a:latin typeface="Courier New" panose="02070309020205020404" pitchFamily="49" charset="0"/>
-                <a:cs typeface="Courier New" panose="02070309020205020404" pitchFamily="49" charset="0"/>
-              </a:rPr>
-              <a:t> </a:t>
-            </a:r>
-            <a:r>
-              <a:rPr lang="en-US" sz="1200" dirty="0" err="1">
-                <a:latin typeface="Courier New" panose="02070309020205020404" pitchFamily="49" charset="0"/>
-                <a:cs typeface="Courier New" panose="02070309020205020404" pitchFamily="49" charset="0"/>
-              </a:rPr>
-              <a:t>hands_on</a:t>
-            </a:r>
-            <a:r>
-              <a:rPr lang="en-US" sz="1200" dirty="0">
-                <a:latin typeface="Courier New" panose="02070309020205020404" pitchFamily="49" charset="0"/>
-                <a:cs typeface="Courier New" panose="02070309020205020404" pitchFamily="49" charset="0"/>
-              </a:rPr>
-              <a:t>/</a:t>
-            </a:r>
-            <a:r>
-              <a:rPr lang="en-US" sz="1200" dirty="0" err="1">
-                <a:latin typeface="Courier New" panose="02070309020205020404" pitchFamily="49" charset="0"/>
-                <a:cs typeface="Courier New" panose="02070309020205020404" pitchFamily="49" charset="0"/>
-              </a:rPr>
-              <a:t>pyanno_votin</a:t>
-            </a:r>
-            <a:endParaRPr lang="en-CH" sz="1200" dirty="0">
-              <a:latin typeface="Courier New" panose="02070309020205020404" pitchFamily="49" charset="0"/>
-              <a:cs typeface="Courier New" panose="02070309020205020404" pitchFamily="49" charset="0"/>
-            </a:endParaRPr>
+              <a:t>        pytest -sv hands_on/pyanno_votin</a:t>
+            </a:r>
           </a:p>
         </p:txBody>
       </p:sp>
@@ -8628,13 +7599,31 @@
           <a:p>
             <a:r>
               <a:rPr lang="en-US" dirty="0"/>
-              <a:t>Adapt your configuration file and push it to GitHub</a:t>
-            </a:r>
-          </a:p>
-          <a:p>
+              <a:t>Adapt your git actions configuration file </a:t>
+            </a:r>
+            <a:r>
+              <a:rPr lang="en-US" dirty="0" err="1">
+                <a:latin typeface="Consolas" panose="020B0609020204030204" pitchFamily="49" charset="0"/>
+                <a:cs typeface="Consolas" panose="020B0609020204030204" pitchFamily="49" charset="0"/>
+              </a:rPr>
+              <a:t>run_test_on_push.yml</a:t>
+            </a:r>
+            <a:r>
+              <a:rPr lang="en-US" dirty="0">
+                <a:latin typeface="Consolas" panose="020B0609020204030204" pitchFamily="49" charset="0"/>
+                <a:cs typeface="Consolas" panose="020B0609020204030204" pitchFamily="49" charset="0"/>
+              </a:rPr>
+              <a:t> </a:t>
+            </a:r>
+            <a:r>
+              <a:rPr lang="en-US" dirty="0">
+                <a:cs typeface="Consolas" panose="020B0609020204030204" pitchFamily="49" charset="0"/>
+              </a:rPr>
+              <a:t>to r</a:t>
+            </a:r>
             <a:r>
               <a:rPr lang="en-US" dirty="0"/>
-              <a:t>Run the logistic function CI workflow on Python 3.7, 3.8, 3.9, and on Linux and Windows</a:t>
+              <a:t>un the testing workflow on Python 3.7, 3.8, 3.9, and on Linux and Windows</a:t>
             </a:r>
             <a:endParaRPr lang="en-CH" dirty="0"/>
           </a:p>
@@ -9556,7 +8545,7 @@
         </p:nvSpPr>
         <p:spPr>
           <a:xfrm>
-            <a:off x="3962400" y="2705100"/>
+            <a:off x="1981200" y="2708920"/>
             <a:ext cx="8229600" cy="990600"/>
           </a:xfrm>
         </p:spPr>
@@ -9568,7 +8557,7 @@
           <a:p>
             <a:pPr algn="ctr"/>
             <a:r>
-              <a:rPr lang="en-GB" sz="5400" dirty="0"/>
+              <a:rPr lang="en-GB" sz="6000" dirty="0"/>
               <a:t>Thank you!</a:t>
             </a:r>
           </a:p>
@@ -11280,18 +10269,9 @@
           <a:lstStyle/>
           <a:p>
             <a:r>
-              <a:rPr lang="de-DE" dirty="0"/>
-              <a:t>Collaborative Development </a:t>
-            </a:r>
-            <a:r>
-              <a:rPr lang="de-DE" dirty="0" err="1"/>
-              <a:t>with</a:t>
-            </a:r>
-            <a:r>
-              <a:rPr lang="de-DE" dirty="0"/>
-              <a:t> CI</a:t>
-            </a:r>
-            <a:endParaRPr lang="en-CH" dirty="0"/>
+              <a:rPr lang="en-US"/>
+              <a:t>Collaborative Development with CI</a:t>
+            </a:r>
           </a:p>
         </p:txBody>
       </p:sp>
@@ -12377,8 +11357,8 @@
             </a:r>
             <a:r>
               <a:rPr lang="en-CH" sz="2000" dirty="0">
-                <a:latin typeface="Courier New" panose="02070309020205020404" pitchFamily="49" charset="0"/>
-                <a:cs typeface="Courier New" panose="02070309020205020404" pitchFamily="49" charset="0"/>
+                <a:latin typeface="Consolas" panose="020B0609020204030204" pitchFamily="49" charset="0"/>
+                <a:cs typeface="Consolas" panose="020B0609020204030204" pitchFamily="49" charset="0"/>
               </a:rPr>
               <a:t>.github/workflows </a:t>
             </a:r>

</xml_diff>

<commit_message>
PDF version of all slides
</commit_message>
<xml_diff>
--- a/continuous_integration.pptx
+++ b/continuous_integration.pptx
@@ -15,7 +15,7 @@
     <p:sldId id="316" r:id="rId3"/>
     <p:sldId id="314" r:id="rId4"/>
     <p:sldId id="317" r:id="rId5"/>
-    <p:sldId id="315" r:id="rId6"/>
+    <p:sldId id="477" r:id="rId6"/>
     <p:sldId id="306" r:id="rId7"/>
     <p:sldId id="318" r:id="rId8"/>
     <p:sldId id="308" r:id="rId9"/>
@@ -32,10 +32,10 @@
     <p:sldId id="322" r:id="rId20"/>
     <p:sldId id="476" r:id="rId21"/>
     <p:sldId id="288" r:id="rId22"/>
-    <p:sldId id="328" r:id="rId23"/>
-    <p:sldId id="307" r:id="rId24"/>
-    <p:sldId id="321" r:id="rId25"/>
-    <p:sldId id="298" r:id="rId26"/>
+    <p:sldId id="298" r:id="rId23"/>
+    <p:sldId id="328" r:id="rId24"/>
+    <p:sldId id="307" r:id="rId25"/>
+    <p:sldId id="321" r:id="rId26"/>
   </p:sldIdLst>
   <p:sldSz cx="12192000" cy="6858000"/>
   <p:notesSz cx="6858000" cy="9144000"/>
@@ -143,7 +143,7 @@
             <p14:sldId id="316"/>
             <p14:sldId id="314"/>
             <p14:sldId id="317"/>
-            <p14:sldId id="315"/>
+            <p14:sldId id="477"/>
             <p14:sldId id="306"/>
             <p14:sldId id="318"/>
             <p14:sldId id="308"/>
@@ -160,10 +160,10 @@
             <p14:sldId id="322"/>
             <p14:sldId id="476"/>
             <p14:sldId id="288"/>
+            <p14:sldId id="298"/>
             <p14:sldId id="328"/>
             <p14:sldId id="307"/>
             <p14:sldId id="321"/>
-            <p14:sldId id="298"/>
           </p14:sldIdLst>
         </p14:section>
       </p14:sectionLst>
@@ -269,7 +269,7 @@
             <a:fld id="{80AC11AF-147E-0A48-A5B0-8DA858D84551}" type="datetimeFigureOut">
               <a:rPr lang="en-US" smtClean="0"/>
               <a:pPr/>
-              <a:t>8/19/23</a:t>
+              <a:t>8/28/23</a:t>
             </a:fld>
             <a:endParaRPr lang="en-US"/>
           </a:p>
@@ -4388,8 +4388,20 @@
           <a:lstStyle/>
           <a:p>
             <a:r>
+              <a:rPr lang="en-DE"/>
+              <a:t>Git</a:t>
+            </a:r>
+            <a:r>
+              <a:rPr lang="en-US" dirty="0"/>
+              <a:t>H</a:t>
+            </a:r>
+            <a:r>
+              <a:rPr lang="en-DE"/>
+              <a:t>ub </a:t>
+            </a:r>
+            <a:r>
               <a:rPr lang="en-DE" dirty="0"/>
-              <a:t>Github Actions</a:t>
+              <a:t>Actions</a:t>
             </a:r>
           </a:p>
         </p:txBody>
@@ -4662,7 +4674,7 @@
         <p:spPr>
           <a:xfrm>
             <a:off x="325552" y="1196752"/>
-            <a:ext cx="9946912" cy="400110"/>
+            <a:ext cx="11315064" cy="400110"/>
           </a:xfrm>
           <a:prstGeom prst="rect">
             <a:avLst/>
@@ -4677,14 +4689,27 @@
           <a:p>
             <a:r>
               <a:rPr lang="en-CH" sz="2000" dirty="0"/>
-              <a:t>The configuration file is saved somewhere in </a:t>
+              <a:t>The configuration file is saved in </a:t>
             </a:r>
             <a:r>
               <a:rPr lang="en-CH" dirty="0">
                 <a:latin typeface="Consolas" panose="020B0609020204030204" pitchFamily="49" charset="0"/>
                 <a:cs typeface="Consolas" panose="020B0609020204030204" pitchFamily="49" charset="0"/>
               </a:rPr>
-              <a:t>.github/worflows/config-name.yml</a:t>
+              <a:t>.github/workflows </a:t>
+            </a:r>
+            <a:r>
+              <a:rPr lang="en-CH" sz="2000" dirty="0">
+                <a:cs typeface="Consolas" panose="020B0609020204030204" pitchFamily="49" charset="0"/>
+              </a:rPr>
+              <a:t>, with a name related to its task, e.g.  </a:t>
+            </a:r>
+            <a:r>
+              <a:rPr lang="en-CH" dirty="0">
+                <a:latin typeface="Consolas" panose="020B0609020204030204" pitchFamily="49" charset="0"/>
+                <a:cs typeface="Consolas" panose="020B0609020204030204" pitchFamily="49" charset="0"/>
+              </a:rPr>
+              <a:t>run-tests.yml</a:t>
             </a:r>
             <a:endParaRPr lang="en-CH" sz="2000" dirty="0">
               <a:latin typeface="Consolas" panose="020B0609020204030204" pitchFamily="49" charset="0"/>
@@ -8620,6 +8645,106 @@
       </p:grpSpPr>
       <p:sp>
         <p:nvSpPr>
+          <p:cNvPr id="2" name="Date Placeholder 1"/>
+          <p:cNvSpPr>
+            <a:spLocks noGrp="1"/>
+          </p:cNvSpPr>
+          <p:nvPr>
+            <p:ph type="dt" sz="half" idx="10"/>
+          </p:nvPr>
+        </p:nvSpPr>
+        <p:spPr/>
+        <p:txBody>
+          <a:bodyPr/>
+          <a:lstStyle/>
+          <a:p>
+            <a:r>
+              <a:rPr lang="de-CH"/>
+              <a:t>August 2023, CC BY-SA 4.0</a:t>
+            </a:r>
+            <a:endParaRPr lang="en-US"/>
+          </a:p>
+        </p:txBody>
+      </p:sp>
+      <p:sp>
+        <p:nvSpPr>
+          <p:cNvPr id="3" name="Footer Placeholder 2"/>
+          <p:cNvSpPr>
+            <a:spLocks noGrp="1"/>
+          </p:cNvSpPr>
+          <p:nvPr>
+            <p:ph type="ftr" sz="quarter" idx="11"/>
+          </p:nvPr>
+        </p:nvSpPr>
+        <p:spPr/>
+        <p:txBody>
+          <a:bodyPr/>
+          <a:lstStyle/>
+          <a:p>
+            <a:r>
+              <a:rPr lang="en-US"/>
+              <a:t>Continuous integration, v4.0</a:t>
+            </a:r>
+          </a:p>
+        </p:txBody>
+      </p:sp>
+      <p:sp>
+        <p:nvSpPr>
+          <p:cNvPr id="4" name="Slide Number Placeholder 3">
+            <a:extLst>
+              <a:ext uri="{FF2B5EF4-FFF2-40B4-BE49-F238E27FC236}">
+                <a16:creationId xmlns:a16="http://schemas.microsoft.com/office/drawing/2014/main" id="{681DCCF7-2560-B7FD-A1B3-CA321B59FEB7}"/>
+              </a:ext>
+            </a:extLst>
+          </p:cNvPr>
+          <p:cNvSpPr>
+            <a:spLocks noGrp="1"/>
+          </p:cNvSpPr>
+          <p:nvPr>
+            <p:ph type="sldNum" sz="quarter" idx="12"/>
+          </p:nvPr>
+        </p:nvSpPr>
+        <p:spPr/>
+        <p:txBody>
+          <a:bodyPr/>
+          <a:lstStyle/>
+          <a:p>
+            <a:fld id="{EF79ADEA-B933-47CC-A4E9-04E6298B917C}" type="slidenum">
+              <a:rPr lang="en-US" smtClean="0"/>
+              <a:pPr/>
+              <a:t>22</a:t>
+            </a:fld>
+            <a:endParaRPr lang="en-US"/>
+          </a:p>
+        </p:txBody>
+      </p:sp>
+    </p:spTree>
+  </p:cSld>
+  <p:clrMapOvr>
+    <a:masterClrMapping/>
+  </p:clrMapOvr>
+</p:sld>
+</file>
+
+<file path=ppt/slides/slide23.xml><?xml version="1.0" encoding="utf-8"?>
+<p:sld xmlns:a="http://schemas.openxmlformats.org/drawingml/2006/main" xmlns:r="http://schemas.openxmlformats.org/officeDocument/2006/relationships" xmlns:p="http://schemas.openxmlformats.org/presentationml/2006/main">
+  <p:cSld>
+    <p:spTree>
+      <p:nvGrpSpPr>
+        <p:cNvPr id="1" name=""/>
+        <p:cNvGrpSpPr/>
+        <p:nvPr/>
+      </p:nvGrpSpPr>
+      <p:grpSpPr>
+        <a:xfrm>
+          <a:off x="0" y="0"/>
+          <a:ext cx="0" cy="0"/>
+          <a:chOff x="0" y="0"/>
+          <a:chExt cx="0" cy="0"/>
+        </a:xfrm>
+      </p:grpSpPr>
+      <p:sp>
+        <p:nvSpPr>
           <p:cNvPr id="2" name="Title 1">
             <a:extLst>
               <a:ext uri="{FF2B5EF4-FFF2-40B4-BE49-F238E27FC236}">
@@ -9141,7 +9266,7 @@
             <a:fld id="{EF79ADEA-B933-47CC-A4E9-04E6298B917C}" type="slidenum">
               <a:rPr lang="en-US" smtClean="0"/>
               <a:pPr/>
-              <a:t>22</a:t>
+              <a:t>23</a:t>
             </a:fld>
             <a:endParaRPr lang="en-US"/>
           </a:p>
@@ -9151,275 +9276,6 @@
     <p:extLst>
       <p:ext uri="{BB962C8B-B14F-4D97-AF65-F5344CB8AC3E}">
         <p14:creationId xmlns:p14="http://schemas.microsoft.com/office/powerpoint/2010/main" val="261603392"/>
-      </p:ext>
-    </p:extLst>
-  </p:cSld>
-  <p:clrMapOvr>
-    <a:masterClrMapping/>
-  </p:clrMapOvr>
-</p:sld>
-</file>
-
-<file path=ppt/slides/slide23.xml><?xml version="1.0" encoding="utf-8"?>
-<p:sld xmlns:a="http://schemas.openxmlformats.org/drawingml/2006/main" xmlns:r="http://schemas.openxmlformats.org/officeDocument/2006/relationships" xmlns:p="http://schemas.openxmlformats.org/presentationml/2006/main">
-  <p:cSld>
-    <p:spTree>
-      <p:nvGrpSpPr>
-        <p:cNvPr id="1" name=""/>
-        <p:cNvGrpSpPr/>
-        <p:nvPr/>
-      </p:nvGrpSpPr>
-      <p:grpSpPr>
-        <a:xfrm>
-          <a:off x="0" y="0"/>
-          <a:ext cx="0" cy="0"/>
-          <a:chOff x="0" y="0"/>
-          <a:chExt cx="0" cy="0"/>
-        </a:xfrm>
-      </p:grpSpPr>
-      <p:sp>
-        <p:nvSpPr>
-          <p:cNvPr id="2" name="Title 1">
-            <a:extLst>
-              <a:ext uri="{FF2B5EF4-FFF2-40B4-BE49-F238E27FC236}">
-                <a16:creationId xmlns:a16="http://schemas.microsoft.com/office/drawing/2014/main" id="{061016C8-512C-EB4B-9D32-9CF4CB9D4F11}"/>
-              </a:ext>
-            </a:extLst>
-          </p:cNvPr>
-          <p:cNvSpPr>
-            <a:spLocks noGrp="1"/>
-          </p:cNvSpPr>
-          <p:nvPr>
-            <p:ph type="title"/>
-          </p:nvPr>
-        </p:nvSpPr>
-        <p:spPr/>
-        <p:txBody>
-          <a:bodyPr/>
-          <a:lstStyle/>
-          <a:p>
-            <a:r>
-              <a:rPr lang="de-DE" dirty="0"/>
-              <a:t>Bonus: </a:t>
-            </a:r>
-            <a:r>
-              <a:rPr lang="en-CH"/>
-              <a:t>Security</a:t>
-            </a:r>
-            <a:endParaRPr lang="en-CH" dirty="0"/>
-          </a:p>
-        </p:txBody>
-      </p:sp>
-      <p:sp>
-        <p:nvSpPr>
-          <p:cNvPr id="3" name="Content Placeholder 2">
-            <a:extLst>
-              <a:ext uri="{FF2B5EF4-FFF2-40B4-BE49-F238E27FC236}">
-                <a16:creationId xmlns:a16="http://schemas.microsoft.com/office/drawing/2014/main" id="{463079FE-7331-C647-815D-07795DC7ED3D}"/>
-              </a:ext>
-            </a:extLst>
-          </p:cNvPr>
-          <p:cNvSpPr>
-            <a:spLocks noGrp="1"/>
-          </p:cNvSpPr>
-          <p:nvPr>
-            <p:ph idx="1"/>
-          </p:nvPr>
-        </p:nvSpPr>
-        <p:spPr>
-          <a:xfrm>
-            <a:off x="1981200" y="1412776"/>
-            <a:ext cx="8229600" cy="4744184"/>
-          </a:xfrm>
-        </p:spPr>
-        <p:txBody>
-          <a:bodyPr>
-            <a:normAutofit/>
-          </a:bodyPr>
-          <a:lstStyle/>
-          <a:p>
-            <a:r>
-              <a:rPr lang="en-CH"/>
-              <a:t>Secrets </a:t>
-            </a:r>
-            <a:r>
-              <a:rPr lang="en-CH" dirty="0"/>
-              <a:t>in GitHub actions can be added </a:t>
-            </a:r>
-            <a:r>
-              <a:rPr lang="en-CH"/>
-              <a:t>under </a:t>
-            </a:r>
-            <a:br>
-              <a:rPr lang="de-DE" dirty="0"/>
-            </a:br>
-            <a:r>
-              <a:rPr lang="en-CH">
-                <a:latin typeface="Courier New" panose="02070309020205020404" pitchFamily="49" charset="0"/>
-                <a:cs typeface="Courier New" panose="02070309020205020404" pitchFamily="49" charset="0"/>
-              </a:rPr>
-              <a:t>Settings </a:t>
-            </a:r>
-            <a:r>
-              <a:rPr lang="de-DE" dirty="0">
-                <a:latin typeface="Courier New" panose="02070309020205020404" pitchFamily="49" charset="0"/>
-                <a:cs typeface="Courier New" panose="02070309020205020404" pitchFamily="49" charset="0"/>
-              </a:rPr>
-              <a:t>-</a:t>
-            </a:r>
-            <a:r>
-              <a:rPr lang="en-CH">
-                <a:latin typeface="Courier New" panose="02070309020205020404" pitchFamily="49" charset="0"/>
-                <a:cs typeface="Courier New" panose="02070309020205020404" pitchFamily="49" charset="0"/>
-              </a:rPr>
-              <a:t>&gt; </a:t>
-            </a:r>
-            <a:r>
-              <a:rPr lang="en-CH" dirty="0">
-                <a:latin typeface="Courier New" panose="02070309020205020404" pitchFamily="49" charset="0"/>
-                <a:cs typeface="Courier New" panose="02070309020205020404" pitchFamily="49" charset="0"/>
-              </a:rPr>
-              <a:t>Secrets</a:t>
-            </a:r>
-            <a:r>
-              <a:rPr lang="en-CH" dirty="0"/>
-              <a:t>.  The secret is stored encrypted by GitHub, and decrypted at the moment of running the workflow</a:t>
-            </a:r>
-          </a:p>
-          <a:p>
-            <a:r>
-              <a:rPr lang="en-CH" dirty="0"/>
-              <a:t>Secrets can then be referred to in the workflow as</a:t>
-            </a:r>
-            <a:br>
-              <a:rPr lang="en-CH" dirty="0"/>
-            </a:br>
-            <a:endParaRPr lang="en-CH" dirty="0"/>
-          </a:p>
-        </p:txBody>
-      </p:sp>
-      <p:sp>
-        <p:nvSpPr>
-          <p:cNvPr id="4" name="Date Placeholder 3">
-            <a:extLst>
-              <a:ext uri="{FF2B5EF4-FFF2-40B4-BE49-F238E27FC236}">
-                <a16:creationId xmlns:a16="http://schemas.microsoft.com/office/drawing/2014/main" id="{9EE323CB-7E09-7C4F-B160-F4B2E2E319F3}"/>
-              </a:ext>
-            </a:extLst>
-          </p:cNvPr>
-          <p:cNvSpPr>
-            <a:spLocks noGrp="1"/>
-          </p:cNvSpPr>
-          <p:nvPr>
-            <p:ph type="dt" sz="half" idx="10"/>
-          </p:nvPr>
-        </p:nvSpPr>
-        <p:spPr/>
-        <p:txBody>
-          <a:bodyPr/>
-          <a:lstStyle/>
-          <a:p>
-            <a:r>
-              <a:rPr lang="de-CH" sz="1000"/>
-              <a:t>August 2023, CC BY-SA 4.0</a:t>
-            </a:r>
-            <a:endParaRPr lang="en-US" sz="1000" dirty="0"/>
-          </a:p>
-        </p:txBody>
-      </p:sp>
-      <p:sp>
-        <p:nvSpPr>
-          <p:cNvPr id="5" name="Footer Placeholder 4">
-            <a:extLst>
-              <a:ext uri="{FF2B5EF4-FFF2-40B4-BE49-F238E27FC236}">
-                <a16:creationId xmlns:a16="http://schemas.microsoft.com/office/drawing/2014/main" id="{3453E2C3-64E5-E44E-8FAB-45D4F29AD119}"/>
-              </a:ext>
-            </a:extLst>
-          </p:cNvPr>
-          <p:cNvSpPr>
-            <a:spLocks noGrp="1"/>
-          </p:cNvSpPr>
-          <p:nvPr>
-            <p:ph type="ftr" sz="quarter" idx="11"/>
-          </p:nvPr>
-        </p:nvSpPr>
-        <p:spPr/>
-        <p:txBody>
-          <a:bodyPr/>
-          <a:lstStyle/>
-          <a:p>
-            <a:r>
-              <a:rPr lang="en-US"/>
-              <a:t>Continuous integration, v4.0</a:t>
-            </a:r>
-            <a:endParaRPr lang="en-US" dirty="0"/>
-          </a:p>
-        </p:txBody>
-      </p:sp>
-      <p:pic>
-        <p:nvPicPr>
-          <p:cNvPr id="6" name="Picture 5">
-            <a:extLst>
-              <a:ext uri="{FF2B5EF4-FFF2-40B4-BE49-F238E27FC236}">
-                <a16:creationId xmlns:a16="http://schemas.microsoft.com/office/drawing/2014/main" id="{6160D76E-090E-DD4A-92D3-5E3DA427B157}"/>
-              </a:ext>
-            </a:extLst>
-          </p:cNvPr>
-          <p:cNvPicPr>
-            <a:picLocks noChangeAspect="1"/>
-          </p:cNvPicPr>
-          <p:nvPr/>
-        </p:nvPicPr>
-        <p:blipFill>
-          <a:blip r:embed="rId2"/>
-          <a:stretch>
-            <a:fillRect/>
-          </a:stretch>
-        </p:blipFill>
-        <p:spPr>
-          <a:xfrm>
-            <a:off x="3143672" y="3789040"/>
-            <a:ext cx="5643482" cy="1800200"/>
-          </a:xfrm>
-          <a:prstGeom prst="rect">
-            <a:avLst/>
-          </a:prstGeom>
-        </p:spPr>
-      </p:pic>
-      <p:sp>
-        <p:nvSpPr>
-          <p:cNvPr id="7" name="Slide Number Placeholder 6">
-            <a:extLst>
-              <a:ext uri="{FF2B5EF4-FFF2-40B4-BE49-F238E27FC236}">
-                <a16:creationId xmlns:a16="http://schemas.microsoft.com/office/drawing/2014/main" id="{3F872150-F1C8-D16D-5401-B703854D69D1}"/>
-              </a:ext>
-            </a:extLst>
-          </p:cNvPr>
-          <p:cNvSpPr>
-            <a:spLocks noGrp="1"/>
-          </p:cNvSpPr>
-          <p:nvPr>
-            <p:ph type="sldNum" sz="quarter" idx="12"/>
-          </p:nvPr>
-        </p:nvSpPr>
-        <p:spPr/>
-        <p:txBody>
-          <a:bodyPr/>
-          <a:lstStyle/>
-          <a:p>
-            <a:fld id="{EF79ADEA-B933-47CC-A4E9-04E6298B917C}" type="slidenum">
-              <a:rPr lang="en-US" smtClean="0"/>
-              <a:pPr/>
-              <a:t>23</a:t>
-            </a:fld>
-            <a:endParaRPr lang="en-US"/>
-          </a:p>
-        </p:txBody>
-      </p:sp>
-    </p:spTree>
-    <p:extLst>
-      <p:ext uri="{BB962C8B-B14F-4D97-AF65-F5344CB8AC3E}">
-        <p14:creationId xmlns:p14="http://schemas.microsoft.com/office/powerpoint/2010/main" val="2375245855"/>
       </p:ext>
     </p:extLst>
   </p:cSld>
@@ -9451,7 +9307,7 @@
           <p:cNvPr id="2" name="Title 1">
             <a:extLst>
               <a:ext uri="{FF2B5EF4-FFF2-40B4-BE49-F238E27FC236}">
-                <a16:creationId xmlns:a16="http://schemas.microsoft.com/office/drawing/2014/main" id="{D85EDF41-0FBB-5548-8206-29D15F1E1334}"/>
+                <a16:creationId xmlns:a16="http://schemas.microsoft.com/office/drawing/2014/main" id="{061016C8-512C-EB4B-9D32-9CF4CB9D4F11}"/>
               </a:ext>
             </a:extLst>
           </p:cNvPr>
@@ -9473,12 +9329,9 @@
             </a:r>
             <a:r>
               <a:rPr lang="en-CH"/>
-              <a:t>Examples </a:t>
-            </a:r>
-            <a:r>
-              <a:rPr lang="en-CH" dirty="0"/>
-              <a:t>of handling secrets</a:t>
-            </a:r>
+              <a:t>Security</a:t>
+            </a:r>
+            <a:endParaRPr lang="en-CH" dirty="0"/>
           </a:p>
         </p:txBody>
       </p:sp>
@@ -9487,7 +9340,7 @@
           <p:cNvPr id="3" name="Content Placeholder 2">
             <a:extLst>
               <a:ext uri="{FF2B5EF4-FFF2-40B4-BE49-F238E27FC236}">
-                <a16:creationId xmlns:a16="http://schemas.microsoft.com/office/drawing/2014/main" id="{BB2C67C3-32BF-C441-8A6B-23796F786C85}"/>
+                <a16:creationId xmlns:a16="http://schemas.microsoft.com/office/drawing/2014/main" id="{463079FE-7331-C647-815D-07795DC7ED3D}"/>
               </a:ext>
             </a:extLst>
           </p:cNvPr>
@@ -9500,8 +9353,8 @@
         </p:nvSpPr>
         <p:spPr>
           <a:xfrm>
-            <a:off x="1981200" y="5318720"/>
-            <a:ext cx="8229600" cy="990600"/>
+            <a:off x="1981200" y="1412776"/>
+            <a:ext cx="8229600" cy="4744184"/>
           </a:xfrm>
         </p:spPr>
         <p:txBody>
@@ -9510,37 +9363,63 @@
           </a:bodyPr>
           <a:lstStyle/>
           <a:p>
-            <a:pPr marL="0" indent="0">
-              <a:buNone/>
-            </a:pPr>
+            <a:r>
+              <a:rPr lang="en-CH"/>
+              <a:t>Secrets </a:t>
+            </a:r>
             <a:r>
               <a:rPr lang="en-CH" dirty="0"/>
-              <a:t>Details available at</a:t>
+              <a:t>in GitHub actions can be added </a:t>
+            </a:r>
+            <a:r>
+              <a:rPr lang="en-CH"/>
+              <a:t>under </a:t>
+            </a:r>
+            <a:br>
+              <a:rPr lang="de-DE" dirty="0"/>
+            </a:br>
+            <a:r>
+              <a:rPr lang="en-CH">
+                <a:latin typeface="Courier New" panose="02070309020205020404" pitchFamily="49" charset="0"/>
+                <a:cs typeface="Courier New" panose="02070309020205020404" pitchFamily="49" charset="0"/>
+              </a:rPr>
+              <a:t>Settings </a:t>
+            </a:r>
+            <a:r>
+              <a:rPr lang="de-DE" dirty="0">
+                <a:latin typeface="Courier New" panose="02070309020205020404" pitchFamily="49" charset="0"/>
+                <a:cs typeface="Courier New" panose="02070309020205020404" pitchFamily="49" charset="0"/>
+              </a:rPr>
+              <a:t>-</a:t>
+            </a:r>
+            <a:r>
+              <a:rPr lang="en-CH">
+                <a:latin typeface="Courier New" panose="02070309020205020404" pitchFamily="49" charset="0"/>
+                <a:cs typeface="Courier New" panose="02070309020205020404" pitchFamily="49" charset="0"/>
+              </a:rPr>
+              <a:t>&gt; </a:t>
+            </a:r>
+            <a:r>
+              <a:rPr lang="en-CH" dirty="0">
+                <a:latin typeface="Courier New" panose="02070309020205020404" pitchFamily="49" charset="0"/>
+                <a:cs typeface="Courier New" panose="02070309020205020404" pitchFamily="49" charset="0"/>
+              </a:rPr>
+              <a:t>Secrets</a:t>
+            </a:r>
+            <a:r>
+              <a:rPr lang="en-CH" dirty="0"/>
+              <a:t>.  The secret is stored encrypted by GitHub, and decrypted at the moment of running the workflow</a:t>
+            </a:r>
+          </a:p>
+          <a:p>
+            <a:r>
+              <a:rPr lang="en-CH" dirty="0"/>
+              <a:t>Secrets can then be referred to in the workflow as</a:t>
             </a:r>
             <a:br>
               <a:rPr lang="en-CH" dirty="0"/>
             </a:br>
-            <a:r>
-              <a:rPr lang="en-US" sz="1800" dirty="0">
-                <a:latin typeface="Courier New" panose="02070309020205020404" pitchFamily="49" charset="0"/>
-                <a:cs typeface="Courier New" panose="02070309020205020404" pitchFamily="49" charset="0"/>
-                <a:hlinkClick r:id="rId2"/>
-              </a:rPr>
-              <a:t>https://docs.github.com/en/actions/reference/encrypted-secrets</a:t>
-            </a:r>
-            <a:endParaRPr lang="en-US" sz="1800" dirty="0">
-              <a:latin typeface="Courier New" panose="02070309020205020404" pitchFamily="49" charset="0"/>
-              <a:cs typeface="Courier New" panose="02070309020205020404" pitchFamily="49" charset="0"/>
-            </a:endParaRPr>
-          </a:p>
-          <a:p>
-            <a:pPr marL="0" indent="0">
-              <a:buNone/>
-            </a:pPr>
-            <a:endParaRPr lang="en-CH" dirty="0">
-              <a:latin typeface="Courier New" panose="02070309020205020404" pitchFamily="49" charset="0"/>
-              <a:cs typeface="Courier New" panose="02070309020205020404" pitchFamily="49" charset="0"/>
-            </a:endParaRPr>
+            <a:endParaRPr lang="en-CH" dirty="0"/>
           </a:p>
         </p:txBody>
       </p:sp>
@@ -9549,7 +9428,7 @@
           <p:cNvPr id="4" name="Date Placeholder 3">
             <a:extLst>
               <a:ext uri="{FF2B5EF4-FFF2-40B4-BE49-F238E27FC236}">
-                <a16:creationId xmlns:a16="http://schemas.microsoft.com/office/drawing/2014/main" id="{EFDE6383-63B8-0F40-A2F9-3C9190716F80}"/>
+                <a16:creationId xmlns:a16="http://schemas.microsoft.com/office/drawing/2014/main" id="{9EE323CB-7E09-7C4F-B160-F4B2E2E319F3}"/>
               </a:ext>
             </a:extLst>
           </p:cNvPr>
@@ -9578,7 +9457,7 @@
           <p:cNvPr id="5" name="Footer Placeholder 4">
             <a:extLst>
               <a:ext uri="{FF2B5EF4-FFF2-40B4-BE49-F238E27FC236}">
-                <a16:creationId xmlns:a16="http://schemas.microsoft.com/office/drawing/2014/main" id="{33A31BB0-4A2A-6C47-9EAA-F64406BF1A82}"/>
+                <a16:creationId xmlns:a16="http://schemas.microsoft.com/office/drawing/2014/main" id="{3453E2C3-64E5-E44E-8FAB-45D4F29AD119}"/>
               </a:ext>
             </a:extLst>
           </p:cNvPr>
@@ -9602,228 +9481,42 @@
           </a:p>
         </p:txBody>
       </p:sp>
-      <p:sp>
-        <p:nvSpPr>
-          <p:cNvPr id="7" name="TextBox 6">
-            <a:extLst>
-              <a:ext uri="{FF2B5EF4-FFF2-40B4-BE49-F238E27FC236}">
-                <a16:creationId xmlns:a16="http://schemas.microsoft.com/office/drawing/2014/main" id="{039746D5-6BF5-384F-93EB-C12A9E07EB20}"/>
-              </a:ext>
-            </a:extLst>
-          </p:cNvPr>
-          <p:cNvSpPr txBox="1"/>
+      <p:pic>
+        <p:nvPicPr>
+          <p:cNvPr id="6" name="Picture 5">
+            <a:extLst>
+              <a:ext uri="{FF2B5EF4-FFF2-40B4-BE49-F238E27FC236}">
+                <a16:creationId xmlns:a16="http://schemas.microsoft.com/office/drawing/2014/main" id="{6160D76E-090E-DD4A-92D3-5E3DA427B157}"/>
+              </a:ext>
+            </a:extLst>
+          </p:cNvPr>
+          <p:cNvPicPr>
+            <a:picLocks noChangeAspect="1"/>
+          </p:cNvPicPr>
           <p:nvPr/>
-        </p:nvSpPr>
+        </p:nvPicPr>
+        <p:blipFill>
+          <a:blip r:embed="rId2"/>
+          <a:stretch>
+            <a:fillRect/>
+          </a:stretch>
+        </p:blipFill>
         <p:spPr>
           <a:xfrm>
-            <a:off x="1981200" y="1268760"/>
-            <a:ext cx="6563072" cy="3970318"/>
+            <a:off x="3143672" y="3789040"/>
+            <a:ext cx="5643482" cy="1800200"/>
           </a:xfrm>
           <a:prstGeom prst="rect">
             <a:avLst/>
           </a:prstGeom>
-          <a:solidFill>
-            <a:schemeClr val="bg1"/>
-          </a:solidFill>
         </p:spPr>
-        <p:txBody>
-          <a:bodyPr wrap="square" rtlCol="0">
-            <a:spAutoFit/>
-          </a:bodyPr>
-          <a:lstStyle/>
-          <a:p>
-            <a:r>
-              <a:rPr lang="en-US" sz="1200" dirty="0">
-                <a:latin typeface="Courier New" panose="02070309020205020404" pitchFamily="49" charset="0"/>
-                <a:cs typeface="Courier New" panose="02070309020205020404" pitchFamily="49" charset="0"/>
-              </a:rPr>
-              <a:t>name: Reveal a secret when the repository is tagged as something starting by secret</a:t>
-            </a:r>
-          </a:p>
-          <a:p>
-            <a:endParaRPr lang="en-US" sz="1200" dirty="0">
-              <a:latin typeface="Courier New" panose="02070309020205020404" pitchFamily="49" charset="0"/>
-              <a:cs typeface="Courier New" panose="02070309020205020404" pitchFamily="49" charset="0"/>
-            </a:endParaRPr>
-          </a:p>
-          <a:p>
-            <a:r>
-              <a:rPr lang="en-US" sz="1200" dirty="0">
-                <a:latin typeface="Courier New" panose="02070309020205020404" pitchFamily="49" charset="0"/>
-                <a:cs typeface="Courier New" panose="02070309020205020404" pitchFamily="49" charset="0"/>
-              </a:rPr>
-              <a:t>on:</a:t>
-            </a:r>
-          </a:p>
-          <a:p>
-            <a:r>
-              <a:rPr lang="en-US" sz="1200" dirty="0">
-                <a:latin typeface="Courier New" panose="02070309020205020404" pitchFamily="49" charset="0"/>
-                <a:cs typeface="Courier New" panose="02070309020205020404" pitchFamily="49" charset="0"/>
-              </a:rPr>
-              <a:t>  push:</a:t>
-            </a:r>
-          </a:p>
-          <a:p>
-            <a:r>
-              <a:rPr lang="en-US" sz="1200" dirty="0">
-                <a:latin typeface="Courier New" panose="02070309020205020404" pitchFamily="49" charset="0"/>
-                <a:cs typeface="Courier New" panose="02070309020205020404" pitchFamily="49" charset="0"/>
-              </a:rPr>
-              <a:t>    tags:</a:t>
-            </a:r>
-          </a:p>
-          <a:p>
-            <a:r>
-              <a:rPr lang="en-US" sz="1200" dirty="0">
-                <a:latin typeface="Courier New" panose="02070309020205020404" pitchFamily="49" charset="0"/>
-                <a:cs typeface="Courier New" panose="02070309020205020404" pitchFamily="49" charset="0"/>
-              </a:rPr>
-              <a:t>      - 'secret*'</a:t>
-            </a:r>
-          </a:p>
-          <a:p>
-            <a:endParaRPr lang="en-US" sz="1200" dirty="0">
-              <a:latin typeface="Courier New" panose="02070309020205020404" pitchFamily="49" charset="0"/>
-              <a:cs typeface="Courier New" panose="02070309020205020404" pitchFamily="49" charset="0"/>
-            </a:endParaRPr>
-          </a:p>
-          <a:p>
-            <a:r>
-              <a:rPr lang="en-US" sz="1200" dirty="0">
-                <a:latin typeface="Courier New" panose="02070309020205020404" pitchFamily="49" charset="0"/>
-                <a:cs typeface="Courier New" panose="02070309020205020404" pitchFamily="49" charset="0"/>
-              </a:rPr>
-              <a:t>jobs:</a:t>
-            </a:r>
-          </a:p>
-          <a:p>
-            <a:r>
-              <a:rPr lang="en-US" sz="1200" dirty="0">
-                <a:latin typeface="Courier New" panose="02070309020205020404" pitchFamily="49" charset="0"/>
-                <a:cs typeface="Courier New" panose="02070309020205020404" pitchFamily="49" charset="0"/>
-              </a:rPr>
-              <a:t>  reveal-secret:</a:t>
-            </a:r>
-          </a:p>
-          <a:p>
-            <a:r>
-              <a:rPr lang="en-US" sz="1200" dirty="0">
-                <a:latin typeface="Courier New" panose="02070309020205020404" pitchFamily="49" charset="0"/>
-                <a:cs typeface="Courier New" panose="02070309020205020404" pitchFamily="49" charset="0"/>
-              </a:rPr>
-              <a:t>    runs-on: ubuntu-latest</a:t>
-            </a:r>
-          </a:p>
-          <a:p>
-            <a:endParaRPr lang="en-US" sz="1200" dirty="0">
-              <a:latin typeface="Courier New" panose="02070309020205020404" pitchFamily="49" charset="0"/>
-              <a:cs typeface="Courier New" panose="02070309020205020404" pitchFamily="49" charset="0"/>
-            </a:endParaRPr>
-          </a:p>
-          <a:p>
-            <a:r>
-              <a:rPr lang="en-US" sz="1200" dirty="0">
-                <a:latin typeface="Courier New" panose="02070309020205020404" pitchFamily="49" charset="0"/>
-                <a:cs typeface="Courier New" panose="02070309020205020404" pitchFamily="49" charset="0"/>
-              </a:rPr>
-              <a:t>    steps:</a:t>
-            </a:r>
-          </a:p>
-          <a:p>
-            <a:r>
-              <a:rPr lang="en-US" sz="1200" dirty="0">
-                <a:latin typeface="Courier New" panose="02070309020205020404" pitchFamily="49" charset="0"/>
-                <a:cs typeface="Courier New" panose="02070309020205020404" pitchFamily="49" charset="0"/>
-              </a:rPr>
-              <a:t>    - shell: bash</a:t>
-            </a:r>
-          </a:p>
-          <a:p>
-            <a:r>
-              <a:rPr lang="en-US" sz="1200" dirty="0">
-                <a:latin typeface="Courier New" panose="02070309020205020404" pitchFamily="49" charset="0"/>
-                <a:cs typeface="Courier New" panose="02070309020205020404" pitchFamily="49" charset="0"/>
-              </a:rPr>
-              <a:t>      env:</a:t>
-            </a:r>
-          </a:p>
-          <a:p>
-            <a:r>
-              <a:rPr lang="en-US" sz="1200" dirty="0">
-                <a:latin typeface="Courier New" panose="02070309020205020404" pitchFamily="49" charset="0"/>
-                <a:cs typeface="Courier New" panose="02070309020205020404" pitchFamily="49" charset="0"/>
-              </a:rPr>
-              <a:t>        SECRET_MSG: ${{ </a:t>
-            </a:r>
-            <a:r>
-              <a:rPr lang="en-US" sz="1200" dirty="0" err="1">
-                <a:latin typeface="Courier New" panose="02070309020205020404" pitchFamily="49" charset="0"/>
-                <a:cs typeface="Courier New" panose="02070309020205020404" pitchFamily="49" charset="0"/>
-              </a:rPr>
-              <a:t>secrets.TOP_SECRET</a:t>
-            </a:r>
-            <a:r>
-              <a:rPr lang="en-US" sz="1200" dirty="0">
-                <a:latin typeface="Courier New" panose="02070309020205020404" pitchFamily="49" charset="0"/>
-                <a:cs typeface="Courier New" panose="02070309020205020404" pitchFamily="49" charset="0"/>
-              </a:rPr>
-              <a:t> }}</a:t>
-            </a:r>
-          </a:p>
-          <a:p>
-            <a:r>
-              <a:rPr lang="en-US" sz="1200" dirty="0">
-                <a:latin typeface="Courier New" panose="02070309020205020404" pitchFamily="49" charset="0"/>
-                <a:cs typeface="Courier New" panose="02070309020205020404" pitchFamily="49" charset="0"/>
-              </a:rPr>
-              <a:t>      run: |</a:t>
-            </a:r>
-          </a:p>
-          <a:p>
-            <a:r>
-              <a:rPr lang="en-US" sz="1200" dirty="0">
-                <a:latin typeface="Courier New" panose="02070309020205020404" pitchFamily="49" charset="0"/>
-                <a:cs typeface="Courier New" panose="02070309020205020404" pitchFamily="49" charset="0"/>
-              </a:rPr>
-              <a:t>        echo The secret is "$SECRET_MSG"</a:t>
-            </a:r>
-          </a:p>
-          <a:p>
-            <a:r>
-              <a:rPr lang="en-US" sz="1200" dirty="0">
-                <a:latin typeface="Courier New" panose="02070309020205020404" pitchFamily="49" charset="0"/>
-                <a:cs typeface="Courier New" panose="02070309020205020404" pitchFamily="49" charset="0"/>
-              </a:rPr>
-              <a:t>        if [ "$SECRET_MSG" = 'do not tell anyone' ]; then</a:t>
-            </a:r>
-          </a:p>
-          <a:p>
-            <a:r>
-              <a:rPr lang="en-US" sz="1200" dirty="0">
-                <a:latin typeface="Courier New" panose="02070309020205020404" pitchFamily="49" charset="0"/>
-                <a:cs typeface="Courier New" panose="02070309020205020404" pitchFamily="49" charset="0"/>
-              </a:rPr>
-              <a:t>          echo matches</a:t>
-            </a:r>
-          </a:p>
-          <a:p>
-            <a:r>
-              <a:rPr lang="en-US" sz="1200" dirty="0">
-                <a:latin typeface="Courier New" panose="02070309020205020404" pitchFamily="49" charset="0"/>
-                <a:cs typeface="Courier New" panose="02070309020205020404" pitchFamily="49" charset="0"/>
-              </a:rPr>
-              <a:t>        fi</a:t>
-            </a:r>
-          </a:p>
-        </p:txBody>
-      </p:sp>
-      <p:sp>
-        <p:nvSpPr>
-          <p:cNvPr id="6" name="Slide Number Placeholder 5">
-            <a:extLst>
-              <a:ext uri="{FF2B5EF4-FFF2-40B4-BE49-F238E27FC236}">
-                <a16:creationId xmlns:a16="http://schemas.microsoft.com/office/drawing/2014/main" id="{B7EEEE8A-D92F-4E52-5C1B-81AA2CFE3D6A}"/>
+      </p:pic>
+      <p:sp>
+        <p:nvSpPr>
+          <p:cNvPr id="7" name="Slide Number Placeholder 6">
+            <a:extLst>
+              <a:ext uri="{FF2B5EF4-FFF2-40B4-BE49-F238E27FC236}">
+                <a16:creationId xmlns:a16="http://schemas.microsoft.com/office/drawing/2014/main" id="{3F872150-F1C8-D16D-5401-B703854D69D1}"/>
               </a:ext>
             </a:extLst>
           </p:cNvPr>
@@ -9851,7 +9544,7 @@
     </p:spTree>
     <p:extLst>
       <p:ext uri="{BB962C8B-B14F-4D97-AF65-F5344CB8AC3E}">
-        <p14:creationId xmlns:p14="http://schemas.microsoft.com/office/powerpoint/2010/main" val="2944273705"/>
+        <p14:creationId xmlns:p14="http://schemas.microsoft.com/office/powerpoint/2010/main" val="2375245855"/>
       </p:ext>
     </p:extLst>
   </p:cSld>
@@ -9880,7 +9573,111 @@
       </p:grpSpPr>
       <p:sp>
         <p:nvSpPr>
-          <p:cNvPr id="2" name="Date Placeholder 1"/>
+          <p:cNvPr id="2" name="Title 1">
+            <a:extLst>
+              <a:ext uri="{FF2B5EF4-FFF2-40B4-BE49-F238E27FC236}">
+                <a16:creationId xmlns:a16="http://schemas.microsoft.com/office/drawing/2014/main" id="{D85EDF41-0FBB-5548-8206-29D15F1E1334}"/>
+              </a:ext>
+            </a:extLst>
+          </p:cNvPr>
+          <p:cNvSpPr>
+            <a:spLocks noGrp="1"/>
+          </p:cNvSpPr>
+          <p:nvPr>
+            <p:ph type="title"/>
+          </p:nvPr>
+        </p:nvSpPr>
+        <p:spPr/>
+        <p:txBody>
+          <a:bodyPr/>
+          <a:lstStyle/>
+          <a:p>
+            <a:r>
+              <a:rPr lang="de-DE" dirty="0"/>
+              <a:t>Bonus: </a:t>
+            </a:r>
+            <a:r>
+              <a:rPr lang="en-CH"/>
+              <a:t>Examples </a:t>
+            </a:r>
+            <a:r>
+              <a:rPr lang="en-CH" dirty="0"/>
+              <a:t>of handling secrets</a:t>
+            </a:r>
+          </a:p>
+        </p:txBody>
+      </p:sp>
+      <p:sp>
+        <p:nvSpPr>
+          <p:cNvPr id="3" name="Content Placeholder 2">
+            <a:extLst>
+              <a:ext uri="{FF2B5EF4-FFF2-40B4-BE49-F238E27FC236}">
+                <a16:creationId xmlns:a16="http://schemas.microsoft.com/office/drawing/2014/main" id="{BB2C67C3-32BF-C441-8A6B-23796F786C85}"/>
+              </a:ext>
+            </a:extLst>
+          </p:cNvPr>
+          <p:cNvSpPr>
+            <a:spLocks noGrp="1"/>
+          </p:cNvSpPr>
+          <p:nvPr>
+            <p:ph idx="1"/>
+          </p:nvPr>
+        </p:nvSpPr>
+        <p:spPr>
+          <a:xfrm>
+            <a:off x="1981200" y="5318720"/>
+            <a:ext cx="8229600" cy="990600"/>
+          </a:xfrm>
+        </p:spPr>
+        <p:txBody>
+          <a:bodyPr>
+            <a:normAutofit/>
+          </a:bodyPr>
+          <a:lstStyle/>
+          <a:p>
+            <a:pPr marL="0" indent="0">
+              <a:buNone/>
+            </a:pPr>
+            <a:r>
+              <a:rPr lang="en-CH" dirty="0"/>
+              <a:t>Details available at</a:t>
+            </a:r>
+            <a:br>
+              <a:rPr lang="en-CH" dirty="0"/>
+            </a:br>
+            <a:r>
+              <a:rPr lang="en-US" sz="1800" dirty="0">
+                <a:latin typeface="Courier New" panose="02070309020205020404" pitchFamily="49" charset="0"/>
+                <a:cs typeface="Courier New" panose="02070309020205020404" pitchFamily="49" charset="0"/>
+                <a:hlinkClick r:id="rId2"/>
+              </a:rPr>
+              <a:t>https://docs.github.com/en/actions/reference/encrypted-secrets</a:t>
+            </a:r>
+            <a:endParaRPr lang="en-US" sz="1800" dirty="0">
+              <a:latin typeface="Courier New" panose="02070309020205020404" pitchFamily="49" charset="0"/>
+              <a:cs typeface="Courier New" panose="02070309020205020404" pitchFamily="49" charset="0"/>
+            </a:endParaRPr>
+          </a:p>
+          <a:p>
+            <a:pPr marL="0" indent="0">
+              <a:buNone/>
+            </a:pPr>
+            <a:endParaRPr lang="en-CH" dirty="0">
+              <a:latin typeface="Courier New" panose="02070309020205020404" pitchFamily="49" charset="0"/>
+              <a:cs typeface="Courier New" panose="02070309020205020404" pitchFamily="49" charset="0"/>
+            </a:endParaRPr>
+          </a:p>
+        </p:txBody>
+      </p:sp>
+      <p:sp>
+        <p:nvSpPr>
+          <p:cNvPr id="4" name="Date Placeholder 3">
+            <a:extLst>
+              <a:ext uri="{FF2B5EF4-FFF2-40B4-BE49-F238E27FC236}">
+                <a16:creationId xmlns:a16="http://schemas.microsoft.com/office/drawing/2014/main" id="{EFDE6383-63B8-0F40-A2F9-3C9190716F80}"/>
+              </a:ext>
+            </a:extLst>
+          </p:cNvPr>
           <p:cNvSpPr>
             <a:spLocks noGrp="1"/>
           </p:cNvSpPr>
@@ -9894,16 +9691,22 @@
           <a:lstStyle/>
           <a:p>
             <a:r>
-              <a:rPr lang="de-CH"/>
+              <a:rPr lang="de-CH" sz="1000"/>
               <a:t>August 2023, CC BY-SA 4.0</a:t>
             </a:r>
-            <a:endParaRPr lang="en-US"/>
-          </a:p>
-        </p:txBody>
-      </p:sp>
-      <p:sp>
-        <p:nvSpPr>
-          <p:cNvPr id="3" name="Footer Placeholder 2"/>
+            <a:endParaRPr lang="en-US" sz="1000" dirty="0"/>
+          </a:p>
+        </p:txBody>
+      </p:sp>
+      <p:sp>
+        <p:nvSpPr>
+          <p:cNvPr id="5" name="Footer Placeholder 4">
+            <a:extLst>
+              <a:ext uri="{FF2B5EF4-FFF2-40B4-BE49-F238E27FC236}">
+                <a16:creationId xmlns:a16="http://schemas.microsoft.com/office/drawing/2014/main" id="{33A31BB0-4A2A-6C47-9EAA-F64406BF1A82}"/>
+              </a:ext>
+            </a:extLst>
+          </p:cNvPr>
           <p:cNvSpPr>
             <a:spLocks noGrp="1"/>
           </p:cNvSpPr>
@@ -9920,15 +9723,232 @@
               <a:rPr lang="en-US"/>
               <a:t>Continuous integration, v4.0</a:t>
             </a:r>
-          </a:p>
-        </p:txBody>
-      </p:sp>
-      <p:sp>
-        <p:nvSpPr>
-          <p:cNvPr id="4" name="Slide Number Placeholder 3">
-            <a:extLst>
-              <a:ext uri="{FF2B5EF4-FFF2-40B4-BE49-F238E27FC236}">
-                <a16:creationId xmlns:a16="http://schemas.microsoft.com/office/drawing/2014/main" id="{681DCCF7-2560-B7FD-A1B3-CA321B59FEB7}"/>
+            <a:endParaRPr lang="en-US" dirty="0"/>
+          </a:p>
+        </p:txBody>
+      </p:sp>
+      <p:sp>
+        <p:nvSpPr>
+          <p:cNvPr id="7" name="TextBox 6">
+            <a:extLst>
+              <a:ext uri="{FF2B5EF4-FFF2-40B4-BE49-F238E27FC236}">
+                <a16:creationId xmlns:a16="http://schemas.microsoft.com/office/drawing/2014/main" id="{039746D5-6BF5-384F-93EB-C12A9E07EB20}"/>
+              </a:ext>
+            </a:extLst>
+          </p:cNvPr>
+          <p:cNvSpPr txBox="1"/>
+          <p:nvPr/>
+        </p:nvSpPr>
+        <p:spPr>
+          <a:xfrm>
+            <a:off x="1981200" y="1268760"/>
+            <a:ext cx="6563072" cy="3970318"/>
+          </a:xfrm>
+          <a:prstGeom prst="rect">
+            <a:avLst/>
+          </a:prstGeom>
+          <a:solidFill>
+            <a:schemeClr val="bg1"/>
+          </a:solidFill>
+        </p:spPr>
+        <p:txBody>
+          <a:bodyPr wrap="square" rtlCol="0">
+            <a:spAutoFit/>
+          </a:bodyPr>
+          <a:lstStyle/>
+          <a:p>
+            <a:r>
+              <a:rPr lang="en-US" sz="1200" dirty="0">
+                <a:latin typeface="Courier New" panose="02070309020205020404" pitchFamily="49" charset="0"/>
+                <a:cs typeface="Courier New" panose="02070309020205020404" pitchFamily="49" charset="0"/>
+              </a:rPr>
+              <a:t>name: Reveal a secret when the repository is tagged as something starting by secret</a:t>
+            </a:r>
+          </a:p>
+          <a:p>
+            <a:endParaRPr lang="en-US" sz="1200" dirty="0">
+              <a:latin typeface="Courier New" panose="02070309020205020404" pitchFamily="49" charset="0"/>
+              <a:cs typeface="Courier New" panose="02070309020205020404" pitchFamily="49" charset="0"/>
+            </a:endParaRPr>
+          </a:p>
+          <a:p>
+            <a:r>
+              <a:rPr lang="en-US" sz="1200" dirty="0">
+                <a:latin typeface="Courier New" panose="02070309020205020404" pitchFamily="49" charset="0"/>
+                <a:cs typeface="Courier New" panose="02070309020205020404" pitchFamily="49" charset="0"/>
+              </a:rPr>
+              <a:t>on:</a:t>
+            </a:r>
+          </a:p>
+          <a:p>
+            <a:r>
+              <a:rPr lang="en-US" sz="1200" dirty="0">
+                <a:latin typeface="Courier New" panose="02070309020205020404" pitchFamily="49" charset="0"/>
+                <a:cs typeface="Courier New" panose="02070309020205020404" pitchFamily="49" charset="0"/>
+              </a:rPr>
+              <a:t>  push:</a:t>
+            </a:r>
+          </a:p>
+          <a:p>
+            <a:r>
+              <a:rPr lang="en-US" sz="1200" dirty="0">
+                <a:latin typeface="Courier New" panose="02070309020205020404" pitchFamily="49" charset="0"/>
+                <a:cs typeface="Courier New" panose="02070309020205020404" pitchFamily="49" charset="0"/>
+              </a:rPr>
+              <a:t>    tags:</a:t>
+            </a:r>
+          </a:p>
+          <a:p>
+            <a:r>
+              <a:rPr lang="en-US" sz="1200" dirty="0">
+                <a:latin typeface="Courier New" panose="02070309020205020404" pitchFamily="49" charset="0"/>
+                <a:cs typeface="Courier New" panose="02070309020205020404" pitchFamily="49" charset="0"/>
+              </a:rPr>
+              <a:t>      - 'secret*'</a:t>
+            </a:r>
+          </a:p>
+          <a:p>
+            <a:endParaRPr lang="en-US" sz="1200" dirty="0">
+              <a:latin typeface="Courier New" panose="02070309020205020404" pitchFamily="49" charset="0"/>
+              <a:cs typeface="Courier New" panose="02070309020205020404" pitchFamily="49" charset="0"/>
+            </a:endParaRPr>
+          </a:p>
+          <a:p>
+            <a:r>
+              <a:rPr lang="en-US" sz="1200" dirty="0">
+                <a:latin typeface="Courier New" panose="02070309020205020404" pitchFamily="49" charset="0"/>
+                <a:cs typeface="Courier New" panose="02070309020205020404" pitchFamily="49" charset="0"/>
+              </a:rPr>
+              <a:t>jobs:</a:t>
+            </a:r>
+          </a:p>
+          <a:p>
+            <a:r>
+              <a:rPr lang="en-US" sz="1200" dirty="0">
+                <a:latin typeface="Courier New" panose="02070309020205020404" pitchFamily="49" charset="0"/>
+                <a:cs typeface="Courier New" panose="02070309020205020404" pitchFamily="49" charset="0"/>
+              </a:rPr>
+              <a:t>  reveal-secret:</a:t>
+            </a:r>
+          </a:p>
+          <a:p>
+            <a:r>
+              <a:rPr lang="en-US" sz="1200" dirty="0">
+                <a:latin typeface="Courier New" panose="02070309020205020404" pitchFamily="49" charset="0"/>
+                <a:cs typeface="Courier New" panose="02070309020205020404" pitchFamily="49" charset="0"/>
+              </a:rPr>
+              <a:t>    runs-on: ubuntu-latest</a:t>
+            </a:r>
+          </a:p>
+          <a:p>
+            <a:endParaRPr lang="en-US" sz="1200" dirty="0">
+              <a:latin typeface="Courier New" panose="02070309020205020404" pitchFamily="49" charset="0"/>
+              <a:cs typeface="Courier New" panose="02070309020205020404" pitchFamily="49" charset="0"/>
+            </a:endParaRPr>
+          </a:p>
+          <a:p>
+            <a:r>
+              <a:rPr lang="en-US" sz="1200" dirty="0">
+                <a:latin typeface="Courier New" panose="02070309020205020404" pitchFamily="49" charset="0"/>
+                <a:cs typeface="Courier New" panose="02070309020205020404" pitchFamily="49" charset="0"/>
+              </a:rPr>
+              <a:t>    steps:</a:t>
+            </a:r>
+          </a:p>
+          <a:p>
+            <a:r>
+              <a:rPr lang="en-US" sz="1200" dirty="0">
+                <a:latin typeface="Courier New" panose="02070309020205020404" pitchFamily="49" charset="0"/>
+                <a:cs typeface="Courier New" panose="02070309020205020404" pitchFamily="49" charset="0"/>
+              </a:rPr>
+              <a:t>    - shell: bash</a:t>
+            </a:r>
+          </a:p>
+          <a:p>
+            <a:r>
+              <a:rPr lang="en-US" sz="1200" dirty="0">
+                <a:latin typeface="Courier New" panose="02070309020205020404" pitchFamily="49" charset="0"/>
+                <a:cs typeface="Courier New" panose="02070309020205020404" pitchFamily="49" charset="0"/>
+              </a:rPr>
+              <a:t>      env:</a:t>
+            </a:r>
+          </a:p>
+          <a:p>
+            <a:r>
+              <a:rPr lang="en-US" sz="1200" dirty="0">
+                <a:latin typeface="Courier New" panose="02070309020205020404" pitchFamily="49" charset="0"/>
+                <a:cs typeface="Courier New" panose="02070309020205020404" pitchFamily="49" charset="0"/>
+              </a:rPr>
+              <a:t>        SECRET_MSG: ${{ </a:t>
+            </a:r>
+            <a:r>
+              <a:rPr lang="en-US" sz="1200" dirty="0" err="1">
+                <a:latin typeface="Courier New" panose="02070309020205020404" pitchFamily="49" charset="0"/>
+                <a:cs typeface="Courier New" panose="02070309020205020404" pitchFamily="49" charset="0"/>
+              </a:rPr>
+              <a:t>secrets.TOP_SECRET</a:t>
+            </a:r>
+            <a:r>
+              <a:rPr lang="en-US" sz="1200" dirty="0">
+                <a:latin typeface="Courier New" panose="02070309020205020404" pitchFamily="49" charset="0"/>
+                <a:cs typeface="Courier New" panose="02070309020205020404" pitchFamily="49" charset="0"/>
+              </a:rPr>
+              <a:t> }}</a:t>
+            </a:r>
+          </a:p>
+          <a:p>
+            <a:r>
+              <a:rPr lang="en-US" sz="1200" dirty="0">
+                <a:latin typeface="Courier New" panose="02070309020205020404" pitchFamily="49" charset="0"/>
+                <a:cs typeface="Courier New" panose="02070309020205020404" pitchFamily="49" charset="0"/>
+              </a:rPr>
+              <a:t>      run: |</a:t>
+            </a:r>
+          </a:p>
+          <a:p>
+            <a:r>
+              <a:rPr lang="en-US" sz="1200" dirty="0">
+                <a:latin typeface="Courier New" panose="02070309020205020404" pitchFamily="49" charset="0"/>
+                <a:cs typeface="Courier New" panose="02070309020205020404" pitchFamily="49" charset="0"/>
+              </a:rPr>
+              <a:t>        echo The secret is "$SECRET_MSG"</a:t>
+            </a:r>
+          </a:p>
+          <a:p>
+            <a:r>
+              <a:rPr lang="en-US" sz="1200" dirty="0">
+                <a:latin typeface="Courier New" panose="02070309020205020404" pitchFamily="49" charset="0"/>
+                <a:cs typeface="Courier New" panose="02070309020205020404" pitchFamily="49" charset="0"/>
+              </a:rPr>
+              <a:t>        if [ "$SECRET_MSG" = 'do not tell anyone' ]; then</a:t>
+            </a:r>
+          </a:p>
+          <a:p>
+            <a:r>
+              <a:rPr lang="en-US" sz="1200" dirty="0">
+                <a:latin typeface="Courier New" panose="02070309020205020404" pitchFamily="49" charset="0"/>
+                <a:cs typeface="Courier New" panose="02070309020205020404" pitchFamily="49" charset="0"/>
+              </a:rPr>
+              <a:t>          echo matches</a:t>
+            </a:r>
+          </a:p>
+          <a:p>
+            <a:r>
+              <a:rPr lang="en-US" sz="1200" dirty="0">
+                <a:latin typeface="Courier New" panose="02070309020205020404" pitchFamily="49" charset="0"/>
+                <a:cs typeface="Courier New" panose="02070309020205020404" pitchFamily="49" charset="0"/>
+              </a:rPr>
+              <a:t>        fi</a:t>
+            </a:r>
+          </a:p>
+        </p:txBody>
+      </p:sp>
+      <p:sp>
+        <p:nvSpPr>
+          <p:cNvPr id="6" name="Slide Number Placeholder 5">
+            <a:extLst>
+              <a:ext uri="{FF2B5EF4-FFF2-40B4-BE49-F238E27FC236}">
+                <a16:creationId xmlns:a16="http://schemas.microsoft.com/office/drawing/2014/main" id="{B7EEEE8A-D92F-4E52-5C1B-81AA2CFE3D6A}"/>
               </a:ext>
             </a:extLst>
           </p:cNvPr>
@@ -9954,6 +9974,11 @@
         </p:txBody>
       </p:sp>
     </p:spTree>
+    <p:extLst>
+      <p:ext uri="{BB962C8B-B14F-4D97-AF65-F5344CB8AC3E}">
+        <p14:creationId xmlns:p14="http://schemas.microsoft.com/office/powerpoint/2010/main" val="2944273705"/>
+      </p:ext>
+    </p:extLst>
   </p:cSld>
   <p:clrMapOvr>
     <a:masterClrMapping/>
@@ -10482,66 +10507,79 @@
           <a:p>
             <a:r>
               <a:rPr lang="en-CH" b="1" dirty="0"/>
+              <a:t>Task 1: Run test when a PR is created</a:t>
+            </a:r>
+          </a:p>
+          <a:p>
+            <a:pPr lvl="1"/>
+            <a:r>
+              <a:rPr lang="en-CH" b="1" dirty="0"/>
               <a:t>Event trigger: </a:t>
             </a:r>
             <a:r>
               <a:rPr lang="en-CH" dirty="0"/>
-              <a:t>PR is created or a commit is pushed to master</a:t>
-            </a:r>
-            <a:br>
+              <a:t>PR is created</a:t>
+            </a:r>
+          </a:p>
+          <a:p>
+            <a:pPr lvl="1"/>
+            <a:r>
+              <a:rPr lang="en-CH" b="1" dirty="0"/>
+              <a:t>Action: </a:t>
+            </a:r>
+            <a:r>
               <a:rPr lang="en-CH" dirty="0"/>
-            </a:br>
+              <a:t>Run all tests for different Python versions</a:t>
+            </a:r>
+          </a:p>
+          <a:p>
+            <a:pPr marL="0" indent="0">
+              <a:buNone/>
+            </a:pPr>
+            <a:endParaRPr lang="en-CH" dirty="0"/>
+          </a:p>
+          <a:p>
             <a:r>
               <a:rPr lang="en-CH" b="1" dirty="0"/>
-              <a:t>Tasks:</a:t>
+              <a:t>Task 2: Release package when version is bumped</a:t>
             </a:r>
           </a:p>
           <a:p>
             <a:pPr lvl="1"/>
             <a:r>
-              <a:rPr lang="en-CH" dirty="0"/>
-              <a:t>Run all tests for different Python versions </a:t>
-            </a:r>
-          </a:p>
-          <a:p>
-            <a:pPr lvl="1"/>
-            <a:r>
-              <a:rPr lang="en-CH" dirty="0"/>
-              <a:t>(Verify code coverage)</a:t>
-            </a:r>
-          </a:p>
-          <a:p>
-            <a:pPr lvl="1"/>
-            <a:r>
-              <a:rPr lang="en-CH" dirty="0"/>
-              <a:t>(Check code style)</a:t>
-            </a:r>
-          </a:p>
-          <a:p>
-            <a:r>
               <a:rPr lang="en-CH" b="1" dirty="0"/>
-              <a:t>Event trigger:  </a:t>
+              <a:t>Event trigger: </a:t>
             </a:r>
             <a:r>
               <a:rPr lang="en-CH" dirty="0"/>
               <a:t>Version is bumped</a:t>
             </a:r>
-            <a:br>
-              <a:rPr lang="en-CH" dirty="0"/>
-            </a:br>
+          </a:p>
+          <a:p>
+            <a:pPr lvl="1"/>
             <a:r>
               <a:rPr lang="en-CH" b="1" dirty="0"/>
-              <a:t>Tasks:</a:t>
-            </a:r>
-          </a:p>
-          <a:p>
-            <a:pPr lvl="1"/>
+              <a:t>Action: </a:t>
+            </a:r>
             <a:r>
               <a:rPr lang="en-CH" dirty="0"/>
               <a:t>Create binary packages for Linux, Mac, Windows and upload them to a package repository</a:t>
             </a:r>
           </a:p>
           <a:p>
+            <a:pPr marL="0" indent="0">
+              <a:buNone/>
+            </a:pPr>
+            <a:endParaRPr lang="en-CH" b="1" dirty="0"/>
+          </a:p>
+          <a:p>
+            <a:r>
+              <a:rPr lang="en-CH" b="1" dirty="0"/>
+              <a:t>Task 3: Publish documentation on request</a:t>
+            </a:r>
+          </a:p>
+          <a:p>
+            <a:pPr lvl="1"/>
             <a:r>
               <a:rPr lang="en-CH" b="1" dirty="0"/>
               <a:t>Event trigger:</a:t>
@@ -10550,16 +10588,13 @@
               <a:rPr lang="en-CH" dirty="0"/>
               <a:t> Repository is tagged in a certain way</a:t>
             </a:r>
-            <a:br>
-              <a:rPr lang="en-CH" dirty="0"/>
-            </a:br>
+          </a:p>
+          <a:p>
+            <a:pPr lvl="1"/>
             <a:r>
               <a:rPr lang="en-CH" b="1" dirty="0"/>
-              <a:t>Tasks:</a:t>
-            </a:r>
-          </a:p>
-          <a:p>
-            <a:pPr lvl="1"/>
+              <a:t>Action: </a:t>
+            </a:r>
             <a:r>
               <a:rPr lang="en-CH" dirty="0"/>
               <a:t>Build and publish the documentation</a:t>
@@ -10657,7 +10692,7 @@
     </p:spTree>
     <p:extLst>
       <p:ext uri="{BB962C8B-B14F-4D97-AF65-F5344CB8AC3E}">
-        <p14:creationId xmlns:p14="http://schemas.microsoft.com/office/powerpoint/2010/main" val="3902177127"/>
+        <p14:creationId xmlns:p14="http://schemas.microsoft.com/office/powerpoint/2010/main" val="335450895"/>
       </p:ext>
     </p:extLst>
   </p:cSld>

</xml_diff>

<commit_message>
shortens the ci presentation
</commit_message>
<xml_diff>
--- a/continuous_integration.pptx
+++ b/continuous_integration.pptx
@@ -18,20 +18,20 @@
     <p:sldId id="477" r:id="rId6"/>
     <p:sldId id="306" r:id="rId7"/>
     <p:sldId id="318" r:id="rId8"/>
-    <p:sldId id="308" r:id="rId9"/>
-    <p:sldId id="312" r:id="rId10"/>
-    <p:sldId id="329" r:id="rId11"/>
-    <p:sldId id="324" r:id="rId12"/>
-    <p:sldId id="323" r:id="rId13"/>
-    <p:sldId id="313" r:id="rId14"/>
-    <p:sldId id="319" r:id="rId15"/>
-    <p:sldId id="325" r:id="rId16"/>
-    <p:sldId id="326" r:id="rId17"/>
-    <p:sldId id="327" r:id="rId18"/>
-    <p:sldId id="320" r:id="rId19"/>
-    <p:sldId id="322" r:id="rId20"/>
-    <p:sldId id="476" r:id="rId21"/>
-    <p:sldId id="288" r:id="rId22"/>
+    <p:sldId id="322" r:id="rId9"/>
+    <p:sldId id="476" r:id="rId10"/>
+    <p:sldId id="288" r:id="rId11"/>
+    <p:sldId id="308" r:id="rId12"/>
+    <p:sldId id="312" r:id="rId13"/>
+    <p:sldId id="329" r:id="rId14"/>
+    <p:sldId id="324" r:id="rId15"/>
+    <p:sldId id="323" r:id="rId16"/>
+    <p:sldId id="313" r:id="rId17"/>
+    <p:sldId id="319" r:id="rId18"/>
+    <p:sldId id="325" r:id="rId19"/>
+    <p:sldId id="326" r:id="rId20"/>
+    <p:sldId id="327" r:id="rId21"/>
+    <p:sldId id="320" r:id="rId22"/>
     <p:sldId id="298" r:id="rId23"/>
     <p:sldId id="328" r:id="rId24"/>
     <p:sldId id="307" r:id="rId25"/>
@@ -146,6 +146,9 @@
             <p14:sldId id="477"/>
             <p14:sldId id="306"/>
             <p14:sldId id="318"/>
+            <p14:sldId id="322"/>
+            <p14:sldId id="476"/>
+            <p14:sldId id="288"/>
             <p14:sldId id="308"/>
             <p14:sldId id="312"/>
             <p14:sldId id="329"/>
@@ -157,9 +160,6 @@
             <p14:sldId id="326"/>
             <p14:sldId id="327"/>
             <p14:sldId id="320"/>
-            <p14:sldId id="322"/>
-            <p14:sldId id="476"/>
-            <p14:sldId id="288"/>
             <p14:sldId id="298"/>
             <p14:sldId id="328"/>
             <p14:sldId id="307"/>
@@ -269,7 +269,7 @@
             <a:fld id="{80AC11AF-147E-0A48-A5B0-8DA858D84551}" type="datetimeFigureOut">
               <a:rPr lang="en-US" smtClean="0"/>
               <a:pPr/>
-              <a:t>8/28/23</a:t>
+              <a:t>8/26/24</a:t>
             </a:fld>
             <a:endParaRPr lang="en-US"/>
           </a:p>
@@ -4316,28 +4316,25 @@
         </p:nvSpPr>
         <p:spPr>
           <a:xfrm>
-            <a:off x="3035660" y="3861048"/>
-            <a:ext cx="6120680" cy="533400"/>
+            <a:off x="3035660" y="4509120"/>
+            <a:ext cx="6120680" cy="317376"/>
           </a:xfrm>
         </p:spPr>
         <p:txBody>
           <a:bodyPr>
-            <a:normAutofit/>
+            <a:normAutofit fontScale="62500" lnSpcReduction="20000"/>
           </a:bodyPr>
           <a:lstStyle/>
           <a:p>
             <a:r>
               <a:rPr lang="en-GB" sz="2800" dirty="0"/>
-              <a:t>Lisa </a:t>
+              <a:t>Lisa Schwetlick and Pamela </a:t>
             </a:r>
             <a:r>
               <a:rPr lang="en-GB" sz="2800" dirty="0" err="1"/>
-              <a:t>Schwetlick</a:t>
-            </a:r>
-            <a:r>
-              <a:rPr lang="en-GB" sz="2800" dirty="0"/>
-              <a:t> and Pietro Berkes</a:t>
-            </a:r>
+              <a:t>Hathway</a:t>
+            </a:r>
+            <a:endParaRPr lang="en-GB" sz="2800" dirty="0"/>
           </a:p>
         </p:txBody>
       </p:sp>
@@ -4368,6 +4365,725 @@
       </p:grpSpPr>
       <p:sp>
         <p:nvSpPr>
+          <p:cNvPr id="3" name="Date Placeholder 2"/>
+          <p:cNvSpPr>
+            <a:spLocks noGrp="1"/>
+          </p:cNvSpPr>
+          <p:nvPr>
+            <p:ph type="dt" sz="half" idx="10"/>
+          </p:nvPr>
+        </p:nvSpPr>
+        <p:spPr/>
+        <p:txBody>
+          <a:bodyPr/>
+          <a:lstStyle/>
+          <a:p>
+            <a:r>
+              <a:rPr lang="de-CH"/>
+              <a:t>August 2023, CC BY-SA 4.0</a:t>
+            </a:r>
+            <a:endParaRPr lang="en-US"/>
+          </a:p>
+        </p:txBody>
+      </p:sp>
+      <p:sp>
+        <p:nvSpPr>
+          <p:cNvPr id="4" name="Footer Placeholder 3"/>
+          <p:cNvSpPr>
+            <a:spLocks noGrp="1"/>
+          </p:cNvSpPr>
+          <p:nvPr>
+            <p:ph type="ftr" sz="quarter" idx="11"/>
+          </p:nvPr>
+        </p:nvSpPr>
+        <p:spPr/>
+        <p:txBody>
+          <a:bodyPr/>
+          <a:lstStyle/>
+          <a:p>
+            <a:r>
+              <a:rPr lang="en-US"/>
+              <a:t>Continuous integration, v4.0</a:t>
+            </a:r>
+          </a:p>
+        </p:txBody>
+      </p:sp>
+      <p:sp>
+        <p:nvSpPr>
+          <p:cNvPr id="2" name="Title 1"/>
+          <p:cNvSpPr>
+            <a:spLocks noGrp="1"/>
+          </p:cNvSpPr>
+          <p:nvPr>
+            <p:ph type="title" idx="4294967295"/>
+          </p:nvPr>
+        </p:nvSpPr>
+        <p:spPr>
+          <a:xfrm>
+            <a:off x="1981200" y="2708920"/>
+            <a:ext cx="8229600" cy="990600"/>
+          </a:xfrm>
+        </p:spPr>
+        <p:txBody>
+          <a:bodyPr anchor="ctr">
+            <a:normAutofit/>
+          </a:bodyPr>
+          <a:lstStyle/>
+          <a:p>
+            <a:pPr algn="ctr"/>
+            <a:r>
+              <a:rPr lang="en-GB" sz="6000" dirty="0"/>
+              <a:t>Thank you!</a:t>
+            </a:r>
+          </a:p>
+        </p:txBody>
+      </p:sp>
+      <p:sp>
+        <p:nvSpPr>
+          <p:cNvPr id="5" name="Slide Number Placeholder 4">
+            <a:extLst>
+              <a:ext uri="{FF2B5EF4-FFF2-40B4-BE49-F238E27FC236}">
+                <a16:creationId xmlns:a16="http://schemas.microsoft.com/office/drawing/2014/main" id="{42177564-7B7F-A6B5-E504-FD7CCEBE8303}"/>
+              </a:ext>
+            </a:extLst>
+          </p:cNvPr>
+          <p:cNvSpPr>
+            <a:spLocks noGrp="1"/>
+          </p:cNvSpPr>
+          <p:nvPr>
+            <p:ph type="sldNum" sz="quarter" idx="12"/>
+          </p:nvPr>
+        </p:nvSpPr>
+        <p:spPr/>
+        <p:txBody>
+          <a:bodyPr/>
+          <a:lstStyle/>
+          <a:p>
+            <a:fld id="{EF79ADEA-B933-47CC-A4E9-04E6298B917C}" type="slidenum">
+              <a:rPr lang="en-US" smtClean="0"/>
+              <a:pPr/>
+              <a:t>10</a:t>
+            </a:fld>
+            <a:endParaRPr lang="en-US"/>
+          </a:p>
+        </p:txBody>
+      </p:sp>
+    </p:spTree>
+  </p:cSld>
+  <p:clrMapOvr>
+    <a:masterClrMapping/>
+  </p:clrMapOvr>
+</p:sld>
+</file>
+
+<file path=ppt/slides/slide11.xml><?xml version="1.0" encoding="utf-8"?>
+<p:sld xmlns:a="http://schemas.openxmlformats.org/drawingml/2006/main" xmlns:r="http://schemas.openxmlformats.org/officeDocument/2006/relationships" xmlns:p="http://schemas.openxmlformats.org/presentationml/2006/main" show="0">
+  <p:cSld>
+    <p:spTree>
+      <p:nvGrpSpPr>
+        <p:cNvPr id="1" name=""/>
+        <p:cNvGrpSpPr/>
+        <p:nvPr/>
+      </p:nvGrpSpPr>
+      <p:grpSpPr>
+        <a:xfrm>
+          <a:off x="0" y="0"/>
+          <a:ext cx="0" cy="0"/>
+          <a:chOff x="0" y="0"/>
+          <a:chExt cx="0" cy="0"/>
+        </a:xfrm>
+      </p:grpSpPr>
+      <p:sp>
+        <p:nvSpPr>
+          <p:cNvPr id="2" name="Title 1">
+            <a:extLst>
+              <a:ext uri="{FF2B5EF4-FFF2-40B4-BE49-F238E27FC236}">
+                <a16:creationId xmlns:a16="http://schemas.microsoft.com/office/drawing/2014/main" id="{BD476358-0FD2-764F-AEC5-3A574E8F39D1}"/>
+              </a:ext>
+            </a:extLst>
+          </p:cNvPr>
+          <p:cNvSpPr>
+            <a:spLocks noGrp="1"/>
+          </p:cNvSpPr>
+          <p:nvPr>
+            <p:ph type="title"/>
+          </p:nvPr>
+        </p:nvSpPr>
+        <p:spPr/>
+        <p:txBody>
+          <a:bodyPr/>
+          <a:lstStyle/>
+          <a:p>
+            <a:r>
+              <a:rPr lang="en-CH" dirty="0"/>
+              <a:t>GitHub Actions basic ideas</a:t>
+            </a:r>
+          </a:p>
+        </p:txBody>
+      </p:sp>
+      <p:sp>
+        <p:nvSpPr>
+          <p:cNvPr id="3" name="Content Placeholder 2">
+            <a:extLst>
+              <a:ext uri="{FF2B5EF4-FFF2-40B4-BE49-F238E27FC236}">
+                <a16:creationId xmlns:a16="http://schemas.microsoft.com/office/drawing/2014/main" id="{6D76AC3E-727D-9345-BF91-E141F622FCB8}"/>
+              </a:ext>
+            </a:extLst>
+          </p:cNvPr>
+          <p:cNvSpPr>
+            <a:spLocks noGrp="1"/>
+          </p:cNvSpPr>
+          <p:nvPr>
+            <p:ph idx="1"/>
+          </p:nvPr>
+        </p:nvSpPr>
+        <p:spPr>
+          <a:xfrm>
+            <a:off x="838200" y="1196752"/>
+            <a:ext cx="10515600" cy="4980211"/>
+          </a:xfrm>
+        </p:spPr>
+        <p:txBody>
+          <a:bodyPr>
+            <a:normAutofit lnSpcReduction="10000"/>
+          </a:bodyPr>
+          <a:lstStyle/>
+          <a:p>
+            <a:pPr marL="0" indent="0">
+              <a:buNone/>
+            </a:pPr>
+            <a:r>
+              <a:rPr lang="en-CH" dirty="0"/>
+              <a:t>An event occurs, it has an associated commit SHA</a:t>
+            </a:r>
+            <a:br>
+              <a:rPr lang="en-CH" dirty="0"/>
+            </a:br>
+            <a:r>
+              <a:rPr lang="en-CH" dirty="0"/>
+              <a:t>(e.g., a PR is opened or a commit tag is pushed)</a:t>
+            </a:r>
+          </a:p>
+          <a:p>
+            <a:pPr marL="0" indent="0">
+              <a:buNone/>
+            </a:pPr>
+            <a:br>
+              <a:rPr lang="en-CH" dirty="0"/>
+            </a:br>
+            <a:br>
+              <a:rPr lang="en-CH" dirty="0"/>
+            </a:br>
+            <a:endParaRPr lang="de-DE" dirty="0"/>
+          </a:p>
+          <a:p>
+            <a:pPr marL="0" indent="0">
+              <a:buNone/>
+            </a:pPr>
+            <a:r>
+              <a:rPr lang="en-CH" dirty="0"/>
+              <a:t>GitHub searches for config files in </a:t>
+            </a:r>
+            <a:r>
+              <a:rPr lang="en-CH" sz="2000" dirty="0">
+                <a:latin typeface="Consolas" panose="020B0609020204030204" pitchFamily="49" charset="0"/>
+                <a:cs typeface="Consolas" panose="020B0609020204030204" pitchFamily="49" charset="0"/>
+              </a:rPr>
+              <a:t>.github/workflows </a:t>
+            </a:r>
+            <a:r>
+              <a:rPr lang="en-CH" dirty="0"/>
+              <a:t>at that SHA, and looks if there is a trigger that matches the event</a:t>
+            </a:r>
+            <a:br>
+              <a:rPr lang="en-CH" dirty="0"/>
+            </a:br>
+            <a:br>
+              <a:rPr lang="en-CH" dirty="0"/>
+            </a:br>
+            <a:br>
+              <a:rPr lang="en-CH" dirty="0"/>
+            </a:br>
+            <a:endParaRPr lang="de-DE" dirty="0"/>
+          </a:p>
+          <a:p>
+            <a:pPr marL="0" indent="0">
+              <a:buNone/>
+            </a:pPr>
+            <a:r>
+              <a:rPr lang="en-CH" dirty="0"/>
+              <a:t>It then creates a virtual machine as specified in the config file and runs the commands listed there</a:t>
+            </a:r>
+          </a:p>
+        </p:txBody>
+      </p:sp>
+      <p:sp>
+        <p:nvSpPr>
+          <p:cNvPr id="4" name="Date Placeholder 3">
+            <a:extLst>
+              <a:ext uri="{FF2B5EF4-FFF2-40B4-BE49-F238E27FC236}">
+                <a16:creationId xmlns:a16="http://schemas.microsoft.com/office/drawing/2014/main" id="{01B74FBB-6928-0E40-87F8-3689137B6A44}"/>
+              </a:ext>
+            </a:extLst>
+          </p:cNvPr>
+          <p:cNvSpPr>
+            <a:spLocks noGrp="1"/>
+          </p:cNvSpPr>
+          <p:nvPr>
+            <p:ph type="dt" sz="half" idx="10"/>
+          </p:nvPr>
+        </p:nvSpPr>
+        <p:spPr/>
+        <p:txBody>
+          <a:bodyPr/>
+          <a:lstStyle/>
+          <a:p>
+            <a:r>
+              <a:rPr lang="de-CH" sz="1000"/>
+              <a:t>August 2023, CC BY-SA 4.0</a:t>
+            </a:r>
+            <a:endParaRPr lang="en-US" sz="1000" dirty="0"/>
+          </a:p>
+        </p:txBody>
+      </p:sp>
+      <p:sp>
+        <p:nvSpPr>
+          <p:cNvPr id="5" name="Footer Placeholder 4">
+            <a:extLst>
+              <a:ext uri="{FF2B5EF4-FFF2-40B4-BE49-F238E27FC236}">
+                <a16:creationId xmlns:a16="http://schemas.microsoft.com/office/drawing/2014/main" id="{4FB5E559-28D2-B742-A608-B353E85B9786}"/>
+              </a:ext>
+            </a:extLst>
+          </p:cNvPr>
+          <p:cNvSpPr>
+            <a:spLocks noGrp="1"/>
+          </p:cNvSpPr>
+          <p:nvPr>
+            <p:ph type="ftr" sz="quarter" idx="11"/>
+          </p:nvPr>
+        </p:nvSpPr>
+        <p:spPr/>
+        <p:txBody>
+          <a:bodyPr/>
+          <a:lstStyle/>
+          <a:p>
+            <a:r>
+              <a:rPr lang="en-US"/>
+              <a:t>Continuous integration, v4.0</a:t>
+            </a:r>
+            <a:endParaRPr lang="en-US" dirty="0"/>
+          </a:p>
+        </p:txBody>
+      </p:sp>
+      <p:sp>
+        <p:nvSpPr>
+          <p:cNvPr id="6" name="Down Arrow 5">
+            <a:extLst>
+              <a:ext uri="{FF2B5EF4-FFF2-40B4-BE49-F238E27FC236}">
+                <a16:creationId xmlns:a16="http://schemas.microsoft.com/office/drawing/2014/main" id="{50A72591-34F8-1346-A0C1-FA32BF9E01FA}"/>
+              </a:ext>
+            </a:extLst>
+          </p:cNvPr>
+          <p:cNvSpPr/>
+          <p:nvPr/>
+        </p:nvSpPr>
+        <p:spPr>
+          <a:xfrm>
+            <a:off x="5663952" y="2366883"/>
+            <a:ext cx="720080" cy="504056"/>
+          </a:xfrm>
+          <a:prstGeom prst="downArrow">
+            <a:avLst/>
+          </a:prstGeom>
+        </p:spPr>
+        <p:style>
+          <a:lnRef idx="2">
+            <a:schemeClr val="dk1">
+              <a:shade val="50000"/>
+            </a:schemeClr>
+          </a:lnRef>
+          <a:fillRef idx="1">
+            <a:schemeClr val="dk1"/>
+          </a:fillRef>
+          <a:effectRef idx="0">
+            <a:schemeClr val="dk1"/>
+          </a:effectRef>
+          <a:fontRef idx="minor">
+            <a:schemeClr val="lt1"/>
+          </a:fontRef>
+        </p:style>
+        <p:txBody>
+          <a:bodyPr rtlCol="0" anchor="ctr"/>
+          <a:lstStyle/>
+          <a:p>
+            <a:pPr algn="ctr"/>
+            <a:endParaRPr lang="en-DE"/>
+          </a:p>
+        </p:txBody>
+      </p:sp>
+      <p:sp>
+        <p:nvSpPr>
+          <p:cNvPr id="7" name="Down Arrow 6">
+            <a:extLst>
+              <a:ext uri="{FF2B5EF4-FFF2-40B4-BE49-F238E27FC236}">
+                <a16:creationId xmlns:a16="http://schemas.microsoft.com/office/drawing/2014/main" id="{CDB19F76-86CF-6A42-A378-4363121B737B}"/>
+              </a:ext>
+            </a:extLst>
+          </p:cNvPr>
+          <p:cNvSpPr/>
+          <p:nvPr/>
+        </p:nvSpPr>
+        <p:spPr>
+          <a:xfrm>
+            <a:off x="5663952" y="4125543"/>
+            <a:ext cx="720080" cy="504056"/>
+          </a:xfrm>
+          <a:prstGeom prst="downArrow">
+            <a:avLst/>
+          </a:prstGeom>
+        </p:spPr>
+        <p:style>
+          <a:lnRef idx="2">
+            <a:schemeClr val="dk1">
+              <a:shade val="50000"/>
+            </a:schemeClr>
+          </a:lnRef>
+          <a:fillRef idx="1">
+            <a:schemeClr val="dk1"/>
+          </a:fillRef>
+          <a:effectRef idx="0">
+            <a:schemeClr val="dk1"/>
+          </a:effectRef>
+          <a:fontRef idx="minor">
+            <a:schemeClr val="lt1"/>
+          </a:fontRef>
+        </p:style>
+        <p:txBody>
+          <a:bodyPr rtlCol="0" anchor="ctr"/>
+          <a:lstStyle/>
+          <a:p>
+            <a:pPr algn="ctr"/>
+            <a:endParaRPr lang="en-DE"/>
+          </a:p>
+        </p:txBody>
+      </p:sp>
+      <p:sp>
+        <p:nvSpPr>
+          <p:cNvPr id="8" name="Slide Number Placeholder 7">
+            <a:extLst>
+              <a:ext uri="{FF2B5EF4-FFF2-40B4-BE49-F238E27FC236}">
+                <a16:creationId xmlns:a16="http://schemas.microsoft.com/office/drawing/2014/main" id="{B63FAC1A-9BFC-440F-8AC4-C3F27E96EB3D}"/>
+              </a:ext>
+            </a:extLst>
+          </p:cNvPr>
+          <p:cNvSpPr>
+            <a:spLocks noGrp="1"/>
+          </p:cNvSpPr>
+          <p:nvPr>
+            <p:ph type="sldNum" sz="quarter" idx="12"/>
+          </p:nvPr>
+        </p:nvSpPr>
+        <p:spPr/>
+        <p:txBody>
+          <a:bodyPr/>
+          <a:lstStyle/>
+          <a:p>
+            <a:fld id="{EF79ADEA-B933-47CC-A4E9-04E6298B917C}" type="slidenum">
+              <a:rPr lang="en-US" smtClean="0"/>
+              <a:pPr/>
+              <a:t>11</a:t>
+            </a:fld>
+            <a:endParaRPr lang="en-US"/>
+          </a:p>
+        </p:txBody>
+      </p:sp>
+    </p:spTree>
+    <p:extLst>
+      <p:ext uri="{BB962C8B-B14F-4D97-AF65-F5344CB8AC3E}">
+        <p14:creationId xmlns:p14="http://schemas.microsoft.com/office/powerpoint/2010/main" val="3315879559"/>
+      </p:ext>
+    </p:extLst>
+  </p:cSld>
+  <p:clrMapOvr>
+    <a:masterClrMapping/>
+  </p:clrMapOvr>
+</p:sld>
+</file>
+
+<file path=ppt/slides/slide12.xml><?xml version="1.0" encoding="utf-8"?>
+<p:sld xmlns:a="http://schemas.openxmlformats.org/drawingml/2006/main" xmlns:r="http://schemas.openxmlformats.org/officeDocument/2006/relationships" xmlns:p="http://schemas.openxmlformats.org/presentationml/2006/main" show="0">
+  <p:cSld>
+    <p:spTree>
+      <p:nvGrpSpPr>
+        <p:cNvPr id="1" name=""/>
+        <p:cNvGrpSpPr/>
+        <p:nvPr/>
+      </p:nvGrpSpPr>
+      <p:grpSpPr>
+        <a:xfrm>
+          <a:off x="0" y="0"/>
+          <a:ext cx="0" cy="0"/>
+          <a:chOff x="0" y="0"/>
+          <a:chExt cx="0" cy="0"/>
+        </a:xfrm>
+      </p:grpSpPr>
+      <p:sp>
+        <p:nvSpPr>
+          <p:cNvPr id="2" name="Title 1">
+            <a:extLst>
+              <a:ext uri="{FF2B5EF4-FFF2-40B4-BE49-F238E27FC236}">
+                <a16:creationId xmlns:a16="http://schemas.microsoft.com/office/drawing/2014/main" id="{BD476358-0FD2-764F-AEC5-3A574E8F39D1}"/>
+              </a:ext>
+            </a:extLst>
+          </p:cNvPr>
+          <p:cNvSpPr>
+            <a:spLocks noGrp="1"/>
+          </p:cNvSpPr>
+          <p:nvPr>
+            <p:ph type="title"/>
+          </p:nvPr>
+        </p:nvSpPr>
+        <p:spPr/>
+        <p:txBody>
+          <a:bodyPr/>
+          <a:lstStyle/>
+          <a:p>
+            <a:r>
+              <a:rPr lang="en-CH" dirty="0"/>
+              <a:t>GitHub Actions basic ideas</a:t>
+            </a:r>
+          </a:p>
+        </p:txBody>
+      </p:sp>
+      <p:sp>
+        <p:nvSpPr>
+          <p:cNvPr id="3" name="Content Placeholder 2">
+            <a:extLst>
+              <a:ext uri="{FF2B5EF4-FFF2-40B4-BE49-F238E27FC236}">
+                <a16:creationId xmlns:a16="http://schemas.microsoft.com/office/drawing/2014/main" id="{6D76AC3E-727D-9345-BF91-E141F622FCB8}"/>
+              </a:ext>
+            </a:extLst>
+          </p:cNvPr>
+          <p:cNvSpPr>
+            <a:spLocks noGrp="1"/>
+          </p:cNvSpPr>
+          <p:nvPr>
+            <p:ph idx="1"/>
+          </p:nvPr>
+        </p:nvSpPr>
+        <p:spPr/>
+        <p:txBody>
+          <a:bodyPr/>
+          <a:lstStyle/>
+          <a:p>
+            <a:r>
+              <a:rPr lang="en-CH"/>
+              <a:t>The </a:t>
+            </a:r>
+            <a:r>
+              <a:rPr lang="en-CH" dirty="0"/>
+              <a:t>outcome is logged and if the job exits cleanly it is marked as ”passed” otherwise “</a:t>
+            </a:r>
+            <a:r>
+              <a:rPr lang="en-CH"/>
+              <a:t>failed”</a:t>
+            </a:r>
+            <a:endParaRPr lang="de-DE" dirty="0"/>
+          </a:p>
+        </p:txBody>
+      </p:sp>
+      <p:sp>
+        <p:nvSpPr>
+          <p:cNvPr id="4" name="Date Placeholder 3">
+            <a:extLst>
+              <a:ext uri="{FF2B5EF4-FFF2-40B4-BE49-F238E27FC236}">
+                <a16:creationId xmlns:a16="http://schemas.microsoft.com/office/drawing/2014/main" id="{01B74FBB-6928-0E40-87F8-3689137B6A44}"/>
+              </a:ext>
+            </a:extLst>
+          </p:cNvPr>
+          <p:cNvSpPr>
+            <a:spLocks noGrp="1"/>
+          </p:cNvSpPr>
+          <p:nvPr>
+            <p:ph type="dt" sz="half" idx="10"/>
+          </p:nvPr>
+        </p:nvSpPr>
+        <p:spPr/>
+        <p:txBody>
+          <a:bodyPr/>
+          <a:lstStyle/>
+          <a:p>
+            <a:r>
+              <a:rPr lang="de-CH" sz="1000"/>
+              <a:t>August 2023, CC BY-SA 4.0</a:t>
+            </a:r>
+            <a:endParaRPr lang="en-US" sz="1000" dirty="0"/>
+          </a:p>
+        </p:txBody>
+      </p:sp>
+      <p:sp>
+        <p:nvSpPr>
+          <p:cNvPr id="5" name="Footer Placeholder 4">
+            <a:extLst>
+              <a:ext uri="{FF2B5EF4-FFF2-40B4-BE49-F238E27FC236}">
+                <a16:creationId xmlns:a16="http://schemas.microsoft.com/office/drawing/2014/main" id="{4FB5E559-28D2-B742-A608-B353E85B9786}"/>
+              </a:ext>
+            </a:extLst>
+          </p:cNvPr>
+          <p:cNvSpPr>
+            <a:spLocks noGrp="1"/>
+          </p:cNvSpPr>
+          <p:nvPr>
+            <p:ph type="ftr" sz="quarter" idx="11"/>
+          </p:nvPr>
+        </p:nvSpPr>
+        <p:spPr/>
+        <p:txBody>
+          <a:bodyPr/>
+          <a:lstStyle/>
+          <a:p>
+            <a:r>
+              <a:rPr lang="en-US"/>
+              <a:t>Continuous integration, v4.0</a:t>
+            </a:r>
+            <a:endParaRPr lang="en-US" dirty="0"/>
+          </a:p>
+        </p:txBody>
+      </p:sp>
+      <p:pic>
+        <p:nvPicPr>
+          <p:cNvPr id="8" name="Picture 7" descr="A screenshot of a computer&#10;&#10;Description automatically generated with medium confidence">
+            <a:extLst>
+              <a:ext uri="{FF2B5EF4-FFF2-40B4-BE49-F238E27FC236}">
+                <a16:creationId xmlns:a16="http://schemas.microsoft.com/office/drawing/2014/main" id="{2161033D-8E2B-394A-B1ED-5F835F679C2E}"/>
+              </a:ext>
+            </a:extLst>
+          </p:cNvPr>
+          <p:cNvPicPr>
+            <a:picLocks noChangeAspect="1"/>
+          </p:cNvPicPr>
+          <p:nvPr/>
+        </p:nvPicPr>
+        <p:blipFill>
+          <a:blip r:embed="rId2">
+            <a:extLst>
+              <a:ext uri="{28A0092B-C50C-407E-A947-70E740481C1C}">
+                <a14:useLocalDpi xmlns:a14="http://schemas.microsoft.com/office/drawing/2010/main" val="0"/>
+              </a:ext>
+            </a:extLst>
+          </a:blip>
+          <a:stretch>
+            <a:fillRect/>
+          </a:stretch>
+        </p:blipFill>
+        <p:spPr>
+          <a:xfrm>
+            <a:off x="1991544" y="2562763"/>
+            <a:ext cx="5328592" cy="2316779"/>
+          </a:xfrm>
+          <a:prstGeom prst="rect">
+            <a:avLst/>
+          </a:prstGeom>
+        </p:spPr>
+      </p:pic>
+      <p:pic>
+        <p:nvPicPr>
+          <p:cNvPr id="9" name="Picture 8" descr="Graphical user interface, text, application&#10;&#10;Description automatically generated">
+            <a:extLst>
+              <a:ext uri="{FF2B5EF4-FFF2-40B4-BE49-F238E27FC236}">
+                <a16:creationId xmlns:a16="http://schemas.microsoft.com/office/drawing/2014/main" id="{EC30FD2E-55B1-4D4E-8DCD-80DC18F36C5A}"/>
+              </a:ext>
+            </a:extLst>
+          </p:cNvPr>
+          <p:cNvPicPr>
+            <a:picLocks noChangeAspect="1"/>
+          </p:cNvPicPr>
+          <p:nvPr/>
+        </p:nvPicPr>
+        <p:blipFill>
+          <a:blip r:embed="rId3">
+            <a:extLst>
+              <a:ext uri="{28A0092B-C50C-407E-A947-70E740481C1C}">
+                <a14:useLocalDpi xmlns:a14="http://schemas.microsoft.com/office/drawing/2010/main" val="0"/>
+              </a:ext>
+            </a:extLst>
+          </a:blip>
+          <a:stretch>
+            <a:fillRect/>
+          </a:stretch>
+        </p:blipFill>
+        <p:spPr>
+          <a:xfrm>
+            <a:off x="4778220" y="3920550"/>
+            <a:ext cx="5442924" cy="2316762"/>
+          </a:xfrm>
+          <a:prstGeom prst="rect">
+            <a:avLst/>
+          </a:prstGeom>
+        </p:spPr>
+      </p:pic>
+      <p:sp>
+        <p:nvSpPr>
+          <p:cNvPr id="6" name="Slide Number Placeholder 5">
+            <a:extLst>
+              <a:ext uri="{FF2B5EF4-FFF2-40B4-BE49-F238E27FC236}">
+                <a16:creationId xmlns:a16="http://schemas.microsoft.com/office/drawing/2014/main" id="{7B07FFD5-AD05-C0D7-BC0E-E8BF58378D85}"/>
+              </a:ext>
+            </a:extLst>
+          </p:cNvPr>
+          <p:cNvSpPr>
+            <a:spLocks noGrp="1"/>
+          </p:cNvSpPr>
+          <p:nvPr>
+            <p:ph type="sldNum" sz="quarter" idx="12"/>
+          </p:nvPr>
+        </p:nvSpPr>
+        <p:spPr/>
+        <p:txBody>
+          <a:bodyPr/>
+          <a:lstStyle/>
+          <a:p>
+            <a:fld id="{EF79ADEA-B933-47CC-A4E9-04E6298B917C}" type="slidenum">
+              <a:rPr lang="en-US" smtClean="0"/>
+              <a:pPr/>
+              <a:t>12</a:t>
+            </a:fld>
+            <a:endParaRPr lang="en-US"/>
+          </a:p>
+        </p:txBody>
+      </p:sp>
+    </p:spTree>
+    <p:extLst>
+      <p:ext uri="{BB962C8B-B14F-4D97-AF65-F5344CB8AC3E}">
+        <p14:creationId xmlns:p14="http://schemas.microsoft.com/office/powerpoint/2010/main" val="4034475540"/>
+      </p:ext>
+    </p:extLst>
+  </p:cSld>
+  <p:clrMapOvr>
+    <a:masterClrMapping/>
+  </p:clrMapOvr>
+</p:sld>
+</file>
+
+<file path=ppt/slides/slide13.xml><?xml version="1.0" encoding="utf-8"?>
+<p:sld xmlns:a="http://schemas.openxmlformats.org/drawingml/2006/main" xmlns:r="http://schemas.openxmlformats.org/officeDocument/2006/relationships" xmlns:p="http://schemas.openxmlformats.org/presentationml/2006/main" show="0">
+  <p:cSld>
+    <p:spTree>
+      <p:nvGrpSpPr>
+        <p:cNvPr id="1" name=""/>
+        <p:cNvGrpSpPr/>
+        <p:nvPr/>
+      </p:nvGrpSpPr>
+      <p:grpSpPr>
+        <a:xfrm>
+          <a:off x="0" y="0"/>
+          <a:ext cx="0" cy="0"/>
+          <a:chOff x="0" y="0"/>
+          <a:chExt cx="0" cy="0"/>
+        </a:xfrm>
+      </p:grpSpPr>
+      <p:sp>
+        <p:nvSpPr>
           <p:cNvPr id="2" name="Title 1">
             <a:extLst>
               <a:ext uri="{FF2B5EF4-FFF2-40B4-BE49-F238E27FC236}">
@@ -4523,7 +5239,7 @@
             <a:fld id="{EF79ADEA-B933-47CC-A4E9-04E6298B917C}" type="slidenum">
               <a:rPr lang="en-US" smtClean="0"/>
               <a:pPr/>
-              <a:t>10</a:t>
+              <a:t>13</a:t>
             </a:fld>
             <a:endParaRPr lang="en-US"/>
           </a:p>
@@ -4542,8 +5258,8 @@
 </p:sld>
 </file>
 
-<file path=ppt/slides/slide11.xml><?xml version="1.0" encoding="utf-8"?>
-<p:sld xmlns:a="http://schemas.openxmlformats.org/drawingml/2006/main" xmlns:r="http://schemas.openxmlformats.org/officeDocument/2006/relationships" xmlns:p="http://schemas.openxmlformats.org/presentationml/2006/main">
+<file path=ppt/slides/slide14.xml><?xml version="1.0" encoding="utf-8"?>
+<p:sld xmlns:a="http://schemas.openxmlformats.org/drawingml/2006/main" xmlns:r="http://schemas.openxmlformats.org/officeDocument/2006/relationships" xmlns:p="http://schemas.openxmlformats.org/presentationml/2006/main" show="0">
   <p:cSld>
     <p:spTree>
       <p:nvGrpSpPr>
@@ -5335,7 +6051,7 @@
             <a:fld id="{EF79ADEA-B933-47CC-A4E9-04E6298B917C}" type="slidenum">
               <a:rPr lang="en-US" smtClean="0"/>
               <a:pPr/>
-              <a:t>11</a:t>
+              <a:t>14</a:t>
             </a:fld>
             <a:endParaRPr lang="en-US"/>
           </a:p>
@@ -5354,8 +6070,8 @@
 </p:sld>
 </file>
 
-<file path=ppt/slides/slide12.xml><?xml version="1.0" encoding="utf-8"?>
-<p:sld xmlns:a="http://schemas.openxmlformats.org/drawingml/2006/main" xmlns:r="http://schemas.openxmlformats.org/officeDocument/2006/relationships" xmlns:p="http://schemas.openxmlformats.org/presentationml/2006/main">
+<file path=ppt/slides/slide15.xml><?xml version="1.0" encoding="utf-8"?>
+<p:sld xmlns:a="http://schemas.openxmlformats.org/drawingml/2006/main" xmlns:r="http://schemas.openxmlformats.org/officeDocument/2006/relationships" xmlns:p="http://schemas.openxmlformats.org/presentationml/2006/main" show="0">
   <p:cSld>
     <p:spTree>
       <p:nvGrpSpPr>
@@ -5580,7 +6296,7 @@
             <a:fld id="{EF79ADEA-B933-47CC-A4E9-04E6298B917C}" type="slidenum">
               <a:rPr lang="en-US" smtClean="0"/>
               <a:pPr/>
-              <a:t>12</a:t>
+              <a:t>15</a:t>
             </a:fld>
             <a:endParaRPr lang="en-US"/>
           </a:p>
@@ -5599,8 +6315,8 @@
 </p:sld>
 </file>
 
-<file path=ppt/slides/slide13.xml><?xml version="1.0" encoding="utf-8"?>
-<p:sld xmlns:a="http://schemas.openxmlformats.org/drawingml/2006/main" xmlns:r="http://schemas.openxmlformats.org/officeDocument/2006/relationships" xmlns:p="http://schemas.openxmlformats.org/presentationml/2006/main">
+<file path=ppt/slides/slide16.xml><?xml version="1.0" encoding="utf-8"?>
+<p:sld xmlns:a="http://schemas.openxmlformats.org/drawingml/2006/main" xmlns:r="http://schemas.openxmlformats.org/officeDocument/2006/relationships" xmlns:p="http://schemas.openxmlformats.org/presentationml/2006/main" show="0">
   <p:cSld>
     <p:spTree>
       <p:nvGrpSpPr>
@@ -5881,7 +6597,7 @@
             <a:fld id="{EF79ADEA-B933-47CC-A4E9-04E6298B917C}" type="slidenum">
               <a:rPr lang="en-US" smtClean="0"/>
               <a:pPr/>
-              <a:t>13</a:t>
+              <a:t>16</a:t>
             </a:fld>
             <a:endParaRPr lang="en-US"/>
           </a:p>
@@ -5953,8 +6669,8 @@
 </p:sld>
 </file>
 
-<file path=ppt/slides/slide14.xml><?xml version="1.0" encoding="utf-8"?>
-<p:sld xmlns:a="http://schemas.openxmlformats.org/drawingml/2006/main" xmlns:r="http://schemas.openxmlformats.org/officeDocument/2006/relationships" xmlns:p="http://schemas.openxmlformats.org/presentationml/2006/main">
+<file path=ppt/slides/slide17.xml><?xml version="1.0" encoding="utf-8"?>
+<p:sld xmlns:a="http://schemas.openxmlformats.org/drawingml/2006/main" xmlns:r="http://schemas.openxmlformats.org/officeDocument/2006/relationships" xmlns:p="http://schemas.openxmlformats.org/presentationml/2006/main" show="0">
   <p:cSld>
     <p:spTree>
       <p:nvGrpSpPr>
@@ -6138,7 +6854,7 @@
             <a:fld id="{EF79ADEA-B933-47CC-A4E9-04E6298B917C}" type="slidenum">
               <a:rPr lang="en-US" smtClean="0"/>
               <a:pPr/>
-              <a:t>14</a:t>
+              <a:t>17</a:t>
             </a:fld>
             <a:endParaRPr lang="en-US"/>
           </a:p>
@@ -6157,8 +6873,8 @@
 </p:sld>
 </file>
 
-<file path=ppt/slides/slide15.xml><?xml version="1.0" encoding="utf-8"?>
-<p:sld xmlns:a="http://schemas.openxmlformats.org/drawingml/2006/main" xmlns:r="http://schemas.openxmlformats.org/officeDocument/2006/relationships" xmlns:p="http://schemas.openxmlformats.org/presentationml/2006/main">
+<file path=ppt/slides/slide18.xml><?xml version="1.0" encoding="utf-8"?>
+<p:sld xmlns:a="http://schemas.openxmlformats.org/drawingml/2006/main" xmlns:r="http://schemas.openxmlformats.org/officeDocument/2006/relationships" xmlns:p="http://schemas.openxmlformats.org/presentationml/2006/main" show="0">
   <p:cSld>
     <p:spTree>
       <p:nvGrpSpPr>
@@ -6632,7 +7348,7 @@
             <a:fld id="{EF79ADEA-B933-47CC-A4E9-04E6298B917C}" type="slidenum">
               <a:rPr lang="en-US" smtClean="0"/>
               <a:pPr/>
-              <a:t>15</a:t>
+              <a:t>18</a:t>
             </a:fld>
             <a:endParaRPr lang="en-US"/>
           </a:p>
@@ -6651,8 +7367,8 @@
 </p:sld>
 </file>
 
-<file path=ppt/slides/slide16.xml><?xml version="1.0" encoding="utf-8"?>
-<p:sld xmlns:a="http://schemas.openxmlformats.org/drawingml/2006/main" xmlns:r="http://schemas.openxmlformats.org/officeDocument/2006/relationships" xmlns:p="http://schemas.openxmlformats.org/presentationml/2006/main">
+<file path=ppt/slides/slide19.xml><?xml version="1.0" encoding="utf-8"?>
+<p:sld xmlns:a="http://schemas.openxmlformats.org/drawingml/2006/main" xmlns:r="http://schemas.openxmlformats.org/officeDocument/2006/relationships" xmlns:p="http://schemas.openxmlformats.org/presentationml/2006/main" show="0">
   <p:cSld>
     <p:spTree>
       <p:nvGrpSpPr>
@@ -7289,7 +8005,7 @@
             <a:fld id="{EF79ADEA-B933-47CC-A4E9-04E6298B917C}" type="slidenum">
               <a:rPr lang="en-US" smtClean="0"/>
               <a:pPr/>
-              <a:t>16</a:t>
+              <a:t>19</a:t>
             </a:fld>
             <a:endParaRPr lang="en-US"/>
           </a:p>
@@ -7308,7 +8024,7 @@
 </p:sld>
 </file>
 
-<file path=ppt/slides/slide17.xml><?xml version="1.0" encoding="utf-8"?>
+<file path=ppt/slides/slide2.xml><?xml version="1.0" encoding="utf-8"?>
 <p:sld xmlns:a="http://schemas.openxmlformats.org/drawingml/2006/main" xmlns:r="http://schemas.openxmlformats.org/officeDocument/2006/relationships" xmlns:p="http://schemas.openxmlformats.org/presentationml/2006/main">
   <p:cSld>
     <p:spTree>
@@ -7330,7 +8046,7 @@
           <p:cNvPr id="2" name="Title 1">
             <a:extLst>
               <a:ext uri="{FF2B5EF4-FFF2-40B4-BE49-F238E27FC236}">
-                <a16:creationId xmlns:a16="http://schemas.microsoft.com/office/drawing/2014/main" id="{EACC7A8A-CD41-EB49-BCCF-D1CC9D385024}"/>
+                <a16:creationId xmlns:a16="http://schemas.microsoft.com/office/drawing/2014/main" id="{4993AE45-A766-0F4D-9D65-D692ECB4ED00}"/>
               </a:ext>
             </a:extLst>
           </p:cNvPr>
@@ -7347,140 +8063,48 @@
           <a:lstStyle/>
           <a:p>
             <a:r>
-              <a:rPr lang="en-CH" dirty="0"/>
-              <a:t>GitHub Actions reference</a:t>
-            </a:r>
-          </a:p>
-        </p:txBody>
-      </p:sp>
-      <p:sp>
-        <p:nvSpPr>
-          <p:cNvPr id="3" name="Content Placeholder 2">
-            <a:extLst>
-              <a:ext uri="{FF2B5EF4-FFF2-40B4-BE49-F238E27FC236}">
-                <a16:creationId xmlns:a16="http://schemas.microsoft.com/office/drawing/2014/main" id="{DE78B902-F52A-5B4E-AC89-A7164CC5CB2E}"/>
-              </a:ext>
-            </a:extLst>
-          </p:cNvPr>
-          <p:cNvSpPr>
-            <a:spLocks noGrp="1"/>
-          </p:cNvSpPr>
-          <p:nvPr>
-            <p:ph idx="1"/>
-          </p:nvPr>
-        </p:nvSpPr>
-        <p:spPr/>
-        <p:txBody>
-          <a:bodyPr>
-            <a:normAutofit/>
-          </a:bodyPr>
-          <a:lstStyle/>
-          <a:p>
-            <a:r>
-              <a:rPr lang="en-US" dirty="0"/>
-              <a:t>Types of virtual machines available on GitHub Actions:</a:t>
-            </a:r>
-            <a:br>
-              <a:rPr lang="en-US" dirty="0"/>
-            </a:br>
-            <a:r>
-              <a:rPr lang="en-US" sz="1800" dirty="0">
-                <a:latin typeface="Courier New" panose="02070309020205020404" pitchFamily="49" charset="0"/>
-                <a:cs typeface="Courier New" panose="02070309020205020404" pitchFamily="49" charset="0"/>
-                <a:hlinkClick r:id="rId2"/>
-              </a:rPr>
-              <a:t>https://docs.github.com/en/actions/using-github-hosted-runners/about-github-hosted-runners#supported-runners-and-hardware-resources</a:t>
-            </a:r>
-            <a:endParaRPr lang="en-US" sz="1800" dirty="0">
-              <a:latin typeface="Courier New" panose="02070309020205020404" pitchFamily="49" charset="0"/>
-              <a:cs typeface="Courier New" panose="02070309020205020404" pitchFamily="49" charset="0"/>
-            </a:endParaRPr>
-          </a:p>
-          <a:p>
-            <a:r>
-              <a:rPr lang="en-US" sz="1800" dirty="0">
-                <a:latin typeface="Courier New" panose="02070309020205020404" pitchFamily="49" charset="0"/>
-                <a:cs typeface="Courier New" panose="02070309020205020404" pitchFamily="49" charset="0"/>
-              </a:rPr>
-              <a:t>setup-python</a:t>
-            </a:r>
-            <a:r>
-              <a:rPr lang="en-US" sz="1800" dirty="0">
-                <a:cs typeface="Courier New" panose="02070309020205020404" pitchFamily="49" charset="0"/>
-              </a:rPr>
-              <a:t> </a:t>
-            </a:r>
-            <a:r>
-              <a:rPr lang="en-US" sz="2000" dirty="0">
-                <a:cs typeface="Courier New" panose="02070309020205020404" pitchFamily="49" charset="0"/>
-              </a:rPr>
-              <a:t>community action, all available Python flavors and versions:</a:t>
-            </a:r>
-            <a:br>
-              <a:rPr lang="en-US" sz="2000" dirty="0">
-                <a:cs typeface="Courier New" panose="02070309020205020404" pitchFamily="49" charset="0"/>
-              </a:rPr>
-            </a:br>
-            <a:r>
-              <a:rPr lang="en-US" sz="1800" dirty="0">
-                <a:latin typeface="Courier New" panose="02070309020205020404" pitchFamily="49" charset="0"/>
-                <a:cs typeface="Courier New" panose="02070309020205020404" pitchFamily="49" charset="0"/>
-                <a:hlinkClick r:id="rId3"/>
-              </a:rPr>
-              <a:t>https://github.com/marketplace/actions/setup-python</a:t>
-            </a:r>
-            <a:endParaRPr lang="en-US" sz="1800" dirty="0">
-              <a:latin typeface="Courier New" panose="02070309020205020404" pitchFamily="49" charset="0"/>
-              <a:cs typeface="Courier New" panose="02070309020205020404" pitchFamily="49" charset="0"/>
-            </a:endParaRPr>
-          </a:p>
-          <a:p>
-            <a:endParaRPr lang="en-US" sz="1800" dirty="0">
-              <a:latin typeface="Courier New" panose="02070309020205020404" pitchFamily="49" charset="0"/>
-              <a:cs typeface="Courier New" panose="02070309020205020404" pitchFamily="49" charset="0"/>
-            </a:endParaRPr>
-          </a:p>
-          <a:p>
-            <a:pPr marL="0" indent="0">
-              <a:buNone/>
-            </a:pPr>
+              <a:rPr lang="de-DE" dirty="0"/>
+              <a:t>Collaborative Development </a:t>
+            </a:r>
+            <a:r>
+              <a:rPr lang="de-DE" dirty="0" err="1"/>
+              <a:t>without</a:t>
+            </a:r>
+            <a:r>
+              <a:rPr lang="de-DE" dirty="0"/>
+              <a:t> CI</a:t>
+            </a:r>
+            <a:endParaRPr lang="en-CH" dirty="0"/>
+          </a:p>
+        </p:txBody>
+      </p:sp>
+      <p:sp>
+        <p:nvSpPr>
+          <p:cNvPr id="4" name="Date Placeholder 3">
+            <a:extLst>
+              <a:ext uri="{FF2B5EF4-FFF2-40B4-BE49-F238E27FC236}">
+                <a16:creationId xmlns:a16="http://schemas.microsoft.com/office/drawing/2014/main" id="{BB7DFD63-E8DE-9344-BDD0-A143F8BD67AC}"/>
+              </a:ext>
+            </a:extLst>
+          </p:cNvPr>
+          <p:cNvSpPr>
+            <a:spLocks noGrp="1"/>
+          </p:cNvSpPr>
+          <p:nvPr>
+            <p:ph type="dt" sz="half" idx="10"/>
+          </p:nvPr>
+        </p:nvSpPr>
+        <p:spPr/>
+        <p:txBody>
+          <a:bodyPr/>
+          <a:lstStyle/>
+          <a:p>
+            <a:r>
+              <a:rPr lang="de-CH"/>
+              <a:t>August 2023, CC BY-SA 4.0</a:t>
+            </a:r>
             <a:endParaRPr lang="en-US" dirty="0"/>
           </a:p>
-          <a:p>
-            <a:pPr marL="0" indent="0">
-              <a:buNone/>
-            </a:pPr>
-            <a:endParaRPr lang="en-CH" dirty="0"/>
-          </a:p>
-        </p:txBody>
-      </p:sp>
-      <p:sp>
-        <p:nvSpPr>
-          <p:cNvPr id="4" name="Date Placeholder 3">
-            <a:extLst>
-              <a:ext uri="{FF2B5EF4-FFF2-40B4-BE49-F238E27FC236}">
-                <a16:creationId xmlns:a16="http://schemas.microsoft.com/office/drawing/2014/main" id="{BD10E3E1-D420-6649-A15F-D53900236E0F}"/>
-              </a:ext>
-            </a:extLst>
-          </p:cNvPr>
-          <p:cNvSpPr>
-            <a:spLocks noGrp="1"/>
-          </p:cNvSpPr>
-          <p:nvPr>
-            <p:ph type="dt" sz="half" idx="10"/>
-          </p:nvPr>
-        </p:nvSpPr>
-        <p:spPr/>
-        <p:txBody>
-          <a:bodyPr/>
-          <a:lstStyle/>
-          <a:p>
-            <a:r>
-              <a:rPr lang="de-CH" sz="1000"/>
-              <a:t>August 2023, CC BY-SA 4.0</a:t>
-            </a:r>
-            <a:endParaRPr lang="en-US" sz="1000" dirty="0"/>
-          </a:p>
         </p:txBody>
       </p:sp>
       <p:sp>
@@ -7488,7 +8112,7 @@
           <p:cNvPr id="5" name="Footer Placeholder 4">
             <a:extLst>
               <a:ext uri="{FF2B5EF4-FFF2-40B4-BE49-F238E27FC236}">
-                <a16:creationId xmlns:a16="http://schemas.microsoft.com/office/drawing/2014/main" id="{6F012DDD-E088-A248-B0DC-043A5AFA7F11}"/>
+                <a16:creationId xmlns:a16="http://schemas.microsoft.com/office/drawing/2014/main" id="{5138C878-C3D9-AC4C-BDD7-9EFA39DFB1A1}"/>
               </a:ext>
             </a:extLst>
           </p:cNvPr>
@@ -7514,10 +8138,118 @@
       </p:sp>
       <p:sp>
         <p:nvSpPr>
-          <p:cNvPr id="6" name="Slide Number Placeholder 5">
-            <a:extLst>
-              <a:ext uri="{FF2B5EF4-FFF2-40B4-BE49-F238E27FC236}">
-                <a16:creationId xmlns:a16="http://schemas.microsoft.com/office/drawing/2014/main" id="{D1A31B90-0CF8-18DE-6D32-3B65F6DE2E1C}"/>
+          <p:cNvPr id="15" name="Rectangle 14">
+            <a:extLst>
+              <a:ext uri="{FF2B5EF4-FFF2-40B4-BE49-F238E27FC236}">
+                <a16:creationId xmlns:a16="http://schemas.microsoft.com/office/drawing/2014/main" id="{A6D19DE0-5F67-1746-9159-5DDB1C4C03CA}"/>
+              </a:ext>
+            </a:extLst>
+          </p:cNvPr>
+          <p:cNvSpPr/>
+          <p:nvPr/>
+        </p:nvSpPr>
+        <p:spPr>
+          <a:xfrm>
+            <a:off x="983432" y="4398262"/>
+            <a:ext cx="10793960" cy="2000548"/>
+          </a:xfrm>
+          <a:prstGeom prst="rect">
+            <a:avLst/>
+          </a:prstGeom>
+        </p:spPr>
+        <p:txBody>
+          <a:bodyPr wrap="square">
+            <a:spAutoFit/>
+          </a:bodyPr>
+          <a:lstStyle/>
+          <a:p>
+            <a:r>
+              <a:rPr lang="en-CH" sz="2400" dirty="0">
+                <a:latin typeface="+mn-lt"/>
+              </a:rPr>
+              <a:t>Potential issues</a:t>
+            </a:r>
+          </a:p>
+          <a:p>
+            <a:pPr marL="342900" indent="-342900">
+              <a:buFontTx/>
+              <a:buChar char="-"/>
+            </a:pPr>
+            <a:r>
+              <a:rPr lang="en-CH" sz="2000" dirty="0">
+                <a:latin typeface="+mn-lt"/>
+              </a:rPr>
+              <a:t>The tests might pass on one machine and/or the other, but not in a third-party environment (versions, OS, etc.)</a:t>
+            </a:r>
+          </a:p>
+          <a:p>
+            <a:pPr marL="342900" indent="-342900">
+              <a:buFontTx/>
+              <a:buChar char="-"/>
+            </a:pPr>
+            <a:r>
+              <a:rPr lang="en-CH" sz="2000" dirty="0">
+                <a:latin typeface="+mn-lt"/>
+              </a:rPr>
+              <a:t>A maintainer needs to ensure that the software works on all the supported combinations of versions / OSs</a:t>
+            </a:r>
+          </a:p>
+          <a:p>
+            <a:pPr marL="342900" indent="-342900">
+              <a:buFontTx/>
+              <a:buChar char="-"/>
+            </a:pPr>
+            <a:r>
+              <a:rPr lang="en-CH" sz="2000" dirty="0">
+                <a:latin typeface="+mn-lt"/>
+              </a:rPr>
+              <a:t>A maintainer needs to create and upload artifacts like binary packages, documentation, etc </a:t>
+            </a:r>
+          </a:p>
+        </p:txBody>
+      </p:sp>
+      <p:pic>
+        <p:nvPicPr>
+          <p:cNvPr id="7" name="Picture 6" descr="Graphical user interface, diagram&#10;&#10;Description automatically generated">
+            <a:extLst>
+              <a:ext uri="{FF2B5EF4-FFF2-40B4-BE49-F238E27FC236}">
+                <a16:creationId xmlns:a16="http://schemas.microsoft.com/office/drawing/2014/main" id="{D7FC7664-635F-E842-8D8C-22F2EAE1C75C}"/>
+              </a:ext>
+            </a:extLst>
+          </p:cNvPr>
+          <p:cNvPicPr>
+            <a:picLocks noChangeAspect="1"/>
+          </p:cNvPicPr>
+          <p:nvPr/>
+        </p:nvPicPr>
+        <p:blipFill>
+          <a:blip r:embed="rId2">
+            <a:extLst>
+              <a:ext uri="{28A0092B-C50C-407E-A947-70E740481C1C}">
+                <a14:useLocalDpi xmlns:a14="http://schemas.microsoft.com/office/drawing/2010/main" val="0"/>
+              </a:ext>
+            </a:extLst>
+          </a:blip>
+          <a:stretch>
+            <a:fillRect/>
+          </a:stretch>
+        </p:blipFill>
+        <p:spPr>
+          <a:xfrm>
+            <a:off x="2495600" y="1196752"/>
+            <a:ext cx="7200800" cy="3181749"/>
+          </a:xfrm>
+          <a:prstGeom prst="rect">
+            <a:avLst/>
+          </a:prstGeom>
+        </p:spPr>
+      </p:pic>
+      <p:sp>
+        <p:nvSpPr>
+          <p:cNvPr id="3" name="Slide Number Placeholder 2">
+            <a:extLst>
+              <a:ext uri="{FF2B5EF4-FFF2-40B4-BE49-F238E27FC236}">
+                <a16:creationId xmlns:a16="http://schemas.microsoft.com/office/drawing/2014/main" id="{74910C84-24D3-716E-1EB5-1CBCED425CD9}"/>
               </a:ext>
             </a:extLst>
           </p:cNvPr>
@@ -7536,7 +8268,7 @@
             <a:fld id="{EF79ADEA-B933-47CC-A4E9-04E6298B917C}" type="slidenum">
               <a:rPr lang="en-US" smtClean="0"/>
               <a:pPr/>
-              <a:t>17</a:t>
+              <a:t>2</a:t>
             </a:fld>
             <a:endParaRPr lang="en-US"/>
           </a:p>
@@ -7545,7 +8277,7 @@
     </p:spTree>
     <p:extLst>
       <p:ext uri="{BB962C8B-B14F-4D97-AF65-F5344CB8AC3E}">
-        <p14:creationId xmlns:p14="http://schemas.microsoft.com/office/powerpoint/2010/main" val="3469218920"/>
+        <p14:creationId xmlns:p14="http://schemas.microsoft.com/office/powerpoint/2010/main" val="578119186"/>
       </p:ext>
     </p:extLst>
   </p:cSld>
@@ -7555,8 +8287,8 @@
 </p:sld>
 </file>
 
-<file path=ppt/slides/slide18.xml><?xml version="1.0" encoding="utf-8"?>
-<p:sld xmlns:a="http://schemas.openxmlformats.org/drawingml/2006/main" xmlns:r="http://schemas.openxmlformats.org/officeDocument/2006/relationships" xmlns:p="http://schemas.openxmlformats.org/presentationml/2006/main">
+<file path=ppt/slides/slide20.xml><?xml version="1.0" encoding="utf-8"?>
+<p:sld xmlns:a="http://schemas.openxmlformats.org/drawingml/2006/main" xmlns:r="http://schemas.openxmlformats.org/officeDocument/2006/relationships" xmlns:p="http://schemas.openxmlformats.org/presentationml/2006/main" show="0">
   <p:cSld>
     <p:spTree>
       <p:nvGrpSpPr>
@@ -7577,6 +8309,253 @@
           <p:cNvPr id="2" name="Title 1">
             <a:extLst>
               <a:ext uri="{FF2B5EF4-FFF2-40B4-BE49-F238E27FC236}">
+                <a16:creationId xmlns:a16="http://schemas.microsoft.com/office/drawing/2014/main" id="{EACC7A8A-CD41-EB49-BCCF-D1CC9D385024}"/>
+              </a:ext>
+            </a:extLst>
+          </p:cNvPr>
+          <p:cNvSpPr>
+            <a:spLocks noGrp="1"/>
+          </p:cNvSpPr>
+          <p:nvPr>
+            <p:ph type="title"/>
+          </p:nvPr>
+        </p:nvSpPr>
+        <p:spPr/>
+        <p:txBody>
+          <a:bodyPr/>
+          <a:lstStyle/>
+          <a:p>
+            <a:r>
+              <a:rPr lang="en-CH" dirty="0"/>
+              <a:t>GitHub Actions reference</a:t>
+            </a:r>
+          </a:p>
+        </p:txBody>
+      </p:sp>
+      <p:sp>
+        <p:nvSpPr>
+          <p:cNvPr id="3" name="Content Placeholder 2">
+            <a:extLst>
+              <a:ext uri="{FF2B5EF4-FFF2-40B4-BE49-F238E27FC236}">
+                <a16:creationId xmlns:a16="http://schemas.microsoft.com/office/drawing/2014/main" id="{DE78B902-F52A-5B4E-AC89-A7164CC5CB2E}"/>
+              </a:ext>
+            </a:extLst>
+          </p:cNvPr>
+          <p:cNvSpPr>
+            <a:spLocks noGrp="1"/>
+          </p:cNvSpPr>
+          <p:nvPr>
+            <p:ph idx="1"/>
+          </p:nvPr>
+        </p:nvSpPr>
+        <p:spPr/>
+        <p:txBody>
+          <a:bodyPr>
+            <a:normAutofit/>
+          </a:bodyPr>
+          <a:lstStyle/>
+          <a:p>
+            <a:r>
+              <a:rPr lang="en-US" dirty="0"/>
+              <a:t>Types of virtual machines available on GitHub Actions:</a:t>
+            </a:r>
+            <a:br>
+              <a:rPr lang="en-US" dirty="0"/>
+            </a:br>
+            <a:r>
+              <a:rPr lang="en-US" sz="1800" dirty="0">
+                <a:latin typeface="Courier New" panose="02070309020205020404" pitchFamily="49" charset="0"/>
+                <a:cs typeface="Courier New" panose="02070309020205020404" pitchFamily="49" charset="0"/>
+                <a:hlinkClick r:id="rId2"/>
+              </a:rPr>
+              <a:t>https://docs.github.com/en/actions/using-github-hosted-runners/about-github-hosted-runners#supported-runners-and-hardware-resources</a:t>
+            </a:r>
+            <a:endParaRPr lang="en-US" sz="1800" dirty="0">
+              <a:latin typeface="Courier New" panose="02070309020205020404" pitchFamily="49" charset="0"/>
+              <a:cs typeface="Courier New" panose="02070309020205020404" pitchFamily="49" charset="0"/>
+            </a:endParaRPr>
+          </a:p>
+          <a:p>
+            <a:r>
+              <a:rPr lang="en-US" sz="1800" dirty="0">
+                <a:latin typeface="Courier New" panose="02070309020205020404" pitchFamily="49" charset="0"/>
+                <a:cs typeface="Courier New" panose="02070309020205020404" pitchFamily="49" charset="0"/>
+              </a:rPr>
+              <a:t>setup-python</a:t>
+            </a:r>
+            <a:r>
+              <a:rPr lang="en-US" sz="1800" dirty="0">
+                <a:cs typeface="Courier New" panose="02070309020205020404" pitchFamily="49" charset="0"/>
+              </a:rPr>
+              <a:t> </a:t>
+            </a:r>
+            <a:r>
+              <a:rPr lang="en-US" sz="2000" dirty="0">
+                <a:cs typeface="Courier New" panose="02070309020205020404" pitchFamily="49" charset="0"/>
+              </a:rPr>
+              <a:t>community action, all available Python flavors and versions:</a:t>
+            </a:r>
+            <a:br>
+              <a:rPr lang="en-US" sz="2000" dirty="0">
+                <a:cs typeface="Courier New" panose="02070309020205020404" pitchFamily="49" charset="0"/>
+              </a:rPr>
+            </a:br>
+            <a:r>
+              <a:rPr lang="en-US" sz="1800" dirty="0">
+                <a:latin typeface="Courier New" panose="02070309020205020404" pitchFamily="49" charset="0"/>
+                <a:cs typeface="Courier New" panose="02070309020205020404" pitchFamily="49" charset="0"/>
+                <a:hlinkClick r:id="rId3"/>
+              </a:rPr>
+              <a:t>https://github.com/marketplace/actions/setup-python</a:t>
+            </a:r>
+            <a:endParaRPr lang="en-US" sz="1800" dirty="0">
+              <a:latin typeface="Courier New" panose="02070309020205020404" pitchFamily="49" charset="0"/>
+              <a:cs typeface="Courier New" panose="02070309020205020404" pitchFamily="49" charset="0"/>
+            </a:endParaRPr>
+          </a:p>
+          <a:p>
+            <a:endParaRPr lang="en-US" sz="1800" dirty="0">
+              <a:latin typeface="Courier New" panose="02070309020205020404" pitchFamily="49" charset="0"/>
+              <a:cs typeface="Courier New" panose="02070309020205020404" pitchFamily="49" charset="0"/>
+            </a:endParaRPr>
+          </a:p>
+          <a:p>
+            <a:pPr marL="0" indent="0">
+              <a:buNone/>
+            </a:pPr>
+            <a:endParaRPr lang="en-US" dirty="0"/>
+          </a:p>
+          <a:p>
+            <a:pPr marL="0" indent="0">
+              <a:buNone/>
+            </a:pPr>
+            <a:endParaRPr lang="en-CH" dirty="0"/>
+          </a:p>
+        </p:txBody>
+      </p:sp>
+      <p:sp>
+        <p:nvSpPr>
+          <p:cNvPr id="4" name="Date Placeholder 3">
+            <a:extLst>
+              <a:ext uri="{FF2B5EF4-FFF2-40B4-BE49-F238E27FC236}">
+                <a16:creationId xmlns:a16="http://schemas.microsoft.com/office/drawing/2014/main" id="{BD10E3E1-D420-6649-A15F-D53900236E0F}"/>
+              </a:ext>
+            </a:extLst>
+          </p:cNvPr>
+          <p:cNvSpPr>
+            <a:spLocks noGrp="1"/>
+          </p:cNvSpPr>
+          <p:nvPr>
+            <p:ph type="dt" sz="half" idx="10"/>
+          </p:nvPr>
+        </p:nvSpPr>
+        <p:spPr/>
+        <p:txBody>
+          <a:bodyPr/>
+          <a:lstStyle/>
+          <a:p>
+            <a:r>
+              <a:rPr lang="de-CH" sz="1000"/>
+              <a:t>August 2023, CC BY-SA 4.0</a:t>
+            </a:r>
+            <a:endParaRPr lang="en-US" sz="1000" dirty="0"/>
+          </a:p>
+        </p:txBody>
+      </p:sp>
+      <p:sp>
+        <p:nvSpPr>
+          <p:cNvPr id="5" name="Footer Placeholder 4">
+            <a:extLst>
+              <a:ext uri="{FF2B5EF4-FFF2-40B4-BE49-F238E27FC236}">
+                <a16:creationId xmlns:a16="http://schemas.microsoft.com/office/drawing/2014/main" id="{6F012DDD-E088-A248-B0DC-043A5AFA7F11}"/>
+              </a:ext>
+            </a:extLst>
+          </p:cNvPr>
+          <p:cNvSpPr>
+            <a:spLocks noGrp="1"/>
+          </p:cNvSpPr>
+          <p:nvPr>
+            <p:ph type="ftr" sz="quarter" idx="11"/>
+          </p:nvPr>
+        </p:nvSpPr>
+        <p:spPr/>
+        <p:txBody>
+          <a:bodyPr/>
+          <a:lstStyle/>
+          <a:p>
+            <a:r>
+              <a:rPr lang="en-US"/>
+              <a:t>Continuous integration, v4.0</a:t>
+            </a:r>
+            <a:endParaRPr lang="en-US" dirty="0"/>
+          </a:p>
+        </p:txBody>
+      </p:sp>
+      <p:sp>
+        <p:nvSpPr>
+          <p:cNvPr id="6" name="Slide Number Placeholder 5">
+            <a:extLst>
+              <a:ext uri="{FF2B5EF4-FFF2-40B4-BE49-F238E27FC236}">
+                <a16:creationId xmlns:a16="http://schemas.microsoft.com/office/drawing/2014/main" id="{D1A31B90-0CF8-18DE-6D32-3B65F6DE2E1C}"/>
+              </a:ext>
+            </a:extLst>
+          </p:cNvPr>
+          <p:cNvSpPr>
+            <a:spLocks noGrp="1"/>
+          </p:cNvSpPr>
+          <p:nvPr>
+            <p:ph type="sldNum" sz="quarter" idx="12"/>
+          </p:nvPr>
+        </p:nvSpPr>
+        <p:spPr/>
+        <p:txBody>
+          <a:bodyPr/>
+          <a:lstStyle/>
+          <a:p>
+            <a:fld id="{EF79ADEA-B933-47CC-A4E9-04E6298B917C}" type="slidenum">
+              <a:rPr lang="en-US" smtClean="0"/>
+              <a:pPr/>
+              <a:t>20</a:t>
+            </a:fld>
+            <a:endParaRPr lang="en-US"/>
+          </a:p>
+        </p:txBody>
+      </p:sp>
+    </p:spTree>
+    <p:extLst>
+      <p:ext uri="{BB962C8B-B14F-4D97-AF65-F5344CB8AC3E}">
+        <p14:creationId xmlns:p14="http://schemas.microsoft.com/office/powerpoint/2010/main" val="3469218920"/>
+      </p:ext>
+    </p:extLst>
+  </p:cSld>
+  <p:clrMapOvr>
+    <a:masterClrMapping/>
+  </p:clrMapOvr>
+</p:sld>
+</file>
+
+<file path=ppt/slides/slide21.xml><?xml version="1.0" encoding="utf-8"?>
+<p:sld xmlns:a="http://schemas.openxmlformats.org/drawingml/2006/main" xmlns:r="http://schemas.openxmlformats.org/officeDocument/2006/relationships" xmlns:p="http://schemas.openxmlformats.org/presentationml/2006/main" show="0">
+  <p:cSld>
+    <p:spTree>
+      <p:nvGrpSpPr>
+        <p:cNvPr id="1" name=""/>
+        <p:cNvGrpSpPr/>
+        <p:nvPr/>
+      </p:nvGrpSpPr>
+      <p:grpSpPr>
+        <a:xfrm>
+          <a:off x="0" y="0"/>
+          <a:ext cx="0" cy="0"/>
+          <a:chOff x="0" y="0"/>
+          <a:chExt cx="0" cy="0"/>
+        </a:xfrm>
+      </p:grpSpPr>
+      <p:sp>
+        <p:nvSpPr>
+          <p:cNvPr id="2" name="Title 1">
+            <a:extLst>
+              <a:ext uri="{FF2B5EF4-FFF2-40B4-BE49-F238E27FC236}">
                 <a16:creationId xmlns:a16="http://schemas.microsoft.com/office/drawing/2014/main" id="{33165359-9CD5-EF41-9C08-A5F425B6C08E}"/>
               </a:ext>
             </a:extLst>
@@ -7745,7 +8724,7 @@
             <a:fld id="{EF79ADEA-B933-47CC-A4E9-04E6298B917C}" type="slidenum">
               <a:rPr lang="en-US" smtClean="0"/>
               <a:pPr/>
-              <a:t>18</a:t>
+              <a:t>21</a:t>
             </a:fld>
             <a:endParaRPr lang="en-US"/>
           </a:p>
@@ -7817,8 +8796,8 @@
 </p:sld>
 </file>
 
-<file path=ppt/slides/slide19.xml><?xml version="1.0" encoding="utf-8"?>
-<p:sld xmlns:a="http://schemas.openxmlformats.org/drawingml/2006/main" xmlns:r="http://schemas.openxmlformats.org/officeDocument/2006/relationships" xmlns:p="http://schemas.openxmlformats.org/presentationml/2006/main">
+<file path=ppt/slides/slide22.xml><?xml version="1.0" encoding="utf-8"?>
+<p:sld xmlns:a="http://schemas.openxmlformats.org/drawingml/2006/main" xmlns:r="http://schemas.openxmlformats.org/officeDocument/2006/relationships" xmlns:p="http://schemas.openxmlformats.org/presentationml/2006/main" show="0">
   <p:cSld>
     <p:spTree>
       <p:nvGrpSpPr>
@@ -7836,815 +8815,6 @@
       </p:grpSpPr>
       <p:sp>
         <p:nvSpPr>
-          <p:cNvPr id="2" name="Title 1">
-            <a:extLst>
-              <a:ext uri="{FF2B5EF4-FFF2-40B4-BE49-F238E27FC236}">
-                <a16:creationId xmlns:a16="http://schemas.microsoft.com/office/drawing/2014/main" id="{0209F7B9-B500-6A48-B3AA-7D5C6DC44CB2}"/>
-              </a:ext>
-            </a:extLst>
-          </p:cNvPr>
-          <p:cNvSpPr>
-            <a:spLocks noGrp="1"/>
-          </p:cNvSpPr>
-          <p:nvPr>
-            <p:ph type="title"/>
-          </p:nvPr>
-        </p:nvSpPr>
-        <p:spPr/>
-        <p:txBody>
-          <a:bodyPr/>
-          <a:lstStyle/>
-          <a:p>
-            <a:r>
-              <a:rPr lang="en-CH" dirty="0"/>
-              <a:t>Conclusions</a:t>
-            </a:r>
-          </a:p>
-        </p:txBody>
-      </p:sp>
-      <p:sp>
-        <p:nvSpPr>
-          <p:cNvPr id="3" name="Content Placeholder 2">
-            <a:extLst>
-              <a:ext uri="{FF2B5EF4-FFF2-40B4-BE49-F238E27FC236}">
-                <a16:creationId xmlns:a16="http://schemas.microsoft.com/office/drawing/2014/main" id="{B483744F-BEF5-0B46-9B81-355BEB76BA2A}"/>
-              </a:ext>
-            </a:extLst>
-          </p:cNvPr>
-          <p:cNvSpPr>
-            <a:spLocks noGrp="1"/>
-          </p:cNvSpPr>
-          <p:nvPr>
-            <p:ph idx="1"/>
-          </p:nvPr>
-        </p:nvSpPr>
-        <p:spPr/>
-        <p:txBody>
-          <a:bodyPr/>
-          <a:lstStyle/>
-          <a:p>
-            <a:r>
-              <a:rPr lang="en-CH" dirty="0"/>
-              <a:t>It takes a bit of time to set up and debug a Continuous Integration workflow, but it’s a good investment that can save you a lot </a:t>
-            </a:r>
-            <a:r>
-              <a:rPr lang="en-CH"/>
-              <a:t>of time later on!</a:t>
-            </a:r>
-            <a:endParaRPr lang="en-CH" dirty="0"/>
-          </a:p>
-        </p:txBody>
-      </p:sp>
-      <p:sp>
-        <p:nvSpPr>
-          <p:cNvPr id="4" name="Date Placeholder 3">
-            <a:extLst>
-              <a:ext uri="{FF2B5EF4-FFF2-40B4-BE49-F238E27FC236}">
-                <a16:creationId xmlns:a16="http://schemas.microsoft.com/office/drawing/2014/main" id="{C03D37C7-B59B-1048-A802-78F6FA69F6C7}"/>
-              </a:ext>
-            </a:extLst>
-          </p:cNvPr>
-          <p:cNvSpPr>
-            <a:spLocks noGrp="1"/>
-          </p:cNvSpPr>
-          <p:nvPr>
-            <p:ph type="dt" sz="half" idx="10"/>
-          </p:nvPr>
-        </p:nvSpPr>
-        <p:spPr/>
-        <p:txBody>
-          <a:bodyPr/>
-          <a:lstStyle/>
-          <a:p>
-            <a:r>
-              <a:rPr lang="de-CH" sz="1000"/>
-              <a:t>August 2023, CC BY-SA 4.0</a:t>
-            </a:r>
-            <a:endParaRPr lang="en-US" sz="1000" dirty="0"/>
-          </a:p>
-        </p:txBody>
-      </p:sp>
-      <p:sp>
-        <p:nvSpPr>
-          <p:cNvPr id="5" name="Footer Placeholder 4">
-            <a:extLst>
-              <a:ext uri="{FF2B5EF4-FFF2-40B4-BE49-F238E27FC236}">
-                <a16:creationId xmlns:a16="http://schemas.microsoft.com/office/drawing/2014/main" id="{DB93DB5F-4A03-CA44-A54B-D5F34E39E00B}"/>
-              </a:ext>
-            </a:extLst>
-          </p:cNvPr>
-          <p:cNvSpPr>
-            <a:spLocks noGrp="1"/>
-          </p:cNvSpPr>
-          <p:nvPr>
-            <p:ph type="ftr" sz="quarter" idx="11"/>
-          </p:nvPr>
-        </p:nvSpPr>
-        <p:spPr/>
-        <p:txBody>
-          <a:bodyPr/>
-          <a:lstStyle/>
-          <a:p>
-            <a:r>
-              <a:rPr lang="en-US"/>
-              <a:t>Continuous integration, v4.0</a:t>
-            </a:r>
-            <a:endParaRPr lang="en-US" dirty="0"/>
-          </a:p>
-        </p:txBody>
-      </p:sp>
-      <p:pic>
-        <p:nvPicPr>
-          <p:cNvPr id="7" name="Picture 6" descr="A picture containing metalware, gear, white&#10;&#10;Description automatically generated">
-            <a:extLst>
-              <a:ext uri="{FF2B5EF4-FFF2-40B4-BE49-F238E27FC236}">
-                <a16:creationId xmlns:a16="http://schemas.microsoft.com/office/drawing/2014/main" id="{1C8CF780-D6FA-BB4C-A576-417D77749A00}"/>
-              </a:ext>
-            </a:extLst>
-          </p:cNvPr>
-          <p:cNvPicPr>
-            <a:picLocks noChangeAspect="1"/>
-          </p:cNvPicPr>
-          <p:nvPr/>
-        </p:nvPicPr>
-        <p:blipFill>
-          <a:blip r:embed="rId2">
-            <a:extLst>
-              <a:ext uri="{28A0092B-C50C-407E-A947-70E740481C1C}">
-                <a14:useLocalDpi xmlns:a14="http://schemas.microsoft.com/office/drawing/2010/main" val="0"/>
-              </a:ext>
-            </a:extLst>
-          </a:blip>
-          <a:stretch>
-            <a:fillRect/>
-          </a:stretch>
-        </p:blipFill>
-        <p:spPr>
-          <a:xfrm rot="16200000">
-            <a:off x="7481585" y="3157241"/>
-            <a:ext cx="3830908" cy="2567310"/>
-          </a:xfrm>
-          <a:prstGeom prst="rect">
-            <a:avLst/>
-          </a:prstGeom>
-        </p:spPr>
-      </p:pic>
-      <p:sp>
-        <p:nvSpPr>
-          <p:cNvPr id="6" name="Slide Number Placeholder 5">
-            <a:extLst>
-              <a:ext uri="{FF2B5EF4-FFF2-40B4-BE49-F238E27FC236}">
-                <a16:creationId xmlns:a16="http://schemas.microsoft.com/office/drawing/2014/main" id="{5DEDE8BE-6A16-9CF5-AAB2-D916CF912B21}"/>
-              </a:ext>
-            </a:extLst>
-          </p:cNvPr>
-          <p:cNvSpPr>
-            <a:spLocks noGrp="1"/>
-          </p:cNvSpPr>
-          <p:nvPr>
-            <p:ph type="sldNum" sz="quarter" idx="12"/>
-          </p:nvPr>
-        </p:nvSpPr>
-        <p:spPr/>
-        <p:txBody>
-          <a:bodyPr/>
-          <a:lstStyle/>
-          <a:p>
-            <a:fld id="{EF79ADEA-B933-47CC-A4E9-04E6298B917C}" type="slidenum">
-              <a:rPr lang="en-US" smtClean="0"/>
-              <a:pPr/>
-              <a:t>19</a:t>
-            </a:fld>
-            <a:endParaRPr lang="en-US"/>
-          </a:p>
-        </p:txBody>
-      </p:sp>
-    </p:spTree>
-    <p:extLst>
-      <p:ext uri="{BB962C8B-B14F-4D97-AF65-F5344CB8AC3E}">
-        <p14:creationId xmlns:p14="http://schemas.microsoft.com/office/powerpoint/2010/main" val="202595180"/>
-      </p:ext>
-    </p:extLst>
-  </p:cSld>
-  <p:clrMapOvr>
-    <a:masterClrMapping/>
-  </p:clrMapOvr>
-</p:sld>
-</file>
-
-<file path=ppt/slides/slide2.xml><?xml version="1.0" encoding="utf-8"?>
-<p:sld xmlns:a="http://schemas.openxmlformats.org/drawingml/2006/main" xmlns:r="http://schemas.openxmlformats.org/officeDocument/2006/relationships" xmlns:p="http://schemas.openxmlformats.org/presentationml/2006/main">
-  <p:cSld>
-    <p:spTree>
-      <p:nvGrpSpPr>
-        <p:cNvPr id="1" name=""/>
-        <p:cNvGrpSpPr/>
-        <p:nvPr/>
-      </p:nvGrpSpPr>
-      <p:grpSpPr>
-        <a:xfrm>
-          <a:off x="0" y="0"/>
-          <a:ext cx="0" cy="0"/>
-          <a:chOff x="0" y="0"/>
-          <a:chExt cx="0" cy="0"/>
-        </a:xfrm>
-      </p:grpSpPr>
-      <p:sp>
-        <p:nvSpPr>
-          <p:cNvPr id="2" name="Title 1">
-            <a:extLst>
-              <a:ext uri="{FF2B5EF4-FFF2-40B4-BE49-F238E27FC236}">
-                <a16:creationId xmlns:a16="http://schemas.microsoft.com/office/drawing/2014/main" id="{4993AE45-A766-0F4D-9D65-D692ECB4ED00}"/>
-              </a:ext>
-            </a:extLst>
-          </p:cNvPr>
-          <p:cNvSpPr>
-            <a:spLocks noGrp="1"/>
-          </p:cNvSpPr>
-          <p:nvPr>
-            <p:ph type="title"/>
-          </p:nvPr>
-        </p:nvSpPr>
-        <p:spPr/>
-        <p:txBody>
-          <a:bodyPr/>
-          <a:lstStyle/>
-          <a:p>
-            <a:r>
-              <a:rPr lang="de-DE" dirty="0"/>
-              <a:t>Collaborative Development </a:t>
-            </a:r>
-            <a:r>
-              <a:rPr lang="de-DE" dirty="0" err="1"/>
-              <a:t>without</a:t>
-            </a:r>
-            <a:r>
-              <a:rPr lang="de-DE" dirty="0"/>
-              <a:t> CI</a:t>
-            </a:r>
-            <a:endParaRPr lang="en-CH" dirty="0"/>
-          </a:p>
-        </p:txBody>
-      </p:sp>
-      <p:sp>
-        <p:nvSpPr>
-          <p:cNvPr id="4" name="Date Placeholder 3">
-            <a:extLst>
-              <a:ext uri="{FF2B5EF4-FFF2-40B4-BE49-F238E27FC236}">
-                <a16:creationId xmlns:a16="http://schemas.microsoft.com/office/drawing/2014/main" id="{BB7DFD63-E8DE-9344-BDD0-A143F8BD67AC}"/>
-              </a:ext>
-            </a:extLst>
-          </p:cNvPr>
-          <p:cNvSpPr>
-            <a:spLocks noGrp="1"/>
-          </p:cNvSpPr>
-          <p:nvPr>
-            <p:ph type="dt" sz="half" idx="10"/>
-          </p:nvPr>
-        </p:nvSpPr>
-        <p:spPr/>
-        <p:txBody>
-          <a:bodyPr/>
-          <a:lstStyle/>
-          <a:p>
-            <a:r>
-              <a:rPr lang="de-CH"/>
-              <a:t>August 2023, CC BY-SA 4.0</a:t>
-            </a:r>
-            <a:endParaRPr lang="en-US" dirty="0"/>
-          </a:p>
-        </p:txBody>
-      </p:sp>
-      <p:sp>
-        <p:nvSpPr>
-          <p:cNvPr id="5" name="Footer Placeholder 4">
-            <a:extLst>
-              <a:ext uri="{FF2B5EF4-FFF2-40B4-BE49-F238E27FC236}">
-                <a16:creationId xmlns:a16="http://schemas.microsoft.com/office/drawing/2014/main" id="{5138C878-C3D9-AC4C-BDD7-9EFA39DFB1A1}"/>
-              </a:ext>
-            </a:extLst>
-          </p:cNvPr>
-          <p:cNvSpPr>
-            <a:spLocks noGrp="1"/>
-          </p:cNvSpPr>
-          <p:nvPr>
-            <p:ph type="ftr" sz="quarter" idx="11"/>
-          </p:nvPr>
-        </p:nvSpPr>
-        <p:spPr/>
-        <p:txBody>
-          <a:bodyPr/>
-          <a:lstStyle/>
-          <a:p>
-            <a:r>
-              <a:rPr lang="en-US"/>
-              <a:t>Continuous integration, v4.0</a:t>
-            </a:r>
-            <a:endParaRPr lang="en-US" dirty="0"/>
-          </a:p>
-        </p:txBody>
-      </p:sp>
-      <p:sp>
-        <p:nvSpPr>
-          <p:cNvPr id="15" name="Rectangle 14">
-            <a:extLst>
-              <a:ext uri="{FF2B5EF4-FFF2-40B4-BE49-F238E27FC236}">
-                <a16:creationId xmlns:a16="http://schemas.microsoft.com/office/drawing/2014/main" id="{A6D19DE0-5F67-1746-9159-5DDB1C4C03CA}"/>
-              </a:ext>
-            </a:extLst>
-          </p:cNvPr>
-          <p:cNvSpPr/>
-          <p:nvPr/>
-        </p:nvSpPr>
-        <p:spPr>
-          <a:xfrm>
-            <a:off x="983432" y="4398262"/>
-            <a:ext cx="10793960" cy="2000548"/>
-          </a:xfrm>
-          <a:prstGeom prst="rect">
-            <a:avLst/>
-          </a:prstGeom>
-        </p:spPr>
-        <p:txBody>
-          <a:bodyPr wrap="square">
-            <a:spAutoFit/>
-          </a:bodyPr>
-          <a:lstStyle/>
-          <a:p>
-            <a:r>
-              <a:rPr lang="en-CH" sz="2400" dirty="0">
-                <a:latin typeface="+mn-lt"/>
-              </a:rPr>
-              <a:t>Potential issues</a:t>
-            </a:r>
-          </a:p>
-          <a:p>
-            <a:pPr marL="342900" indent="-342900">
-              <a:buFontTx/>
-              <a:buChar char="-"/>
-            </a:pPr>
-            <a:r>
-              <a:rPr lang="en-CH" sz="2000" dirty="0">
-                <a:latin typeface="+mn-lt"/>
-              </a:rPr>
-              <a:t>The tests might pass on one machine and/or the other, but not in a third-party environment (versions, OS, etc.)</a:t>
-            </a:r>
-          </a:p>
-          <a:p>
-            <a:pPr marL="342900" indent="-342900">
-              <a:buFontTx/>
-              <a:buChar char="-"/>
-            </a:pPr>
-            <a:r>
-              <a:rPr lang="en-CH" sz="2000" dirty="0">
-                <a:latin typeface="+mn-lt"/>
-              </a:rPr>
-              <a:t>A maintainer needs to ensure that the software works on all the supported combinations of versions / OSs</a:t>
-            </a:r>
-          </a:p>
-          <a:p>
-            <a:pPr marL="342900" indent="-342900">
-              <a:buFontTx/>
-              <a:buChar char="-"/>
-            </a:pPr>
-            <a:r>
-              <a:rPr lang="en-CH" sz="2000" dirty="0">
-                <a:latin typeface="+mn-lt"/>
-              </a:rPr>
-              <a:t>A maintainer needs to create and upload artifacts like binary packages, documentation, etc </a:t>
-            </a:r>
-          </a:p>
-        </p:txBody>
-      </p:sp>
-      <p:pic>
-        <p:nvPicPr>
-          <p:cNvPr id="7" name="Picture 6" descr="Graphical user interface, diagram&#10;&#10;Description automatically generated">
-            <a:extLst>
-              <a:ext uri="{FF2B5EF4-FFF2-40B4-BE49-F238E27FC236}">
-                <a16:creationId xmlns:a16="http://schemas.microsoft.com/office/drawing/2014/main" id="{D7FC7664-635F-E842-8D8C-22F2EAE1C75C}"/>
-              </a:ext>
-            </a:extLst>
-          </p:cNvPr>
-          <p:cNvPicPr>
-            <a:picLocks noChangeAspect="1"/>
-          </p:cNvPicPr>
-          <p:nvPr/>
-        </p:nvPicPr>
-        <p:blipFill>
-          <a:blip r:embed="rId2">
-            <a:extLst>
-              <a:ext uri="{28A0092B-C50C-407E-A947-70E740481C1C}">
-                <a14:useLocalDpi xmlns:a14="http://schemas.microsoft.com/office/drawing/2010/main" val="0"/>
-              </a:ext>
-            </a:extLst>
-          </a:blip>
-          <a:stretch>
-            <a:fillRect/>
-          </a:stretch>
-        </p:blipFill>
-        <p:spPr>
-          <a:xfrm>
-            <a:off x="2495600" y="1196752"/>
-            <a:ext cx="7200800" cy="3181749"/>
-          </a:xfrm>
-          <a:prstGeom prst="rect">
-            <a:avLst/>
-          </a:prstGeom>
-        </p:spPr>
-      </p:pic>
-      <p:sp>
-        <p:nvSpPr>
-          <p:cNvPr id="3" name="Slide Number Placeholder 2">
-            <a:extLst>
-              <a:ext uri="{FF2B5EF4-FFF2-40B4-BE49-F238E27FC236}">
-                <a16:creationId xmlns:a16="http://schemas.microsoft.com/office/drawing/2014/main" id="{74910C84-24D3-716E-1EB5-1CBCED425CD9}"/>
-              </a:ext>
-            </a:extLst>
-          </p:cNvPr>
-          <p:cNvSpPr>
-            <a:spLocks noGrp="1"/>
-          </p:cNvSpPr>
-          <p:nvPr>
-            <p:ph type="sldNum" sz="quarter" idx="12"/>
-          </p:nvPr>
-        </p:nvSpPr>
-        <p:spPr/>
-        <p:txBody>
-          <a:bodyPr/>
-          <a:lstStyle/>
-          <a:p>
-            <a:fld id="{EF79ADEA-B933-47CC-A4E9-04E6298B917C}" type="slidenum">
-              <a:rPr lang="en-US" smtClean="0"/>
-              <a:pPr/>
-              <a:t>2</a:t>
-            </a:fld>
-            <a:endParaRPr lang="en-US"/>
-          </a:p>
-        </p:txBody>
-      </p:sp>
-    </p:spTree>
-    <p:extLst>
-      <p:ext uri="{BB962C8B-B14F-4D97-AF65-F5344CB8AC3E}">
-        <p14:creationId xmlns:p14="http://schemas.microsoft.com/office/powerpoint/2010/main" val="578119186"/>
-      </p:ext>
-    </p:extLst>
-  </p:cSld>
-  <p:clrMapOvr>
-    <a:masterClrMapping/>
-  </p:clrMapOvr>
-</p:sld>
-</file>
-
-<file path=ppt/slides/slide20.xml><?xml version="1.0" encoding="utf-8"?>
-<p:sld xmlns:a="http://schemas.openxmlformats.org/drawingml/2006/main" xmlns:r="http://schemas.openxmlformats.org/officeDocument/2006/relationships" xmlns:p="http://schemas.openxmlformats.org/presentationml/2006/main">
-  <p:cSld>
-    <p:spTree>
-      <p:nvGrpSpPr>
-        <p:cNvPr id="1" name=""/>
-        <p:cNvGrpSpPr/>
-        <p:nvPr/>
-      </p:nvGrpSpPr>
-      <p:grpSpPr>
-        <a:xfrm>
-          <a:off x="0" y="0"/>
-          <a:ext cx="0" cy="0"/>
-          <a:chOff x="0" y="0"/>
-          <a:chExt cx="0" cy="0"/>
-        </a:xfrm>
-      </p:grpSpPr>
-      <p:sp>
-        <p:nvSpPr>
-          <p:cNvPr id="6" name="Title 5"/>
-          <p:cNvSpPr>
-            <a:spLocks noGrp="1"/>
-          </p:cNvSpPr>
-          <p:nvPr>
-            <p:ph type="title"/>
-          </p:nvPr>
-        </p:nvSpPr>
-        <p:spPr/>
-        <p:txBody>
-          <a:bodyPr>
-            <a:normAutofit/>
-          </a:bodyPr>
-          <a:lstStyle/>
-          <a:p>
-            <a:r>
-              <a:rPr lang="en-US" dirty="0"/>
-              <a:t>Recommended reading</a:t>
-            </a:r>
-          </a:p>
-        </p:txBody>
-      </p:sp>
-      <p:sp>
-        <p:nvSpPr>
-          <p:cNvPr id="2" name="Date Placeholder 1"/>
-          <p:cNvSpPr>
-            <a:spLocks noGrp="1"/>
-          </p:cNvSpPr>
-          <p:nvPr>
-            <p:ph type="dt" sz="half" idx="10"/>
-          </p:nvPr>
-        </p:nvSpPr>
-        <p:spPr/>
-        <p:txBody>
-          <a:bodyPr/>
-          <a:lstStyle/>
-          <a:p>
-            <a:r>
-              <a:rPr lang="de-CH"/>
-              <a:t>August 2023, CC BY-SA 4.0</a:t>
-            </a:r>
-            <a:endParaRPr lang="en-US"/>
-          </a:p>
-        </p:txBody>
-      </p:sp>
-      <p:sp>
-        <p:nvSpPr>
-          <p:cNvPr id="3" name="Footer Placeholder 2"/>
-          <p:cNvSpPr>
-            <a:spLocks noGrp="1"/>
-          </p:cNvSpPr>
-          <p:nvPr>
-            <p:ph type="ftr" sz="quarter" idx="11"/>
-          </p:nvPr>
-        </p:nvSpPr>
-        <p:spPr/>
-        <p:txBody>
-          <a:bodyPr/>
-          <a:lstStyle/>
-          <a:p>
-            <a:r>
-              <a:rPr lang="en-US"/>
-              <a:t>Continuous integration, v4.0</a:t>
-            </a:r>
-          </a:p>
-        </p:txBody>
-      </p:sp>
-      <p:pic>
-        <p:nvPicPr>
-          <p:cNvPr id="9" name="Picture 8"/>
-          <p:cNvPicPr>
-            <a:picLocks noChangeAspect="1"/>
-          </p:cNvPicPr>
-          <p:nvPr/>
-        </p:nvPicPr>
-        <p:blipFill>
-          <a:blip r:embed="rId2"/>
-          <a:stretch>
-            <a:fillRect/>
-          </a:stretch>
-        </p:blipFill>
-        <p:spPr>
-          <a:xfrm>
-            <a:off x="2351585" y="2132856"/>
-            <a:ext cx="2352367" cy="2952328"/>
-          </a:xfrm>
-          <a:prstGeom prst="rect">
-            <a:avLst/>
-          </a:prstGeom>
-        </p:spPr>
-      </p:pic>
-      <p:pic>
-        <p:nvPicPr>
-          <p:cNvPr id="10" name="Picture 9"/>
-          <p:cNvPicPr>
-            <a:picLocks noChangeAspect="1"/>
-          </p:cNvPicPr>
-          <p:nvPr/>
-        </p:nvPicPr>
-        <p:blipFill>
-          <a:blip r:embed="rId3"/>
-          <a:stretch>
-            <a:fillRect/>
-          </a:stretch>
-        </p:blipFill>
-        <p:spPr>
-          <a:xfrm>
-            <a:off x="5015880" y="2132856"/>
-            <a:ext cx="2355484" cy="2952328"/>
-          </a:xfrm>
-          <a:prstGeom prst="rect">
-            <a:avLst/>
-          </a:prstGeom>
-        </p:spPr>
-      </p:pic>
-      <p:pic>
-        <p:nvPicPr>
-          <p:cNvPr id="11" name="Picture 10"/>
-          <p:cNvPicPr>
-            <a:picLocks noChangeAspect="1"/>
-          </p:cNvPicPr>
-          <p:nvPr/>
-        </p:nvPicPr>
-        <p:blipFill>
-          <a:blip r:embed="rId4"/>
-          <a:stretch>
-            <a:fillRect/>
-          </a:stretch>
-        </p:blipFill>
-        <p:spPr>
-          <a:xfrm>
-            <a:off x="7680177" y="2132856"/>
-            <a:ext cx="2273475" cy="2952328"/>
-          </a:xfrm>
-          <a:prstGeom prst="rect">
-            <a:avLst/>
-          </a:prstGeom>
-        </p:spPr>
-      </p:pic>
-      <p:sp>
-        <p:nvSpPr>
-          <p:cNvPr id="4" name="Slide Number Placeholder 3">
-            <a:extLst>
-              <a:ext uri="{FF2B5EF4-FFF2-40B4-BE49-F238E27FC236}">
-                <a16:creationId xmlns:a16="http://schemas.microsoft.com/office/drawing/2014/main" id="{FEFFB0F3-FEA9-0348-6B4A-F74170B41898}"/>
-              </a:ext>
-            </a:extLst>
-          </p:cNvPr>
-          <p:cNvSpPr>
-            <a:spLocks noGrp="1"/>
-          </p:cNvSpPr>
-          <p:nvPr>
-            <p:ph type="sldNum" sz="quarter" idx="12"/>
-          </p:nvPr>
-        </p:nvSpPr>
-        <p:spPr/>
-        <p:txBody>
-          <a:bodyPr/>
-          <a:lstStyle/>
-          <a:p>
-            <a:fld id="{EF79ADEA-B933-47CC-A4E9-04E6298B917C}" type="slidenum">
-              <a:rPr lang="en-US" smtClean="0"/>
-              <a:pPr/>
-              <a:t>20</a:t>
-            </a:fld>
-            <a:endParaRPr lang="en-US"/>
-          </a:p>
-        </p:txBody>
-      </p:sp>
-    </p:spTree>
-    <p:extLst>
-      <p:ext uri="{BB962C8B-B14F-4D97-AF65-F5344CB8AC3E}">
-        <p14:creationId xmlns:p14="http://schemas.microsoft.com/office/powerpoint/2010/main" val="554997526"/>
-      </p:ext>
-    </p:extLst>
-  </p:cSld>
-  <p:clrMapOvr>
-    <a:masterClrMapping/>
-  </p:clrMapOvr>
-</p:sld>
-</file>
-
-<file path=ppt/slides/slide21.xml><?xml version="1.0" encoding="utf-8"?>
-<p:sld xmlns:a="http://schemas.openxmlformats.org/drawingml/2006/main" xmlns:r="http://schemas.openxmlformats.org/officeDocument/2006/relationships" xmlns:p="http://schemas.openxmlformats.org/presentationml/2006/main">
-  <p:cSld>
-    <p:spTree>
-      <p:nvGrpSpPr>
-        <p:cNvPr id="1" name=""/>
-        <p:cNvGrpSpPr/>
-        <p:nvPr/>
-      </p:nvGrpSpPr>
-      <p:grpSpPr>
-        <a:xfrm>
-          <a:off x="0" y="0"/>
-          <a:ext cx="0" cy="0"/>
-          <a:chOff x="0" y="0"/>
-          <a:chExt cx="0" cy="0"/>
-        </a:xfrm>
-      </p:grpSpPr>
-      <p:sp>
-        <p:nvSpPr>
-          <p:cNvPr id="3" name="Date Placeholder 2"/>
-          <p:cNvSpPr>
-            <a:spLocks noGrp="1"/>
-          </p:cNvSpPr>
-          <p:nvPr>
-            <p:ph type="dt" sz="half" idx="10"/>
-          </p:nvPr>
-        </p:nvSpPr>
-        <p:spPr/>
-        <p:txBody>
-          <a:bodyPr/>
-          <a:lstStyle/>
-          <a:p>
-            <a:r>
-              <a:rPr lang="de-CH"/>
-              <a:t>August 2023, CC BY-SA 4.0</a:t>
-            </a:r>
-            <a:endParaRPr lang="en-US"/>
-          </a:p>
-        </p:txBody>
-      </p:sp>
-      <p:sp>
-        <p:nvSpPr>
-          <p:cNvPr id="4" name="Footer Placeholder 3"/>
-          <p:cNvSpPr>
-            <a:spLocks noGrp="1"/>
-          </p:cNvSpPr>
-          <p:nvPr>
-            <p:ph type="ftr" sz="quarter" idx="11"/>
-          </p:nvPr>
-        </p:nvSpPr>
-        <p:spPr/>
-        <p:txBody>
-          <a:bodyPr/>
-          <a:lstStyle/>
-          <a:p>
-            <a:r>
-              <a:rPr lang="en-US"/>
-              <a:t>Continuous integration, v4.0</a:t>
-            </a:r>
-          </a:p>
-        </p:txBody>
-      </p:sp>
-      <p:sp>
-        <p:nvSpPr>
-          <p:cNvPr id="2" name="Title 1"/>
-          <p:cNvSpPr>
-            <a:spLocks noGrp="1"/>
-          </p:cNvSpPr>
-          <p:nvPr>
-            <p:ph type="title" idx="4294967295"/>
-          </p:nvPr>
-        </p:nvSpPr>
-        <p:spPr>
-          <a:xfrm>
-            <a:off x="1981200" y="2708920"/>
-            <a:ext cx="8229600" cy="990600"/>
-          </a:xfrm>
-        </p:spPr>
-        <p:txBody>
-          <a:bodyPr anchor="ctr">
-            <a:normAutofit/>
-          </a:bodyPr>
-          <a:lstStyle/>
-          <a:p>
-            <a:pPr algn="ctr"/>
-            <a:r>
-              <a:rPr lang="en-GB" sz="6000" dirty="0"/>
-              <a:t>Thank you!</a:t>
-            </a:r>
-          </a:p>
-        </p:txBody>
-      </p:sp>
-      <p:sp>
-        <p:nvSpPr>
-          <p:cNvPr id="5" name="Slide Number Placeholder 4">
-            <a:extLst>
-              <a:ext uri="{FF2B5EF4-FFF2-40B4-BE49-F238E27FC236}">
-                <a16:creationId xmlns:a16="http://schemas.microsoft.com/office/drawing/2014/main" id="{42177564-7B7F-A6B5-E504-FD7CCEBE8303}"/>
-              </a:ext>
-            </a:extLst>
-          </p:cNvPr>
-          <p:cNvSpPr>
-            <a:spLocks noGrp="1"/>
-          </p:cNvSpPr>
-          <p:nvPr>
-            <p:ph type="sldNum" sz="quarter" idx="12"/>
-          </p:nvPr>
-        </p:nvSpPr>
-        <p:spPr/>
-        <p:txBody>
-          <a:bodyPr/>
-          <a:lstStyle/>
-          <a:p>
-            <a:fld id="{EF79ADEA-B933-47CC-A4E9-04E6298B917C}" type="slidenum">
-              <a:rPr lang="en-US" smtClean="0"/>
-              <a:pPr/>
-              <a:t>21</a:t>
-            </a:fld>
-            <a:endParaRPr lang="en-US"/>
-          </a:p>
-        </p:txBody>
-      </p:sp>
-    </p:spTree>
-  </p:cSld>
-  <p:clrMapOvr>
-    <a:masterClrMapping/>
-  </p:clrMapOvr>
-</p:sld>
-</file>
-
-<file path=ppt/slides/slide22.xml><?xml version="1.0" encoding="utf-8"?>
-<p:sld xmlns:a="http://schemas.openxmlformats.org/drawingml/2006/main" xmlns:r="http://schemas.openxmlformats.org/officeDocument/2006/relationships" xmlns:p="http://schemas.openxmlformats.org/presentationml/2006/main">
-  <p:cSld>
-    <p:spTree>
-      <p:nvGrpSpPr>
-        <p:cNvPr id="1" name=""/>
-        <p:cNvGrpSpPr/>
-        <p:nvPr/>
-      </p:nvGrpSpPr>
-      <p:grpSpPr>
-        <a:xfrm>
-          <a:off x="0" y="0"/>
-          <a:ext cx="0" cy="0"/>
-          <a:chOff x="0" y="0"/>
-          <a:chExt cx="0" cy="0"/>
-        </a:xfrm>
-      </p:grpSpPr>
-      <p:sp>
-        <p:nvSpPr>
           <p:cNvPr id="2" name="Date Placeholder 1"/>
           <p:cNvSpPr>
             <a:spLocks noGrp="1"/>
@@ -8727,7 +8897,7 @@
 </file>
 
 <file path=ppt/slides/slide23.xml><?xml version="1.0" encoding="utf-8"?>
-<p:sld xmlns:a="http://schemas.openxmlformats.org/drawingml/2006/main" xmlns:r="http://schemas.openxmlformats.org/officeDocument/2006/relationships" xmlns:p="http://schemas.openxmlformats.org/presentationml/2006/main">
+<p:sld xmlns:a="http://schemas.openxmlformats.org/drawingml/2006/main" xmlns:r="http://schemas.openxmlformats.org/officeDocument/2006/relationships" xmlns:p="http://schemas.openxmlformats.org/presentationml/2006/main" show="0">
   <p:cSld>
     <p:spTree>
       <p:nvGrpSpPr>
@@ -9286,7 +9456,7 @@
 </file>
 
 <file path=ppt/slides/slide24.xml><?xml version="1.0" encoding="utf-8"?>
-<p:sld xmlns:a="http://schemas.openxmlformats.org/drawingml/2006/main" xmlns:r="http://schemas.openxmlformats.org/officeDocument/2006/relationships" xmlns:p="http://schemas.openxmlformats.org/presentationml/2006/main">
+<p:sld xmlns:a="http://schemas.openxmlformats.org/drawingml/2006/main" xmlns:r="http://schemas.openxmlformats.org/officeDocument/2006/relationships" xmlns:p="http://schemas.openxmlformats.org/presentationml/2006/main" show="0">
   <p:cSld>
     <p:spTree>
       <p:nvGrpSpPr>
@@ -9555,7 +9725,7 @@
 </file>
 
 <file path=ppt/slides/slide25.xml><?xml version="1.0" encoding="utf-8"?>
-<p:sld xmlns:a="http://schemas.openxmlformats.org/drawingml/2006/main" xmlns:r="http://schemas.openxmlformats.org/officeDocument/2006/relationships" xmlns:p="http://schemas.openxmlformats.org/presentationml/2006/main">
+<p:sld xmlns:a="http://schemas.openxmlformats.org/drawingml/2006/main" xmlns:r="http://schemas.openxmlformats.org/officeDocument/2006/relationships" xmlns:p="http://schemas.openxmlformats.org/presentationml/2006/main" show="0">
   <p:cSld>
     <p:spTree>
       <p:nvGrpSpPr>
@@ -11304,7 +11474,7 @@
           <p:cNvPr id="2" name="Title 1">
             <a:extLst>
               <a:ext uri="{FF2B5EF4-FFF2-40B4-BE49-F238E27FC236}">
-                <a16:creationId xmlns:a16="http://schemas.microsoft.com/office/drawing/2014/main" id="{BD476358-0FD2-764F-AEC5-3A574E8F39D1}"/>
+                <a16:creationId xmlns:a16="http://schemas.microsoft.com/office/drawing/2014/main" id="{0209F7B9-B500-6A48-B3AA-7D5C6DC44CB2}"/>
               </a:ext>
             </a:extLst>
           </p:cNvPr>
@@ -11322,7 +11492,7 @@
           <a:p>
             <a:r>
               <a:rPr lang="en-CH" dirty="0"/>
-              <a:t>GitHub Actions basic ideas</a:t>
+              <a:t>Conclusions</a:t>
             </a:r>
           </a:p>
         </p:txBody>
@@ -11332,7 +11502,7 @@
           <p:cNvPr id="3" name="Content Placeholder 2">
             <a:extLst>
               <a:ext uri="{FF2B5EF4-FFF2-40B4-BE49-F238E27FC236}">
-                <a16:creationId xmlns:a16="http://schemas.microsoft.com/office/drawing/2014/main" id="{6D76AC3E-727D-9345-BF91-E141F622FCB8}"/>
+                <a16:creationId xmlns:a16="http://schemas.microsoft.com/office/drawing/2014/main" id="{B483744F-BEF5-0B46-9B81-355BEB76BA2A}"/>
               </a:ext>
             </a:extLst>
           </p:cNvPr>
@@ -11343,83 +11513,20 @@
             <p:ph idx="1"/>
           </p:nvPr>
         </p:nvSpPr>
-        <p:spPr>
-          <a:xfrm>
-            <a:off x="838200" y="1196752"/>
-            <a:ext cx="10515600" cy="4980211"/>
-          </a:xfrm>
-        </p:spPr>
-        <p:txBody>
-          <a:bodyPr>
-            <a:normAutofit lnSpcReduction="10000"/>
-          </a:bodyPr>
-          <a:lstStyle/>
-          <a:p>
-            <a:pPr marL="0" indent="0">
-              <a:buNone/>
-            </a:pPr>
+        <p:spPr/>
+        <p:txBody>
+          <a:bodyPr/>
+          <a:lstStyle/>
+          <a:p>
             <a:r>
               <a:rPr lang="en-CH" dirty="0"/>
-              <a:t>An event occurs, it has an associated commit SHA</a:t>
-            </a:r>
-            <a:br>
-              <a:rPr lang="en-CH" dirty="0"/>
-            </a:br>
-            <a:r>
-              <a:rPr lang="en-CH" dirty="0"/>
-              <a:t>(e.g., a PR is opened or a commit tag is pushed)</a:t>
-            </a:r>
-          </a:p>
-          <a:p>
-            <a:pPr marL="0" indent="0">
-              <a:buNone/>
-            </a:pPr>
-            <a:br>
-              <a:rPr lang="en-CH" dirty="0"/>
-            </a:br>
-            <a:br>
-              <a:rPr lang="en-CH" dirty="0"/>
-            </a:br>
-            <a:endParaRPr lang="de-DE" dirty="0"/>
-          </a:p>
-          <a:p>
-            <a:pPr marL="0" indent="0">
-              <a:buNone/>
-            </a:pPr>
-            <a:r>
-              <a:rPr lang="en-CH" dirty="0"/>
-              <a:t>GitHub searches for config files in </a:t>
-            </a:r>
-            <a:r>
-              <a:rPr lang="en-CH" sz="2000" dirty="0">
-                <a:latin typeface="Consolas" panose="020B0609020204030204" pitchFamily="49" charset="0"/>
-                <a:cs typeface="Consolas" panose="020B0609020204030204" pitchFamily="49" charset="0"/>
-              </a:rPr>
-              <a:t>.github/workflows </a:t>
-            </a:r>
-            <a:r>
-              <a:rPr lang="en-CH" dirty="0"/>
-              <a:t>at that SHA, and looks if there is a trigger that matches the event</a:t>
-            </a:r>
-            <a:br>
-              <a:rPr lang="en-CH" dirty="0"/>
-            </a:br>
-            <a:br>
-              <a:rPr lang="en-CH" dirty="0"/>
-            </a:br>
-            <a:br>
-              <a:rPr lang="en-CH" dirty="0"/>
-            </a:br>
-            <a:endParaRPr lang="de-DE" dirty="0"/>
-          </a:p>
-          <a:p>
-            <a:pPr marL="0" indent="0">
-              <a:buNone/>
-            </a:pPr>
-            <a:r>
-              <a:rPr lang="en-CH" dirty="0"/>
-              <a:t>It then creates a virtual machine as specified in the config file and runs the commands listed there</a:t>
-            </a:r>
+              <a:t>It takes a bit of time to set up and debug a Continuous Integration workflow, but it’s a good investment that can save you a lot </a:t>
+            </a:r>
+            <a:r>
+              <a:rPr lang="en-CH"/>
+              <a:t>of time later on!</a:t>
+            </a:r>
+            <a:endParaRPr lang="en-CH" dirty="0"/>
           </a:p>
         </p:txBody>
       </p:sp>
@@ -11428,7 +11535,7 @@
           <p:cNvPr id="4" name="Date Placeholder 3">
             <a:extLst>
               <a:ext uri="{FF2B5EF4-FFF2-40B4-BE49-F238E27FC236}">
-                <a16:creationId xmlns:a16="http://schemas.microsoft.com/office/drawing/2014/main" id="{01B74FBB-6928-0E40-87F8-3689137B6A44}"/>
+                <a16:creationId xmlns:a16="http://schemas.microsoft.com/office/drawing/2014/main" id="{C03D37C7-B59B-1048-A802-78F6FA69F6C7}"/>
               </a:ext>
             </a:extLst>
           </p:cNvPr>
@@ -11457,7 +11564,7 @@
           <p:cNvPr id="5" name="Footer Placeholder 4">
             <a:extLst>
               <a:ext uri="{FF2B5EF4-FFF2-40B4-BE49-F238E27FC236}">
-                <a16:creationId xmlns:a16="http://schemas.microsoft.com/office/drawing/2014/main" id="{4FB5E559-28D2-B742-A608-B353E85B9786}"/>
+                <a16:creationId xmlns:a16="http://schemas.microsoft.com/office/drawing/2014/main" id="{DB93DB5F-4A03-CA44-A54B-D5F34E39E00B}"/>
               </a:ext>
             </a:extLst>
           </p:cNvPr>
@@ -11481,104 +11588,48 @@
           </a:p>
         </p:txBody>
       </p:sp>
-      <p:sp>
-        <p:nvSpPr>
-          <p:cNvPr id="6" name="Down Arrow 5">
-            <a:extLst>
-              <a:ext uri="{FF2B5EF4-FFF2-40B4-BE49-F238E27FC236}">
-                <a16:creationId xmlns:a16="http://schemas.microsoft.com/office/drawing/2014/main" id="{50A72591-34F8-1346-A0C1-FA32BF9E01FA}"/>
-              </a:ext>
-            </a:extLst>
-          </p:cNvPr>
-          <p:cNvSpPr/>
+      <p:pic>
+        <p:nvPicPr>
+          <p:cNvPr id="7" name="Picture 6" descr="A picture containing metalware, gear, white&#10;&#10;Description automatically generated">
+            <a:extLst>
+              <a:ext uri="{FF2B5EF4-FFF2-40B4-BE49-F238E27FC236}">
+                <a16:creationId xmlns:a16="http://schemas.microsoft.com/office/drawing/2014/main" id="{1C8CF780-D6FA-BB4C-A576-417D77749A00}"/>
+              </a:ext>
+            </a:extLst>
+          </p:cNvPr>
+          <p:cNvPicPr>
+            <a:picLocks noChangeAspect="1"/>
+          </p:cNvPicPr>
           <p:nvPr/>
-        </p:nvSpPr>
+        </p:nvPicPr>
+        <p:blipFill>
+          <a:blip r:embed="rId2">
+            <a:extLst>
+              <a:ext uri="{28A0092B-C50C-407E-A947-70E740481C1C}">
+                <a14:useLocalDpi xmlns:a14="http://schemas.microsoft.com/office/drawing/2010/main" val="0"/>
+              </a:ext>
+            </a:extLst>
+          </a:blip>
+          <a:stretch>
+            <a:fillRect/>
+          </a:stretch>
+        </p:blipFill>
         <p:spPr>
-          <a:xfrm>
-            <a:off x="5663952" y="2366883"/>
-            <a:ext cx="720080" cy="504056"/>
+          <a:xfrm rot="16200000">
+            <a:off x="7481585" y="3157241"/>
+            <a:ext cx="3830908" cy="2567310"/>
           </a:xfrm>
-          <a:prstGeom prst="downArrow">
+          <a:prstGeom prst="rect">
             <a:avLst/>
           </a:prstGeom>
         </p:spPr>
-        <p:style>
-          <a:lnRef idx="2">
-            <a:schemeClr val="dk1">
-              <a:shade val="50000"/>
-            </a:schemeClr>
-          </a:lnRef>
-          <a:fillRef idx="1">
-            <a:schemeClr val="dk1"/>
-          </a:fillRef>
-          <a:effectRef idx="0">
-            <a:schemeClr val="dk1"/>
-          </a:effectRef>
-          <a:fontRef idx="minor">
-            <a:schemeClr val="lt1"/>
-          </a:fontRef>
-        </p:style>
-        <p:txBody>
-          <a:bodyPr rtlCol="0" anchor="ctr"/>
-          <a:lstStyle/>
-          <a:p>
-            <a:pPr algn="ctr"/>
-            <a:endParaRPr lang="en-DE"/>
-          </a:p>
-        </p:txBody>
-      </p:sp>
-      <p:sp>
-        <p:nvSpPr>
-          <p:cNvPr id="7" name="Down Arrow 6">
-            <a:extLst>
-              <a:ext uri="{FF2B5EF4-FFF2-40B4-BE49-F238E27FC236}">
-                <a16:creationId xmlns:a16="http://schemas.microsoft.com/office/drawing/2014/main" id="{CDB19F76-86CF-6A42-A378-4363121B737B}"/>
-              </a:ext>
-            </a:extLst>
-          </p:cNvPr>
-          <p:cNvSpPr/>
-          <p:nvPr/>
-        </p:nvSpPr>
-        <p:spPr>
-          <a:xfrm>
-            <a:off x="5663952" y="4125543"/>
-            <a:ext cx="720080" cy="504056"/>
-          </a:xfrm>
-          <a:prstGeom prst="downArrow">
-            <a:avLst/>
-          </a:prstGeom>
-        </p:spPr>
-        <p:style>
-          <a:lnRef idx="2">
-            <a:schemeClr val="dk1">
-              <a:shade val="50000"/>
-            </a:schemeClr>
-          </a:lnRef>
-          <a:fillRef idx="1">
-            <a:schemeClr val="dk1"/>
-          </a:fillRef>
-          <a:effectRef idx="0">
-            <a:schemeClr val="dk1"/>
-          </a:effectRef>
-          <a:fontRef idx="minor">
-            <a:schemeClr val="lt1"/>
-          </a:fontRef>
-        </p:style>
-        <p:txBody>
-          <a:bodyPr rtlCol="0" anchor="ctr"/>
-          <a:lstStyle/>
-          <a:p>
-            <a:pPr algn="ctr"/>
-            <a:endParaRPr lang="en-DE"/>
-          </a:p>
-        </p:txBody>
-      </p:sp>
-      <p:sp>
-        <p:nvSpPr>
-          <p:cNvPr id="8" name="Slide Number Placeholder 7">
-            <a:extLst>
-              <a:ext uri="{FF2B5EF4-FFF2-40B4-BE49-F238E27FC236}">
-                <a16:creationId xmlns:a16="http://schemas.microsoft.com/office/drawing/2014/main" id="{B63FAC1A-9BFC-440F-8AC4-C3F27E96EB3D}"/>
+      </p:pic>
+      <p:sp>
+        <p:nvSpPr>
+          <p:cNvPr id="6" name="Slide Number Placeholder 5">
+            <a:extLst>
+              <a:ext uri="{FF2B5EF4-FFF2-40B4-BE49-F238E27FC236}">
+                <a16:creationId xmlns:a16="http://schemas.microsoft.com/office/drawing/2014/main" id="{5DEDE8BE-6A16-9CF5-AAB2-D916CF912B21}"/>
               </a:ext>
             </a:extLst>
           </p:cNvPr>
@@ -11606,7 +11657,7 @@
     </p:spTree>
     <p:extLst>
       <p:ext uri="{BB962C8B-B14F-4D97-AF65-F5344CB8AC3E}">
-        <p14:creationId xmlns:p14="http://schemas.microsoft.com/office/powerpoint/2010/main" val="3315879559"/>
+        <p14:creationId xmlns:p14="http://schemas.microsoft.com/office/powerpoint/2010/main" val="202595180"/>
       </p:ext>
     </p:extLst>
   </p:cSld>
@@ -11635,13 +11686,7 @@
       </p:grpSpPr>
       <p:sp>
         <p:nvSpPr>
-          <p:cNvPr id="2" name="Title 1">
-            <a:extLst>
-              <a:ext uri="{FF2B5EF4-FFF2-40B4-BE49-F238E27FC236}">
-                <a16:creationId xmlns:a16="http://schemas.microsoft.com/office/drawing/2014/main" id="{BD476358-0FD2-764F-AEC5-3A574E8F39D1}"/>
-              </a:ext>
-            </a:extLst>
-          </p:cNvPr>
+          <p:cNvPr id="6" name="Title 5"/>
           <p:cNvSpPr>
             <a:spLocks noGrp="1"/>
           </p:cNvSpPr>
@@ -11651,62 +11696,21 @@
         </p:nvSpPr>
         <p:spPr/>
         <p:txBody>
-          <a:bodyPr/>
-          <a:lstStyle/>
-          <a:p>
-            <a:r>
-              <a:rPr lang="en-CH" dirty="0"/>
-              <a:t>GitHub Actions basic ideas</a:t>
-            </a:r>
-          </a:p>
-        </p:txBody>
-      </p:sp>
-      <p:sp>
-        <p:nvSpPr>
-          <p:cNvPr id="3" name="Content Placeholder 2">
-            <a:extLst>
-              <a:ext uri="{FF2B5EF4-FFF2-40B4-BE49-F238E27FC236}">
-                <a16:creationId xmlns:a16="http://schemas.microsoft.com/office/drawing/2014/main" id="{6D76AC3E-727D-9345-BF91-E141F622FCB8}"/>
-              </a:ext>
-            </a:extLst>
-          </p:cNvPr>
-          <p:cNvSpPr>
-            <a:spLocks noGrp="1"/>
-          </p:cNvSpPr>
-          <p:nvPr>
-            <p:ph idx="1"/>
-          </p:nvPr>
-        </p:nvSpPr>
-        <p:spPr/>
-        <p:txBody>
-          <a:bodyPr/>
-          <a:lstStyle/>
-          <a:p>
-            <a:r>
-              <a:rPr lang="en-CH"/>
-              <a:t>The </a:t>
-            </a:r>
-            <a:r>
-              <a:rPr lang="en-CH" dirty="0"/>
-              <a:t>outcome is logged and if the job exits cleanly it is marked as ”passed” otherwise “</a:t>
-            </a:r>
-            <a:r>
-              <a:rPr lang="en-CH"/>
-              <a:t>failed”</a:t>
-            </a:r>
-            <a:endParaRPr lang="de-DE" dirty="0"/>
-          </a:p>
-        </p:txBody>
-      </p:sp>
-      <p:sp>
-        <p:nvSpPr>
-          <p:cNvPr id="4" name="Date Placeholder 3">
-            <a:extLst>
-              <a:ext uri="{FF2B5EF4-FFF2-40B4-BE49-F238E27FC236}">
-                <a16:creationId xmlns:a16="http://schemas.microsoft.com/office/drawing/2014/main" id="{01B74FBB-6928-0E40-87F8-3689137B6A44}"/>
-              </a:ext>
-            </a:extLst>
-          </p:cNvPr>
+          <a:bodyPr>
+            <a:normAutofit/>
+          </a:bodyPr>
+          <a:lstStyle/>
+          <a:p>
+            <a:r>
+              <a:rPr lang="en-US" dirty="0"/>
+              <a:t>Recommended reading</a:t>
+            </a:r>
+          </a:p>
+        </p:txBody>
+      </p:sp>
+      <p:sp>
+        <p:nvSpPr>
+          <p:cNvPr id="2" name="Date Placeholder 1"/>
           <p:cNvSpPr>
             <a:spLocks noGrp="1"/>
           </p:cNvSpPr>
@@ -11720,22 +11724,16 @@
           <a:lstStyle/>
           <a:p>
             <a:r>
-              <a:rPr lang="de-CH" sz="1000"/>
+              <a:rPr lang="de-CH"/>
               <a:t>August 2023, CC BY-SA 4.0</a:t>
             </a:r>
-            <a:endParaRPr lang="en-US" sz="1000" dirty="0"/>
-          </a:p>
-        </p:txBody>
-      </p:sp>
-      <p:sp>
-        <p:nvSpPr>
-          <p:cNvPr id="5" name="Footer Placeholder 4">
-            <a:extLst>
-              <a:ext uri="{FF2B5EF4-FFF2-40B4-BE49-F238E27FC236}">
-                <a16:creationId xmlns:a16="http://schemas.microsoft.com/office/drawing/2014/main" id="{4FB5E559-28D2-B742-A608-B353E85B9786}"/>
-              </a:ext>
-            </a:extLst>
-          </p:cNvPr>
+            <a:endParaRPr lang="en-US"/>
+          </a:p>
+        </p:txBody>
+      </p:sp>
+      <p:sp>
+        <p:nvSpPr>
+          <p:cNvPr id="3" name="Footer Placeholder 2"/>
           <p:cNvSpPr>
             <a:spLocks noGrp="1"/>
           </p:cNvSpPr>
@@ -11752,40 +11750,27 @@
               <a:rPr lang="en-US"/>
               <a:t>Continuous integration, v4.0</a:t>
             </a:r>
-            <a:endParaRPr lang="en-US" dirty="0"/>
           </a:p>
         </p:txBody>
       </p:sp>
       <p:pic>
         <p:nvPicPr>
-          <p:cNvPr id="8" name="Picture 7" descr="A screenshot of a computer&#10;&#10;Description automatically generated with medium confidence">
-            <a:extLst>
-              <a:ext uri="{FF2B5EF4-FFF2-40B4-BE49-F238E27FC236}">
-                <a16:creationId xmlns:a16="http://schemas.microsoft.com/office/drawing/2014/main" id="{2161033D-8E2B-394A-B1ED-5F835F679C2E}"/>
-              </a:ext>
-            </a:extLst>
-          </p:cNvPr>
+          <p:cNvPr id="9" name="Picture 8"/>
           <p:cNvPicPr>
             <a:picLocks noChangeAspect="1"/>
           </p:cNvPicPr>
           <p:nvPr/>
         </p:nvPicPr>
         <p:blipFill>
-          <a:blip r:embed="rId2">
-            <a:extLst>
-              <a:ext uri="{28A0092B-C50C-407E-A947-70E740481C1C}">
-                <a14:useLocalDpi xmlns:a14="http://schemas.microsoft.com/office/drawing/2010/main" val="0"/>
-              </a:ext>
-            </a:extLst>
-          </a:blip>
+          <a:blip r:embed="rId2"/>
           <a:stretch>
             <a:fillRect/>
           </a:stretch>
         </p:blipFill>
         <p:spPr>
           <a:xfrm>
-            <a:off x="1991544" y="2562763"/>
-            <a:ext cx="5328592" cy="2316779"/>
+            <a:off x="2351585" y="2132856"/>
+            <a:ext cx="2352367" cy="2952328"/>
           </a:xfrm>
           <a:prstGeom prst="rect">
             <a:avLst/>
@@ -11794,46 +11779,58 @@
       </p:pic>
       <p:pic>
         <p:nvPicPr>
-          <p:cNvPr id="9" name="Picture 8" descr="Graphical user interface, text, application&#10;&#10;Description automatically generated">
-            <a:extLst>
-              <a:ext uri="{FF2B5EF4-FFF2-40B4-BE49-F238E27FC236}">
-                <a16:creationId xmlns:a16="http://schemas.microsoft.com/office/drawing/2014/main" id="{EC30FD2E-55B1-4D4E-8DCD-80DC18F36C5A}"/>
-              </a:ext>
-            </a:extLst>
-          </p:cNvPr>
+          <p:cNvPr id="10" name="Picture 9"/>
           <p:cNvPicPr>
             <a:picLocks noChangeAspect="1"/>
           </p:cNvPicPr>
           <p:nvPr/>
         </p:nvPicPr>
         <p:blipFill>
-          <a:blip r:embed="rId3">
-            <a:extLst>
-              <a:ext uri="{28A0092B-C50C-407E-A947-70E740481C1C}">
-                <a14:useLocalDpi xmlns:a14="http://schemas.microsoft.com/office/drawing/2010/main" val="0"/>
-              </a:ext>
-            </a:extLst>
-          </a:blip>
+          <a:blip r:embed="rId3"/>
           <a:stretch>
             <a:fillRect/>
           </a:stretch>
         </p:blipFill>
         <p:spPr>
           <a:xfrm>
-            <a:off x="4778220" y="3920550"/>
-            <a:ext cx="5442924" cy="2316762"/>
+            <a:off x="5015880" y="2132856"/>
+            <a:ext cx="2355484" cy="2952328"/>
           </a:xfrm>
           <a:prstGeom prst="rect">
             <a:avLst/>
           </a:prstGeom>
         </p:spPr>
       </p:pic>
-      <p:sp>
-        <p:nvSpPr>
-          <p:cNvPr id="6" name="Slide Number Placeholder 5">
-            <a:extLst>
-              <a:ext uri="{FF2B5EF4-FFF2-40B4-BE49-F238E27FC236}">
-                <a16:creationId xmlns:a16="http://schemas.microsoft.com/office/drawing/2014/main" id="{7B07FFD5-AD05-C0D7-BC0E-E8BF58378D85}"/>
+      <p:pic>
+        <p:nvPicPr>
+          <p:cNvPr id="11" name="Picture 10"/>
+          <p:cNvPicPr>
+            <a:picLocks noChangeAspect="1"/>
+          </p:cNvPicPr>
+          <p:nvPr/>
+        </p:nvPicPr>
+        <p:blipFill>
+          <a:blip r:embed="rId4"/>
+          <a:stretch>
+            <a:fillRect/>
+          </a:stretch>
+        </p:blipFill>
+        <p:spPr>
+          <a:xfrm>
+            <a:off x="7680177" y="2132856"/>
+            <a:ext cx="2273475" cy="2952328"/>
+          </a:xfrm>
+          <a:prstGeom prst="rect">
+            <a:avLst/>
+          </a:prstGeom>
+        </p:spPr>
+      </p:pic>
+      <p:sp>
+        <p:nvSpPr>
+          <p:cNvPr id="4" name="Slide Number Placeholder 3">
+            <a:extLst>
+              <a:ext uri="{FF2B5EF4-FFF2-40B4-BE49-F238E27FC236}">
+                <a16:creationId xmlns:a16="http://schemas.microsoft.com/office/drawing/2014/main" id="{FEFFB0F3-FEA9-0348-6B4A-F74170B41898}"/>
               </a:ext>
             </a:extLst>
           </p:cNvPr>
@@ -11861,7 +11858,7 @@
     </p:spTree>
     <p:extLst>
       <p:ext uri="{BB962C8B-B14F-4D97-AF65-F5344CB8AC3E}">
-        <p14:creationId xmlns:p14="http://schemas.microsoft.com/office/powerpoint/2010/main" val="4034475540"/>
+        <p14:creationId xmlns:p14="http://schemas.microsoft.com/office/powerpoint/2010/main" val="554997526"/>
       </p:ext>
     </p:extLst>
   </p:cSld>

</xml_diff>

<commit_message>
changes lisa 2025 plovdiv
</commit_message>
<xml_diff>
--- a/continuous_integration.pptx
+++ b/continuous_integration.pptx
@@ -5,10 +5,10 @@
     <p:sldMasterId id="2147483672" r:id="rId1"/>
   </p:sldMasterIdLst>
   <p:notesMasterIdLst>
-    <p:notesMasterId r:id="rId27"/>
+    <p:notesMasterId r:id="rId28"/>
   </p:notesMasterIdLst>
   <p:handoutMasterIdLst>
-    <p:handoutMasterId r:id="rId28"/>
+    <p:handoutMasterId r:id="rId29"/>
   </p:handoutMasterIdLst>
   <p:sldIdLst>
     <p:sldId id="273" r:id="rId2"/>
@@ -18,24 +18,25 @@
     <p:sldId id="477" r:id="rId6"/>
     <p:sldId id="306" r:id="rId7"/>
     <p:sldId id="318" r:id="rId8"/>
-    <p:sldId id="322" r:id="rId9"/>
-    <p:sldId id="476" r:id="rId10"/>
-    <p:sldId id="288" r:id="rId11"/>
-    <p:sldId id="308" r:id="rId12"/>
-    <p:sldId id="312" r:id="rId13"/>
-    <p:sldId id="329" r:id="rId14"/>
-    <p:sldId id="324" r:id="rId15"/>
-    <p:sldId id="323" r:id="rId16"/>
-    <p:sldId id="313" r:id="rId17"/>
-    <p:sldId id="319" r:id="rId18"/>
-    <p:sldId id="325" r:id="rId19"/>
-    <p:sldId id="326" r:id="rId20"/>
-    <p:sldId id="327" r:id="rId21"/>
-    <p:sldId id="320" r:id="rId22"/>
-    <p:sldId id="298" r:id="rId23"/>
-    <p:sldId id="328" r:id="rId24"/>
-    <p:sldId id="307" r:id="rId25"/>
-    <p:sldId id="321" r:id="rId26"/>
+    <p:sldId id="478" r:id="rId9"/>
+    <p:sldId id="322" r:id="rId10"/>
+    <p:sldId id="476" r:id="rId11"/>
+    <p:sldId id="288" r:id="rId12"/>
+    <p:sldId id="308" r:id="rId13"/>
+    <p:sldId id="312" r:id="rId14"/>
+    <p:sldId id="329" r:id="rId15"/>
+    <p:sldId id="324" r:id="rId16"/>
+    <p:sldId id="323" r:id="rId17"/>
+    <p:sldId id="313" r:id="rId18"/>
+    <p:sldId id="319" r:id="rId19"/>
+    <p:sldId id="325" r:id="rId20"/>
+    <p:sldId id="326" r:id="rId21"/>
+    <p:sldId id="327" r:id="rId22"/>
+    <p:sldId id="320" r:id="rId23"/>
+    <p:sldId id="298" r:id="rId24"/>
+    <p:sldId id="328" r:id="rId25"/>
+    <p:sldId id="307" r:id="rId26"/>
+    <p:sldId id="321" r:id="rId27"/>
   </p:sldIdLst>
   <p:sldSz cx="12192000" cy="6858000"/>
   <p:notesSz cx="6858000" cy="9144000"/>
@@ -146,6 +147,7 @@
             <p14:sldId id="477"/>
             <p14:sldId id="306"/>
             <p14:sldId id="318"/>
+            <p14:sldId id="478"/>
             <p14:sldId id="322"/>
             <p14:sldId id="476"/>
             <p14:sldId id="288"/>
@@ -4365,6 +4367,207 @@
       </p:grpSpPr>
       <p:sp>
         <p:nvSpPr>
+          <p:cNvPr id="6" name="Title 5"/>
+          <p:cNvSpPr>
+            <a:spLocks noGrp="1"/>
+          </p:cNvSpPr>
+          <p:nvPr>
+            <p:ph type="title"/>
+          </p:nvPr>
+        </p:nvSpPr>
+        <p:spPr/>
+        <p:txBody>
+          <a:bodyPr>
+            <a:normAutofit/>
+          </a:bodyPr>
+          <a:lstStyle/>
+          <a:p>
+            <a:r>
+              <a:rPr lang="en-US" dirty="0"/>
+              <a:t>Recommended reading</a:t>
+            </a:r>
+          </a:p>
+        </p:txBody>
+      </p:sp>
+      <p:sp>
+        <p:nvSpPr>
+          <p:cNvPr id="2" name="Date Placeholder 1"/>
+          <p:cNvSpPr>
+            <a:spLocks noGrp="1"/>
+          </p:cNvSpPr>
+          <p:nvPr>
+            <p:ph type="dt" sz="half" idx="10"/>
+          </p:nvPr>
+        </p:nvSpPr>
+        <p:spPr/>
+        <p:txBody>
+          <a:bodyPr/>
+          <a:lstStyle/>
+          <a:p>
+            <a:r>
+              <a:rPr lang="de-CH"/>
+              <a:t>August 2023, CC BY-SA 4.0</a:t>
+            </a:r>
+            <a:endParaRPr lang="en-US"/>
+          </a:p>
+        </p:txBody>
+      </p:sp>
+      <p:sp>
+        <p:nvSpPr>
+          <p:cNvPr id="3" name="Footer Placeholder 2"/>
+          <p:cNvSpPr>
+            <a:spLocks noGrp="1"/>
+          </p:cNvSpPr>
+          <p:nvPr>
+            <p:ph type="ftr" sz="quarter" idx="11"/>
+          </p:nvPr>
+        </p:nvSpPr>
+        <p:spPr/>
+        <p:txBody>
+          <a:bodyPr/>
+          <a:lstStyle/>
+          <a:p>
+            <a:r>
+              <a:rPr lang="en-US"/>
+              <a:t>Continuous integration, v4.0</a:t>
+            </a:r>
+          </a:p>
+        </p:txBody>
+      </p:sp>
+      <p:pic>
+        <p:nvPicPr>
+          <p:cNvPr id="9" name="Picture 8"/>
+          <p:cNvPicPr>
+            <a:picLocks noChangeAspect="1"/>
+          </p:cNvPicPr>
+          <p:nvPr/>
+        </p:nvPicPr>
+        <p:blipFill>
+          <a:blip r:embed="rId2"/>
+          <a:stretch>
+            <a:fillRect/>
+          </a:stretch>
+        </p:blipFill>
+        <p:spPr>
+          <a:xfrm>
+            <a:off x="2351585" y="2132856"/>
+            <a:ext cx="2352367" cy="2952328"/>
+          </a:xfrm>
+          <a:prstGeom prst="rect">
+            <a:avLst/>
+          </a:prstGeom>
+        </p:spPr>
+      </p:pic>
+      <p:pic>
+        <p:nvPicPr>
+          <p:cNvPr id="10" name="Picture 9"/>
+          <p:cNvPicPr>
+            <a:picLocks noChangeAspect="1"/>
+          </p:cNvPicPr>
+          <p:nvPr/>
+        </p:nvPicPr>
+        <p:blipFill>
+          <a:blip r:embed="rId3"/>
+          <a:stretch>
+            <a:fillRect/>
+          </a:stretch>
+        </p:blipFill>
+        <p:spPr>
+          <a:xfrm>
+            <a:off x="5015880" y="2132856"/>
+            <a:ext cx="2355484" cy="2952328"/>
+          </a:xfrm>
+          <a:prstGeom prst="rect">
+            <a:avLst/>
+          </a:prstGeom>
+        </p:spPr>
+      </p:pic>
+      <p:pic>
+        <p:nvPicPr>
+          <p:cNvPr id="11" name="Picture 10"/>
+          <p:cNvPicPr>
+            <a:picLocks noChangeAspect="1"/>
+          </p:cNvPicPr>
+          <p:nvPr/>
+        </p:nvPicPr>
+        <p:blipFill>
+          <a:blip r:embed="rId4"/>
+          <a:stretch>
+            <a:fillRect/>
+          </a:stretch>
+        </p:blipFill>
+        <p:spPr>
+          <a:xfrm>
+            <a:off x="7680177" y="2132856"/>
+            <a:ext cx="2273475" cy="2952328"/>
+          </a:xfrm>
+          <a:prstGeom prst="rect">
+            <a:avLst/>
+          </a:prstGeom>
+        </p:spPr>
+      </p:pic>
+      <p:sp>
+        <p:nvSpPr>
+          <p:cNvPr id="4" name="Slide Number Placeholder 3">
+            <a:extLst>
+              <a:ext uri="{FF2B5EF4-FFF2-40B4-BE49-F238E27FC236}">
+                <a16:creationId xmlns:a16="http://schemas.microsoft.com/office/drawing/2014/main" id="{FEFFB0F3-FEA9-0348-6B4A-F74170B41898}"/>
+              </a:ext>
+            </a:extLst>
+          </p:cNvPr>
+          <p:cNvSpPr>
+            <a:spLocks noGrp="1"/>
+          </p:cNvSpPr>
+          <p:nvPr>
+            <p:ph type="sldNum" sz="quarter" idx="12"/>
+          </p:nvPr>
+        </p:nvSpPr>
+        <p:spPr/>
+        <p:txBody>
+          <a:bodyPr/>
+          <a:lstStyle/>
+          <a:p>
+            <a:fld id="{EF79ADEA-B933-47CC-A4E9-04E6298B917C}" type="slidenum">
+              <a:rPr lang="en-US" smtClean="0"/>
+              <a:pPr/>
+              <a:t>10</a:t>
+            </a:fld>
+            <a:endParaRPr lang="en-US"/>
+          </a:p>
+        </p:txBody>
+      </p:sp>
+    </p:spTree>
+    <p:extLst>
+      <p:ext uri="{BB962C8B-B14F-4D97-AF65-F5344CB8AC3E}">
+        <p14:creationId xmlns:p14="http://schemas.microsoft.com/office/powerpoint/2010/main" val="554997526"/>
+      </p:ext>
+    </p:extLst>
+  </p:cSld>
+  <p:clrMapOvr>
+    <a:masterClrMapping/>
+  </p:clrMapOvr>
+</p:sld>
+</file>
+
+<file path=ppt/slides/slide11.xml><?xml version="1.0" encoding="utf-8"?>
+<p:sld xmlns:a="http://schemas.openxmlformats.org/drawingml/2006/main" xmlns:r="http://schemas.openxmlformats.org/officeDocument/2006/relationships" xmlns:p="http://schemas.openxmlformats.org/presentationml/2006/main">
+  <p:cSld>
+    <p:spTree>
+      <p:nvGrpSpPr>
+        <p:cNvPr id="1" name=""/>
+        <p:cNvGrpSpPr/>
+        <p:nvPr/>
+      </p:nvGrpSpPr>
+      <p:grpSpPr>
+        <a:xfrm>
+          <a:off x="0" y="0"/>
+          <a:ext cx="0" cy="0"/>
+          <a:chOff x="0" y="0"/>
+          <a:chExt cx="0" cy="0"/>
+        </a:xfrm>
+      </p:grpSpPr>
+      <p:sp>
+        <p:nvSpPr>
           <p:cNvPr id="3" name="Date Placeholder 2"/>
           <p:cNvSpPr>
             <a:spLocks noGrp="1"/>
@@ -4462,7 +4665,7 @@
             <a:fld id="{EF79ADEA-B933-47CC-A4E9-04E6298B917C}" type="slidenum">
               <a:rPr lang="en-US" smtClean="0"/>
               <a:pPr/>
-              <a:t>10</a:t>
+              <a:t>11</a:t>
             </a:fld>
             <a:endParaRPr lang="en-US"/>
           </a:p>
@@ -4476,7 +4679,7 @@
 </p:sld>
 </file>
 
-<file path=ppt/slides/slide11.xml><?xml version="1.0" encoding="utf-8"?>
+<file path=ppt/slides/slide12.xml><?xml version="1.0" encoding="utf-8"?>
 <p:sld xmlns:a="http://schemas.openxmlformats.org/drawingml/2006/main" xmlns:r="http://schemas.openxmlformats.org/officeDocument/2006/relationships" xmlns:p="http://schemas.openxmlformats.org/presentationml/2006/main" show="0">
   <p:cSld>
     <p:spTree>
@@ -4791,7 +4994,7 @@
             <a:fld id="{EF79ADEA-B933-47CC-A4E9-04E6298B917C}" type="slidenum">
               <a:rPr lang="en-US" smtClean="0"/>
               <a:pPr/>
-              <a:t>11</a:t>
+              <a:t>12</a:t>
             </a:fld>
             <a:endParaRPr lang="en-US"/>
           </a:p>
@@ -4801,261 +5004,6 @@
     <p:extLst>
       <p:ext uri="{BB962C8B-B14F-4D97-AF65-F5344CB8AC3E}">
         <p14:creationId xmlns:p14="http://schemas.microsoft.com/office/powerpoint/2010/main" val="3315879559"/>
-      </p:ext>
-    </p:extLst>
-  </p:cSld>
-  <p:clrMapOvr>
-    <a:masterClrMapping/>
-  </p:clrMapOvr>
-</p:sld>
-</file>
-
-<file path=ppt/slides/slide12.xml><?xml version="1.0" encoding="utf-8"?>
-<p:sld xmlns:a="http://schemas.openxmlformats.org/drawingml/2006/main" xmlns:r="http://schemas.openxmlformats.org/officeDocument/2006/relationships" xmlns:p="http://schemas.openxmlformats.org/presentationml/2006/main" show="0">
-  <p:cSld>
-    <p:spTree>
-      <p:nvGrpSpPr>
-        <p:cNvPr id="1" name=""/>
-        <p:cNvGrpSpPr/>
-        <p:nvPr/>
-      </p:nvGrpSpPr>
-      <p:grpSpPr>
-        <a:xfrm>
-          <a:off x="0" y="0"/>
-          <a:ext cx="0" cy="0"/>
-          <a:chOff x="0" y="0"/>
-          <a:chExt cx="0" cy="0"/>
-        </a:xfrm>
-      </p:grpSpPr>
-      <p:sp>
-        <p:nvSpPr>
-          <p:cNvPr id="2" name="Title 1">
-            <a:extLst>
-              <a:ext uri="{FF2B5EF4-FFF2-40B4-BE49-F238E27FC236}">
-                <a16:creationId xmlns:a16="http://schemas.microsoft.com/office/drawing/2014/main" id="{BD476358-0FD2-764F-AEC5-3A574E8F39D1}"/>
-              </a:ext>
-            </a:extLst>
-          </p:cNvPr>
-          <p:cNvSpPr>
-            <a:spLocks noGrp="1"/>
-          </p:cNvSpPr>
-          <p:nvPr>
-            <p:ph type="title"/>
-          </p:nvPr>
-        </p:nvSpPr>
-        <p:spPr/>
-        <p:txBody>
-          <a:bodyPr/>
-          <a:lstStyle/>
-          <a:p>
-            <a:r>
-              <a:rPr lang="en-CH" dirty="0"/>
-              <a:t>GitHub Actions basic ideas</a:t>
-            </a:r>
-          </a:p>
-        </p:txBody>
-      </p:sp>
-      <p:sp>
-        <p:nvSpPr>
-          <p:cNvPr id="3" name="Content Placeholder 2">
-            <a:extLst>
-              <a:ext uri="{FF2B5EF4-FFF2-40B4-BE49-F238E27FC236}">
-                <a16:creationId xmlns:a16="http://schemas.microsoft.com/office/drawing/2014/main" id="{6D76AC3E-727D-9345-BF91-E141F622FCB8}"/>
-              </a:ext>
-            </a:extLst>
-          </p:cNvPr>
-          <p:cNvSpPr>
-            <a:spLocks noGrp="1"/>
-          </p:cNvSpPr>
-          <p:nvPr>
-            <p:ph idx="1"/>
-          </p:nvPr>
-        </p:nvSpPr>
-        <p:spPr/>
-        <p:txBody>
-          <a:bodyPr/>
-          <a:lstStyle/>
-          <a:p>
-            <a:r>
-              <a:rPr lang="en-CH"/>
-              <a:t>The </a:t>
-            </a:r>
-            <a:r>
-              <a:rPr lang="en-CH" dirty="0"/>
-              <a:t>outcome is logged and if the job exits cleanly it is marked as ”passed” otherwise “</a:t>
-            </a:r>
-            <a:r>
-              <a:rPr lang="en-CH"/>
-              <a:t>failed”</a:t>
-            </a:r>
-            <a:endParaRPr lang="de-DE" dirty="0"/>
-          </a:p>
-        </p:txBody>
-      </p:sp>
-      <p:sp>
-        <p:nvSpPr>
-          <p:cNvPr id="4" name="Date Placeholder 3">
-            <a:extLst>
-              <a:ext uri="{FF2B5EF4-FFF2-40B4-BE49-F238E27FC236}">
-                <a16:creationId xmlns:a16="http://schemas.microsoft.com/office/drawing/2014/main" id="{01B74FBB-6928-0E40-87F8-3689137B6A44}"/>
-              </a:ext>
-            </a:extLst>
-          </p:cNvPr>
-          <p:cNvSpPr>
-            <a:spLocks noGrp="1"/>
-          </p:cNvSpPr>
-          <p:nvPr>
-            <p:ph type="dt" sz="half" idx="10"/>
-          </p:nvPr>
-        </p:nvSpPr>
-        <p:spPr/>
-        <p:txBody>
-          <a:bodyPr/>
-          <a:lstStyle/>
-          <a:p>
-            <a:r>
-              <a:rPr lang="de-CH" sz="1000"/>
-              <a:t>August 2023, CC BY-SA 4.0</a:t>
-            </a:r>
-            <a:endParaRPr lang="en-US" sz="1000" dirty="0"/>
-          </a:p>
-        </p:txBody>
-      </p:sp>
-      <p:sp>
-        <p:nvSpPr>
-          <p:cNvPr id="5" name="Footer Placeholder 4">
-            <a:extLst>
-              <a:ext uri="{FF2B5EF4-FFF2-40B4-BE49-F238E27FC236}">
-                <a16:creationId xmlns:a16="http://schemas.microsoft.com/office/drawing/2014/main" id="{4FB5E559-28D2-B742-A608-B353E85B9786}"/>
-              </a:ext>
-            </a:extLst>
-          </p:cNvPr>
-          <p:cNvSpPr>
-            <a:spLocks noGrp="1"/>
-          </p:cNvSpPr>
-          <p:nvPr>
-            <p:ph type="ftr" sz="quarter" idx="11"/>
-          </p:nvPr>
-        </p:nvSpPr>
-        <p:spPr/>
-        <p:txBody>
-          <a:bodyPr/>
-          <a:lstStyle/>
-          <a:p>
-            <a:r>
-              <a:rPr lang="en-US"/>
-              <a:t>Continuous integration, v4.0</a:t>
-            </a:r>
-            <a:endParaRPr lang="en-US" dirty="0"/>
-          </a:p>
-        </p:txBody>
-      </p:sp>
-      <p:pic>
-        <p:nvPicPr>
-          <p:cNvPr id="8" name="Picture 7" descr="A screenshot of a computer&#10;&#10;Description automatically generated with medium confidence">
-            <a:extLst>
-              <a:ext uri="{FF2B5EF4-FFF2-40B4-BE49-F238E27FC236}">
-                <a16:creationId xmlns:a16="http://schemas.microsoft.com/office/drawing/2014/main" id="{2161033D-8E2B-394A-B1ED-5F835F679C2E}"/>
-              </a:ext>
-            </a:extLst>
-          </p:cNvPr>
-          <p:cNvPicPr>
-            <a:picLocks noChangeAspect="1"/>
-          </p:cNvPicPr>
-          <p:nvPr/>
-        </p:nvPicPr>
-        <p:blipFill>
-          <a:blip r:embed="rId2">
-            <a:extLst>
-              <a:ext uri="{28A0092B-C50C-407E-A947-70E740481C1C}">
-                <a14:useLocalDpi xmlns:a14="http://schemas.microsoft.com/office/drawing/2010/main" val="0"/>
-              </a:ext>
-            </a:extLst>
-          </a:blip>
-          <a:stretch>
-            <a:fillRect/>
-          </a:stretch>
-        </p:blipFill>
-        <p:spPr>
-          <a:xfrm>
-            <a:off x="1991544" y="2562763"/>
-            <a:ext cx="5328592" cy="2316779"/>
-          </a:xfrm>
-          <a:prstGeom prst="rect">
-            <a:avLst/>
-          </a:prstGeom>
-        </p:spPr>
-      </p:pic>
-      <p:pic>
-        <p:nvPicPr>
-          <p:cNvPr id="9" name="Picture 8" descr="Graphical user interface, text, application&#10;&#10;Description automatically generated">
-            <a:extLst>
-              <a:ext uri="{FF2B5EF4-FFF2-40B4-BE49-F238E27FC236}">
-                <a16:creationId xmlns:a16="http://schemas.microsoft.com/office/drawing/2014/main" id="{EC30FD2E-55B1-4D4E-8DCD-80DC18F36C5A}"/>
-              </a:ext>
-            </a:extLst>
-          </p:cNvPr>
-          <p:cNvPicPr>
-            <a:picLocks noChangeAspect="1"/>
-          </p:cNvPicPr>
-          <p:nvPr/>
-        </p:nvPicPr>
-        <p:blipFill>
-          <a:blip r:embed="rId3">
-            <a:extLst>
-              <a:ext uri="{28A0092B-C50C-407E-A947-70E740481C1C}">
-                <a14:useLocalDpi xmlns:a14="http://schemas.microsoft.com/office/drawing/2010/main" val="0"/>
-              </a:ext>
-            </a:extLst>
-          </a:blip>
-          <a:stretch>
-            <a:fillRect/>
-          </a:stretch>
-        </p:blipFill>
-        <p:spPr>
-          <a:xfrm>
-            <a:off x="4778220" y="3920550"/>
-            <a:ext cx="5442924" cy="2316762"/>
-          </a:xfrm>
-          <a:prstGeom prst="rect">
-            <a:avLst/>
-          </a:prstGeom>
-        </p:spPr>
-      </p:pic>
-      <p:sp>
-        <p:nvSpPr>
-          <p:cNvPr id="6" name="Slide Number Placeholder 5">
-            <a:extLst>
-              <a:ext uri="{FF2B5EF4-FFF2-40B4-BE49-F238E27FC236}">
-                <a16:creationId xmlns:a16="http://schemas.microsoft.com/office/drawing/2014/main" id="{7B07FFD5-AD05-C0D7-BC0E-E8BF58378D85}"/>
-              </a:ext>
-            </a:extLst>
-          </p:cNvPr>
-          <p:cNvSpPr>
-            <a:spLocks noGrp="1"/>
-          </p:cNvSpPr>
-          <p:nvPr>
-            <p:ph type="sldNum" sz="quarter" idx="12"/>
-          </p:nvPr>
-        </p:nvSpPr>
-        <p:spPr/>
-        <p:txBody>
-          <a:bodyPr/>
-          <a:lstStyle/>
-          <a:p>
-            <a:fld id="{EF79ADEA-B933-47CC-A4E9-04E6298B917C}" type="slidenum">
-              <a:rPr lang="en-US" smtClean="0"/>
-              <a:pPr/>
-              <a:t>12</a:t>
-            </a:fld>
-            <a:endParaRPr lang="en-US"/>
-          </a:p>
-        </p:txBody>
-      </p:sp>
-    </p:spTree>
-    <p:extLst>
-      <p:ext uri="{BB962C8B-B14F-4D97-AF65-F5344CB8AC3E}">
-        <p14:creationId xmlns:p14="http://schemas.microsoft.com/office/powerpoint/2010/main" val="4034475540"/>
       </p:ext>
     </p:extLst>
   </p:cSld>
@@ -5087,6 +5035,261 @@
           <p:cNvPr id="2" name="Title 1">
             <a:extLst>
               <a:ext uri="{FF2B5EF4-FFF2-40B4-BE49-F238E27FC236}">
+                <a16:creationId xmlns:a16="http://schemas.microsoft.com/office/drawing/2014/main" id="{BD476358-0FD2-764F-AEC5-3A574E8F39D1}"/>
+              </a:ext>
+            </a:extLst>
+          </p:cNvPr>
+          <p:cNvSpPr>
+            <a:spLocks noGrp="1"/>
+          </p:cNvSpPr>
+          <p:nvPr>
+            <p:ph type="title"/>
+          </p:nvPr>
+        </p:nvSpPr>
+        <p:spPr/>
+        <p:txBody>
+          <a:bodyPr/>
+          <a:lstStyle/>
+          <a:p>
+            <a:r>
+              <a:rPr lang="en-CH" dirty="0"/>
+              <a:t>GitHub Actions basic ideas</a:t>
+            </a:r>
+          </a:p>
+        </p:txBody>
+      </p:sp>
+      <p:sp>
+        <p:nvSpPr>
+          <p:cNvPr id="3" name="Content Placeholder 2">
+            <a:extLst>
+              <a:ext uri="{FF2B5EF4-FFF2-40B4-BE49-F238E27FC236}">
+                <a16:creationId xmlns:a16="http://schemas.microsoft.com/office/drawing/2014/main" id="{6D76AC3E-727D-9345-BF91-E141F622FCB8}"/>
+              </a:ext>
+            </a:extLst>
+          </p:cNvPr>
+          <p:cNvSpPr>
+            <a:spLocks noGrp="1"/>
+          </p:cNvSpPr>
+          <p:nvPr>
+            <p:ph idx="1"/>
+          </p:nvPr>
+        </p:nvSpPr>
+        <p:spPr/>
+        <p:txBody>
+          <a:bodyPr/>
+          <a:lstStyle/>
+          <a:p>
+            <a:r>
+              <a:rPr lang="en-CH"/>
+              <a:t>The </a:t>
+            </a:r>
+            <a:r>
+              <a:rPr lang="en-CH" dirty="0"/>
+              <a:t>outcome is logged and if the job exits cleanly it is marked as ”passed” otherwise “</a:t>
+            </a:r>
+            <a:r>
+              <a:rPr lang="en-CH"/>
+              <a:t>failed”</a:t>
+            </a:r>
+            <a:endParaRPr lang="de-DE" dirty="0"/>
+          </a:p>
+        </p:txBody>
+      </p:sp>
+      <p:sp>
+        <p:nvSpPr>
+          <p:cNvPr id="4" name="Date Placeholder 3">
+            <a:extLst>
+              <a:ext uri="{FF2B5EF4-FFF2-40B4-BE49-F238E27FC236}">
+                <a16:creationId xmlns:a16="http://schemas.microsoft.com/office/drawing/2014/main" id="{01B74FBB-6928-0E40-87F8-3689137B6A44}"/>
+              </a:ext>
+            </a:extLst>
+          </p:cNvPr>
+          <p:cNvSpPr>
+            <a:spLocks noGrp="1"/>
+          </p:cNvSpPr>
+          <p:nvPr>
+            <p:ph type="dt" sz="half" idx="10"/>
+          </p:nvPr>
+        </p:nvSpPr>
+        <p:spPr/>
+        <p:txBody>
+          <a:bodyPr/>
+          <a:lstStyle/>
+          <a:p>
+            <a:r>
+              <a:rPr lang="de-CH" sz="1000"/>
+              <a:t>August 2023, CC BY-SA 4.0</a:t>
+            </a:r>
+            <a:endParaRPr lang="en-US" sz="1000" dirty="0"/>
+          </a:p>
+        </p:txBody>
+      </p:sp>
+      <p:sp>
+        <p:nvSpPr>
+          <p:cNvPr id="5" name="Footer Placeholder 4">
+            <a:extLst>
+              <a:ext uri="{FF2B5EF4-FFF2-40B4-BE49-F238E27FC236}">
+                <a16:creationId xmlns:a16="http://schemas.microsoft.com/office/drawing/2014/main" id="{4FB5E559-28D2-B742-A608-B353E85B9786}"/>
+              </a:ext>
+            </a:extLst>
+          </p:cNvPr>
+          <p:cNvSpPr>
+            <a:spLocks noGrp="1"/>
+          </p:cNvSpPr>
+          <p:nvPr>
+            <p:ph type="ftr" sz="quarter" idx="11"/>
+          </p:nvPr>
+        </p:nvSpPr>
+        <p:spPr/>
+        <p:txBody>
+          <a:bodyPr/>
+          <a:lstStyle/>
+          <a:p>
+            <a:r>
+              <a:rPr lang="en-US"/>
+              <a:t>Continuous integration, v4.0</a:t>
+            </a:r>
+            <a:endParaRPr lang="en-US" dirty="0"/>
+          </a:p>
+        </p:txBody>
+      </p:sp>
+      <p:pic>
+        <p:nvPicPr>
+          <p:cNvPr id="8" name="Picture 7" descr="A screenshot of a computer&#10;&#10;Description automatically generated with medium confidence">
+            <a:extLst>
+              <a:ext uri="{FF2B5EF4-FFF2-40B4-BE49-F238E27FC236}">
+                <a16:creationId xmlns:a16="http://schemas.microsoft.com/office/drawing/2014/main" id="{2161033D-8E2B-394A-B1ED-5F835F679C2E}"/>
+              </a:ext>
+            </a:extLst>
+          </p:cNvPr>
+          <p:cNvPicPr>
+            <a:picLocks noChangeAspect="1"/>
+          </p:cNvPicPr>
+          <p:nvPr/>
+        </p:nvPicPr>
+        <p:blipFill>
+          <a:blip r:embed="rId2">
+            <a:extLst>
+              <a:ext uri="{28A0092B-C50C-407E-A947-70E740481C1C}">
+                <a14:useLocalDpi xmlns:a14="http://schemas.microsoft.com/office/drawing/2010/main" val="0"/>
+              </a:ext>
+            </a:extLst>
+          </a:blip>
+          <a:stretch>
+            <a:fillRect/>
+          </a:stretch>
+        </p:blipFill>
+        <p:spPr>
+          <a:xfrm>
+            <a:off x="1991544" y="2562763"/>
+            <a:ext cx="5328592" cy="2316779"/>
+          </a:xfrm>
+          <a:prstGeom prst="rect">
+            <a:avLst/>
+          </a:prstGeom>
+        </p:spPr>
+      </p:pic>
+      <p:pic>
+        <p:nvPicPr>
+          <p:cNvPr id="9" name="Picture 8" descr="Graphical user interface, text, application&#10;&#10;Description automatically generated">
+            <a:extLst>
+              <a:ext uri="{FF2B5EF4-FFF2-40B4-BE49-F238E27FC236}">
+                <a16:creationId xmlns:a16="http://schemas.microsoft.com/office/drawing/2014/main" id="{EC30FD2E-55B1-4D4E-8DCD-80DC18F36C5A}"/>
+              </a:ext>
+            </a:extLst>
+          </p:cNvPr>
+          <p:cNvPicPr>
+            <a:picLocks noChangeAspect="1"/>
+          </p:cNvPicPr>
+          <p:nvPr/>
+        </p:nvPicPr>
+        <p:blipFill>
+          <a:blip r:embed="rId3">
+            <a:extLst>
+              <a:ext uri="{28A0092B-C50C-407E-A947-70E740481C1C}">
+                <a14:useLocalDpi xmlns:a14="http://schemas.microsoft.com/office/drawing/2010/main" val="0"/>
+              </a:ext>
+            </a:extLst>
+          </a:blip>
+          <a:stretch>
+            <a:fillRect/>
+          </a:stretch>
+        </p:blipFill>
+        <p:spPr>
+          <a:xfrm>
+            <a:off x="4778220" y="3920550"/>
+            <a:ext cx="5442924" cy="2316762"/>
+          </a:xfrm>
+          <a:prstGeom prst="rect">
+            <a:avLst/>
+          </a:prstGeom>
+        </p:spPr>
+      </p:pic>
+      <p:sp>
+        <p:nvSpPr>
+          <p:cNvPr id="6" name="Slide Number Placeholder 5">
+            <a:extLst>
+              <a:ext uri="{FF2B5EF4-FFF2-40B4-BE49-F238E27FC236}">
+                <a16:creationId xmlns:a16="http://schemas.microsoft.com/office/drawing/2014/main" id="{7B07FFD5-AD05-C0D7-BC0E-E8BF58378D85}"/>
+              </a:ext>
+            </a:extLst>
+          </p:cNvPr>
+          <p:cNvSpPr>
+            <a:spLocks noGrp="1"/>
+          </p:cNvSpPr>
+          <p:nvPr>
+            <p:ph type="sldNum" sz="quarter" idx="12"/>
+          </p:nvPr>
+        </p:nvSpPr>
+        <p:spPr/>
+        <p:txBody>
+          <a:bodyPr/>
+          <a:lstStyle/>
+          <a:p>
+            <a:fld id="{EF79ADEA-B933-47CC-A4E9-04E6298B917C}" type="slidenum">
+              <a:rPr lang="en-US" smtClean="0"/>
+              <a:pPr/>
+              <a:t>13</a:t>
+            </a:fld>
+            <a:endParaRPr lang="en-US"/>
+          </a:p>
+        </p:txBody>
+      </p:sp>
+    </p:spTree>
+    <p:extLst>
+      <p:ext uri="{BB962C8B-B14F-4D97-AF65-F5344CB8AC3E}">
+        <p14:creationId xmlns:p14="http://schemas.microsoft.com/office/powerpoint/2010/main" val="4034475540"/>
+      </p:ext>
+    </p:extLst>
+  </p:cSld>
+  <p:clrMapOvr>
+    <a:masterClrMapping/>
+  </p:clrMapOvr>
+</p:sld>
+</file>
+
+<file path=ppt/slides/slide14.xml><?xml version="1.0" encoding="utf-8"?>
+<p:sld xmlns:a="http://schemas.openxmlformats.org/drawingml/2006/main" xmlns:r="http://schemas.openxmlformats.org/officeDocument/2006/relationships" xmlns:p="http://schemas.openxmlformats.org/presentationml/2006/main" show="0">
+  <p:cSld>
+    <p:spTree>
+      <p:nvGrpSpPr>
+        <p:cNvPr id="1" name=""/>
+        <p:cNvGrpSpPr/>
+        <p:nvPr/>
+      </p:nvGrpSpPr>
+      <p:grpSpPr>
+        <a:xfrm>
+          <a:off x="0" y="0"/>
+          <a:ext cx="0" cy="0"/>
+          <a:chOff x="0" y="0"/>
+          <a:chExt cx="0" cy="0"/>
+        </a:xfrm>
+      </p:grpSpPr>
+      <p:sp>
+        <p:nvSpPr>
+          <p:cNvPr id="2" name="Title 1">
+            <a:extLst>
+              <a:ext uri="{FF2B5EF4-FFF2-40B4-BE49-F238E27FC236}">
                 <a16:creationId xmlns:a16="http://schemas.microsoft.com/office/drawing/2014/main" id="{C7CDE157-4CBF-1945-A0D6-4ACAD77885F7}"/>
               </a:ext>
             </a:extLst>
@@ -5239,7 +5442,7 @@
             <a:fld id="{EF79ADEA-B933-47CC-A4E9-04E6298B917C}" type="slidenum">
               <a:rPr lang="en-US" smtClean="0"/>
               <a:pPr/>
-              <a:t>13</a:t>
+              <a:t>14</a:t>
             </a:fld>
             <a:endParaRPr lang="en-US"/>
           </a:p>
@@ -5258,7 +5461,7 @@
 </p:sld>
 </file>
 
-<file path=ppt/slides/slide14.xml><?xml version="1.0" encoding="utf-8"?>
+<file path=ppt/slides/slide15.xml><?xml version="1.0" encoding="utf-8"?>
 <p:sld xmlns:a="http://schemas.openxmlformats.org/drawingml/2006/main" xmlns:r="http://schemas.openxmlformats.org/officeDocument/2006/relationships" xmlns:p="http://schemas.openxmlformats.org/presentationml/2006/main" show="0">
   <p:cSld>
     <p:spTree>
@@ -6051,7 +6254,7 @@
             <a:fld id="{EF79ADEA-B933-47CC-A4E9-04E6298B917C}" type="slidenum">
               <a:rPr lang="en-US" smtClean="0"/>
               <a:pPr/>
-              <a:t>14</a:t>
+              <a:t>15</a:t>
             </a:fld>
             <a:endParaRPr lang="en-US"/>
           </a:p>
@@ -6061,251 +6264,6 @@
     <p:extLst>
       <p:ext uri="{BB962C8B-B14F-4D97-AF65-F5344CB8AC3E}">
         <p14:creationId xmlns:p14="http://schemas.microsoft.com/office/powerpoint/2010/main" val="4154345638"/>
-      </p:ext>
-    </p:extLst>
-  </p:cSld>
-  <p:clrMapOvr>
-    <a:masterClrMapping/>
-  </p:clrMapOvr>
-</p:sld>
-</file>
-
-<file path=ppt/slides/slide15.xml><?xml version="1.0" encoding="utf-8"?>
-<p:sld xmlns:a="http://schemas.openxmlformats.org/drawingml/2006/main" xmlns:r="http://schemas.openxmlformats.org/officeDocument/2006/relationships" xmlns:p="http://schemas.openxmlformats.org/presentationml/2006/main" show="0">
-  <p:cSld>
-    <p:spTree>
-      <p:nvGrpSpPr>
-        <p:cNvPr id="1" name=""/>
-        <p:cNvGrpSpPr/>
-        <p:nvPr/>
-      </p:nvGrpSpPr>
-      <p:grpSpPr>
-        <a:xfrm>
-          <a:off x="0" y="0"/>
-          <a:ext cx="0" cy="0"/>
-          <a:chOff x="0" y="0"/>
-          <a:chExt cx="0" cy="0"/>
-        </a:xfrm>
-      </p:grpSpPr>
-      <p:sp>
-        <p:nvSpPr>
-          <p:cNvPr id="2" name="Title 1">
-            <a:extLst>
-              <a:ext uri="{FF2B5EF4-FFF2-40B4-BE49-F238E27FC236}">
-                <a16:creationId xmlns:a16="http://schemas.microsoft.com/office/drawing/2014/main" id="{EACC7A8A-CD41-EB49-BCCF-D1CC9D385024}"/>
-              </a:ext>
-            </a:extLst>
-          </p:cNvPr>
-          <p:cNvSpPr>
-            <a:spLocks noGrp="1"/>
-          </p:cNvSpPr>
-          <p:nvPr>
-            <p:ph type="title"/>
-          </p:nvPr>
-        </p:nvSpPr>
-        <p:spPr/>
-        <p:txBody>
-          <a:bodyPr/>
-          <a:lstStyle/>
-          <a:p>
-            <a:r>
-              <a:rPr lang="en-CH" dirty="0"/>
-              <a:t>GitHub Actions reference</a:t>
-            </a:r>
-          </a:p>
-        </p:txBody>
-      </p:sp>
-      <p:sp>
-        <p:nvSpPr>
-          <p:cNvPr id="3" name="Content Placeholder 2">
-            <a:extLst>
-              <a:ext uri="{FF2B5EF4-FFF2-40B4-BE49-F238E27FC236}">
-                <a16:creationId xmlns:a16="http://schemas.microsoft.com/office/drawing/2014/main" id="{DE78B902-F52A-5B4E-AC89-A7164CC5CB2E}"/>
-              </a:ext>
-            </a:extLst>
-          </p:cNvPr>
-          <p:cNvSpPr>
-            <a:spLocks noGrp="1"/>
-          </p:cNvSpPr>
-          <p:nvPr>
-            <p:ph idx="1"/>
-          </p:nvPr>
-        </p:nvSpPr>
-        <p:spPr/>
-        <p:txBody>
-          <a:bodyPr>
-            <a:normAutofit/>
-          </a:bodyPr>
-          <a:lstStyle/>
-          <a:p>
-            <a:r>
-              <a:rPr lang="en-CH" dirty="0"/>
-              <a:t>Introduction:</a:t>
-            </a:r>
-            <a:br>
-              <a:rPr lang="en-CH" dirty="0"/>
-            </a:br>
-            <a:r>
-              <a:rPr lang="en-US" sz="1800" dirty="0">
-                <a:latin typeface="Courier New" panose="02070309020205020404" pitchFamily="49" charset="0"/>
-                <a:cs typeface="Courier New" panose="02070309020205020404" pitchFamily="49" charset="0"/>
-                <a:hlinkClick r:id="rId2"/>
-              </a:rPr>
-              <a:t>https://docs.github.com/en/actions/learn-github-actions/introduction-to-github-actions</a:t>
-            </a:r>
-            <a:endParaRPr lang="en-US" sz="1800" dirty="0">
-              <a:latin typeface="Courier New" panose="02070309020205020404" pitchFamily="49" charset="0"/>
-              <a:cs typeface="Courier New" panose="02070309020205020404" pitchFamily="49" charset="0"/>
-            </a:endParaRPr>
-          </a:p>
-          <a:p>
-            <a:r>
-              <a:rPr lang="en-US" dirty="0"/>
-              <a:t>Events that can trigger actions, and their config options:</a:t>
-            </a:r>
-            <a:br>
-              <a:rPr lang="en-US" dirty="0"/>
-            </a:br>
-            <a:r>
-              <a:rPr lang="en-US" sz="1800" dirty="0">
-                <a:latin typeface="Courier New" panose="02070309020205020404" pitchFamily="49" charset="0"/>
-                <a:cs typeface="Courier New" panose="02070309020205020404" pitchFamily="49" charset="0"/>
-                <a:hlinkClick r:id="rId3"/>
-              </a:rPr>
-              <a:t>https://docs.github.com/en/actions/reference/events-that-trigger-workflows#pull_request</a:t>
-            </a:r>
-            <a:endParaRPr lang="en-US" sz="1800" dirty="0">
-              <a:latin typeface="Courier New" panose="02070309020205020404" pitchFamily="49" charset="0"/>
-              <a:cs typeface="Courier New" panose="02070309020205020404" pitchFamily="49" charset="0"/>
-            </a:endParaRPr>
-          </a:p>
-          <a:p>
-            <a:r>
-              <a:rPr lang="en-US" dirty="0"/>
-              <a:t>Catalog of community actions:</a:t>
-            </a:r>
-            <a:br>
-              <a:rPr lang="en-US" dirty="0"/>
-            </a:br>
-            <a:r>
-              <a:rPr lang="en-US" sz="1800" dirty="0">
-                <a:latin typeface="Courier New" panose="02070309020205020404" pitchFamily="49" charset="0"/>
-                <a:cs typeface="Courier New" panose="02070309020205020404" pitchFamily="49" charset="0"/>
-                <a:hlinkClick r:id="rId4"/>
-              </a:rPr>
-              <a:t>https://github.com/marketplace?type=actions</a:t>
-            </a:r>
-            <a:endParaRPr lang="en-US" sz="1800" dirty="0">
-              <a:latin typeface="Courier New" panose="02070309020205020404" pitchFamily="49" charset="0"/>
-              <a:cs typeface="Courier New" panose="02070309020205020404" pitchFamily="49" charset="0"/>
-            </a:endParaRPr>
-          </a:p>
-          <a:p>
-            <a:pPr marL="0" indent="0">
-              <a:buNone/>
-            </a:pPr>
-            <a:endParaRPr lang="en-US" dirty="0"/>
-          </a:p>
-          <a:p>
-            <a:pPr marL="0" indent="0">
-              <a:buNone/>
-            </a:pPr>
-            <a:endParaRPr lang="en-CH" dirty="0"/>
-          </a:p>
-        </p:txBody>
-      </p:sp>
-      <p:sp>
-        <p:nvSpPr>
-          <p:cNvPr id="4" name="Date Placeholder 3">
-            <a:extLst>
-              <a:ext uri="{FF2B5EF4-FFF2-40B4-BE49-F238E27FC236}">
-                <a16:creationId xmlns:a16="http://schemas.microsoft.com/office/drawing/2014/main" id="{BD10E3E1-D420-6649-A15F-D53900236E0F}"/>
-              </a:ext>
-            </a:extLst>
-          </p:cNvPr>
-          <p:cNvSpPr>
-            <a:spLocks noGrp="1"/>
-          </p:cNvSpPr>
-          <p:nvPr>
-            <p:ph type="dt" sz="half" idx="10"/>
-          </p:nvPr>
-        </p:nvSpPr>
-        <p:spPr/>
-        <p:txBody>
-          <a:bodyPr/>
-          <a:lstStyle/>
-          <a:p>
-            <a:r>
-              <a:rPr lang="de-CH" sz="1000"/>
-              <a:t>August 2023, CC BY-SA 4.0</a:t>
-            </a:r>
-            <a:endParaRPr lang="en-US" sz="1000" dirty="0"/>
-          </a:p>
-        </p:txBody>
-      </p:sp>
-      <p:sp>
-        <p:nvSpPr>
-          <p:cNvPr id="5" name="Footer Placeholder 4">
-            <a:extLst>
-              <a:ext uri="{FF2B5EF4-FFF2-40B4-BE49-F238E27FC236}">
-                <a16:creationId xmlns:a16="http://schemas.microsoft.com/office/drawing/2014/main" id="{6F012DDD-E088-A248-B0DC-043A5AFA7F11}"/>
-              </a:ext>
-            </a:extLst>
-          </p:cNvPr>
-          <p:cNvSpPr>
-            <a:spLocks noGrp="1"/>
-          </p:cNvSpPr>
-          <p:nvPr>
-            <p:ph type="ftr" sz="quarter" idx="11"/>
-          </p:nvPr>
-        </p:nvSpPr>
-        <p:spPr/>
-        <p:txBody>
-          <a:bodyPr/>
-          <a:lstStyle/>
-          <a:p>
-            <a:r>
-              <a:rPr lang="en-US"/>
-              <a:t>Continuous integration, v4.0</a:t>
-            </a:r>
-            <a:endParaRPr lang="en-US" dirty="0"/>
-          </a:p>
-        </p:txBody>
-      </p:sp>
-      <p:sp>
-        <p:nvSpPr>
-          <p:cNvPr id="6" name="Slide Number Placeholder 5">
-            <a:extLst>
-              <a:ext uri="{FF2B5EF4-FFF2-40B4-BE49-F238E27FC236}">
-                <a16:creationId xmlns:a16="http://schemas.microsoft.com/office/drawing/2014/main" id="{61F73B10-0263-0C7B-53B4-EA5BA0655AF5}"/>
-              </a:ext>
-            </a:extLst>
-          </p:cNvPr>
-          <p:cNvSpPr>
-            <a:spLocks noGrp="1"/>
-          </p:cNvSpPr>
-          <p:nvPr>
-            <p:ph type="sldNum" sz="quarter" idx="12"/>
-          </p:nvPr>
-        </p:nvSpPr>
-        <p:spPr/>
-        <p:txBody>
-          <a:bodyPr/>
-          <a:lstStyle/>
-          <a:p>
-            <a:fld id="{EF79ADEA-B933-47CC-A4E9-04E6298B917C}" type="slidenum">
-              <a:rPr lang="en-US" smtClean="0"/>
-              <a:pPr/>
-              <a:t>15</a:t>
-            </a:fld>
-            <a:endParaRPr lang="en-US"/>
-          </a:p>
-        </p:txBody>
-      </p:sp>
-    </p:spTree>
-    <p:extLst>
-      <p:ext uri="{BB962C8B-B14F-4D97-AF65-F5344CB8AC3E}">
-        <p14:creationId xmlns:p14="http://schemas.microsoft.com/office/powerpoint/2010/main" val="2663453477"/>
       </p:ext>
     </p:extLst>
   </p:cSld>
@@ -6337,6 +6295,251 @@
           <p:cNvPr id="2" name="Title 1">
             <a:extLst>
               <a:ext uri="{FF2B5EF4-FFF2-40B4-BE49-F238E27FC236}">
+                <a16:creationId xmlns:a16="http://schemas.microsoft.com/office/drawing/2014/main" id="{EACC7A8A-CD41-EB49-BCCF-D1CC9D385024}"/>
+              </a:ext>
+            </a:extLst>
+          </p:cNvPr>
+          <p:cNvSpPr>
+            <a:spLocks noGrp="1"/>
+          </p:cNvSpPr>
+          <p:nvPr>
+            <p:ph type="title"/>
+          </p:nvPr>
+        </p:nvSpPr>
+        <p:spPr/>
+        <p:txBody>
+          <a:bodyPr/>
+          <a:lstStyle/>
+          <a:p>
+            <a:r>
+              <a:rPr lang="en-CH" dirty="0"/>
+              <a:t>GitHub Actions reference</a:t>
+            </a:r>
+          </a:p>
+        </p:txBody>
+      </p:sp>
+      <p:sp>
+        <p:nvSpPr>
+          <p:cNvPr id="3" name="Content Placeholder 2">
+            <a:extLst>
+              <a:ext uri="{FF2B5EF4-FFF2-40B4-BE49-F238E27FC236}">
+                <a16:creationId xmlns:a16="http://schemas.microsoft.com/office/drawing/2014/main" id="{DE78B902-F52A-5B4E-AC89-A7164CC5CB2E}"/>
+              </a:ext>
+            </a:extLst>
+          </p:cNvPr>
+          <p:cNvSpPr>
+            <a:spLocks noGrp="1"/>
+          </p:cNvSpPr>
+          <p:nvPr>
+            <p:ph idx="1"/>
+          </p:nvPr>
+        </p:nvSpPr>
+        <p:spPr/>
+        <p:txBody>
+          <a:bodyPr>
+            <a:normAutofit/>
+          </a:bodyPr>
+          <a:lstStyle/>
+          <a:p>
+            <a:r>
+              <a:rPr lang="en-CH" dirty="0"/>
+              <a:t>Introduction:</a:t>
+            </a:r>
+            <a:br>
+              <a:rPr lang="en-CH" dirty="0"/>
+            </a:br>
+            <a:r>
+              <a:rPr lang="en-US" sz="1800" dirty="0">
+                <a:latin typeface="Courier New" panose="02070309020205020404" pitchFamily="49" charset="0"/>
+                <a:cs typeface="Courier New" panose="02070309020205020404" pitchFamily="49" charset="0"/>
+                <a:hlinkClick r:id="rId2"/>
+              </a:rPr>
+              <a:t>https://docs.github.com/en/actions/learn-github-actions/introduction-to-github-actions</a:t>
+            </a:r>
+            <a:endParaRPr lang="en-US" sz="1800" dirty="0">
+              <a:latin typeface="Courier New" panose="02070309020205020404" pitchFamily="49" charset="0"/>
+              <a:cs typeface="Courier New" panose="02070309020205020404" pitchFamily="49" charset="0"/>
+            </a:endParaRPr>
+          </a:p>
+          <a:p>
+            <a:r>
+              <a:rPr lang="en-US" dirty="0"/>
+              <a:t>Events that can trigger actions, and their config options:</a:t>
+            </a:r>
+            <a:br>
+              <a:rPr lang="en-US" dirty="0"/>
+            </a:br>
+            <a:r>
+              <a:rPr lang="en-US" sz="1800" dirty="0">
+                <a:latin typeface="Courier New" panose="02070309020205020404" pitchFamily="49" charset="0"/>
+                <a:cs typeface="Courier New" panose="02070309020205020404" pitchFamily="49" charset="0"/>
+                <a:hlinkClick r:id="rId3"/>
+              </a:rPr>
+              <a:t>https://docs.github.com/en/actions/reference/events-that-trigger-workflows#pull_request</a:t>
+            </a:r>
+            <a:endParaRPr lang="en-US" sz="1800" dirty="0">
+              <a:latin typeface="Courier New" panose="02070309020205020404" pitchFamily="49" charset="0"/>
+              <a:cs typeface="Courier New" panose="02070309020205020404" pitchFamily="49" charset="0"/>
+            </a:endParaRPr>
+          </a:p>
+          <a:p>
+            <a:r>
+              <a:rPr lang="en-US" dirty="0"/>
+              <a:t>Catalog of community actions:</a:t>
+            </a:r>
+            <a:br>
+              <a:rPr lang="en-US" dirty="0"/>
+            </a:br>
+            <a:r>
+              <a:rPr lang="en-US" sz="1800" dirty="0">
+                <a:latin typeface="Courier New" panose="02070309020205020404" pitchFamily="49" charset="0"/>
+                <a:cs typeface="Courier New" panose="02070309020205020404" pitchFamily="49" charset="0"/>
+                <a:hlinkClick r:id="rId4"/>
+              </a:rPr>
+              <a:t>https://github.com/marketplace?type=actions</a:t>
+            </a:r>
+            <a:endParaRPr lang="en-US" sz="1800" dirty="0">
+              <a:latin typeface="Courier New" panose="02070309020205020404" pitchFamily="49" charset="0"/>
+              <a:cs typeface="Courier New" panose="02070309020205020404" pitchFamily="49" charset="0"/>
+            </a:endParaRPr>
+          </a:p>
+          <a:p>
+            <a:pPr marL="0" indent="0">
+              <a:buNone/>
+            </a:pPr>
+            <a:endParaRPr lang="en-US" dirty="0"/>
+          </a:p>
+          <a:p>
+            <a:pPr marL="0" indent="0">
+              <a:buNone/>
+            </a:pPr>
+            <a:endParaRPr lang="en-CH" dirty="0"/>
+          </a:p>
+        </p:txBody>
+      </p:sp>
+      <p:sp>
+        <p:nvSpPr>
+          <p:cNvPr id="4" name="Date Placeholder 3">
+            <a:extLst>
+              <a:ext uri="{FF2B5EF4-FFF2-40B4-BE49-F238E27FC236}">
+                <a16:creationId xmlns:a16="http://schemas.microsoft.com/office/drawing/2014/main" id="{BD10E3E1-D420-6649-A15F-D53900236E0F}"/>
+              </a:ext>
+            </a:extLst>
+          </p:cNvPr>
+          <p:cNvSpPr>
+            <a:spLocks noGrp="1"/>
+          </p:cNvSpPr>
+          <p:nvPr>
+            <p:ph type="dt" sz="half" idx="10"/>
+          </p:nvPr>
+        </p:nvSpPr>
+        <p:spPr/>
+        <p:txBody>
+          <a:bodyPr/>
+          <a:lstStyle/>
+          <a:p>
+            <a:r>
+              <a:rPr lang="de-CH" sz="1000"/>
+              <a:t>August 2023, CC BY-SA 4.0</a:t>
+            </a:r>
+            <a:endParaRPr lang="en-US" sz="1000" dirty="0"/>
+          </a:p>
+        </p:txBody>
+      </p:sp>
+      <p:sp>
+        <p:nvSpPr>
+          <p:cNvPr id="5" name="Footer Placeholder 4">
+            <a:extLst>
+              <a:ext uri="{FF2B5EF4-FFF2-40B4-BE49-F238E27FC236}">
+                <a16:creationId xmlns:a16="http://schemas.microsoft.com/office/drawing/2014/main" id="{6F012DDD-E088-A248-B0DC-043A5AFA7F11}"/>
+              </a:ext>
+            </a:extLst>
+          </p:cNvPr>
+          <p:cNvSpPr>
+            <a:spLocks noGrp="1"/>
+          </p:cNvSpPr>
+          <p:nvPr>
+            <p:ph type="ftr" sz="quarter" idx="11"/>
+          </p:nvPr>
+        </p:nvSpPr>
+        <p:spPr/>
+        <p:txBody>
+          <a:bodyPr/>
+          <a:lstStyle/>
+          <a:p>
+            <a:r>
+              <a:rPr lang="en-US"/>
+              <a:t>Continuous integration, v4.0</a:t>
+            </a:r>
+            <a:endParaRPr lang="en-US" dirty="0"/>
+          </a:p>
+        </p:txBody>
+      </p:sp>
+      <p:sp>
+        <p:nvSpPr>
+          <p:cNvPr id="6" name="Slide Number Placeholder 5">
+            <a:extLst>
+              <a:ext uri="{FF2B5EF4-FFF2-40B4-BE49-F238E27FC236}">
+                <a16:creationId xmlns:a16="http://schemas.microsoft.com/office/drawing/2014/main" id="{61F73B10-0263-0C7B-53B4-EA5BA0655AF5}"/>
+              </a:ext>
+            </a:extLst>
+          </p:cNvPr>
+          <p:cNvSpPr>
+            <a:spLocks noGrp="1"/>
+          </p:cNvSpPr>
+          <p:nvPr>
+            <p:ph type="sldNum" sz="quarter" idx="12"/>
+          </p:nvPr>
+        </p:nvSpPr>
+        <p:spPr/>
+        <p:txBody>
+          <a:bodyPr/>
+          <a:lstStyle/>
+          <a:p>
+            <a:fld id="{EF79ADEA-B933-47CC-A4E9-04E6298B917C}" type="slidenum">
+              <a:rPr lang="en-US" smtClean="0"/>
+              <a:pPr/>
+              <a:t>16</a:t>
+            </a:fld>
+            <a:endParaRPr lang="en-US"/>
+          </a:p>
+        </p:txBody>
+      </p:sp>
+    </p:spTree>
+    <p:extLst>
+      <p:ext uri="{BB962C8B-B14F-4D97-AF65-F5344CB8AC3E}">
+        <p14:creationId xmlns:p14="http://schemas.microsoft.com/office/powerpoint/2010/main" val="2663453477"/>
+      </p:ext>
+    </p:extLst>
+  </p:cSld>
+  <p:clrMapOvr>
+    <a:masterClrMapping/>
+  </p:clrMapOvr>
+</p:sld>
+</file>
+
+<file path=ppt/slides/slide17.xml><?xml version="1.0" encoding="utf-8"?>
+<p:sld xmlns:a="http://schemas.openxmlformats.org/drawingml/2006/main" xmlns:r="http://schemas.openxmlformats.org/officeDocument/2006/relationships" xmlns:p="http://schemas.openxmlformats.org/presentationml/2006/main" show="0">
+  <p:cSld>
+    <p:spTree>
+      <p:nvGrpSpPr>
+        <p:cNvPr id="1" name=""/>
+        <p:cNvGrpSpPr/>
+        <p:nvPr/>
+      </p:nvGrpSpPr>
+      <p:grpSpPr>
+        <a:xfrm>
+          <a:off x="0" y="0"/>
+          <a:ext cx="0" cy="0"/>
+          <a:chOff x="0" y="0"/>
+          <a:chExt cx="0" cy="0"/>
+        </a:xfrm>
+      </p:grpSpPr>
+      <p:sp>
+        <p:nvSpPr>
+          <p:cNvPr id="2" name="Title 1">
+            <a:extLst>
+              <a:ext uri="{FF2B5EF4-FFF2-40B4-BE49-F238E27FC236}">
                 <a16:creationId xmlns:a16="http://schemas.microsoft.com/office/drawing/2014/main" id="{33165359-9CD5-EF41-9C08-A5F425B6C08E}"/>
               </a:ext>
             </a:extLst>
@@ -6597,7 +6800,7 @@
             <a:fld id="{EF79ADEA-B933-47CC-A4E9-04E6298B917C}" type="slidenum">
               <a:rPr lang="en-US" smtClean="0"/>
               <a:pPr/>
-              <a:t>16</a:t>
+              <a:t>17</a:t>
             </a:fld>
             <a:endParaRPr lang="en-US"/>
           </a:p>
@@ -6669,7 +6872,7 @@
 </p:sld>
 </file>
 
-<file path=ppt/slides/slide17.xml><?xml version="1.0" encoding="utf-8"?>
+<file path=ppt/slides/slide18.xml><?xml version="1.0" encoding="utf-8"?>
 <p:sld xmlns:a="http://schemas.openxmlformats.org/drawingml/2006/main" xmlns:r="http://schemas.openxmlformats.org/officeDocument/2006/relationships" xmlns:p="http://schemas.openxmlformats.org/presentationml/2006/main" show="0">
   <p:cSld>
     <p:spTree>
@@ -6854,7 +7057,7 @@
             <a:fld id="{EF79ADEA-B933-47CC-A4E9-04E6298B917C}" type="slidenum">
               <a:rPr lang="en-US" smtClean="0"/>
               <a:pPr/>
-              <a:t>17</a:t>
+              <a:t>18</a:t>
             </a:fld>
             <a:endParaRPr lang="en-US"/>
           </a:p>
@@ -6873,7 +7076,7 @@
 </p:sld>
 </file>
 
-<file path=ppt/slides/slide18.xml><?xml version="1.0" encoding="utf-8"?>
+<file path=ppt/slides/slide19.xml><?xml version="1.0" encoding="utf-8"?>
 <p:sld xmlns:a="http://schemas.openxmlformats.org/drawingml/2006/main" xmlns:r="http://schemas.openxmlformats.org/officeDocument/2006/relationships" xmlns:p="http://schemas.openxmlformats.org/presentationml/2006/main" show="0">
   <p:cSld>
     <p:spTree>
@@ -7348,7 +7551,7 @@
             <a:fld id="{EF79ADEA-B933-47CC-A4E9-04E6298B917C}" type="slidenum">
               <a:rPr lang="en-US" smtClean="0"/>
               <a:pPr/>
-              <a:t>18</a:t>
+              <a:t>19</a:t>
             </a:fld>
             <a:endParaRPr lang="en-US"/>
           </a:p>
@@ -7367,7 +7570,270 @@
 </p:sld>
 </file>
 
-<file path=ppt/slides/slide19.xml><?xml version="1.0" encoding="utf-8"?>
+<file path=ppt/slides/slide2.xml><?xml version="1.0" encoding="utf-8"?>
+<p:sld xmlns:a="http://schemas.openxmlformats.org/drawingml/2006/main" xmlns:r="http://schemas.openxmlformats.org/officeDocument/2006/relationships" xmlns:p="http://schemas.openxmlformats.org/presentationml/2006/main">
+  <p:cSld>
+    <p:spTree>
+      <p:nvGrpSpPr>
+        <p:cNvPr id="1" name=""/>
+        <p:cNvGrpSpPr/>
+        <p:nvPr/>
+      </p:nvGrpSpPr>
+      <p:grpSpPr>
+        <a:xfrm>
+          <a:off x="0" y="0"/>
+          <a:ext cx="0" cy="0"/>
+          <a:chOff x="0" y="0"/>
+          <a:chExt cx="0" cy="0"/>
+        </a:xfrm>
+      </p:grpSpPr>
+      <p:sp>
+        <p:nvSpPr>
+          <p:cNvPr id="2" name="Title 1">
+            <a:extLst>
+              <a:ext uri="{FF2B5EF4-FFF2-40B4-BE49-F238E27FC236}">
+                <a16:creationId xmlns:a16="http://schemas.microsoft.com/office/drawing/2014/main" id="{4993AE45-A766-0F4D-9D65-D692ECB4ED00}"/>
+              </a:ext>
+            </a:extLst>
+          </p:cNvPr>
+          <p:cNvSpPr>
+            <a:spLocks noGrp="1"/>
+          </p:cNvSpPr>
+          <p:nvPr>
+            <p:ph type="title"/>
+          </p:nvPr>
+        </p:nvSpPr>
+        <p:spPr/>
+        <p:txBody>
+          <a:bodyPr/>
+          <a:lstStyle/>
+          <a:p>
+            <a:r>
+              <a:rPr lang="de-DE" dirty="0"/>
+              <a:t>Collaborative Development </a:t>
+            </a:r>
+            <a:r>
+              <a:rPr lang="de-DE" dirty="0" err="1"/>
+              <a:t>without</a:t>
+            </a:r>
+            <a:r>
+              <a:rPr lang="de-DE" dirty="0"/>
+              <a:t> CI</a:t>
+            </a:r>
+            <a:endParaRPr lang="en-CH" dirty="0"/>
+          </a:p>
+        </p:txBody>
+      </p:sp>
+      <p:sp>
+        <p:nvSpPr>
+          <p:cNvPr id="4" name="Date Placeholder 3">
+            <a:extLst>
+              <a:ext uri="{FF2B5EF4-FFF2-40B4-BE49-F238E27FC236}">
+                <a16:creationId xmlns:a16="http://schemas.microsoft.com/office/drawing/2014/main" id="{BB7DFD63-E8DE-9344-BDD0-A143F8BD67AC}"/>
+              </a:ext>
+            </a:extLst>
+          </p:cNvPr>
+          <p:cNvSpPr>
+            <a:spLocks noGrp="1"/>
+          </p:cNvSpPr>
+          <p:nvPr>
+            <p:ph type="dt" sz="half" idx="10"/>
+          </p:nvPr>
+        </p:nvSpPr>
+        <p:spPr/>
+        <p:txBody>
+          <a:bodyPr/>
+          <a:lstStyle/>
+          <a:p>
+            <a:r>
+              <a:rPr lang="de-CH"/>
+              <a:t>August 2023, CC BY-SA 4.0</a:t>
+            </a:r>
+            <a:endParaRPr lang="en-US" dirty="0"/>
+          </a:p>
+        </p:txBody>
+      </p:sp>
+      <p:sp>
+        <p:nvSpPr>
+          <p:cNvPr id="5" name="Footer Placeholder 4">
+            <a:extLst>
+              <a:ext uri="{FF2B5EF4-FFF2-40B4-BE49-F238E27FC236}">
+                <a16:creationId xmlns:a16="http://schemas.microsoft.com/office/drawing/2014/main" id="{5138C878-C3D9-AC4C-BDD7-9EFA39DFB1A1}"/>
+              </a:ext>
+            </a:extLst>
+          </p:cNvPr>
+          <p:cNvSpPr>
+            <a:spLocks noGrp="1"/>
+          </p:cNvSpPr>
+          <p:nvPr>
+            <p:ph type="ftr" sz="quarter" idx="11"/>
+          </p:nvPr>
+        </p:nvSpPr>
+        <p:spPr/>
+        <p:txBody>
+          <a:bodyPr/>
+          <a:lstStyle/>
+          <a:p>
+            <a:r>
+              <a:rPr lang="en-US"/>
+              <a:t>Continuous integration, v4.0</a:t>
+            </a:r>
+            <a:endParaRPr lang="en-US" dirty="0"/>
+          </a:p>
+        </p:txBody>
+      </p:sp>
+      <p:sp>
+        <p:nvSpPr>
+          <p:cNvPr id="15" name="Rectangle 14">
+            <a:extLst>
+              <a:ext uri="{FF2B5EF4-FFF2-40B4-BE49-F238E27FC236}">
+                <a16:creationId xmlns:a16="http://schemas.microsoft.com/office/drawing/2014/main" id="{A6D19DE0-5F67-1746-9159-5DDB1C4C03CA}"/>
+              </a:ext>
+            </a:extLst>
+          </p:cNvPr>
+          <p:cNvSpPr/>
+          <p:nvPr/>
+        </p:nvSpPr>
+        <p:spPr>
+          <a:xfrm>
+            <a:off x="983432" y="4398262"/>
+            <a:ext cx="10793960" cy="2000548"/>
+          </a:xfrm>
+          <a:prstGeom prst="rect">
+            <a:avLst/>
+          </a:prstGeom>
+        </p:spPr>
+        <p:txBody>
+          <a:bodyPr wrap="square">
+            <a:spAutoFit/>
+          </a:bodyPr>
+          <a:lstStyle/>
+          <a:p>
+            <a:r>
+              <a:rPr lang="en-CH" sz="2400" dirty="0">
+                <a:latin typeface="+mn-lt"/>
+              </a:rPr>
+              <a:t>Potential issues</a:t>
+            </a:r>
+          </a:p>
+          <a:p>
+            <a:pPr marL="342900" indent="-342900">
+              <a:buFontTx/>
+              <a:buChar char="-"/>
+            </a:pPr>
+            <a:r>
+              <a:rPr lang="en-CH" sz="2000" dirty="0">
+                <a:latin typeface="+mn-lt"/>
+              </a:rPr>
+              <a:t>The tests might pass on one machine and/or the other, but not in a third-party environment (versions, OS, etc.)</a:t>
+            </a:r>
+          </a:p>
+          <a:p>
+            <a:pPr marL="342900" indent="-342900">
+              <a:buFontTx/>
+              <a:buChar char="-"/>
+            </a:pPr>
+            <a:r>
+              <a:rPr lang="en-CH" sz="2000" dirty="0">
+                <a:latin typeface="+mn-lt"/>
+              </a:rPr>
+              <a:t>A maintainer needs to ensure that the software works on all the supported combinations of versions / OSs</a:t>
+            </a:r>
+          </a:p>
+          <a:p>
+            <a:pPr marL="342900" indent="-342900">
+              <a:buFontTx/>
+              <a:buChar char="-"/>
+            </a:pPr>
+            <a:r>
+              <a:rPr lang="en-CH" sz="2000" dirty="0">
+                <a:latin typeface="+mn-lt"/>
+              </a:rPr>
+              <a:t>A maintainer needs to create and upload artifacts like binary packages, documentation, etc </a:t>
+            </a:r>
+          </a:p>
+        </p:txBody>
+      </p:sp>
+      <p:pic>
+        <p:nvPicPr>
+          <p:cNvPr id="7" name="Picture 6" descr="Graphical user interface, diagram&#10;&#10;Description automatically generated">
+            <a:extLst>
+              <a:ext uri="{FF2B5EF4-FFF2-40B4-BE49-F238E27FC236}">
+                <a16:creationId xmlns:a16="http://schemas.microsoft.com/office/drawing/2014/main" id="{D7FC7664-635F-E842-8D8C-22F2EAE1C75C}"/>
+              </a:ext>
+            </a:extLst>
+          </p:cNvPr>
+          <p:cNvPicPr>
+            <a:picLocks noChangeAspect="1"/>
+          </p:cNvPicPr>
+          <p:nvPr/>
+        </p:nvPicPr>
+        <p:blipFill>
+          <a:blip r:embed="rId2">
+            <a:extLst>
+              <a:ext uri="{28A0092B-C50C-407E-A947-70E740481C1C}">
+                <a14:useLocalDpi xmlns:a14="http://schemas.microsoft.com/office/drawing/2010/main" val="0"/>
+              </a:ext>
+            </a:extLst>
+          </a:blip>
+          <a:stretch>
+            <a:fillRect/>
+          </a:stretch>
+        </p:blipFill>
+        <p:spPr>
+          <a:xfrm>
+            <a:off x="2495600" y="1196752"/>
+            <a:ext cx="7200800" cy="3181749"/>
+          </a:xfrm>
+          <a:prstGeom prst="rect">
+            <a:avLst/>
+          </a:prstGeom>
+        </p:spPr>
+      </p:pic>
+      <p:sp>
+        <p:nvSpPr>
+          <p:cNvPr id="3" name="Slide Number Placeholder 2">
+            <a:extLst>
+              <a:ext uri="{FF2B5EF4-FFF2-40B4-BE49-F238E27FC236}">
+                <a16:creationId xmlns:a16="http://schemas.microsoft.com/office/drawing/2014/main" id="{74910C84-24D3-716E-1EB5-1CBCED425CD9}"/>
+              </a:ext>
+            </a:extLst>
+          </p:cNvPr>
+          <p:cNvSpPr>
+            <a:spLocks noGrp="1"/>
+          </p:cNvSpPr>
+          <p:nvPr>
+            <p:ph type="sldNum" sz="quarter" idx="12"/>
+          </p:nvPr>
+        </p:nvSpPr>
+        <p:spPr/>
+        <p:txBody>
+          <a:bodyPr/>
+          <a:lstStyle/>
+          <a:p>
+            <a:fld id="{EF79ADEA-B933-47CC-A4E9-04E6298B917C}" type="slidenum">
+              <a:rPr lang="en-US" smtClean="0"/>
+              <a:pPr/>
+              <a:t>2</a:t>
+            </a:fld>
+            <a:endParaRPr lang="en-US"/>
+          </a:p>
+        </p:txBody>
+      </p:sp>
+    </p:spTree>
+    <p:extLst>
+      <p:ext uri="{BB962C8B-B14F-4D97-AF65-F5344CB8AC3E}">
+        <p14:creationId xmlns:p14="http://schemas.microsoft.com/office/powerpoint/2010/main" val="578119186"/>
+      </p:ext>
+    </p:extLst>
+  </p:cSld>
+  <p:clrMapOvr>
+    <a:masterClrMapping/>
+  </p:clrMapOvr>
+</p:sld>
+</file>
+
+<file path=ppt/slides/slide20.xml><?xml version="1.0" encoding="utf-8"?>
 <p:sld xmlns:a="http://schemas.openxmlformats.org/drawingml/2006/main" xmlns:r="http://schemas.openxmlformats.org/officeDocument/2006/relationships" xmlns:p="http://schemas.openxmlformats.org/presentationml/2006/main" show="0">
   <p:cSld>
     <p:spTree>
@@ -8005,7 +8471,7 @@
             <a:fld id="{EF79ADEA-B933-47CC-A4E9-04E6298B917C}" type="slidenum">
               <a:rPr lang="en-US" smtClean="0"/>
               <a:pPr/>
-              <a:t>19</a:t>
+              <a:t>20</a:t>
             </a:fld>
             <a:endParaRPr lang="en-US"/>
           </a:p>
@@ -8015,516 +8481,6 @@
     <p:extLst>
       <p:ext uri="{BB962C8B-B14F-4D97-AF65-F5344CB8AC3E}">
         <p14:creationId xmlns:p14="http://schemas.microsoft.com/office/powerpoint/2010/main" val="2711912215"/>
-      </p:ext>
-    </p:extLst>
-  </p:cSld>
-  <p:clrMapOvr>
-    <a:masterClrMapping/>
-  </p:clrMapOvr>
-</p:sld>
-</file>
-
-<file path=ppt/slides/slide2.xml><?xml version="1.0" encoding="utf-8"?>
-<p:sld xmlns:a="http://schemas.openxmlformats.org/drawingml/2006/main" xmlns:r="http://schemas.openxmlformats.org/officeDocument/2006/relationships" xmlns:p="http://schemas.openxmlformats.org/presentationml/2006/main">
-  <p:cSld>
-    <p:spTree>
-      <p:nvGrpSpPr>
-        <p:cNvPr id="1" name=""/>
-        <p:cNvGrpSpPr/>
-        <p:nvPr/>
-      </p:nvGrpSpPr>
-      <p:grpSpPr>
-        <a:xfrm>
-          <a:off x="0" y="0"/>
-          <a:ext cx="0" cy="0"/>
-          <a:chOff x="0" y="0"/>
-          <a:chExt cx="0" cy="0"/>
-        </a:xfrm>
-      </p:grpSpPr>
-      <p:sp>
-        <p:nvSpPr>
-          <p:cNvPr id="2" name="Title 1">
-            <a:extLst>
-              <a:ext uri="{FF2B5EF4-FFF2-40B4-BE49-F238E27FC236}">
-                <a16:creationId xmlns:a16="http://schemas.microsoft.com/office/drawing/2014/main" id="{4993AE45-A766-0F4D-9D65-D692ECB4ED00}"/>
-              </a:ext>
-            </a:extLst>
-          </p:cNvPr>
-          <p:cNvSpPr>
-            <a:spLocks noGrp="1"/>
-          </p:cNvSpPr>
-          <p:nvPr>
-            <p:ph type="title"/>
-          </p:nvPr>
-        </p:nvSpPr>
-        <p:spPr/>
-        <p:txBody>
-          <a:bodyPr/>
-          <a:lstStyle/>
-          <a:p>
-            <a:r>
-              <a:rPr lang="de-DE" dirty="0"/>
-              <a:t>Collaborative Development </a:t>
-            </a:r>
-            <a:r>
-              <a:rPr lang="de-DE" dirty="0" err="1"/>
-              <a:t>without</a:t>
-            </a:r>
-            <a:r>
-              <a:rPr lang="de-DE" dirty="0"/>
-              <a:t> CI</a:t>
-            </a:r>
-            <a:endParaRPr lang="en-CH" dirty="0"/>
-          </a:p>
-        </p:txBody>
-      </p:sp>
-      <p:sp>
-        <p:nvSpPr>
-          <p:cNvPr id="4" name="Date Placeholder 3">
-            <a:extLst>
-              <a:ext uri="{FF2B5EF4-FFF2-40B4-BE49-F238E27FC236}">
-                <a16:creationId xmlns:a16="http://schemas.microsoft.com/office/drawing/2014/main" id="{BB7DFD63-E8DE-9344-BDD0-A143F8BD67AC}"/>
-              </a:ext>
-            </a:extLst>
-          </p:cNvPr>
-          <p:cNvSpPr>
-            <a:spLocks noGrp="1"/>
-          </p:cNvSpPr>
-          <p:nvPr>
-            <p:ph type="dt" sz="half" idx="10"/>
-          </p:nvPr>
-        </p:nvSpPr>
-        <p:spPr/>
-        <p:txBody>
-          <a:bodyPr/>
-          <a:lstStyle/>
-          <a:p>
-            <a:r>
-              <a:rPr lang="de-CH"/>
-              <a:t>August 2023, CC BY-SA 4.0</a:t>
-            </a:r>
-            <a:endParaRPr lang="en-US" dirty="0"/>
-          </a:p>
-        </p:txBody>
-      </p:sp>
-      <p:sp>
-        <p:nvSpPr>
-          <p:cNvPr id="5" name="Footer Placeholder 4">
-            <a:extLst>
-              <a:ext uri="{FF2B5EF4-FFF2-40B4-BE49-F238E27FC236}">
-                <a16:creationId xmlns:a16="http://schemas.microsoft.com/office/drawing/2014/main" id="{5138C878-C3D9-AC4C-BDD7-9EFA39DFB1A1}"/>
-              </a:ext>
-            </a:extLst>
-          </p:cNvPr>
-          <p:cNvSpPr>
-            <a:spLocks noGrp="1"/>
-          </p:cNvSpPr>
-          <p:nvPr>
-            <p:ph type="ftr" sz="quarter" idx="11"/>
-          </p:nvPr>
-        </p:nvSpPr>
-        <p:spPr/>
-        <p:txBody>
-          <a:bodyPr/>
-          <a:lstStyle/>
-          <a:p>
-            <a:r>
-              <a:rPr lang="en-US"/>
-              <a:t>Continuous integration, v4.0</a:t>
-            </a:r>
-            <a:endParaRPr lang="en-US" dirty="0"/>
-          </a:p>
-        </p:txBody>
-      </p:sp>
-      <p:sp>
-        <p:nvSpPr>
-          <p:cNvPr id="15" name="Rectangle 14">
-            <a:extLst>
-              <a:ext uri="{FF2B5EF4-FFF2-40B4-BE49-F238E27FC236}">
-                <a16:creationId xmlns:a16="http://schemas.microsoft.com/office/drawing/2014/main" id="{A6D19DE0-5F67-1746-9159-5DDB1C4C03CA}"/>
-              </a:ext>
-            </a:extLst>
-          </p:cNvPr>
-          <p:cNvSpPr/>
-          <p:nvPr/>
-        </p:nvSpPr>
-        <p:spPr>
-          <a:xfrm>
-            <a:off x="983432" y="4398262"/>
-            <a:ext cx="10793960" cy="2000548"/>
-          </a:xfrm>
-          <a:prstGeom prst="rect">
-            <a:avLst/>
-          </a:prstGeom>
-        </p:spPr>
-        <p:txBody>
-          <a:bodyPr wrap="square">
-            <a:spAutoFit/>
-          </a:bodyPr>
-          <a:lstStyle/>
-          <a:p>
-            <a:r>
-              <a:rPr lang="en-CH" sz="2400" dirty="0">
-                <a:latin typeface="+mn-lt"/>
-              </a:rPr>
-              <a:t>Potential issues</a:t>
-            </a:r>
-          </a:p>
-          <a:p>
-            <a:pPr marL="342900" indent="-342900">
-              <a:buFontTx/>
-              <a:buChar char="-"/>
-            </a:pPr>
-            <a:r>
-              <a:rPr lang="en-CH" sz="2000" dirty="0">
-                <a:latin typeface="+mn-lt"/>
-              </a:rPr>
-              <a:t>The tests might pass on one machine and/or the other, but not in a third-party environment (versions, OS, etc.)</a:t>
-            </a:r>
-          </a:p>
-          <a:p>
-            <a:pPr marL="342900" indent="-342900">
-              <a:buFontTx/>
-              <a:buChar char="-"/>
-            </a:pPr>
-            <a:r>
-              <a:rPr lang="en-CH" sz="2000" dirty="0">
-                <a:latin typeface="+mn-lt"/>
-              </a:rPr>
-              <a:t>A maintainer needs to ensure that the software works on all the supported combinations of versions / OSs</a:t>
-            </a:r>
-          </a:p>
-          <a:p>
-            <a:pPr marL="342900" indent="-342900">
-              <a:buFontTx/>
-              <a:buChar char="-"/>
-            </a:pPr>
-            <a:r>
-              <a:rPr lang="en-CH" sz="2000" dirty="0">
-                <a:latin typeface="+mn-lt"/>
-              </a:rPr>
-              <a:t>A maintainer needs to create and upload artifacts like binary packages, documentation, etc </a:t>
-            </a:r>
-          </a:p>
-        </p:txBody>
-      </p:sp>
-      <p:pic>
-        <p:nvPicPr>
-          <p:cNvPr id="7" name="Picture 6" descr="Graphical user interface, diagram&#10;&#10;Description automatically generated">
-            <a:extLst>
-              <a:ext uri="{FF2B5EF4-FFF2-40B4-BE49-F238E27FC236}">
-                <a16:creationId xmlns:a16="http://schemas.microsoft.com/office/drawing/2014/main" id="{D7FC7664-635F-E842-8D8C-22F2EAE1C75C}"/>
-              </a:ext>
-            </a:extLst>
-          </p:cNvPr>
-          <p:cNvPicPr>
-            <a:picLocks noChangeAspect="1"/>
-          </p:cNvPicPr>
-          <p:nvPr/>
-        </p:nvPicPr>
-        <p:blipFill>
-          <a:blip r:embed="rId2">
-            <a:extLst>
-              <a:ext uri="{28A0092B-C50C-407E-A947-70E740481C1C}">
-                <a14:useLocalDpi xmlns:a14="http://schemas.microsoft.com/office/drawing/2010/main" val="0"/>
-              </a:ext>
-            </a:extLst>
-          </a:blip>
-          <a:stretch>
-            <a:fillRect/>
-          </a:stretch>
-        </p:blipFill>
-        <p:spPr>
-          <a:xfrm>
-            <a:off x="2495600" y="1196752"/>
-            <a:ext cx="7200800" cy="3181749"/>
-          </a:xfrm>
-          <a:prstGeom prst="rect">
-            <a:avLst/>
-          </a:prstGeom>
-        </p:spPr>
-      </p:pic>
-      <p:sp>
-        <p:nvSpPr>
-          <p:cNvPr id="3" name="Slide Number Placeholder 2">
-            <a:extLst>
-              <a:ext uri="{FF2B5EF4-FFF2-40B4-BE49-F238E27FC236}">
-                <a16:creationId xmlns:a16="http://schemas.microsoft.com/office/drawing/2014/main" id="{74910C84-24D3-716E-1EB5-1CBCED425CD9}"/>
-              </a:ext>
-            </a:extLst>
-          </p:cNvPr>
-          <p:cNvSpPr>
-            <a:spLocks noGrp="1"/>
-          </p:cNvSpPr>
-          <p:nvPr>
-            <p:ph type="sldNum" sz="quarter" idx="12"/>
-          </p:nvPr>
-        </p:nvSpPr>
-        <p:spPr/>
-        <p:txBody>
-          <a:bodyPr/>
-          <a:lstStyle/>
-          <a:p>
-            <a:fld id="{EF79ADEA-B933-47CC-A4E9-04E6298B917C}" type="slidenum">
-              <a:rPr lang="en-US" smtClean="0"/>
-              <a:pPr/>
-              <a:t>2</a:t>
-            </a:fld>
-            <a:endParaRPr lang="en-US"/>
-          </a:p>
-        </p:txBody>
-      </p:sp>
-    </p:spTree>
-    <p:extLst>
-      <p:ext uri="{BB962C8B-B14F-4D97-AF65-F5344CB8AC3E}">
-        <p14:creationId xmlns:p14="http://schemas.microsoft.com/office/powerpoint/2010/main" val="578119186"/>
-      </p:ext>
-    </p:extLst>
-  </p:cSld>
-  <p:clrMapOvr>
-    <a:masterClrMapping/>
-  </p:clrMapOvr>
-</p:sld>
-</file>
-
-<file path=ppt/slides/slide20.xml><?xml version="1.0" encoding="utf-8"?>
-<p:sld xmlns:a="http://schemas.openxmlformats.org/drawingml/2006/main" xmlns:r="http://schemas.openxmlformats.org/officeDocument/2006/relationships" xmlns:p="http://schemas.openxmlformats.org/presentationml/2006/main" show="0">
-  <p:cSld>
-    <p:spTree>
-      <p:nvGrpSpPr>
-        <p:cNvPr id="1" name=""/>
-        <p:cNvGrpSpPr/>
-        <p:nvPr/>
-      </p:nvGrpSpPr>
-      <p:grpSpPr>
-        <a:xfrm>
-          <a:off x="0" y="0"/>
-          <a:ext cx="0" cy="0"/>
-          <a:chOff x="0" y="0"/>
-          <a:chExt cx="0" cy="0"/>
-        </a:xfrm>
-      </p:grpSpPr>
-      <p:sp>
-        <p:nvSpPr>
-          <p:cNvPr id="2" name="Title 1">
-            <a:extLst>
-              <a:ext uri="{FF2B5EF4-FFF2-40B4-BE49-F238E27FC236}">
-                <a16:creationId xmlns:a16="http://schemas.microsoft.com/office/drawing/2014/main" id="{EACC7A8A-CD41-EB49-BCCF-D1CC9D385024}"/>
-              </a:ext>
-            </a:extLst>
-          </p:cNvPr>
-          <p:cNvSpPr>
-            <a:spLocks noGrp="1"/>
-          </p:cNvSpPr>
-          <p:nvPr>
-            <p:ph type="title"/>
-          </p:nvPr>
-        </p:nvSpPr>
-        <p:spPr/>
-        <p:txBody>
-          <a:bodyPr/>
-          <a:lstStyle/>
-          <a:p>
-            <a:r>
-              <a:rPr lang="en-CH" dirty="0"/>
-              <a:t>GitHub Actions reference</a:t>
-            </a:r>
-          </a:p>
-        </p:txBody>
-      </p:sp>
-      <p:sp>
-        <p:nvSpPr>
-          <p:cNvPr id="3" name="Content Placeholder 2">
-            <a:extLst>
-              <a:ext uri="{FF2B5EF4-FFF2-40B4-BE49-F238E27FC236}">
-                <a16:creationId xmlns:a16="http://schemas.microsoft.com/office/drawing/2014/main" id="{DE78B902-F52A-5B4E-AC89-A7164CC5CB2E}"/>
-              </a:ext>
-            </a:extLst>
-          </p:cNvPr>
-          <p:cNvSpPr>
-            <a:spLocks noGrp="1"/>
-          </p:cNvSpPr>
-          <p:nvPr>
-            <p:ph idx="1"/>
-          </p:nvPr>
-        </p:nvSpPr>
-        <p:spPr/>
-        <p:txBody>
-          <a:bodyPr>
-            <a:normAutofit/>
-          </a:bodyPr>
-          <a:lstStyle/>
-          <a:p>
-            <a:r>
-              <a:rPr lang="en-US" dirty="0"/>
-              <a:t>Types of virtual machines available on GitHub Actions:</a:t>
-            </a:r>
-            <a:br>
-              <a:rPr lang="en-US" dirty="0"/>
-            </a:br>
-            <a:r>
-              <a:rPr lang="en-US" sz="1800" dirty="0">
-                <a:latin typeface="Courier New" panose="02070309020205020404" pitchFamily="49" charset="0"/>
-                <a:cs typeface="Courier New" panose="02070309020205020404" pitchFamily="49" charset="0"/>
-                <a:hlinkClick r:id="rId2"/>
-              </a:rPr>
-              <a:t>https://docs.github.com/en/actions/using-github-hosted-runners/about-github-hosted-runners#supported-runners-and-hardware-resources</a:t>
-            </a:r>
-            <a:endParaRPr lang="en-US" sz="1800" dirty="0">
-              <a:latin typeface="Courier New" panose="02070309020205020404" pitchFamily="49" charset="0"/>
-              <a:cs typeface="Courier New" panose="02070309020205020404" pitchFamily="49" charset="0"/>
-            </a:endParaRPr>
-          </a:p>
-          <a:p>
-            <a:r>
-              <a:rPr lang="en-US" sz="1800" dirty="0">
-                <a:latin typeface="Courier New" panose="02070309020205020404" pitchFamily="49" charset="0"/>
-                <a:cs typeface="Courier New" panose="02070309020205020404" pitchFamily="49" charset="0"/>
-              </a:rPr>
-              <a:t>setup-python</a:t>
-            </a:r>
-            <a:r>
-              <a:rPr lang="en-US" sz="1800" dirty="0">
-                <a:cs typeface="Courier New" panose="02070309020205020404" pitchFamily="49" charset="0"/>
-              </a:rPr>
-              <a:t> </a:t>
-            </a:r>
-            <a:r>
-              <a:rPr lang="en-US" sz="2000" dirty="0">
-                <a:cs typeface="Courier New" panose="02070309020205020404" pitchFamily="49" charset="0"/>
-              </a:rPr>
-              <a:t>community action, all available Python flavors and versions:</a:t>
-            </a:r>
-            <a:br>
-              <a:rPr lang="en-US" sz="2000" dirty="0">
-                <a:cs typeface="Courier New" panose="02070309020205020404" pitchFamily="49" charset="0"/>
-              </a:rPr>
-            </a:br>
-            <a:r>
-              <a:rPr lang="en-US" sz="1800" dirty="0">
-                <a:latin typeface="Courier New" panose="02070309020205020404" pitchFamily="49" charset="0"/>
-                <a:cs typeface="Courier New" panose="02070309020205020404" pitchFamily="49" charset="0"/>
-                <a:hlinkClick r:id="rId3"/>
-              </a:rPr>
-              <a:t>https://github.com/marketplace/actions/setup-python</a:t>
-            </a:r>
-            <a:endParaRPr lang="en-US" sz="1800" dirty="0">
-              <a:latin typeface="Courier New" panose="02070309020205020404" pitchFamily="49" charset="0"/>
-              <a:cs typeface="Courier New" panose="02070309020205020404" pitchFamily="49" charset="0"/>
-            </a:endParaRPr>
-          </a:p>
-          <a:p>
-            <a:endParaRPr lang="en-US" sz="1800" dirty="0">
-              <a:latin typeface="Courier New" panose="02070309020205020404" pitchFamily="49" charset="0"/>
-              <a:cs typeface="Courier New" panose="02070309020205020404" pitchFamily="49" charset="0"/>
-            </a:endParaRPr>
-          </a:p>
-          <a:p>
-            <a:pPr marL="0" indent="0">
-              <a:buNone/>
-            </a:pPr>
-            <a:endParaRPr lang="en-US" dirty="0"/>
-          </a:p>
-          <a:p>
-            <a:pPr marL="0" indent="0">
-              <a:buNone/>
-            </a:pPr>
-            <a:endParaRPr lang="en-CH" dirty="0"/>
-          </a:p>
-        </p:txBody>
-      </p:sp>
-      <p:sp>
-        <p:nvSpPr>
-          <p:cNvPr id="4" name="Date Placeholder 3">
-            <a:extLst>
-              <a:ext uri="{FF2B5EF4-FFF2-40B4-BE49-F238E27FC236}">
-                <a16:creationId xmlns:a16="http://schemas.microsoft.com/office/drawing/2014/main" id="{BD10E3E1-D420-6649-A15F-D53900236E0F}"/>
-              </a:ext>
-            </a:extLst>
-          </p:cNvPr>
-          <p:cNvSpPr>
-            <a:spLocks noGrp="1"/>
-          </p:cNvSpPr>
-          <p:nvPr>
-            <p:ph type="dt" sz="half" idx="10"/>
-          </p:nvPr>
-        </p:nvSpPr>
-        <p:spPr/>
-        <p:txBody>
-          <a:bodyPr/>
-          <a:lstStyle/>
-          <a:p>
-            <a:r>
-              <a:rPr lang="de-CH" sz="1000"/>
-              <a:t>August 2023, CC BY-SA 4.0</a:t>
-            </a:r>
-            <a:endParaRPr lang="en-US" sz="1000" dirty="0"/>
-          </a:p>
-        </p:txBody>
-      </p:sp>
-      <p:sp>
-        <p:nvSpPr>
-          <p:cNvPr id="5" name="Footer Placeholder 4">
-            <a:extLst>
-              <a:ext uri="{FF2B5EF4-FFF2-40B4-BE49-F238E27FC236}">
-                <a16:creationId xmlns:a16="http://schemas.microsoft.com/office/drawing/2014/main" id="{6F012DDD-E088-A248-B0DC-043A5AFA7F11}"/>
-              </a:ext>
-            </a:extLst>
-          </p:cNvPr>
-          <p:cNvSpPr>
-            <a:spLocks noGrp="1"/>
-          </p:cNvSpPr>
-          <p:nvPr>
-            <p:ph type="ftr" sz="quarter" idx="11"/>
-          </p:nvPr>
-        </p:nvSpPr>
-        <p:spPr/>
-        <p:txBody>
-          <a:bodyPr/>
-          <a:lstStyle/>
-          <a:p>
-            <a:r>
-              <a:rPr lang="en-US"/>
-              <a:t>Continuous integration, v4.0</a:t>
-            </a:r>
-            <a:endParaRPr lang="en-US" dirty="0"/>
-          </a:p>
-        </p:txBody>
-      </p:sp>
-      <p:sp>
-        <p:nvSpPr>
-          <p:cNvPr id="6" name="Slide Number Placeholder 5">
-            <a:extLst>
-              <a:ext uri="{FF2B5EF4-FFF2-40B4-BE49-F238E27FC236}">
-                <a16:creationId xmlns:a16="http://schemas.microsoft.com/office/drawing/2014/main" id="{D1A31B90-0CF8-18DE-6D32-3B65F6DE2E1C}"/>
-              </a:ext>
-            </a:extLst>
-          </p:cNvPr>
-          <p:cNvSpPr>
-            <a:spLocks noGrp="1"/>
-          </p:cNvSpPr>
-          <p:nvPr>
-            <p:ph type="sldNum" sz="quarter" idx="12"/>
-          </p:nvPr>
-        </p:nvSpPr>
-        <p:spPr/>
-        <p:txBody>
-          <a:bodyPr/>
-          <a:lstStyle/>
-          <a:p>
-            <a:fld id="{EF79ADEA-B933-47CC-A4E9-04E6298B917C}" type="slidenum">
-              <a:rPr lang="en-US" smtClean="0"/>
-              <a:pPr/>
-              <a:t>20</a:t>
-            </a:fld>
-            <a:endParaRPr lang="en-US"/>
-          </a:p>
-        </p:txBody>
-      </p:sp>
-    </p:spTree>
-    <p:extLst>
-      <p:ext uri="{BB962C8B-B14F-4D97-AF65-F5344CB8AC3E}">
-        <p14:creationId xmlns:p14="http://schemas.microsoft.com/office/powerpoint/2010/main" val="3469218920"/>
       </p:ext>
     </p:extLst>
   </p:cSld>
@@ -8556,6 +8512,253 @@
           <p:cNvPr id="2" name="Title 1">
             <a:extLst>
               <a:ext uri="{FF2B5EF4-FFF2-40B4-BE49-F238E27FC236}">
+                <a16:creationId xmlns:a16="http://schemas.microsoft.com/office/drawing/2014/main" id="{EACC7A8A-CD41-EB49-BCCF-D1CC9D385024}"/>
+              </a:ext>
+            </a:extLst>
+          </p:cNvPr>
+          <p:cNvSpPr>
+            <a:spLocks noGrp="1"/>
+          </p:cNvSpPr>
+          <p:nvPr>
+            <p:ph type="title"/>
+          </p:nvPr>
+        </p:nvSpPr>
+        <p:spPr/>
+        <p:txBody>
+          <a:bodyPr/>
+          <a:lstStyle/>
+          <a:p>
+            <a:r>
+              <a:rPr lang="en-CH" dirty="0"/>
+              <a:t>GitHub Actions reference</a:t>
+            </a:r>
+          </a:p>
+        </p:txBody>
+      </p:sp>
+      <p:sp>
+        <p:nvSpPr>
+          <p:cNvPr id="3" name="Content Placeholder 2">
+            <a:extLst>
+              <a:ext uri="{FF2B5EF4-FFF2-40B4-BE49-F238E27FC236}">
+                <a16:creationId xmlns:a16="http://schemas.microsoft.com/office/drawing/2014/main" id="{DE78B902-F52A-5B4E-AC89-A7164CC5CB2E}"/>
+              </a:ext>
+            </a:extLst>
+          </p:cNvPr>
+          <p:cNvSpPr>
+            <a:spLocks noGrp="1"/>
+          </p:cNvSpPr>
+          <p:nvPr>
+            <p:ph idx="1"/>
+          </p:nvPr>
+        </p:nvSpPr>
+        <p:spPr/>
+        <p:txBody>
+          <a:bodyPr>
+            <a:normAutofit/>
+          </a:bodyPr>
+          <a:lstStyle/>
+          <a:p>
+            <a:r>
+              <a:rPr lang="en-US" dirty="0"/>
+              <a:t>Types of virtual machines available on GitHub Actions:</a:t>
+            </a:r>
+            <a:br>
+              <a:rPr lang="en-US" dirty="0"/>
+            </a:br>
+            <a:r>
+              <a:rPr lang="en-US" sz="1800" dirty="0">
+                <a:latin typeface="Courier New" panose="02070309020205020404" pitchFamily="49" charset="0"/>
+                <a:cs typeface="Courier New" panose="02070309020205020404" pitchFamily="49" charset="0"/>
+                <a:hlinkClick r:id="rId2"/>
+              </a:rPr>
+              <a:t>https://docs.github.com/en/actions/using-github-hosted-runners/about-github-hosted-runners#supported-runners-and-hardware-resources</a:t>
+            </a:r>
+            <a:endParaRPr lang="en-US" sz="1800" dirty="0">
+              <a:latin typeface="Courier New" panose="02070309020205020404" pitchFamily="49" charset="0"/>
+              <a:cs typeface="Courier New" panose="02070309020205020404" pitchFamily="49" charset="0"/>
+            </a:endParaRPr>
+          </a:p>
+          <a:p>
+            <a:r>
+              <a:rPr lang="en-US" sz="1800" dirty="0">
+                <a:latin typeface="Courier New" panose="02070309020205020404" pitchFamily="49" charset="0"/>
+                <a:cs typeface="Courier New" panose="02070309020205020404" pitchFamily="49" charset="0"/>
+              </a:rPr>
+              <a:t>setup-python</a:t>
+            </a:r>
+            <a:r>
+              <a:rPr lang="en-US" sz="1800" dirty="0">
+                <a:cs typeface="Courier New" panose="02070309020205020404" pitchFamily="49" charset="0"/>
+              </a:rPr>
+              <a:t> </a:t>
+            </a:r>
+            <a:r>
+              <a:rPr lang="en-US" sz="2000" dirty="0">
+                <a:cs typeface="Courier New" panose="02070309020205020404" pitchFamily="49" charset="0"/>
+              </a:rPr>
+              <a:t>community action, all available Python flavors and versions:</a:t>
+            </a:r>
+            <a:br>
+              <a:rPr lang="en-US" sz="2000" dirty="0">
+                <a:cs typeface="Courier New" panose="02070309020205020404" pitchFamily="49" charset="0"/>
+              </a:rPr>
+            </a:br>
+            <a:r>
+              <a:rPr lang="en-US" sz="1800" dirty="0">
+                <a:latin typeface="Courier New" panose="02070309020205020404" pitchFamily="49" charset="0"/>
+                <a:cs typeface="Courier New" panose="02070309020205020404" pitchFamily="49" charset="0"/>
+                <a:hlinkClick r:id="rId3"/>
+              </a:rPr>
+              <a:t>https://github.com/marketplace/actions/setup-python</a:t>
+            </a:r>
+            <a:endParaRPr lang="en-US" sz="1800" dirty="0">
+              <a:latin typeface="Courier New" panose="02070309020205020404" pitchFamily="49" charset="0"/>
+              <a:cs typeface="Courier New" panose="02070309020205020404" pitchFamily="49" charset="0"/>
+            </a:endParaRPr>
+          </a:p>
+          <a:p>
+            <a:endParaRPr lang="en-US" sz="1800" dirty="0">
+              <a:latin typeface="Courier New" panose="02070309020205020404" pitchFamily="49" charset="0"/>
+              <a:cs typeface="Courier New" panose="02070309020205020404" pitchFamily="49" charset="0"/>
+            </a:endParaRPr>
+          </a:p>
+          <a:p>
+            <a:pPr marL="0" indent="0">
+              <a:buNone/>
+            </a:pPr>
+            <a:endParaRPr lang="en-US" dirty="0"/>
+          </a:p>
+          <a:p>
+            <a:pPr marL="0" indent="0">
+              <a:buNone/>
+            </a:pPr>
+            <a:endParaRPr lang="en-CH" dirty="0"/>
+          </a:p>
+        </p:txBody>
+      </p:sp>
+      <p:sp>
+        <p:nvSpPr>
+          <p:cNvPr id="4" name="Date Placeholder 3">
+            <a:extLst>
+              <a:ext uri="{FF2B5EF4-FFF2-40B4-BE49-F238E27FC236}">
+                <a16:creationId xmlns:a16="http://schemas.microsoft.com/office/drawing/2014/main" id="{BD10E3E1-D420-6649-A15F-D53900236E0F}"/>
+              </a:ext>
+            </a:extLst>
+          </p:cNvPr>
+          <p:cNvSpPr>
+            <a:spLocks noGrp="1"/>
+          </p:cNvSpPr>
+          <p:nvPr>
+            <p:ph type="dt" sz="half" idx="10"/>
+          </p:nvPr>
+        </p:nvSpPr>
+        <p:spPr/>
+        <p:txBody>
+          <a:bodyPr/>
+          <a:lstStyle/>
+          <a:p>
+            <a:r>
+              <a:rPr lang="de-CH" sz="1000"/>
+              <a:t>August 2023, CC BY-SA 4.0</a:t>
+            </a:r>
+            <a:endParaRPr lang="en-US" sz="1000" dirty="0"/>
+          </a:p>
+        </p:txBody>
+      </p:sp>
+      <p:sp>
+        <p:nvSpPr>
+          <p:cNvPr id="5" name="Footer Placeholder 4">
+            <a:extLst>
+              <a:ext uri="{FF2B5EF4-FFF2-40B4-BE49-F238E27FC236}">
+                <a16:creationId xmlns:a16="http://schemas.microsoft.com/office/drawing/2014/main" id="{6F012DDD-E088-A248-B0DC-043A5AFA7F11}"/>
+              </a:ext>
+            </a:extLst>
+          </p:cNvPr>
+          <p:cNvSpPr>
+            <a:spLocks noGrp="1"/>
+          </p:cNvSpPr>
+          <p:nvPr>
+            <p:ph type="ftr" sz="quarter" idx="11"/>
+          </p:nvPr>
+        </p:nvSpPr>
+        <p:spPr/>
+        <p:txBody>
+          <a:bodyPr/>
+          <a:lstStyle/>
+          <a:p>
+            <a:r>
+              <a:rPr lang="en-US"/>
+              <a:t>Continuous integration, v4.0</a:t>
+            </a:r>
+            <a:endParaRPr lang="en-US" dirty="0"/>
+          </a:p>
+        </p:txBody>
+      </p:sp>
+      <p:sp>
+        <p:nvSpPr>
+          <p:cNvPr id="6" name="Slide Number Placeholder 5">
+            <a:extLst>
+              <a:ext uri="{FF2B5EF4-FFF2-40B4-BE49-F238E27FC236}">
+                <a16:creationId xmlns:a16="http://schemas.microsoft.com/office/drawing/2014/main" id="{D1A31B90-0CF8-18DE-6D32-3B65F6DE2E1C}"/>
+              </a:ext>
+            </a:extLst>
+          </p:cNvPr>
+          <p:cNvSpPr>
+            <a:spLocks noGrp="1"/>
+          </p:cNvSpPr>
+          <p:nvPr>
+            <p:ph type="sldNum" sz="quarter" idx="12"/>
+          </p:nvPr>
+        </p:nvSpPr>
+        <p:spPr/>
+        <p:txBody>
+          <a:bodyPr/>
+          <a:lstStyle/>
+          <a:p>
+            <a:fld id="{EF79ADEA-B933-47CC-A4E9-04E6298B917C}" type="slidenum">
+              <a:rPr lang="en-US" smtClean="0"/>
+              <a:pPr/>
+              <a:t>21</a:t>
+            </a:fld>
+            <a:endParaRPr lang="en-US"/>
+          </a:p>
+        </p:txBody>
+      </p:sp>
+    </p:spTree>
+    <p:extLst>
+      <p:ext uri="{BB962C8B-B14F-4D97-AF65-F5344CB8AC3E}">
+        <p14:creationId xmlns:p14="http://schemas.microsoft.com/office/powerpoint/2010/main" val="3469218920"/>
+      </p:ext>
+    </p:extLst>
+  </p:cSld>
+  <p:clrMapOvr>
+    <a:masterClrMapping/>
+  </p:clrMapOvr>
+</p:sld>
+</file>
+
+<file path=ppt/slides/slide22.xml><?xml version="1.0" encoding="utf-8"?>
+<p:sld xmlns:a="http://schemas.openxmlformats.org/drawingml/2006/main" xmlns:r="http://schemas.openxmlformats.org/officeDocument/2006/relationships" xmlns:p="http://schemas.openxmlformats.org/presentationml/2006/main" show="0">
+  <p:cSld>
+    <p:spTree>
+      <p:nvGrpSpPr>
+        <p:cNvPr id="1" name=""/>
+        <p:cNvGrpSpPr/>
+        <p:nvPr/>
+      </p:nvGrpSpPr>
+      <p:grpSpPr>
+        <a:xfrm>
+          <a:off x="0" y="0"/>
+          <a:ext cx="0" cy="0"/>
+          <a:chOff x="0" y="0"/>
+          <a:chExt cx="0" cy="0"/>
+        </a:xfrm>
+      </p:grpSpPr>
+      <p:sp>
+        <p:nvSpPr>
+          <p:cNvPr id="2" name="Title 1">
+            <a:extLst>
+              <a:ext uri="{FF2B5EF4-FFF2-40B4-BE49-F238E27FC236}">
                 <a16:creationId xmlns:a16="http://schemas.microsoft.com/office/drawing/2014/main" id="{33165359-9CD5-EF41-9C08-A5F425B6C08E}"/>
               </a:ext>
             </a:extLst>
@@ -8724,7 +8927,7 @@
             <a:fld id="{EF79ADEA-B933-47CC-A4E9-04E6298B917C}" type="slidenum">
               <a:rPr lang="en-US" smtClean="0"/>
               <a:pPr/>
-              <a:t>21</a:t>
+              <a:t>22</a:t>
             </a:fld>
             <a:endParaRPr lang="en-US"/>
           </a:p>
@@ -8796,7 +8999,7 @@
 </p:sld>
 </file>
 
-<file path=ppt/slides/slide22.xml><?xml version="1.0" encoding="utf-8"?>
+<file path=ppt/slides/slide23.xml><?xml version="1.0" encoding="utf-8"?>
 <p:sld xmlns:a="http://schemas.openxmlformats.org/drawingml/2006/main" xmlns:r="http://schemas.openxmlformats.org/officeDocument/2006/relationships" xmlns:p="http://schemas.openxmlformats.org/presentationml/2006/main" show="0">
   <p:cSld>
     <p:spTree>
@@ -8882,7 +9085,7 @@
             <a:fld id="{EF79ADEA-B933-47CC-A4E9-04E6298B917C}" type="slidenum">
               <a:rPr lang="en-US" smtClean="0"/>
               <a:pPr/>
-              <a:t>22</a:t>
+              <a:t>23</a:t>
             </a:fld>
             <a:endParaRPr lang="en-US"/>
           </a:p>
@@ -8896,7 +9099,7 @@
 </p:sld>
 </file>
 
-<file path=ppt/slides/slide23.xml><?xml version="1.0" encoding="utf-8"?>
+<file path=ppt/slides/slide24.xml><?xml version="1.0" encoding="utf-8"?>
 <p:sld xmlns:a="http://schemas.openxmlformats.org/drawingml/2006/main" xmlns:r="http://schemas.openxmlformats.org/officeDocument/2006/relationships" xmlns:p="http://schemas.openxmlformats.org/presentationml/2006/main" show="0">
   <p:cSld>
     <p:spTree>
@@ -9436,7 +9639,7 @@
             <a:fld id="{EF79ADEA-B933-47CC-A4E9-04E6298B917C}" type="slidenum">
               <a:rPr lang="en-US" smtClean="0"/>
               <a:pPr/>
-              <a:t>23</a:t>
+              <a:t>24</a:t>
             </a:fld>
             <a:endParaRPr lang="en-US"/>
           </a:p>
@@ -9446,275 +9649,6 @@
     <p:extLst>
       <p:ext uri="{BB962C8B-B14F-4D97-AF65-F5344CB8AC3E}">
         <p14:creationId xmlns:p14="http://schemas.microsoft.com/office/powerpoint/2010/main" val="261603392"/>
-      </p:ext>
-    </p:extLst>
-  </p:cSld>
-  <p:clrMapOvr>
-    <a:masterClrMapping/>
-  </p:clrMapOvr>
-</p:sld>
-</file>
-
-<file path=ppt/slides/slide24.xml><?xml version="1.0" encoding="utf-8"?>
-<p:sld xmlns:a="http://schemas.openxmlformats.org/drawingml/2006/main" xmlns:r="http://schemas.openxmlformats.org/officeDocument/2006/relationships" xmlns:p="http://schemas.openxmlformats.org/presentationml/2006/main" show="0">
-  <p:cSld>
-    <p:spTree>
-      <p:nvGrpSpPr>
-        <p:cNvPr id="1" name=""/>
-        <p:cNvGrpSpPr/>
-        <p:nvPr/>
-      </p:nvGrpSpPr>
-      <p:grpSpPr>
-        <a:xfrm>
-          <a:off x="0" y="0"/>
-          <a:ext cx="0" cy="0"/>
-          <a:chOff x="0" y="0"/>
-          <a:chExt cx="0" cy="0"/>
-        </a:xfrm>
-      </p:grpSpPr>
-      <p:sp>
-        <p:nvSpPr>
-          <p:cNvPr id="2" name="Title 1">
-            <a:extLst>
-              <a:ext uri="{FF2B5EF4-FFF2-40B4-BE49-F238E27FC236}">
-                <a16:creationId xmlns:a16="http://schemas.microsoft.com/office/drawing/2014/main" id="{061016C8-512C-EB4B-9D32-9CF4CB9D4F11}"/>
-              </a:ext>
-            </a:extLst>
-          </p:cNvPr>
-          <p:cNvSpPr>
-            <a:spLocks noGrp="1"/>
-          </p:cNvSpPr>
-          <p:nvPr>
-            <p:ph type="title"/>
-          </p:nvPr>
-        </p:nvSpPr>
-        <p:spPr/>
-        <p:txBody>
-          <a:bodyPr/>
-          <a:lstStyle/>
-          <a:p>
-            <a:r>
-              <a:rPr lang="de-DE" dirty="0"/>
-              <a:t>Bonus: </a:t>
-            </a:r>
-            <a:r>
-              <a:rPr lang="en-CH"/>
-              <a:t>Security</a:t>
-            </a:r>
-            <a:endParaRPr lang="en-CH" dirty="0"/>
-          </a:p>
-        </p:txBody>
-      </p:sp>
-      <p:sp>
-        <p:nvSpPr>
-          <p:cNvPr id="3" name="Content Placeholder 2">
-            <a:extLst>
-              <a:ext uri="{FF2B5EF4-FFF2-40B4-BE49-F238E27FC236}">
-                <a16:creationId xmlns:a16="http://schemas.microsoft.com/office/drawing/2014/main" id="{463079FE-7331-C647-815D-07795DC7ED3D}"/>
-              </a:ext>
-            </a:extLst>
-          </p:cNvPr>
-          <p:cNvSpPr>
-            <a:spLocks noGrp="1"/>
-          </p:cNvSpPr>
-          <p:nvPr>
-            <p:ph idx="1"/>
-          </p:nvPr>
-        </p:nvSpPr>
-        <p:spPr>
-          <a:xfrm>
-            <a:off x="1981200" y="1412776"/>
-            <a:ext cx="8229600" cy="4744184"/>
-          </a:xfrm>
-        </p:spPr>
-        <p:txBody>
-          <a:bodyPr>
-            <a:normAutofit/>
-          </a:bodyPr>
-          <a:lstStyle/>
-          <a:p>
-            <a:r>
-              <a:rPr lang="en-CH"/>
-              <a:t>Secrets </a:t>
-            </a:r>
-            <a:r>
-              <a:rPr lang="en-CH" dirty="0"/>
-              <a:t>in GitHub actions can be added </a:t>
-            </a:r>
-            <a:r>
-              <a:rPr lang="en-CH"/>
-              <a:t>under </a:t>
-            </a:r>
-            <a:br>
-              <a:rPr lang="de-DE" dirty="0"/>
-            </a:br>
-            <a:r>
-              <a:rPr lang="en-CH">
-                <a:latin typeface="Courier New" panose="02070309020205020404" pitchFamily="49" charset="0"/>
-                <a:cs typeface="Courier New" panose="02070309020205020404" pitchFamily="49" charset="0"/>
-              </a:rPr>
-              <a:t>Settings </a:t>
-            </a:r>
-            <a:r>
-              <a:rPr lang="de-DE" dirty="0">
-                <a:latin typeface="Courier New" panose="02070309020205020404" pitchFamily="49" charset="0"/>
-                <a:cs typeface="Courier New" panose="02070309020205020404" pitchFamily="49" charset="0"/>
-              </a:rPr>
-              <a:t>-</a:t>
-            </a:r>
-            <a:r>
-              <a:rPr lang="en-CH">
-                <a:latin typeface="Courier New" panose="02070309020205020404" pitchFamily="49" charset="0"/>
-                <a:cs typeface="Courier New" panose="02070309020205020404" pitchFamily="49" charset="0"/>
-              </a:rPr>
-              <a:t>&gt; </a:t>
-            </a:r>
-            <a:r>
-              <a:rPr lang="en-CH" dirty="0">
-                <a:latin typeface="Courier New" panose="02070309020205020404" pitchFamily="49" charset="0"/>
-                <a:cs typeface="Courier New" panose="02070309020205020404" pitchFamily="49" charset="0"/>
-              </a:rPr>
-              <a:t>Secrets</a:t>
-            </a:r>
-            <a:r>
-              <a:rPr lang="en-CH" dirty="0"/>
-              <a:t>.  The secret is stored encrypted by GitHub, and decrypted at the moment of running the workflow</a:t>
-            </a:r>
-          </a:p>
-          <a:p>
-            <a:r>
-              <a:rPr lang="en-CH" dirty="0"/>
-              <a:t>Secrets can then be referred to in the workflow as</a:t>
-            </a:r>
-            <a:br>
-              <a:rPr lang="en-CH" dirty="0"/>
-            </a:br>
-            <a:endParaRPr lang="en-CH" dirty="0"/>
-          </a:p>
-        </p:txBody>
-      </p:sp>
-      <p:sp>
-        <p:nvSpPr>
-          <p:cNvPr id="4" name="Date Placeholder 3">
-            <a:extLst>
-              <a:ext uri="{FF2B5EF4-FFF2-40B4-BE49-F238E27FC236}">
-                <a16:creationId xmlns:a16="http://schemas.microsoft.com/office/drawing/2014/main" id="{9EE323CB-7E09-7C4F-B160-F4B2E2E319F3}"/>
-              </a:ext>
-            </a:extLst>
-          </p:cNvPr>
-          <p:cNvSpPr>
-            <a:spLocks noGrp="1"/>
-          </p:cNvSpPr>
-          <p:nvPr>
-            <p:ph type="dt" sz="half" idx="10"/>
-          </p:nvPr>
-        </p:nvSpPr>
-        <p:spPr/>
-        <p:txBody>
-          <a:bodyPr/>
-          <a:lstStyle/>
-          <a:p>
-            <a:r>
-              <a:rPr lang="de-CH" sz="1000"/>
-              <a:t>August 2023, CC BY-SA 4.0</a:t>
-            </a:r>
-            <a:endParaRPr lang="en-US" sz="1000" dirty="0"/>
-          </a:p>
-        </p:txBody>
-      </p:sp>
-      <p:sp>
-        <p:nvSpPr>
-          <p:cNvPr id="5" name="Footer Placeholder 4">
-            <a:extLst>
-              <a:ext uri="{FF2B5EF4-FFF2-40B4-BE49-F238E27FC236}">
-                <a16:creationId xmlns:a16="http://schemas.microsoft.com/office/drawing/2014/main" id="{3453E2C3-64E5-E44E-8FAB-45D4F29AD119}"/>
-              </a:ext>
-            </a:extLst>
-          </p:cNvPr>
-          <p:cNvSpPr>
-            <a:spLocks noGrp="1"/>
-          </p:cNvSpPr>
-          <p:nvPr>
-            <p:ph type="ftr" sz="quarter" idx="11"/>
-          </p:nvPr>
-        </p:nvSpPr>
-        <p:spPr/>
-        <p:txBody>
-          <a:bodyPr/>
-          <a:lstStyle/>
-          <a:p>
-            <a:r>
-              <a:rPr lang="en-US"/>
-              <a:t>Continuous integration, v4.0</a:t>
-            </a:r>
-            <a:endParaRPr lang="en-US" dirty="0"/>
-          </a:p>
-        </p:txBody>
-      </p:sp>
-      <p:pic>
-        <p:nvPicPr>
-          <p:cNvPr id="6" name="Picture 5">
-            <a:extLst>
-              <a:ext uri="{FF2B5EF4-FFF2-40B4-BE49-F238E27FC236}">
-                <a16:creationId xmlns:a16="http://schemas.microsoft.com/office/drawing/2014/main" id="{6160D76E-090E-DD4A-92D3-5E3DA427B157}"/>
-              </a:ext>
-            </a:extLst>
-          </p:cNvPr>
-          <p:cNvPicPr>
-            <a:picLocks noChangeAspect="1"/>
-          </p:cNvPicPr>
-          <p:nvPr/>
-        </p:nvPicPr>
-        <p:blipFill>
-          <a:blip r:embed="rId2"/>
-          <a:stretch>
-            <a:fillRect/>
-          </a:stretch>
-        </p:blipFill>
-        <p:spPr>
-          <a:xfrm>
-            <a:off x="3143672" y="3789040"/>
-            <a:ext cx="5643482" cy="1800200"/>
-          </a:xfrm>
-          <a:prstGeom prst="rect">
-            <a:avLst/>
-          </a:prstGeom>
-        </p:spPr>
-      </p:pic>
-      <p:sp>
-        <p:nvSpPr>
-          <p:cNvPr id="7" name="Slide Number Placeholder 6">
-            <a:extLst>
-              <a:ext uri="{FF2B5EF4-FFF2-40B4-BE49-F238E27FC236}">
-                <a16:creationId xmlns:a16="http://schemas.microsoft.com/office/drawing/2014/main" id="{3F872150-F1C8-D16D-5401-B703854D69D1}"/>
-              </a:ext>
-            </a:extLst>
-          </p:cNvPr>
-          <p:cNvSpPr>
-            <a:spLocks noGrp="1"/>
-          </p:cNvSpPr>
-          <p:nvPr>
-            <p:ph type="sldNum" sz="quarter" idx="12"/>
-          </p:nvPr>
-        </p:nvSpPr>
-        <p:spPr/>
-        <p:txBody>
-          <a:bodyPr/>
-          <a:lstStyle/>
-          <a:p>
-            <a:fld id="{EF79ADEA-B933-47CC-A4E9-04E6298B917C}" type="slidenum">
-              <a:rPr lang="en-US" smtClean="0"/>
-              <a:pPr/>
-              <a:t>24</a:t>
-            </a:fld>
-            <a:endParaRPr lang="en-US"/>
-          </a:p>
-        </p:txBody>
-      </p:sp>
-    </p:spTree>
-    <p:extLst>
-      <p:ext uri="{BB962C8B-B14F-4D97-AF65-F5344CB8AC3E}">
-        <p14:creationId xmlns:p14="http://schemas.microsoft.com/office/powerpoint/2010/main" val="2375245855"/>
       </p:ext>
     </p:extLst>
   </p:cSld>
@@ -9746,6 +9680,275 @@
           <p:cNvPr id="2" name="Title 1">
             <a:extLst>
               <a:ext uri="{FF2B5EF4-FFF2-40B4-BE49-F238E27FC236}">
+                <a16:creationId xmlns:a16="http://schemas.microsoft.com/office/drawing/2014/main" id="{061016C8-512C-EB4B-9D32-9CF4CB9D4F11}"/>
+              </a:ext>
+            </a:extLst>
+          </p:cNvPr>
+          <p:cNvSpPr>
+            <a:spLocks noGrp="1"/>
+          </p:cNvSpPr>
+          <p:nvPr>
+            <p:ph type="title"/>
+          </p:nvPr>
+        </p:nvSpPr>
+        <p:spPr/>
+        <p:txBody>
+          <a:bodyPr/>
+          <a:lstStyle/>
+          <a:p>
+            <a:r>
+              <a:rPr lang="de-DE" dirty="0"/>
+              <a:t>Bonus: </a:t>
+            </a:r>
+            <a:r>
+              <a:rPr lang="en-CH"/>
+              <a:t>Security</a:t>
+            </a:r>
+            <a:endParaRPr lang="en-CH" dirty="0"/>
+          </a:p>
+        </p:txBody>
+      </p:sp>
+      <p:sp>
+        <p:nvSpPr>
+          <p:cNvPr id="3" name="Content Placeholder 2">
+            <a:extLst>
+              <a:ext uri="{FF2B5EF4-FFF2-40B4-BE49-F238E27FC236}">
+                <a16:creationId xmlns:a16="http://schemas.microsoft.com/office/drawing/2014/main" id="{463079FE-7331-C647-815D-07795DC7ED3D}"/>
+              </a:ext>
+            </a:extLst>
+          </p:cNvPr>
+          <p:cNvSpPr>
+            <a:spLocks noGrp="1"/>
+          </p:cNvSpPr>
+          <p:nvPr>
+            <p:ph idx="1"/>
+          </p:nvPr>
+        </p:nvSpPr>
+        <p:spPr>
+          <a:xfrm>
+            <a:off x="1981200" y="1412776"/>
+            <a:ext cx="8229600" cy="4744184"/>
+          </a:xfrm>
+        </p:spPr>
+        <p:txBody>
+          <a:bodyPr>
+            <a:normAutofit/>
+          </a:bodyPr>
+          <a:lstStyle/>
+          <a:p>
+            <a:r>
+              <a:rPr lang="en-CH"/>
+              <a:t>Secrets </a:t>
+            </a:r>
+            <a:r>
+              <a:rPr lang="en-CH" dirty="0"/>
+              <a:t>in GitHub actions can be added </a:t>
+            </a:r>
+            <a:r>
+              <a:rPr lang="en-CH"/>
+              <a:t>under </a:t>
+            </a:r>
+            <a:br>
+              <a:rPr lang="de-DE" dirty="0"/>
+            </a:br>
+            <a:r>
+              <a:rPr lang="en-CH">
+                <a:latin typeface="Courier New" panose="02070309020205020404" pitchFamily="49" charset="0"/>
+                <a:cs typeface="Courier New" panose="02070309020205020404" pitchFamily="49" charset="0"/>
+              </a:rPr>
+              <a:t>Settings </a:t>
+            </a:r>
+            <a:r>
+              <a:rPr lang="de-DE" dirty="0">
+                <a:latin typeface="Courier New" panose="02070309020205020404" pitchFamily="49" charset="0"/>
+                <a:cs typeface="Courier New" panose="02070309020205020404" pitchFamily="49" charset="0"/>
+              </a:rPr>
+              <a:t>-</a:t>
+            </a:r>
+            <a:r>
+              <a:rPr lang="en-CH">
+                <a:latin typeface="Courier New" panose="02070309020205020404" pitchFamily="49" charset="0"/>
+                <a:cs typeface="Courier New" panose="02070309020205020404" pitchFamily="49" charset="0"/>
+              </a:rPr>
+              <a:t>&gt; </a:t>
+            </a:r>
+            <a:r>
+              <a:rPr lang="en-CH" dirty="0">
+                <a:latin typeface="Courier New" panose="02070309020205020404" pitchFamily="49" charset="0"/>
+                <a:cs typeface="Courier New" panose="02070309020205020404" pitchFamily="49" charset="0"/>
+              </a:rPr>
+              <a:t>Secrets</a:t>
+            </a:r>
+            <a:r>
+              <a:rPr lang="en-CH" dirty="0"/>
+              <a:t>.  The secret is stored encrypted by GitHub, and decrypted at the moment of running the workflow</a:t>
+            </a:r>
+          </a:p>
+          <a:p>
+            <a:r>
+              <a:rPr lang="en-CH" dirty="0"/>
+              <a:t>Secrets can then be referred to in the workflow as</a:t>
+            </a:r>
+            <a:br>
+              <a:rPr lang="en-CH" dirty="0"/>
+            </a:br>
+            <a:endParaRPr lang="en-CH" dirty="0"/>
+          </a:p>
+        </p:txBody>
+      </p:sp>
+      <p:sp>
+        <p:nvSpPr>
+          <p:cNvPr id="4" name="Date Placeholder 3">
+            <a:extLst>
+              <a:ext uri="{FF2B5EF4-FFF2-40B4-BE49-F238E27FC236}">
+                <a16:creationId xmlns:a16="http://schemas.microsoft.com/office/drawing/2014/main" id="{9EE323CB-7E09-7C4F-B160-F4B2E2E319F3}"/>
+              </a:ext>
+            </a:extLst>
+          </p:cNvPr>
+          <p:cNvSpPr>
+            <a:spLocks noGrp="1"/>
+          </p:cNvSpPr>
+          <p:nvPr>
+            <p:ph type="dt" sz="half" idx="10"/>
+          </p:nvPr>
+        </p:nvSpPr>
+        <p:spPr/>
+        <p:txBody>
+          <a:bodyPr/>
+          <a:lstStyle/>
+          <a:p>
+            <a:r>
+              <a:rPr lang="de-CH" sz="1000"/>
+              <a:t>August 2023, CC BY-SA 4.0</a:t>
+            </a:r>
+            <a:endParaRPr lang="en-US" sz="1000" dirty="0"/>
+          </a:p>
+        </p:txBody>
+      </p:sp>
+      <p:sp>
+        <p:nvSpPr>
+          <p:cNvPr id="5" name="Footer Placeholder 4">
+            <a:extLst>
+              <a:ext uri="{FF2B5EF4-FFF2-40B4-BE49-F238E27FC236}">
+                <a16:creationId xmlns:a16="http://schemas.microsoft.com/office/drawing/2014/main" id="{3453E2C3-64E5-E44E-8FAB-45D4F29AD119}"/>
+              </a:ext>
+            </a:extLst>
+          </p:cNvPr>
+          <p:cNvSpPr>
+            <a:spLocks noGrp="1"/>
+          </p:cNvSpPr>
+          <p:nvPr>
+            <p:ph type="ftr" sz="quarter" idx="11"/>
+          </p:nvPr>
+        </p:nvSpPr>
+        <p:spPr/>
+        <p:txBody>
+          <a:bodyPr/>
+          <a:lstStyle/>
+          <a:p>
+            <a:r>
+              <a:rPr lang="en-US"/>
+              <a:t>Continuous integration, v4.0</a:t>
+            </a:r>
+            <a:endParaRPr lang="en-US" dirty="0"/>
+          </a:p>
+        </p:txBody>
+      </p:sp>
+      <p:pic>
+        <p:nvPicPr>
+          <p:cNvPr id="6" name="Picture 5">
+            <a:extLst>
+              <a:ext uri="{FF2B5EF4-FFF2-40B4-BE49-F238E27FC236}">
+                <a16:creationId xmlns:a16="http://schemas.microsoft.com/office/drawing/2014/main" id="{6160D76E-090E-DD4A-92D3-5E3DA427B157}"/>
+              </a:ext>
+            </a:extLst>
+          </p:cNvPr>
+          <p:cNvPicPr>
+            <a:picLocks noChangeAspect="1"/>
+          </p:cNvPicPr>
+          <p:nvPr/>
+        </p:nvPicPr>
+        <p:blipFill>
+          <a:blip r:embed="rId2"/>
+          <a:stretch>
+            <a:fillRect/>
+          </a:stretch>
+        </p:blipFill>
+        <p:spPr>
+          <a:xfrm>
+            <a:off x="3143672" y="3789040"/>
+            <a:ext cx="5643482" cy="1800200"/>
+          </a:xfrm>
+          <a:prstGeom prst="rect">
+            <a:avLst/>
+          </a:prstGeom>
+        </p:spPr>
+      </p:pic>
+      <p:sp>
+        <p:nvSpPr>
+          <p:cNvPr id="7" name="Slide Number Placeholder 6">
+            <a:extLst>
+              <a:ext uri="{FF2B5EF4-FFF2-40B4-BE49-F238E27FC236}">
+                <a16:creationId xmlns:a16="http://schemas.microsoft.com/office/drawing/2014/main" id="{3F872150-F1C8-D16D-5401-B703854D69D1}"/>
+              </a:ext>
+            </a:extLst>
+          </p:cNvPr>
+          <p:cNvSpPr>
+            <a:spLocks noGrp="1"/>
+          </p:cNvSpPr>
+          <p:nvPr>
+            <p:ph type="sldNum" sz="quarter" idx="12"/>
+          </p:nvPr>
+        </p:nvSpPr>
+        <p:spPr/>
+        <p:txBody>
+          <a:bodyPr/>
+          <a:lstStyle/>
+          <a:p>
+            <a:fld id="{EF79ADEA-B933-47CC-A4E9-04E6298B917C}" type="slidenum">
+              <a:rPr lang="en-US" smtClean="0"/>
+              <a:pPr/>
+              <a:t>25</a:t>
+            </a:fld>
+            <a:endParaRPr lang="en-US"/>
+          </a:p>
+        </p:txBody>
+      </p:sp>
+    </p:spTree>
+    <p:extLst>
+      <p:ext uri="{BB962C8B-B14F-4D97-AF65-F5344CB8AC3E}">
+        <p14:creationId xmlns:p14="http://schemas.microsoft.com/office/powerpoint/2010/main" val="2375245855"/>
+      </p:ext>
+    </p:extLst>
+  </p:cSld>
+  <p:clrMapOvr>
+    <a:masterClrMapping/>
+  </p:clrMapOvr>
+</p:sld>
+</file>
+
+<file path=ppt/slides/slide26.xml><?xml version="1.0" encoding="utf-8"?>
+<p:sld xmlns:a="http://schemas.openxmlformats.org/drawingml/2006/main" xmlns:r="http://schemas.openxmlformats.org/officeDocument/2006/relationships" xmlns:p="http://schemas.openxmlformats.org/presentationml/2006/main" show="0">
+  <p:cSld>
+    <p:spTree>
+      <p:nvGrpSpPr>
+        <p:cNvPr id="1" name=""/>
+        <p:cNvGrpSpPr/>
+        <p:nvPr/>
+      </p:nvGrpSpPr>
+      <p:grpSpPr>
+        <a:xfrm>
+          <a:off x="0" y="0"/>
+          <a:ext cx="0" cy="0"/>
+          <a:chOff x="0" y="0"/>
+          <a:chExt cx="0" cy="0"/>
+        </a:xfrm>
+      </p:grpSpPr>
+      <p:sp>
+        <p:nvSpPr>
+          <p:cNvPr id="2" name="Title 1">
+            <a:extLst>
+              <a:ext uri="{FF2B5EF4-FFF2-40B4-BE49-F238E27FC236}">
                 <a16:creationId xmlns:a16="http://schemas.microsoft.com/office/drawing/2014/main" id="{D85EDF41-0FBB-5548-8206-29D15F1E1334}"/>
               </a:ext>
             </a:extLst>
@@ -10137,7 +10340,7 @@
             <a:fld id="{EF79ADEA-B933-47CC-A4E9-04E6298B917C}" type="slidenum">
               <a:rPr lang="en-US" smtClean="0"/>
               <a:pPr/>
-              <a:t>25</a:t>
+              <a:t>26</a:t>
             </a:fld>
             <a:endParaRPr lang="en-US"/>
           </a:p>
@@ -11474,7 +11677,7 @@
           <p:cNvPr id="2" name="Title 1">
             <a:extLst>
               <a:ext uri="{FF2B5EF4-FFF2-40B4-BE49-F238E27FC236}">
-                <a16:creationId xmlns:a16="http://schemas.microsoft.com/office/drawing/2014/main" id="{0209F7B9-B500-6A48-B3AA-7D5C6DC44CB2}"/>
+                <a16:creationId xmlns:a16="http://schemas.microsoft.com/office/drawing/2014/main" id="{7E1CDB04-5B12-2113-30D7-EBBED79C22EC}"/>
               </a:ext>
             </a:extLst>
           </p:cNvPr>
@@ -11485,57 +11688,43 @@
             <p:ph type="title"/>
           </p:nvPr>
         </p:nvSpPr>
-        <p:spPr/>
-        <p:txBody>
-          <a:bodyPr/>
-          <a:lstStyle/>
-          <a:p>
-            <a:r>
-              <a:rPr lang="en-CH" dirty="0"/>
-              <a:t>Conclusions</a:t>
-            </a:r>
-          </a:p>
-        </p:txBody>
-      </p:sp>
-      <p:sp>
-        <p:nvSpPr>
-          <p:cNvPr id="3" name="Content Placeholder 2">
-            <a:extLst>
-              <a:ext uri="{FF2B5EF4-FFF2-40B4-BE49-F238E27FC236}">
-                <a16:creationId xmlns:a16="http://schemas.microsoft.com/office/drawing/2014/main" id="{B483744F-BEF5-0B46-9B81-355BEB76BA2A}"/>
-              </a:ext>
-            </a:extLst>
-          </p:cNvPr>
-          <p:cNvSpPr>
-            <a:spLocks noGrp="1"/>
-          </p:cNvSpPr>
-          <p:nvPr>
-            <p:ph idx="1"/>
-          </p:nvPr>
-        </p:nvSpPr>
-        <p:spPr/>
-        <p:txBody>
-          <a:bodyPr/>
-          <a:lstStyle/>
-          <a:p>
-            <a:r>
-              <a:rPr lang="en-CH" dirty="0"/>
-              <a:t>It takes a bit of time to set up and debug a Continuous Integration workflow, but it’s a good investment that can save you a lot </a:t>
-            </a:r>
-            <a:r>
-              <a:rPr lang="en-CH"/>
-              <a:t>of time later on!</a:t>
-            </a:r>
-            <a:endParaRPr lang="en-CH" dirty="0"/>
-          </a:p>
-        </p:txBody>
-      </p:sp>
-      <p:sp>
-        <p:nvSpPr>
-          <p:cNvPr id="4" name="Date Placeholder 3">
-            <a:extLst>
-              <a:ext uri="{FF2B5EF4-FFF2-40B4-BE49-F238E27FC236}">
-                <a16:creationId xmlns:a16="http://schemas.microsoft.com/office/drawing/2014/main" id="{C03D37C7-B59B-1048-A802-78F6FA69F6C7}"/>
+        <p:spPr>
+          <a:xfrm>
+            <a:off x="983432" y="2636912"/>
+            <a:ext cx="8787408" cy="831627"/>
+          </a:xfrm>
+        </p:spPr>
+        <p:txBody>
+          <a:bodyPr>
+            <a:normAutofit fontScale="90000"/>
+          </a:bodyPr>
+          <a:lstStyle/>
+          <a:p>
+            <a:br>
+              <a:rPr lang="en-GB" sz="2800" dirty="0">
+                <a:hlinkClick r:id="rId2"/>
+              </a:rPr>
+            </a:br>
+            <a:r>
+              <a:rPr lang="en-GB" sz="2800" dirty="0">
+                <a:hlinkClick r:id="rId2"/>
+              </a:rPr>
+              <a:t>https://github.com/lschwetlick/ASPP_testing_project_ci</a:t>
+            </a:r>
+            <a:r>
+              <a:rPr lang="en-GB" sz="2800" dirty="0"/>
+              <a:t> </a:t>
+            </a:r>
+            <a:endParaRPr lang="en-DE" sz="2800" dirty="0"/>
+          </a:p>
+        </p:txBody>
+      </p:sp>
+      <p:sp>
+        <p:nvSpPr>
+          <p:cNvPr id="3" name="Date Placeholder 2">
+            <a:extLst>
+              <a:ext uri="{FF2B5EF4-FFF2-40B4-BE49-F238E27FC236}">
+                <a16:creationId xmlns:a16="http://schemas.microsoft.com/office/drawing/2014/main" id="{3EC39654-5AFB-D589-B7DA-26F8E517C558}"/>
               </a:ext>
             </a:extLst>
           </p:cNvPr>
@@ -11552,19 +11741,19 @@
           <a:lstStyle/>
           <a:p>
             <a:r>
-              <a:rPr lang="de-CH" sz="1000"/>
+              <a:rPr lang="de-CH"/>
               <a:t>August 2023, CC BY-SA 4.0</a:t>
             </a:r>
-            <a:endParaRPr lang="en-US" sz="1000" dirty="0"/>
-          </a:p>
-        </p:txBody>
-      </p:sp>
-      <p:sp>
-        <p:nvSpPr>
-          <p:cNvPr id="5" name="Footer Placeholder 4">
-            <a:extLst>
-              <a:ext uri="{FF2B5EF4-FFF2-40B4-BE49-F238E27FC236}">
-                <a16:creationId xmlns:a16="http://schemas.microsoft.com/office/drawing/2014/main" id="{DB93DB5F-4A03-CA44-A54B-D5F34E39E00B}"/>
+            <a:endParaRPr lang="en-US"/>
+          </a:p>
+        </p:txBody>
+      </p:sp>
+      <p:sp>
+        <p:nvSpPr>
+          <p:cNvPr id="4" name="Footer Placeholder 3">
+            <a:extLst>
+              <a:ext uri="{FF2B5EF4-FFF2-40B4-BE49-F238E27FC236}">
+                <a16:creationId xmlns:a16="http://schemas.microsoft.com/office/drawing/2014/main" id="{851FEB0A-E68B-473B-7B14-7553FB65880A}"/>
               </a:ext>
             </a:extLst>
           </p:cNvPr>
@@ -11584,52 +11773,15 @@
               <a:rPr lang="en-US"/>
               <a:t>Continuous integration, v4.0</a:t>
             </a:r>
-            <a:endParaRPr lang="en-US" dirty="0"/>
-          </a:p>
-        </p:txBody>
-      </p:sp>
-      <p:pic>
-        <p:nvPicPr>
-          <p:cNvPr id="7" name="Picture 6" descr="A picture containing metalware, gear, white&#10;&#10;Description automatically generated">
-            <a:extLst>
-              <a:ext uri="{FF2B5EF4-FFF2-40B4-BE49-F238E27FC236}">
-                <a16:creationId xmlns:a16="http://schemas.microsoft.com/office/drawing/2014/main" id="{1C8CF780-D6FA-BB4C-A576-417D77749A00}"/>
-              </a:ext>
-            </a:extLst>
-          </p:cNvPr>
-          <p:cNvPicPr>
-            <a:picLocks noChangeAspect="1"/>
-          </p:cNvPicPr>
-          <p:nvPr/>
-        </p:nvPicPr>
-        <p:blipFill>
-          <a:blip r:embed="rId2">
-            <a:extLst>
-              <a:ext uri="{28A0092B-C50C-407E-A947-70E740481C1C}">
-                <a14:useLocalDpi xmlns:a14="http://schemas.microsoft.com/office/drawing/2010/main" val="0"/>
-              </a:ext>
-            </a:extLst>
-          </a:blip>
-          <a:stretch>
-            <a:fillRect/>
-          </a:stretch>
-        </p:blipFill>
-        <p:spPr>
-          <a:xfrm rot="16200000">
-            <a:off x="7481585" y="3157241"/>
-            <a:ext cx="3830908" cy="2567310"/>
-          </a:xfrm>
-          <a:prstGeom prst="rect">
-            <a:avLst/>
-          </a:prstGeom>
-        </p:spPr>
-      </p:pic>
-      <p:sp>
-        <p:nvSpPr>
-          <p:cNvPr id="6" name="Slide Number Placeholder 5">
-            <a:extLst>
-              <a:ext uri="{FF2B5EF4-FFF2-40B4-BE49-F238E27FC236}">
-                <a16:creationId xmlns:a16="http://schemas.microsoft.com/office/drawing/2014/main" id="{5DEDE8BE-6A16-9CF5-AAB2-D916CF912B21}"/>
+          </a:p>
+        </p:txBody>
+      </p:sp>
+      <p:sp>
+        <p:nvSpPr>
+          <p:cNvPr id="5" name="Slide Number Placeholder 4">
+            <a:extLst>
+              <a:ext uri="{FF2B5EF4-FFF2-40B4-BE49-F238E27FC236}">
+                <a16:creationId xmlns:a16="http://schemas.microsoft.com/office/drawing/2014/main" id="{F7B9CD3F-DFF7-FB39-4B55-37BE41A85EE5}"/>
               </a:ext>
             </a:extLst>
           </p:cNvPr>
@@ -11654,10 +11806,77 @@
           </a:p>
         </p:txBody>
       </p:sp>
+      <p:sp>
+        <p:nvSpPr>
+          <p:cNvPr id="6" name="TextBox 5">
+            <a:extLst>
+              <a:ext uri="{FF2B5EF4-FFF2-40B4-BE49-F238E27FC236}">
+                <a16:creationId xmlns:a16="http://schemas.microsoft.com/office/drawing/2014/main" id="{0C5A5ECF-F835-930D-3243-82F088989FA0}"/>
+              </a:ext>
+            </a:extLst>
+          </p:cNvPr>
+          <p:cNvSpPr txBox="1"/>
+          <p:nvPr/>
+        </p:nvSpPr>
+        <p:spPr>
+          <a:xfrm>
+            <a:off x="4913906" y="2719346"/>
+            <a:ext cx="184731" cy="369332"/>
+          </a:xfrm>
+          <a:prstGeom prst="rect">
+            <a:avLst/>
+          </a:prstGeom>
+          <a:noFill/>
+        </p:spPr>
+        <p:txBody>
+          <a:bodyPr wrap="none" rtlCol="0">
+            <a:spAutoFit/>
+          </a:bodyPr>
+          <a:lstStyle/>
+          <a:p>
+            <a:endParaRPr lang="en-DE" dirty="0"/>
+          </a:p>
+        </p:txBody>
+      </p:sp>
+      <p:sp>
+        <p:nvSpPr>
+          <p:cNvPr id="7" name="TextBox 6">
+            <a:extLst>
+              <a:ext uri="{FF2B5EF4-FFF2-40B4-BE49-F238E27FC236}">
+                <a16:creationId xmlns:a16="http://schemas.microsoft.com/office/drawing/2014/main" id="{26AEC2FB-2E92-52B4-796F-3E7C25AC2A14}"/>
+              </a:ext>
+            </a:extLst>
+          </p:cNvPr>
+          <p:cNvSpPr txBox="1"/>
+          <p:nvPr/>
+        </p:nvSpPr>
+        <p:spPr>
+          <a:xfrm>
+            <a:off x="3503712" y="2132856"/>
+            <a:ext cx="2305439" cy="707886"/>
+          </a:xfrm>
+          <a:prstGeom prst="rect">
+            <a:avLst/>
+          </a:prstGeom>
+          <a:noFill/>
+        </p:spPr>
+        <p:txBody>
+          <a:bodyPr wrap="none" rtlCol="0">
+            <a:spAutoFit/>
+          </a:bodyPr>
+          <a:lstStyle/>
+          <a:p>
+            <a:r>
+              <a:rPr lang="en-DE" sz="4000" dirty="0"/>
+              <a:t>EXAMPLE:</a:t>
+            </a:r>
+          </a:p>
+        </p:txBody>
+      </p:sp>
     </p:spTree>
     <p:extLst>
       <p:ext uri="{BB962C8B-B14F-4D97-AF65-F5344CB8AC3E}">
-        <p14:creationId xmlns:p14="http://schemas.microsoft.com/office/powerpoint/2010/main" val="202595180"/>
+        <p14:creationId xmlns:p14="http://schemas.microsoft.com/office/powerpoint/2010/main" val="3985310547"/>
       </p:ext>
     </p:extLst>
   </p:cSld>
@@ -11686,7 +11905,13 @@
       </p:grpSpPr>
       <p:sp>
         <p:nvSpPr>
-          <p:cNvPr id="6" name="Title 5"/>
+          <p:cNvPr id="2" name="Title 1">
+            <a:extLst>
+              <a:ext uri="{FF2B5EF4-FFF2-40B4-BE49-F238E27FC236}">
+                <a16:creationId xmlns:a16="http://schemas.microsoft.com/office/drawing/2014/main" id="{0209F7B9-B500-6A48-B3AA-7D5C6DC44CB2}"/>
+              </a:ext>
+            </a:extLst>
+          </p:cNvPr>
           <p:cNvSpPr>
             <a:spLocks noGrp="1"/>
           </p:cNvSpPr>
@@ -11696,21 +11921,58 @@
         </p:nvSpPr>
         <p:spPr/>
         <p:txBody>
-          <a:bodyPr>
-            <a:normAutofit/>
-          </a:bodyPr>
-          <a:lstStyle/>
-          <a:p>
-            <a:r>
-              <a:rPr lang="en-US" dirty="0"/>
-              <a:t>Recommended reading</a:t>
-            </a:r>
-          </a:p>
-        </p:txBody>
-      </p:sp>
-      <p:sp>
-        <p:nvSpPr>
-          <p:cNvPr id="2" name="Date Placeholder 1"/>
+          <a:bodyPr/>
+          <a:lstStyle/>
+          <a:p>
+            <a:r>
+              <a:rPr lang="en-CH" dirty="0"/>
+              <a:t>Conclusions</a:t>
+            </a:r>
+          </a:p>
+        </p:txBody>
+      </p:sp>
+      <p:sp>
+        <p:nvSpPr>
+          <p:cNvPr id="3" name="Content Placeholder 2">
+            <a:extLst>
+              <a:ext uri="{FF2B5EF4-FFF2-40B4-BE49-F238E27FC236}">
+                <a16:creationId xmlns:a16="http://schemas.microsoft.com/office/drawing/2014/main" id="{B483744F-BEF5-0B46-9B81-355BEB76BA2A}"/>
+              </a:ext>
+            </a:extLst>
+          </p:cNvPr>
+          <p:cNvSpPr>
+            <a:spLocks noGrp="1"/>
+          </p:cNvSpPr>
+          <p:nvPr>
+            <p:ph idx="1"/>
+          </p:nvPr>
+        </p:nvSpPr>
+        <p:spPr/>
+        <p:txBody>
+          <a:bodyPr/>
+          <a:lstStyle/>
+          <a:p>
+            <a:r>
+              <a:rPr lang="en-CH" dirty="0"/>
+              <a:t>It takes a bit of time to set up and debug a Continuous Integration workflow, but it’s a good investment that can save you a lot </a:t>
+            </a:r>
+            <a:r>
+              <a:rPr lang="en-CH"/>
+              <a:t>of time later on!</a:t>
+            </a:r>
+            <a:endParaRPr lang="en-CH" dirty="0"/>
+          </a:p>
+        </p:txBody>
+      </p:sp>
+      <p:sp>
+        <p:nvSpPr>
+          <p:cNvPr id="4" name="Date Placeholder 3">
+            <a:extLst>
+              <a:ext uri="{FF2B5EF4-FFF2-40B4-BE49-F238E27FC236}">
+                <a16:creationId xmlns:a16="http://schemas.microsoft.com/office/drawing/2014/main" id="{C03D37C7-B59B-1048-A802-78F6FA69F6C7}"/>
+              </a:ext>
+            </a:extLst>
+          </p:cNvPr>
           <p:cNvSpPr>
             <a:spLocks noGrp="1"/>
           </p:cNvSpPr>
@@ -11724,16 +11986,22 @@
           <a:lstStyle/>
           <a:p>
             <a:r>
-              <a:rPr lang="de-CH"/>
+              <a:rPr lang="de-CH" sz="1000"/>
               <a:t>August 2023, CC BY-SA 4.0</a:t>
             </a:r>
-            <a:endParaRPr lang="en-US"/>
-          </a:p>
-        </p:txBody>
-      </p:sp>
-      <p:sp>
-        <p:nvSpPr>
-          <p:cNvPr id="3" name="Footer Placeholder 2"/>
+            <a:endParaRPr lang="en-US" sz="1000" dirty="0"/>
+          </a:p>
+        </p:txBody>
+      </p:sp>
+      <p:sp>
+        <p:nvSpPr>
+          <p:cNvPr id="5" name="Footer Placeholder 4">
+            <a:extLst>
+              <a:ext uri="{FF2B5EF4-FFF2-40B4-BE49-F238E27FC236}">
+                <a16:creationId xmlns:a16="http://schemas.microsoft.com/office/drawing/2014/main" id="{DB93DB5F-4A03-CA44-A54B-D5F34E39E00B}"/>
+              </a:ext>
+            </a:extLst>
+          </p:cNvPr>
           <p:cNvSpPr>
             <a:spLocks noGrp="1"/>
           </p:cNvSpPr>
@@ -11750,87 +12018,52 @@
               <a:rPr lang="en-US"/>
               <a:t>Continuous integration, v4.0</a:t>
             </a:r>
+            <a:endParaRPr lang="en-US" dirty="0"/>
           </a:p>
         </p:txBody>
       </p:sp>
       <p:pic>
         <p:nvPicPr>
-          <p:cNvPr id="9" name="Picture 8"/>
+          <p:cNvPr id="7" name="Picture 6" descr="A picture containing metalware, gear, white&#10;&#10;Description automatically generated">
+            <a:extLst>
+              <a:ext uri="{FF2B5EF4-FFF2-40B4-BE49-F238E27FC236}">
+                <a16:creationId xmlns:a16="http://schemas.microsoft.com/office/drawing/2014/main" id="{1C8CF780-D6FA-BB4C-A576-417D77749A00}"/>
+              </a:ext>
+            </a:extLst>
+          </p:cNvPr>
           <p:cNvPicPr>
             <a:picLocks noChangeAspect="1"/>
           </p:cNvPicPr>
           <p:nvPr/>
         </p:nvPicPr>
         <p:blipFill>
-          <a:blip r:embed="rId2"/>
+          <a:blip r:embed="rId2">
+            <a:extLst>
+              <a:ext uri="{28A0092B-C50C-407E-A947-70E740481C1C}">
+                <a14:useLocalDpi xmlns:a14="http://schemas.microsoft.com/office/drawing/2010/main" val="0"/>
+              </a:ext>
+            </a:extLst>
+          </a:blip>
           <a:stretch>
             <a:fillRect/>
           </a:stretch>
         </p:blipFill>
         <p:spPr>
-          <a:xfrm>
-            <a:off x="2351585" y="2132856"/>
-            <a:ext cx="2352367" cy="2952328"/>
+          <a:xfrm rot="16200000">
+            <a:off x="7481585" y="3157241"/>
+            <a:ext cx="3830908" cy="2567310"/>
           </a:xfrm>
           <a:prstGeom prst="rect">
             <a:avLst/>
           </a:prstGeom>
         </p:spPr>
       </p:pic>
-      <p:pic>
-        <p:nvPicPr>
-          <p:cNvPr id="10" name="Picture 9"/>
-          <p:cNvPicPr>
-            <a:picLocks noChangeAspect="1"/>
-          </p:cNvPicPr>
-          <p:nvPr/>
-        </p:nvPicPr>
-        <p:blipFill>
-          <a:blip r:embed="rId3"/>
-          <a:stretch>
-            <a:fillRect/>
-          </a:stretch>
-        </p:blipFill>
-        <p:spPr>
-          <a:xfrm>
-            <a:off x="5015880" y="2132856"/>
-            <a:ext cx="2355484" cy="2952328"/>
-          </a:xfrm>
-          <a:prstGeom prst="rect">
-            <a:avLst/>
-          </a:prstGeom>
-        </p:spPr>
-      </p:pic>
-      <p:pic>
-        <p:nvPicPr>
-          <p:cNvPr id="11" name="Picture 10"/>
-          <p:cNvPicPr>
-            <a:picLocks noChangeAspect="1"/>
-          </p:cNvPicPr>
-          <p:nvPr/>
-        </p:nvPicPr>
-        <p:blipFill>
-          <a:blip r:embed="rId4"/>
-          <a:stretch>
-            <a:fillRect/>
-          </a:stretch>
-        </p:blipFill>
-        <p:spPr>
-          <a:xfrm>
-            <a:off x="7680177" y="2132856"/>
-            <a:ext cx="2273475" cy="2952328"/>
-          </a:xfrm>
-          <a:prstGeom prst="rect">
-            <a:avLst/>
-          </a:prstGeom>
-        </p:spPr>
-      </p:pic>
-      <p:sp>
-        <p:nvSpPr>
-          <p:cNvPr id="4" name="Slide Number Placeholder 3">
-            <a:extLst>
-              <a:ext uri="{FF2B5EF4-FFF2-40B4-BE49-F238E27FC236}">
-                <a16:creationId xmlns:a16="http://schemas.microsoft.com/office/drawing/2014/main" id="{FEFFB0F3-FEA9-0348-6B4A-F74170B41898}"/>
+      <p:sp>
+        <p:nvSpPr>
+          <p:cNvPr id="6" name="Slide Number Placeholder 5">
+            <a:extLst>
+              <a:ext uri="{FF2B5EF4-FFF2-40B4-BE49-F238E27FC236}">
+                <a16:creationId xmlns:a16="http://schemas.microsoft.com/office/drawing/2014/main" id="{5DEDE8BE-6A16-9CF5-AAB2-D916CF912B21}"/>
               </a:ext>
             </a:extLst>
           </p:cNvPr>
@@ -11858,7 +12091,7 @@
     </p:spTree>
     <p:extLst>
       <p:ext uri="{BB962C8B-B14F-4D97-AF65-F5344CB8AC3E}">
-        <p14:creationId xmlns:p14="http://schemas.microsoft.com/office/powerpoint/2010/main" val="554997526"/>
+        <p14:creationId xmlns:p14="http://schemas.microsoft.com/office/powerpoint/2010/main" val="202595180"/>
       </p:ext>
     </p:extLst>
   </p:cSld>

</xml_diff>